<commit_message>
Updated HPC slides and lab
</commit_message>
<xml_diff>
--- a/Workshop/6. HPC and Containers/HPC and Azure Container Service.pptx
+++ b/Workshop/6. HPC and Containers/HPC and Azure Container Service.pptx
@@ -6,29 +6,31 @@
     <p:sldMasterId id="2147483663" r:id="rId2"/>
   </p:sldMasterIdLst>
   <p:notesMasterIdLst>
-    <p:notesMasterId r:id="rId23"/>
+    <p:notesMasterId r:id="rId25"/>
   </p:notesMasterIdLst>
   <p:sldIdLst>
     <p:sldId id="256" r:id="rId3"/>
-    <p:sldId id="321" r:id="rId4"/>
-    <p:sldId id="318" r:id="rId5"/>
-    <p:sldId id="319" r:id="rId6"/>
-    <p:sldId id="320" r:id="rId7"/>
-    <p:sldId id="304" r:id="rId8"/>
-    <p:sldId id="322" r:id="rId9"/>
-    <p:sldId id="305" r:id="rId10"/>
-    <p:sldId id="306" r:id="rId11"/>
-    <p:sldId id="307" r:id="rId12"/>
-    <p:sldId id="308" r:id="rId13"/>
-    <p:sldId id="314" r:id="rId14"/>
-    <p:sldId id="313" r:id="rId15"/>
-    <p:sldId id="315" r:id="rId16"/>
-    <p:sldId id="316" r:id="rId17"/>
-    <p:sldId id="309" r:id="rId18"/>
-    <p:sldId id="311" r:id="rId19"/>
-    <p:sldId id="317" r:id="rId20"/>
-    <p:sldId id="295" r:id="rId21"/>
-    <p:sldId id="299" r:id="rId22"/>
+    <p:sldId id="323" r:id="rId4"/>
+    <p:sldId id="324" r:id="rId5"/>
+    <p:sldId id="325" r:id="rId6"/>
+    <p:sldId id="318" r:id="rId7"/>
+    <p:sldId id="319" r:id="rId8"/>
+    <p:sldId id="320" r:id="rId9"/>
+    <p:sldId id="304" r:id="rId10"/>
+    <p:sldId id="322" r:id="rId11"/>
+    <p:sldId id="305" r:id="rId12"/>
+    <p:sldId id="306" r:id="rId13"/>
+    <p:sldId id="307" r:id="rId14"/>
+    <p:sldId id="308" r:id="rId15"/>
+    <p:sldId id="314" r:id="rId16"/>
+    <p:sldId id="313" r:id="rId17"/>
+    <p:sldId id="315" r:id="rId18"/>
+    <p:sldId id="316" r:id="rId19"/>
+    <p:sldId id="309" r:id="rId20"/>
+    <p:sldId id="311" r:id="rId21"/>
+    <p:sldId id="317" r:id="rId22"/>
+    <p:sldId id="295" r:id="rId23"/>
+    <p:sldId id="299" r:id="rId24"/>
   </p:sldIdLst>
   <p:sldSz cx="12192000" cy="6858000"/>
   <p:notesSz cx="6858000" cy="9144000"/>
@@ -217,7 +219,7 @@
           <a:p>
             <a:fld id="{49B60EF2-7028-489F-85D8-FE86CD7CF2A0}" type="datetimeFigureOut">
               <a:rPr lang="en-US" smtClean="0"/>
-              <a:t>10/24/2016</a:t>
+              <a:t>12/20/2016</a:t>
             </a:fld>
             <a:endParaRPr lang="en-US"/>
           </a:p>
@@ -613,22 +615,102 @@
           <a:lstStyle/>
           <a:p>
             <a:r>
+              <a:rPr lang="en-US" sz="1200" kern="1200" dirty="0" smtClean="0">
+                <a:solidFill>
+                  <a:schemeClr val="tx1"/>
+                </a:solidFill>
+                <a:effectLst/>
+                <a:latin typeface="+mn-lt"/>
+                <a:ea typeface="+mn-ea"/>
+                <a:cs typeface="+mn-cs"/>
+              </a:rPr>
+              <a:t>You can build deployment templates of your own, or you can use ones that have already been built. An assortment of templates built by the Azure team and by others in the community can be found on the Azure </a:t>
+            </a:r>
+            <a:r>
+              <a:rPr lang="en-US" sz="1200" kern="1200" dirty="0" err="1" smtClean="0">
+                <a:solidFill>
+                  <a:schemeClr val="tx1"/>
+                </a:solidFill>
+                <a:effectLst/>
+                <a:latin typeface="+mn-lt"/>
+                <a:ea typeface="+mn-ea"/>
+                <a:cs typeface="+mn-cs"/>
+              </a:rPr>
+              <a:t>Quickstart</a:t>
+            </a:r>
+            <a:r>
+              <a:rPr lang="en-US" sz="1200" kern="1200" dirty="0" smtClean="0">
+                <a:solidFill>
+                  <a:schemeClr val="tx1"/>
+                </a:solidFill>
+                <a:effectLst/>
+                <a:latin typeface="+mn-lt"/>
+                <a:ea typeface="+mn-ea"/>
+                <a:cs typeface="+mn-cs"/>
+              </a:rPr>
+              <a:t> Templates Web site or on GitHub. There are templates for creating clusters of Linux VMs, deploying </a:t>
+            </a:r>
+            <a:r>
+              <a:rPr lang="en-US" sz="1200" kern="1200" dirty="0" err="1" smtClean="0">
+                <a:solidFill>
+                  <a:schemeClr val="tx1"/>
+                </a:solidFill>
+                <a:effectLst/>
+                <a:latin typeface="+mn-lt"/>
+                <a:ea typeface="+mn-ea"/>
+                <a:cs typeface="+mn-cs"/>
+              </a:rPr>
+              <a:t>Redis</a:t>
+            </a:r>
+            <a:r>
+              <a:rPr lang="en-US" sz="1200" kern="1200" dirty="0" smtClean="0">
+                <a:solidFill>
+                  <a:schemeClr val="tx1"/>
+                </a:solidFill>
+                <a:effectLst/>
+                <a:latin typeface="+mn-lt"/>
+                <a:ea typeface="+mn-ea"/>
+                <a:cs typeface="+mn-cs"/>
+              </a:rPr>
+              <a:t> clusters of Ubuntu VMs, deploying MySQL servers, creating Windows VMs provisioned with IIS, and a whole lot more. There is even a template that deploys Minecraft Server in an Ubuntu VM.</a:t>
+            </a:r>
+          </a:p>
+          <a:p>
+            <a:r>
+              <a:rPr lang="en-US" sz="1200" kern="1200" dirty="0" smtClean="0">
+                <a:solidFill>
+                  <a:schemeClr val="tx1"/>
+                </a:solidFill>
+                <a:effectLst/>
+                <a:latin typeface="+mn-lt"/>
+                <a:ea typeface="+mn-ea"/>
+                <a:cs typeface="+mn-cs"/>
+              </a:rPr>
+              <a:t> </a:t>
+            </a:r>
+          </a:p>
+          <a:p>
+            <a:r>
+              <a:rPr lang="en-US" sz="1200" kern="1200" dirty="0" smtClean="0">
+                <a:solidFill>
+                  <a:schemeClr val="tx1"/>
+                </a:solidFill>
+                <a:effectLst/>
+                <a:latin typeface="+mn-lt"/>
+                <a:ea typeface="+mn-ea"/>
+                <a:cs typeface="+mn-cs"/>
+              </a:rPr>
+              <a:t>Using any of these templates requires nothing more than a button click. Each template comes with documentation that tells you what parameters it requires and whether the template was created by Microsoft or by someone in the community. Best of all, you can view each template’s source code, which is little more than a JSON script, and customize it to fit your needs or even build upon it to create templates of your own.</a:t>
+            </a:r>
+          </a:p>
+          <a:p>
+            <a:endParaRPr lang="en-US" dirty="0" smtClean="0"/>
+          </a:p>
+          <a:p>
+            <a:r>
               <a:rPr lang="en-US" dirty="0" smtClean="0"/>
-              <a:t>A</a:t>
-            </a:r>
-            <a:r>
-              <a:rPr lang="en-US" baseline="0" dirty="0" smtClean="0"/>
-              <a:t> virtual machine is -- well -- a virtualized machine created and managed by a hypervisor such as </a:t>
-            </a:r>
-            <a:r>
-              <a:rPr lang="en-US" baseline="0" dirty="0" err="1" smtClean="0"/>
-              <a:t>VirtualBox</a:t>
-            </a:r>
-            <a:r>
-              <a:rPr lang="en-US" baseline="0" dirty="0" smtClean="0"/>
-              <a:t> or Hyper-V. Even though a VM runs on a machine that has an operating system, each VM requires its own complete operating system, even if it's the same operating system as the host OS. VMs offer a very high degree of isolation, but at a cost: longer startup times, lower portability (ever tried to move a 127 GB virtual hard disk, or VHD, from one PC to another?), and higher memory requirements. Containers, by contrast, leverage the operating system that is already in place but offer nearly as much separation. RAM requirements are lower since the OS isn't being duplicated in each container, and cost is lower, too, because while cloud platforms typically charge for each VM, a single VM can host multiple container instances.</a:t>
-            </a:r>
-            <a:endParaRPr lang="en-US" dirty="0"/>
+              <a:t>The three templates pictured here are just a few of the many dozens of templates currently available.</a:t>
+            </a:r>
           </a:p>
         </p:txBody>
       </p:sp>
@@ -658,7 +740,7 @@
     </p:spTree>
     <p:extLst>
       <p:ext uri="{BB962C8B-B14F-4D97-AF65-F5344CB8AC3E}">
-        <p14:creationId xmlns:p14="http://schemas.microsoft.com/office/powerpoint/2010/main" val="3918904550"/>
+        <p14:creationId xmlns:p14="http://schemas.microsoft.com/office/powerpoint/2010/main" val="3998187520"/>
       </p:ext>
     </p:extLst>
   </p:cSld>
@@ -712,23 +794,27 @@
           <a:bodyPr/>
           <a:lstStyle/>
           <a:p>
+            <a:pPr marL="0" marR="0" indent="0" algn="l" defTabSz="914400" rtl="0" eaLnBrk="1" fontAlgn="auto" latinLnBrk="0" hangingPunct="1">
+              <a:lnSpc>
+                <a:spcPct val="100000"/>
+              </a:lnSpc>
+              <a:spcBef>
+                <a:spcPts val="0"/>
+              </a:spcBef>
+              <a:spcAft>
+                <a:spcPts val="0"/>
+              </a:spcAft>
+              <a:buClrTx/>
+              <a:buSzTx/>
+              <a:buFontTx/>
+              <a:buNone/>
+              <a:tabLst/>
+              <a:defRPr/>
+            </a:pPr>
             <a:r>
               <a:rPr lang="en-US" dirty="0" smtClean="0"/>
-              <a:t>Docker (www.docker.com) isn't the world's only containerization platform, but it is the most popular. It is free, open-source,</a:t>
-            </a:r>
-            <a:r>
-              <a:rPr lang="en-US" baseline="0" dirty="0" smtClean="0"/>
-              <a:t> and Linux-based, with Windows support (Windows Server 2016) in the works. </a:t>
-            </a:r>
-            <a:r>
-              <a:rPr lang="en-US" dirty="0" smtClean="0"/>
-              <a:t>It has earned massive</a:t>
-            </a:r>
-            <a:r>
-              <a:rPr lang="en-US" baseline="0" dirty="0" smtClean="0"/>
-              <a:t> mindshare in the developer community. And with Azure Container Service, you can deploy Docker containers to Azure with minimal effort. Moreover, Docker containers are easily moved between Azure and Amazon Web Services (AWS), affording developers portability between cloud platforms.</a:t>
-            </a:r>
-            <a:endParaRPr lang="en-US" dirty="0"/>
+              <a:t>The Simple Linux Utility for Resource Management (SLURM), also known as the SLURM Workload Manager, is a free and open-source job scheduler for Linux that excels at distributing heavy computing workloads across clusters of machines and processors. It is used on more than half of the world's largest supercomputers and High-Performance Computing (HPC) clusters, and it enjoys widespread use in the research community for jobs that require significant CPU resources.</a:t>
+            </a:r>
           </a:p>
         </p:txBody>
       </p:sp>
@@ -758,7 +844,7 @@
     </p:spTree>
     <p:extLst>
       <p:ext uri="{BB962C8B-B14F-4D97-AF65-F5344CB8AC3E}">
-        <p14:creationId xmlns:p14="http://schemas.microsoft.com/office/powerpoint/2010/main" val="4017007276"/>
+        <p14:creationId xmlns:p14="http://schemas.microsoft.com/office/powerpoint/2010/main" val="2236143850"/>
       </p:ext>
     </p:extLst>
   </p:cSld>
@@ -812,76 +898,23 @@
           <a:bodyPr/>
           <a:lstStyle/>
           <a:p>
-            <a:pPr marL="0" marR="0" lvl="0" indent="0" algn="l" defTabSz="914400" rtl="0" eaLnBrk="1" fontAlgn="auto" latinLnBrk="0" hangingPunct="1">
-              <a:lnSpc>
-                <a:spcPct val="100000"/>
-              </a:lnSpc>
-              <a:spcBef>
-                <a:spcPts val="0"/>
-              </a:spcBef>
-              <a:spcAft>
-                <a:spcPts val="0"/>
-              </a:spcAft>
-              <a:buClrTx/>
-              <a:buSzTx/>
-              <a:buFontTx/>
-              <a:buNone/>
-              <a:tabLst/>
-              <a:defRPr/>
-            </a:pPr>
             <a:r>
               <a:rPr lang="en-US" dirty="0" smtClean="0"/>
-              <a:t>Docker utilizes</a:t>
+              <a:t>A</a:t>
             </a:r>
             <a:r>
               <a:rPr lang="en-US" baseline="0" dirty="0" smtClean="0"/>
-              <a:t> a client-server architecture. You execute Docker commands through a Docker client such as the Docker CLI or </a:t>
+              <a:t> virtual machine is -- well -- a virtualized machine created and managed by a hypervisor such as </a:t>
             </a:r>
             <a:r>
               <a:rPr lang="en-US" baseline="0" dirty="0" err="1" smtClean="0"/>
-              <a:t>Kitematic</a:t>
+              <a:t>VirtualBox</a:t>
             </a:r>
             <a:r>
               <a:rPr lang="en-US" baseline="0" dirty="0" smtClean="0"/>
-              <a:t>. The client uses REST commands to communicate with the Docker daemon running on a Docker host such as the Azure Container services. These commands can be used to push, pull (</a:t>
-            </a:r>
-            <a:r>
-              <a:rPr lang="en-US" b="1" baseline="0" dirty="0" err="1" smtClean="0"/>
-              <a:t>docker</a:t>
-            </a:r>
-            <a:r>
-              <a:rPr lang="en-US" b="1" baseline="0" dirty="0" smtClean="0"/>
-              <a:t> pull</a:t>
-            </a:r>
-            <a:r>
-              <a:rPr lang="en-US" baseline="0" dirty="0" smtClean="0"/>
-              <a:t>), and create Docker images, to run them in containers, and to manage those containers. Images can be built with the </a:t>
-            </a:r>
-            <a:r>
-              <a:rPr lang="en-US" b="1" baseline="0" dirty="0" err="1" smtClean="0"/>
-              <a:t>docker</a:t>
-            </a:r>
-            <a:r>
-              <a:rPr lang="en-US" b="1" baseline="0" dirty="0" smtClean="0"/>
-              <a:t> build</a:t>
-            </a:r>
-            <a:r>
-              <a:rPr lang="en-US" baseline="0" dirty="0" smtClean="0"/>
-              <a:t> command, and they can be stand-alone, or they can "inherit" from other images. Images are stored in Docker registries, which can be public or private, local or remote. Docker Hub is a popular public registry that is managed by Docker; it contains a "huge collection" of images that anyone may use. The </a:t>
-            </a:r>
-            <a:r>
-              <a:rPr lang="en-US" b="1" baseline="0" dirty="0" err="1" smtClean="0"/>
-              <a:t>docker</a:t>
-            </a:r>
-            <a:r>
-              <a:rPr lang="en-US" b="1" baseline="0" dirty="0" smtClean="0"/>
-              <a:t> run</a:t>
-            </a:r>
-            <a:r>
-              <a:rPr lang="en-US" baseline="0" dirty="0" smtClean="0"/>
-              <a:t> command runs a container using an image as a template.</a:t>
-            </a:r>
-            <a:endParaRPr lang="en-US" dirty="0" smtClean="0"/>
+              <a:t> or Hyper-V. Even though a VM runs on a machine that has an operating system, each VM requires its own complete operating system, even if it's the same operating system as the host OS. VMs offer a very high degree of isolation, but at a cost: longer startup times, lower portability (ever tried to move a 127 GB virtual hard disk, or VHD, from one PC to another?), and higher memory requirements. Containers, by contrast, leverage the operating system that is already in place but offer nearly as much separation. RAM requirements are lower since the OS isn't being duplicated in each container, and cost is lower, too, because while cloud platforms typically charge for each VM, a single VM can host multiple container instances.</a:t>
+            </a:r>
+            <a:endParaRPr lang="en-US" dirty="0"/>
           </a:p>
         </p:txBody>
       </p:sp>
@@ -911,7 +944,7 @@
     </p:spTree>
     <p:extLst>
       <p:ext uri="{BB962C8B-B14F-4D97-AF65-F5344CB8AC3E}">
-        <p14:creationId xmlns:p14="http://schemas.microsoft.com/office/powerpoint/2010/main" val="2815615228"/>
+        <p14:creationId xmlns:p14="http://schemas.microsoft.com/office/powerpoint/2010/main" val="3918904550"/>
       </p:ext>
     </p:extLst>
   </p:cSld>
@@ -967,19 +1000,19 @@
           <a:p>
             <a:r>
               <a:rPr lang="en-US" dirty="0" smtClean="0"/>
-              <a:t>The Docker Client,</a:t>
+              <a:t>Docker (www.docker.com) isn't the world's only containerization platform, but it is the most popular. It is free, open-source,</a:t>
             </a:r>
             <a:r>
               <a:rPr lang="en-US" baseline="0" dirty="0" smtClean="0"/>
-              <a:t> also known as the Docker CLI, is the primary tool you use to manage Docker containers. You can download container images from repositories such as Docker Hub, build container images, run container instances, list container images and instances, and much more. After connecting to Azure Container Service using SSH, you can use port forwarding to execute commands locally that act on an Azure Container Service running in the cloud. In this example, the -H switch used with the </a:t>
-            </a:r>
-            <a:r>
-              <a:rPr lang="en-US" b="1" baseline="0" dirty="0" err="1" smtClean="0"/>
-              <a:t>docker</a:t>
+              <a:t> and Linux-based, with Windows support (Windows Server 2016) in the works. </a:t>
+            </a:r>
+            <a:r>
+              <a:rPr lang="en-US" dirty="0" smtClean="0"/>
+              <a:t>It has earned massive</a:t>
             </a:r>
             <a:r>
               <a:rPr lang="en-US" baseline="0" dirty="0" smtClean="0"/>
-              <a:t> commands forwards commands sent to port 22375 on localhost to the Azure Container Services via SSH.</a:t>
+              <a:t> mindshare in the developer community. And with Azure Container Service, you can deploy Docker containers to Azure with minimal effort. Moreover, Docker containers are easily moved between Azure and Amazon Web Services (AWS), affording developers portability between cloud platforms.</a:t>
             </a:r>
             <a:endParaRPr lang="en-US" dirty="0"/>
           </a:p>
@@ -1011,7 +1044,7 @@
     </p:spTree>
     <p:extLst>
       <p:ext uri="{BB962C8B-B14F-4D97-AF65-F5344CB8AC3E}">
-        <p14:creationId xmlns:p14="http://schemas.microsoft.com/office/powerpoint/2010/main" val="999235491"/>
+        <p14:creationId xmlns:p14="http://schemas.microsoft.com/office/powerpoint/2010/main" val="4017007276"/>
       </p:ext>
     </p:extLst>
   </p:cSld>
@@ -1084,11 +1117,19 @@
             </a:pPr>
             <a:r>
               <a:rPr lang="en-US" dirty="0" smtClean="0"/>
-              <a:t>This command pulls the image</a:t>
+              <a:t>Docker utilizes</a:t>
             </a:r>
             <a:r>
               <a:rPr lang="en-US" baseline="0" dirty="0" smtClean="0"/>
-              <a:t> named "Ubuntu" from Docker Hub (or a local registry if the image is cached there) and runs it interactively in a container. "Interactively" means standard input, output, and error are connected locally so you can provide input to the container and see its output. Of course, you are not limited to the "Ubuntu" image. You can specify other images and even create images of your own with </a:t>
+              <a:t> a client-server architecture. You execute Docker commands through a Docker client such as the Docker CLI or </a:t>
+            </a:r>
+            <a:r>
+              <a:rPr lang="en-US" baseline="0" dirty="0" err="1" smtClean="0"/>
+              <a:t>Kitematic</a:t>
+            </a:r>
+            <a:r>
+              <a:rPr lang="en-US" baseline="0" dirty="0" smtClean="0"/>
+              <a:t>. The client uses REST commands to communicate with the Docker daemon running on a Docker host such as the Azure Container services. These commands can be used to push, pull (</a:t>
             </a:r>
             <a:r>
               <a:rPr lang="en-US" b="1" baseline="0" dirty="0" err="1" smtClean="0"/>
@@ -1096,27 +1137,35 @@
             </a:r>
             <a:r>
               <a:rPr lang="en-US" b="1" baseline="0" dirty="0" smtClean="0"/>
-              <a:t> build</a:t>
+              <a:t> pull</a:t>
             </a:r>
             <a:r>
               <a:rPr lang="en-US" baseline="0" dirty="0" smtClean="0"/>
-              <a:t>. Where the container runs depends on the context. The container can run locally in a </a:t>
-            </a:r>
-            <a:r>
-              <a:rPr lang="en-US" baseline="0" dirty="0" err="1" smtClean="0"/>
-              <a:t>docker</a:t>
-            </a:r>
-            <a:r>
-              <a:rPr lang="en-US" baseline="0" dirty="0" smtClean="0"/>
-              <a:t> host (for example, a VM on Windows), or it can remotely if you connect to a remote Docker daemon (for example, one running in Azure) via SSH tunneling and use port forwarding to forward </a:t>
+              <a:t>), and create Docker images, to run them in containers, and to manage those containers. Images can be built with the </a:t>
             </a:r>
             <a:r>
               <a:rPr lang="en-US" b="1" baseline="0" dirty="0" err="1" smtClean="0"/>
               <a:t>docker</a:t>
             </a:r>
             <a:r>
+              <a:rPr lang="en-US" b="1" baseline="0" dirty="0" smtClean="0"/>
+              <a:t> build</a:t>
+            </a:r>
+            <a:r>
               <a:rPr lang="en-US" baseline="0" dirty="0" smtClean="0"/>
-              <a:t> commands to the daemon.</a:t>
+              <a:t> command, and they can be stand-alone, or they can "inherit" from other images. Images are stored in Docker registries, which can be public or private, local or remote. Docker Hub is a popular public registry that is managed by Docker; it contains a "huge collection" of images that anyone may use. The </a:t>
+            </a:r>
+            <a:r>
+              <a:rPr lang="en-US" b="1" baseline="0" dirty="0" err="1" smtClean="0"/>
+              <a:t>docker</a:t>
+            </a:r>
+            <a:r>
+              <a:rPr lang="en-US" b="1" baseline="0" dirty="0" smtClean="0"/>
+              <a:t> run</a:t>
+            </a:r>
+            <a:r>
+              <a:rPr lang="en-US" baseline="0" dirty="0" smtClean="0"/>
+              <a:t> command runs a container using an image as a template.</a:t>
             </a:r>
             <a:endParaRPr lang="en-US" dirty="0" smtClean="0"/>
           </a:p>
@@ -1148,7 +1197,7 @@
     </p:spTree>
     <p:extLst>
       <p:ext uri="{BB962C8B-B14F-4D97-AF65-F5344CB8AC3E}">
-        <p14:creationId xmlns:p14="http://schemas.microsoft.com/office/powerpoint/2010/main" val="2246746569"/>
+        <p14:creationId xmlns:p14="http://schemas.microsoft.com/office/powerpoint/2010/main" val="2815615228"/>
       </p:ext>
     </p:extLst>
   </p:cSld>
@@ -1202,128 +1251,23 @@
           <a:bodyPr/>
           <a:lstStyle/>
           <a:p>
-            <a:pPr marL="0" marR="0" lvl="0" indent="0" algn="l" defTabSz="914400" rtl="0" eaLnBrk="1" fontAlgn="auto" latinLnBrk="0" hangingPunct="1">
-              <a:lnSpc>
-                <a:spcPct val="100000"/>
-              </a:lnSpc>
-              <a:spcBef>
-                <a:spcPts val="0"/>
-              </a:spcBef>
-              <a:spcAft>
-                <a:spcPts val="0"/>
-              </a:spcAft>
-              <a:buClrTx/>
-              <a:buSzTx/>
-              <a:buFontTx/>
-              <a:buNone/>
-              <a:tabLst/>
-              <a:defRPr/>
-            </a:pPr>
             <a:r>
               <a:rPr lang="en-US" dirty="0" smtClean="0"/>
-              <a:t>These are some of the most commonly used </a:t>
-            </a:r>
-            <a:r>
-              <a:rPr lang="en-US" b="1" dirty="0" err="1" smtClean="0"/>
-              <a:t>docker</a:t>
-            </a:r>
-            <a:r>
-              <a:rPr lang="en-US" dirty="0" smtClean="0"/>
-              <a:t> commands. You can also use </a:t>
-            </a:r>
-            <a:r>
-              <a:rPr lang="en-US" b="1" dirty="0" err="1" smtClean="0"/>
-              <a:t>docker</a:t>
-            </a:r>
-            <a:r>
-              <a:rPr lang="en-US" b="1" dirty="0" smtClean="0"/>
-              <a:t> push</a:t>
-            </a:r>
-            <a:r>
-              <a:rPr lang="en-US" dirty="0" smtClean="0"/>
-              <a:t> to push an image to a registry</a:t>
+              <a:t>The Docker Client,</a:t>
             </a:r>
             <a:r>
               <a:rPr lang="en-US" baseline="0" dirty="0" smtClean="0"/>
-              <a:t> such as Docker Hub. Also, </a:t>
+              <a:t> also known as the Docker CLI, is the primary tool you use to manage Docker containers. You can download container images from repositories such as Docker Hub, build container images, run container instances, list container images and instances, and much more. After connecting to Azure Container Service using SSH, you can use port forwarding to execute commands locally that act on an Azure Container Service running in the cloud. In this example, the -H switch used with the </a:t>
             </a:r>
             <a:r>
               <a:rPr lang="en-US" b="1" baseline="0" dirty="0" err="1" smtClean="0"/>
               <a:t>docker</a:t>
             </a:r>
             <a:r>
-              <a:rPr lang="en-US" b="1" baseline="0" dirty="0" smtClean="0"/>
-              <a:t> </a:t>
-            </a:r>
-            <a:r>
-              <a:rPr lang="en-US" b="1" baseline="0" dirty="0" err="1" smtClean="0"/>
-              <a:t>ps</a:t>
-            </a:r>
-            <a:r>
               <a:rPr lang="en-US" baseline="0" dirty="0" smtClean="0"/>
-              <a:t> is often accompanied by a </a:t>
-            </a:r>
-            <a:r>
-              <a:rPr lang="en-US" b="1" baseline="0" dirty="0" smtClean="0"/>
-              <a:t>-a</a:t>
-            </a:r>
-            <a:r>
-              <a:rPr lang="en-US" baseline="0" dirty="0" smtClean="0"/>
-              <a:t> switch to list all containers, including those that are no longer running, while </a:t>
-            </a:r>
-            <a:r>
-              <a:rPr lang="en-US" b="1" baseline="0" dirty="0" err="1" smtClean="0"/>
-              <a:t>docker</a:t>
-            </a:r>
-            <a:r>
-              <a:rPr lang="en-US" b="1" baseline="0" dirty="0" smtClean="0"/>
-              <a:t> </a:t>
-            </a:r>
-            <a:r>
-              <a:rPr lang="en-US" b="1" baseline="0" dirty="0" err="1" smtClean="0"/>
-              <a:t>rm</a:t>
-            </a:r>
-            <a:r>
-              <a:rPr lang="en-US" baseline="0" dirty="0" smtClean="0"/>
-              <a:t> and </a:t>
-            </a:r>
-            <a:r>
-              <a:rPr lang="en-US" b="1" baseline="0" dirty="0" err="1" smtClean="0"/>
-              <a:t>docker</a:t>
-            </a:r>
-            <a:r>
-              <a:rPr lang="en-US" b="1" baseline="0" dirty="0" smtClean="0"/>
-              <a:t> </a:t>
-            </a:r>
-            <a:r>
-              <a:rPr lang="en-US" b="1" baseline="0" dirty="0" err="1" smtClean="0"/>
-              <a:t>rmi</a:t>
-            </a:r>
-            <a:r>
-              <a:rPr lang="en-US" baseline="0" dirty="0" smtClean="0"/>
-              <a:t> are used to delete (remove) containers and images, respectively. The </a:t>
-            </a:r>
-            <a:r>
-              <a:rPr lang="en-US" b="1" baseline="0" dirty="0" err="1" smtClean="0"/>
-              <a:t>docker</a:t>
-            </a:r>
-            <a:r>
-              <a:rPr lang="en-US" b="1" baseline="0" dirty="0" smtClean="0"/>
-              <a:t> build</a:t>
-            </a:r>
-            <a:r>
-              <a:rPr lang="en-US" baseline="0" dirty="0" smtClean="0"/>
-              <a:t> command uses a </a:t>
-            </a:r>
-            <a:r>
-              <a:rPr lang="en-US" baseline="0" dirty="0" err="1" smtClean="0"/>
-              <a:t>Dockerfile</a:t>
-            </a:r>
-            <a:r>
-              <a:rPr lang="en-US" baseline="0" dirty="0" smtClean="0"/>
-              <a:t> (a text file containing build commands) and a "context" -- for example, a specified directory in the file system -- to build Docker images.</a:t>
-            </a:r>
-            <a:endParaRPr lang="en-US" dirty="0" smtClean="0"/>
+              <a:t> commands forwards commands sent to port 22375 on localhost to the Azure Container Services via SSH.</a:t>
+            </a:r>
+            <a:endParaRPr lang="en-US" dirty="0"/>
           </a:p>
         </p:txBody>
       </p:sp>
@@ -1353,7 +1297,7 @@
     </p:spTree>
     <p:extLst>
       <p:ext uri="{BB962C8B-B14F-4D97-AF65-F5344CB8AC3E}">
-        <p14:creationId xmlns:p14="http://schemas.microsoft.com/office/powerpoint/2010/main" val="1832625065"/>
+        <p14:creationId xmlns:p14="http://schemas.microsoft.com/office/powerpoint/2010/main" val="999235491"/>
       </p:ext>
     </p:extLst>
   </p:cSld>
@@ -1407,19 +1351,60 @@
           <a:bodyPr/>
           <a:lstStyle/>
           <a:p>
+            <a:pPr marL="0" marR="0" lvl="0" indent="0" algn="l" defTabSz="914400" rtl="0" eaLnBrk="1" fontAlgn="auto" latinLnBrk="0" hangingPunct="1">
+              <a:lnSpc>
+                <a:spcPct val="100000"/>
+              </a:lnSpc>
+              <a:spcBef>
+                <a:spcPts val="0"/>
+              </a:spcBef>
+              <a:spcAft>
+                <a:spcPts val="0"/>
+              </a:spcAft>
+              <a:buClrTx/>
+              <a:buSzTx/>
+              <a:buFontTx/>
+              <a:buNone/>
+              <a:tabLst/>
+              <a:defRPr/>
+            </a:pPr>
             <a:r>
               <a:rPr lang="en-US" dirty="0" smtClean="0"/>
-              <a:t>From the documentation: "Azure Container Service makes it simpler for you to create, configure, and manage a cluster of virtual machines that are preconfigured to run containerized applications. It uses an optimized configuration of popular open-source scheduling and orchestration tools. This enables you to use your existing skills, or draw upon a large and growing body of community expertise, to deploy and manage container-based applications on Microsoft Azure." ACS supports Linux containers and Windows containers. The latter rely</a:t>
+              <a:t>This command pulls the image</a:t>
             </a:r>
             <a:r>
               <a:rPr lang="en-US" baseline="0" dirty="0" smtClean="0"/>
-              <a:t> on </a:t>
-            </a:r>
-            <a:r>
-              <a:rPr lang="en-US" dirty="0" smtClean="0"/>
-              <a:t>Windows Server 2016.</a:t>
-            </a:r>
-            <a:endParaRPr lang="en-US" dirty="0"/>
+              <a:t> named "Ubuntu" from Docker Hub (or a local registry if the image is cached there) and runs it interactively in a container. "Interactively" means standard input, output, and error are connected locally so you can provide input to the container and see its output. Of course, you are not limited to the "Ubuntu" image. You can specify other images and even create images of your own with </a:t>
+            </a:r>
+            <a:r>
+              <a:rPr lang="en-US" b="1" baseline="0" dirty="0" err="1" smtClean="0"/>
+              <a:t>docker</a:t>
+            </a:r>
+            <a:r>
+              <a:rPr lang="en-US" b="1" baseline="0" dirty="0" smtClean="0"/>
+              <a:t> build</a:t>
+            </a:r>
+            <a:r>
+              <a:rPr lang="en-US" baseline="0" dirty="0" smtClean="0"/>
+              <a:t>. Where the container runs depends on the context. The container can run locally in a </a:t>
+            </a:r>
+            <a:r>
+              <a:rPr lang="en-US" baseline="0" dirty="0" err="1" smtClean="0"/>
+              <a:t>docker</a:t>
+            </a:r>
+            <a:r>
+              <a:rPr lang="en-US" baseline="0" dirty="0" smtClean="0"/>
+              <a:t> host (for example, a VM on Windows), or it can remotely if you connect to a remote Docker daemon (for example, one running in Azure) via SSH tunneling and use port forwarding to forward </a:t>
+            </a:r>
+            <a:r>
+              <a:rPr lang="en-US" b="1" baseline="0" dirty="0" err="1" smtClean="0"/>
+              <a:t>docker</a:t>
+            </a:r>
+            <a:r>
+              <a:rPr lang="en-US" baseline="0" dirty="0" smtClean="0"/>
+              <a:t> commands to the daemon.</a:t>
+            </a:r>
+            <a:endParaRPr lang="en-US" dirty="0" smtClean="0"/>
           </a:p>
         </p:txBody>
       </p:sp>
@@ -1449,7 +1434,7 @@
     </p:spTree>
     <p:extLst>
       <p:ext uri="{BB962C8B-B14F-4D97-AF65-F5344CB8AC3E}">
-        <p14:creationId xmlns:p14="http://schemas.microsoft.com/office/powerpoint/2010/main" val="36852900"/>
+        <p14:creationId xmlns:p14="http://schemas.microsoft.com/office/powerpoint/2010/main" val="2246746569"/>
       </p:ext>
     </p:extLst>
   </p:cSld>
@@ -1503,15 +1488,128 @@
           <a:bodyPr/>
           <a:lstStyle/>
           <a:p>
+            <a:pPr marL="0" marR="0" lvl="0" indent="0" algn="l" defTabSz="914400" rtl="0" eaLnBrk="1" fontAlgn="auto" latinLnBrk="0" hangingPunct="1">
+              <a:lnSpc>
+                <a:spcPct val="100000"/>
+              </a:lnSpc>
+              <a:spcBef>
+                <a:spcPts val="0"/>
+              </a:spcBef>
+              <a:spcAft>
+                <a:spcPts val="0"/>
+              </a:spcAft>
+              <a:buClrTx/>
+              <a:buSzTx/>
+              <a:buFontTx/>
+              <a:buNone/>
+              <a:tabLst/>
+              <a:defRPr/>
+            </a:pPr>
             <a:r>
               <a:rPr lang="en-US" dirty="0" smtClean="0"/>
-              <a:t>Here's what happens in Azure</a:t>
+              <a:t>These are some of the most commonly used </a:t>
+            </a:r>
+            <a:r>
+              <a:rPr lang="en-US" b="1" dirty="0" err="1" smtClean="0"/>
+              <a:t>docker</a:t>
+            </a:r>
+            <a:r>
+              <a:rPr lang="en-US" dirty="0" smtClean="0"/>
+              <a:t> commands. You can also use </a:t>
+            </a:r>
+            <a:r>
+              <a:rPr lang="en-US" b="1" dirty="0" err="1" smtClean="0"/>
+              <a:t>docker</a:t>
+            </a:r>
+            <a:r>
+              <a:rPr lang="en-US" b="1" dirty="0" smtClean="0"/>
+              <a:t> push</a:t>
+            </a:r>
+            <a:r>
+              <a:rPr lang="en-US" dirty="0" smtClean="0"/>
+              <a:t> to push an image to a registry</a:t>
             </a:r>
             <a:r>
               <a:rPr lang="en-US" baseline="0" dirty="0" smtClean="0"/>
-              <a:t> when you create an Azure Container Service with Docker Swarm as the orchestrator. Azure creates one or more master VMs to control the "swarm" of containers, as well as a Virtual Machine Scale Set, which provides the "agent" VMs in which containers run. All these VMs communicate over a private virtual network. To communicate with Docker Swarm in a master VM from a Docker client running on a local machine, you establish an SSH tunnel that forwards the local port 22375 to port 2375 in the VM (via SSH port 2200). This allows you to execute local commands that load container images and run containers in the cloud. Docker Swarm manages the container instances in the agent VMs as well as the agent VMs themselves. You don't have to know this to use Azure Container Service, but it does help explain various port forwarding commands that you employ when running the Docker client on a local machine connected to Azure.</a:t>
-            </a:r>
-            <a:endParaRPr lang="en-US" dirty="0"/>
+              <a:t> such as Docker Hub. Also, </a:t>
+            </a:r>
+            <a:r>
+              <a:rPr lang="en-US" b="1" baseline="0" dirty="0" err="1" smtClean="0"/>
+              <a:t>docker</a:t>
+            </a:r>
+            <a:r>
+              <a:rPr lang="en-US" b="1" baseline="0" dirty="0" smtClean="0"/>
+              <a:t> </a:t>
+            </a:r>
+            <a:r>
+              <a:rPr lang="en-US" b="1" baseline="0" dirty="0" err="1" smtClean="0"/>
+              <a:t>ps</a:t>
+            </a:r>
+            <a:r>
+              <a:rPr lang="en-US" baseline="0" dirty="0" smtClean="0"/>
+              <a:t> is often accompanied by a </a:t>
+            </a:r>
+            <a:r>
+              <a:rPr lang="en-US" b="1" baseline="0" dirty="0" smtClean="0"/>
+              <a:t>-a</a:t>
+            </a:r>
+            <a:r>
+              <a:rPr lang="en-US" baseline="0" dirty="0" smtClean="0"/>
+              <a:t> switch to list all containers, including those that are no longer running, while </a:t>
+            </a:r>
+            <a:r>
+              <a:rPr lang="en-US" b="1" baseline="0" dirty="0" err="1" smtClean="0"/>
+              <a:t>docker</a:t>
+            </a:r>
+            <a:r>
+              <a:rPr lang="en-US" b="1" baseline="0" dirty="0" smtClean="0"/>
+              <a:t> </a:t>
+            </a:r>
+            <a:r>
+              <a:rPr lang="en-US" b="1" baseline="0" dirty="0" err="1" smtClean="0"/>
+              <a:t>rm</a:t>
+            </a:r>
+            <a:r>
+              <a:rPr lang="en-US" baseline="0" dirty="0" smtClean="0"/>
+              <a:t> and </a:t>
+            </a:r>
+            <a:r>
+              <a:rPr lang="en-US" b="1" baseline="0" dirty="0" err="1" smtClean="0"/>
+              <a:t>docker</a:t>
+            </a:r>
+            <a:r>
+              <a:rPr lang="en-US" b="1" baseline="0" dirty="0" smtClean="0"/>
+              <a:t> </a:t>
+            </a:r>
+            <a:r>
+              <a:rPr lang="en-US" b="1" baseline="0" dirty="0" err="1" smtClean="0"/>
+              <a:t>rmi</a:t>
+            </a:r>
+            <a:r>
+              <a:rPr lang="en-US" baseline="0" dirty="0" smtClean="0"/>
+              <a:t> are used to delete (remove) containers and images, respectively. The </a:t>
+            </a:r>
+            <a:r>
+              <a:rPr lang="en-US" b="1" baseline="0" dirty="0" err="1" smtClean="0"/>
+              <a:t>docker</a:t>
+            </a:r>
+            <a:r>
+              <a:rPr lang="en-US" b="1" baseline="0" dirty="0" smtClean="0"/>
+              <a:t> build</a:t>
+            </a:r>
+            <a:r>
+              <a:rPr lang="en-US" baseline="0" dirty="0" smtClean="0"/>
+              <a:t> command uses a </a:t>
+            </a:r>
+            <a:r>
+              <a:rPr lang="en-US" baseline="0" dirty="0" err="1" smtClean="0"/>
+              <a:t>Dockerfile</a:t>
+            </a:r>
+            <a:r>
+              <a:rPr lang="en-US" baseline="0" dirty="0" smtClean="0"/>
+              <a:t> (a text file containing build commands) and a "context" -- for example, a specified directory in the file system -- to build Docker images.</a:t>
+            </a:r>
+            <a:endParaRPr lang="en-US" dirty="0" smtClean="0"/>
           </a:p>
         </p:txBody>
       </p:sp>
@@ -1541,7 +1639,7 @@
     </p:spTree>
     <p:extLst>
       <p:ext uri="{BB962C8B-B14F-4D97-AF65-F5344CB8AC3E}">
-        <p14:creationId xmlns:p14="http://schemas.microsoft.com/office/powerpoint/2010/main" val="2302495390"/>
+        <p14:creationId xmlns:p14="http://schemas.microsoft.com/office/powerpoint/2010/main" val="1832625065"/>
       </p:ext>
     </p:extLst>
   </p:cSld>
@@ -1595,108 +1693,19 @@
           <a:bodyPr/>
           <a:lstStyle/>
           <a:p>
-            <a:pPr marL="0" marR="0" lvl="0" indent="0" algn="l" defTabSz="914400" rtl="0" eaLnBrk="1" fontAlgn="auto" latinLnBrk="0" hangingPunct="1">
-              <a:lnSpc>
-                <a:spcPct val="100000"/>
-              </a:lnSpc>
-              <a:spcBef>
-                <a:spcPts val="0"/>
-              </a:spcBef>
-              <a:spcAft>
-                <a:spcPts val="0"/>
-              </a:spcAft>
-              <a:buClrTx/>
-              <a:buSzTx/>
-              <a:buFontTx/>
-              <a:buNone/>
-              <a:tabLst/>
-              <a:defRPr/>
-            </a:pPr>
-            <a:r>
-              <a:rPr lang="en-US" sz="1200" b="0" i="0" kern="1200" dirty="0" smtClean="0">
-                <a:solidFill>
-                  <a:schemeClr val="tx1"/>
-                </a:solidFill>
-                <a:effectLst/>
-                <a:latin typeface="+mn-lt"/>
-                <a:ea typeface="+mn-ea"/>
-                <a:cs typeface="+mn-cs"/>
-              </a:rPr>
-              <a:t>This command works</a:t>
-            </a:r>
-            <a:r>
-              <a:rPr lang="en-US" sz="1200" b="0" i="0" kern="1200" baseline="0" dirty="0" smtClean="0">
-                <a:solidFill>
-                  <a:schemeClr val="tx1"/>
-                </a:solidFill>
-                <a:effectLst/>
-                <a:latin typeface="+mn-lt"/>
-                <a:ea typeface="+mn-ea"/>
-                <a:cs typeface="+mn-cs"/>
-              </a:rPr>
-              <a:t> in a terminal window on OS X or Linux. (Windows users need to use a third-party SSH tool such as </a:t>
-            </a:r>
-            <a:r>
-              <a:rPr lang="en-US" sz="1200" b="0" i="0" kern="1200" baseline="0" dirty="0" err="1" smtClean="0">
-                <a:solidFill>
-                  <a:schemeClr val="tx1"/>
-                </a:solidFill>
-                <a:effectLst/>
-                <a:latin typeface="+mn-lt"/>
-                <a:ea typeface="+mn-ea"/>
-                <a:cs typeface="+mn-cs"/>
-              </a:rPr>
-              <a:t>PuTTY</a:t>
-            </a:r>
-            <a:r>
-              <a:rPr lang="en-US" sz="1200" b="0" i="0" kern="1200" baseline="0" dirty="0" smtClean="0">
-                <a:solidFill>
-                  <a:schemeClr val="tx1"/>
-                </a:solidFill>
-                <a:effectLst/>
-                <a:latin typeface="+mn-lt"/>
-                <a:ea typeface="+mn-ea"/>
-                <a:cs typeface="+mn-cs"/>
-              </a:rPr>
-              <a:t>.) </a:t>
-            </a:r>
-            <a:r>
-              <a:rPr lang="en-US" sz="1200" b="0" i="0" kern="1200" dirty="0" smtClean="0">
-                <a:solidFill>
-                  <a:schemeClr val="tx1"/>
-                </a:solidFill>
-                <a:effectLst/>
-                <a:latin typeface="+mn-lt"/>
-                <a:ea typeface="+mn-ea"/>
-                <a:cs typeface="+mn-cs"/>
-              </a:rPr>
-              <a:t>The purpose of the -L switch is to forward traffic transmitted through port 22375 on the local machine (that's the port used by the</a:t>
-            </a:r>
-            <a:r>
-              <a:rPr lang="en-US" sz="1200" b="0" i="0" kern="1200" baseline="0" dirty="0" smtClean="0">
-                <a:solidFill>
-                  <a:schemeClr val="tx1"/>
-                </a:solidFill>
-                <a:effectLst/>
-                <a:latin typeface="+mn-lt"/>
-                <a:ea typeface="+mn-ea"/>
-                <a:cs typeface="+mn-cs"/>
-              </a:rPr>
-              <a:t> Docker</a:t>
-            </a:r>
-            <a:r>
-              <a:rPr lang="en-US" sz="1200" b="0" i="0" kern="1200" dirty="0" smtClean="0">
-                <a:solidFill>
-                  <a:schemeClr val="tx1"/>
-                </a:solidFill>
-                <a:effectLst/>
-                <a:latin typeface="+mn-lt"/>
-                <a:ea typeface="+mn-ea"/>
-                <a:cs typeface="+mn-cs"/>
-              </a:rPr>
-              <a:t> CLI) to port 2375 at the other end. Docker Swarm listens on port 2375. The -p switch instructs SSH to use port 2200 rather than the default 22. The load balancer you're connecting to listens on port 2200 and forwards the SSH messages it receives to port 22 on the master VM.</a:t>
-            </a:r>
-            <a:endParaRPr lang="en-US" dirty="0" smtClean="0"/>
+            <a:r>
+              <a:rPr lang="en-US" dirty="0" smtClean="0"/>
+              <a:t>From the documentation: "Azure Container Service makes it simpler for you to create, configure, and manage a cluster of virtual machines that are preconfigured to run containerized applications. It uses an optimized configuration of popular open-source scheduling and orchestration tools. This enables you to use your existing skills, or draw upon a large and growing body of community expertise, to deploy and manage container-based applications on Microsoft Azure." ACS supports Linux containers and Windows containers. The latter rely</a:t>
+            </a:r>
+            <a:r>
+              <a:rPr lang="en-US" baseline="0" dirty="0" smtClean="0"/>
+              <a:t> on </a:t>
+            </a:r>
+            <a:r>
+              <a:rPr lang="en-US" dirty="0" smtClean="0"/>
+              <a:t>Windows Server 2016.</a:t>
+            </a:r>
+            <a:endParaRPr lang="en-US" dirty="0"/>
           </a:p>
         </p:txBody>
       </p:sp>
@@ -1726,7 +1735,99 @@
     </p:spTree>
     <p:extLst>
       <p:ext uri="{BB962C8B-B14F-4D97-AF65-F5344CB8AC3E}">
-        <p14:creationId xmlns:p14="http://schemas.microsoft.com/office/powerpoint/2010/main" val="3975244300"/>
+        <p14:creationId xmlns:p14="http://schemas.microsoft.com/office/powerpoint/2010/main" val="36852900"/>
+      </p:ext>
+    </p:extLst>
+  </p:cSld>
+  <p:clrMapOvr>
+    <a:masterClrMapping/>
+  </p:clrMapOvr>
+</p:notes>
+</file>
+
+<file path=ppt/notesSlides/notesSlide19.xml><?xml version="1.0" encoding="utf-8"?>
+<p:notes xmlns:a="http://schemas.openxmlformats.org/drawingml/2006/main" xmlns:r="http://schemas.openxmlformats.org/officeDocument/2006/relationships" xmlns:p="http://schemas.openxmlformats.org/presentationml/2006/main">
+  <p:cSld>
+    <p:spTree>
+      <p:nvGrpSpPr>
+        <p:cNvPr id="1" name=""/>
+        <p:cNvGrpSpPr/>
+        <p:nvPr/>
+      </p:nvGrpSpPr>
+      <p:grpSpPr>
+        <a:xfrm>
+          <a:off x="0" y="0"/>
+          <a:ext cx="0" cy="0"/>
+          <a:chOff x="0" y="0"/>
+          <a:chExt cx="0" cy="0"/>
+        </a:xfrm>
+      </p:grpSpPr>
+      <p:sp>
+        <p:nvSpPr>
+          <p:cNvPr id="2" name="Slide Image Placeholder 1"/>
+          <p:cNvSpPr>
+            <a:spLocks noGrp="1" noRot="1" noChangeAspect="1"/>
+          </p:cNvSpPr>
+          <p:nvPr>
+            <p:ph type="sldImg"/>
+          </p:nvPr>
+        </p:nvSpPr>
+        <p:spPr/>
+      </p:sp>
+      <p:sp>
+        <p:nvSpPr>
+          <p:cNvPr id="3" name="Notes Placeholder 2"/>
+          <p:cNvSpPr>
+            <a:spLocks noGrp="1"/>
+          </p:cNvSpPr>
+          <p:nvPr>
+            <p:ph type="body" idx="1"/>
+          </p:nvPr>
+        </p:nvSpPr>
+        <p:spPr/>
+        <p:txBody>
+          <a:bodyPr/>
+          <a:lstStyle/>
+          <a:p>
+            <a:r>
+              <a:rPr lang="en-US" dirty="0" smtClean="0"/>
+              <a:t>Here's what happens in Azure</a:t>
+            </a:r>
+            <a:r>
+              <a:rPr lang="en-US" baseline="0" dirty="0" smtClean="0"/>
+              <a:t> when you create an Azure Container Service with Docker Swarm as the orchestrator. Azure creates one or more master VMs to control the "swarm" of containers, as well as a Virtual Machine Scale Set, which provides the "agent" VMs in which containers run. All these VMs communicate over a private virtual network. To communicate with Docker Swarm in a master VM from a Docker client running on a local machine, you establish an SSH tunnel that forwards the local port 22375 to port 2375 in the VM (via SSH port 2200). This allows you to execute local commands that load container images and run containers in the cloud. Docker Swarm manages the container instances in the agent VMs as well as the agent VMs themselves. You don't have to know this to use Azure Container Service, but it does help explain various port forwarding commands that you employ when running the Docker client on a local machine connected to Azure.</a:t>
+            </a:r>
+            <a:endParaRPr lang="en-US" dirty="0"/>
+          </a:p>
+        </p:txBody>
+      </p:sp>
+      <p:sp>
+        <p:nvSpPr>
+          <p:cNvPr id="4" name="Slide Number Placeholder 3"/>
+          <p:cNvSpPr>
+            <a:spLocks noGrp="1"/>
+          </p:cNvSpPr>
+          <p:nvPr>
+            <p:ph type="sldNum" sz="quarter" idx="10"/>
+          </p:nvPr>
+        </p:nvSpPr>
+        <p:spPr/>
+        <p:txBody>
+          <a:bodyPr/>
+          <a:lstStyle/>
+          <a:p>
+            <a:fld id="{01283FAC-A721-45A3-BBDE-EAF2B09B7CD9}" type="slidenum">
+              <a:rPr lang="en-US" smtClean="0"/>
+              <a:t>19</a:t>
+            </a:fld>
+            <a:endParaRPr lang="en-US"/>
+          </a:p>
+        </p:txBody>
+      </p:sp>
+    </p:spTree>
+    <p:extLst>
+      <p:ext uri="{BB962C8B-B14F-4D97-AF65-F5344CB8AC3E}">
+        <p14:creationId xmlns:p14="http://schemas.microsoft.com/office/powerpoint/2010/main" val="2302495390"/>
       </p:ext>
     </p:extLst>
   </p:cSld>
@@ -1780,8 +1881,134 @@
           <a:bodyPr/>
           <a:lstStyle/>
           <a:p>
-            <a:r>
-              <a:rPr lang="en-US" sz="1200" kern="1200" dirty="0" smtClean="0">
+            <a:pPr marL="0" marR="0" lvl="0" indent="0" algn="l" defTabSz="914400" rtl="0" eaLnBrk="1" fontAlgn="auto" latinLnBrk="0" hangingPunct="1">
+              <a:lnSpc>
+                <a:spcPct val="100000"/>
+              </a:lnSpc>
+              <a:spcBef>
+                <a:spcPts val="0"/>
+              </a:spcBef>
+              <a:spcAft>
+                <a:spcPts val="0"/>
+              </a:spcAft>
+              <a:buClrTx/>
+              <a:buSzTx/>
+              <a:buFontTx/>
+              <a:buNone/>
+              <a:tabLst/>
+              <a:defRPr/>
+            </a:pPr>
+            <a:r>
+              <a:rPr lang="en-US" dirty="0" smtClean="0"/>
+              <a:t>High-performance computing (HPC)</a:t>
+            </a:r>
+            <a:r>
+              <a:rPr lang="en-US" baseline="0" dirty="0" smtClean="0"/>
+              <a:t> typically refers to computing power beyond that of a typical desktop computer. Obviously, the definition of high-performance changes with time as more computing power is crammed into smaller spaces, making the supercomputers of today commodity computers of tomorrow. Regardless though, the concepts of HPC have remained the same since the early days of computing wherein scientists and engineers worked to figure out how aggregate more computing resources to perform computing tasks.</a:t>
+            </a:r>
+            <a:endParaRPr lang="en-US" dirty="0" smtClean="0"/>
+          </a:p>
+        </p:txBody>
+      </p:sp>
+      <p:sp>
+        <p:nvSpPr>
+          <p:cNvPr id="4" name="Slide Number Placeholder 3"/>
+          <p:cNvSpPr>
+            <a:spLocks noGrp="1"/>
+          </p:cNvSpPr>
+          <p:nvPr>
+            <p:ph type="sldNum" sz="quarter" idx="10"/>
+          </p:nvPr>
+        </p:nvSpPr>
+        <p:spPr/>
+        <p:txBody>
+          <a:bodyPr/>
+          <a:lstStyle/>
+          <a:p>
+            <a:fld id="{01283FAC-A721-45A3-BBDE-EAF2B09B7CD9}" type="slidenum">
+              <a:rPr lang="en-US" smtClean="0"/>
+              <a:t>2</a:t>
+            </a:fld>
+            <a:endParaRPr lang="en-US"/>
+          </a:p>
+        </p:txBody>
+      </p:sp>
+    </p:spTree>
+    <p:extLst>
+      <p:ext uri="{BB962C8B-B14F-4D97-AF65-F5344CB8AC3E}">
+        <p14:creationId xmlns:p14="http://schemas.microsoft.com/office/powerpoint/2010/main" val="3514575438"/>
+      </p:ext>
+    </p:extLst>
+  </p:cSld>
+  <p:clrMapOvr>
+    <a:masterClrMapping/>
+  </p:clrMapOvr>
+</p:notes>
+</file>
+
+<file path=ppt/notesSlides/notesSlide20.xml><?xml version="1.0" encoding="utf-8"?>
+<p:notes xmlns:a="http://schemas.openxmlformats.org/drawingml/2006/main" xmlns:r="http://schemas.openxmlformats.org/officeDocument/2006/relationships" xmlns:p="http://schemas.openxmlformats.org/presentationml/2006/main">
+  <p:cSld>
+    <p:spTree>
+      <p:nvGrpSpPr>
+        <p:cNvPr id="1" name=""/>
+        <p:cNvGrpSpPr/>
+        <p:nvPr/>
+      </p:nvGrpSpPr>
+      <p:grpSpPr>
+        <a:xfrm>
+          <a:off x="0" y="0"/>
+          <a:ext cx="0" cy="0"/>
+          <a:chOff x="0" y="0"/>
+          <a:chExt cx="0" cy="0"/>
+        </a:xfrm>
+      </p:grpSpPr>
+      <p:sp>
+        <p:nvSpPr>
+          <p:cNvPr id="2" name="Slide Image Placeholder 1"/>
+          <p:cNvSpPr>
+            <a:spLocks noGrp="1" noRot="1" noChangeAspect="1"/>
+          </p:cNvSpPr>
+          <p:nvPr>
+            <p:ph type="sldImg"/>
+          </p:nvPr>
+        </p:nvSpPr>
+        <p:spPr/>
+      </p:sp>
+      <p:sp>
+        <p:nvSpPr>
+          <p:cNvPr id="3" name="Notes Placeholder 2"/>
+          <p:cNvSpPr>
+            <a:spLocks noGrp="1"/>
+          </p:cNvSpPr>
+          <p:nvPr>
+            <p:ph type="body" idx="1"/>
+          </p:nvPr>
+        </p:nvSpPr>
+        <p:spPr/>
+        <p:txBody>
+          <a:bodyPr/>
+          <a:lstStyle/>
+          <a:p>
+            <a:pPr marL="0" marR="0" lvl="0" indent="0" algn="l" defTabSz="914400" rtl="0" eaLnBrk="1" fontAlgn="auto" latinLnBrk="0" hangingPunct="1">
+              <a:lnSpc>
+                <a:spcPct val="100000"/>
+              </a:lnSpc>
+              <a:spcBef>
+                <a:spcPts val="0"/>
+              </a:spcBef>
+              <a:spcAft>
+                <a:spcPts val="0"/>
+              </a:spcAft>
+              <a:buClrTx/>
+              <a:buSzTx/>
+              <a:buFontTx/>
+              <a:buNone/>
+              <a:tabLst/>
+              <a:defRPr/>
+            </a:pPr>
+            <a:r>
+              <a:rPr lang="en-US" sz="1200" b="0" i="0" kern="1200" dirty="0" smtClean="0">
                 <a:solidFill>
                   <a:schemeClr val="tx1"/>
                 </a:solidFill>
@@ -1790,12 +2017,10 @@
                 <a:ea typeface="+mn-ea"/>
                 <a:cs typeface="+mn-cs"/>
               </a:rPr>
-              <a:t>With Azure, you deploy a cluster of VMs to the cloud in minutes and scale it up and down as needed. They can be Windows VMs or Linux VMs; Azure doesn’t care. In fact, Linux VMs are slightly less expensive because you don’t pay Windows licensing fees for them. You can also choose from a variety of virtual-machine sizes, and you can use deployment templates – something I’ll say more about shortly – to automate your deployments.</a:t>
-            </a:r>
-          </a:p>
-          <a:p>
-            <a:r>
-              <a:rPr lang="en-US" sz="1200" kern="1200" dirty="0" smtClean="0">
+              <a:t>This command works</a:t>
+            </a:r>
+            <a:r>
+              <a:rPr lang="en-US" sz="1200" b="0" i="0" kern="1200" baseline="0" dirty="0" smtClean="0">
                 <a:solidFill>
                   <a:schemeClr val="tx1"/>
                 </a:solidFill>
@@ -1804,12 +2029,10 @@
                 <a:ea typeface="+mn-ea"/>
                 <a:cs typeface="+mn-cs"/>
               </a:rPr>
-              <a:t> </a:t>
-            </a:r>
-          </a:p>
-          <a:p>
-            <a:r>
-              <a:rPr lang="en-US" sz="1200" kern="1200" dirty="0" smtClean="0">
+              <a:t> in a terminal window on OS X or Linux. (Windows users need to use a third-party SSH tool such as </a:t>
+            </a:r>
+            <a:r>
+              <a:rPr lang="en-US" sz="1200" b="0" i="0" kern="1200" baseline="0" dirty="0" err="1" smtClean="0">
                 <a:solidFill>
                   <a:schemeClr val="tx1"/>
                 </a:solidFill>
@@ -1818,8 +2041,57 @@
                 <a:ea typeface="+mn-ea"/>
                 <a:cs typeface="+mn-cs"/>
               </a:rPr>
-              <a:t>Azure Batch can also play a role in HPC by allowing you to schedule jobs to run across a pool of VMs, much like the batch-processing services frequently used on mainframes and supercomputers.</a:t>
-            </a:r>
+              <a:t>PuTTY</a:t>
+            </a:r>
+            <a:r>
+              <a:rPr lang="en-US" sz="1200" b="0" i="0" kern="1200" baseline="0" dirty="0" smtClean="0">
+                <a:solidFill>
+                  <a:schemeClr val="tx1"/>
+                </a:solidFill>
+                <a:effectLst/>
+                <a:latin typeface="+mn-lt"/>
+                <a:ea typeface="+mn-ea"/>
+                <a:cs typeface="+mn-cs"/>
+              </a:rPr>
+              <a:t>.) </a:t>
+            </a:r>
+            <a:r>
+              <a:rPr lang="en-US" sz="1200" b="0" i="0" kern="1200" dirty="0" smtClean="0">
+                <a:solidFill>
+                  <a:schemeClr val="tx1"/>
+                </a:solidFill>
+                <a:effectLst/>
+                <a:latin typeface="+mn-lt"/>
+                <a:ea typeface="+mn-ea"/>
+                <a:cs typeface="+mn-cs"/>
+              </a:rPr>
+              <a:t>The purpose of the -L switch is to forward traffic transmitted through port 22375 on the local machine (that's the port used by the</a:t>
+            </a:r>
+            <a:r>
+              <a:rPr lang="en-US" sz="1200" b="0" i="0" kern="1200" baseline="0" dirty="0" smtClean="0">
+                <a:solidFill>
+                  <a:schemeClr val="tx1"/>
+                </a:solidFill>
+                <a:effectLst/>
+                <a:latin typeface="+mn-lt"/>
+                <a:ea typeface="+mn-ea"/>
+                <a:cs typeface="+mn-cs"/>
+              </a:rPr>
+              <a:t> Docker</a:t>
+            </a:r>
+            <a:r>
+              <a:rPr lang="en-US" sz="1200" b="0" i="0" kern="1200" dirty="0" smtClean="0">
+                <a:solidFill>
+                  <a:schemeClr val="tx1"/>
+                </a:solidFill>
+                <a:effectLst/>
+                <a:latin typeface="+mn-lt"/>
+                <a:ea typeface="+mn-ea"/>
+                <a:cs typeface="+mn-cs"/>
+              </a:rPr>
+              <a:t> CLI) to port 2375 at the other end. Docker Swarm listens on port 2375. The -p switch instructs SSH to use port 2200 rather than the default 22. The load balancer you're connecting to listens on port 2200 and forwards the SSH messages it receives to port 22 on the master VM.</a:t>
+            </a:r>
+            <a:endParaRPr lang="en-US" dirty="0" smtClean="0"/>
           </a:p>
         </p:txBody>
       </p:sp>
@@ -1840,7 +2112,7 @@
           <a:p>
             <a:fld id="{01283FAC-A721-45A3-BBDE-EAF2B09B7CD9}" type="slidenum">
               <a:rPr lang="en-US" smtClean="0"/>
-              <a:t>2</a:t>
+              <a:t>20</a:t>
             </a:fld>
             <a:endParaRPr lang="en-US"/>
           </a:p>
@@ -1849,7 +2121,7 @@
     </p:spTree>
     <p:extLst>
       <p:ext uri="{BB962C8B-B14F-4D97-AF65-F5344CB8AC3E}">
-        <p14:creationId xmlns:p14="http://schemas.microsoft.com/office/powerpoint/2010/main" val="2710204306"/>
+        <p14:creationId xmlns:p14="http://schemas.microsoft.com/office/powerpoint/2010/main" val="3975244300"/>
       </p:ext>
     </p:extLst>
   </p:cSld>
@@ -1903,67 +2175,30 @@
           <a:bodyPr/>
           <a:lstStyle/>
           <a:p>
-            <a:r>
-              <a:rPr lang="en-US" sz="1200" kern="1200" dirty="0" smtClean="0">
-                <a:solidFill>
-                  <a:schemeClr val="tx1"/>
-                </a:solidFill>
-                <a:effectLst/>
-                <a:latin typeface="+mn-lt"/>
-                <a:ea typeface="+mn-ea"/>
-                <a:cs typeface="+mn-cs"/>
-              </a:rPr>
-              <a:t>Azure offers a variety of VM sizes in an effort to make sure there’s something to fit everyone’s needs. Each size is identified by a letter and a number: A0, D1, G2, and so on. There is documentation online detailing the specs for each machine – number of cores, amount of RAM, type and size of hard disk, for example – as well as the cost. Not surprisingly, more powerful machines are most costly as well. Prices range from as little as 7 cents an hour for a single core machine running Linux to almost $10 an hour for a machine with 32 cores and almost half a terabyte of RAM. The G-series machines are reserved for the most power-hungry applications.</a:t>
-            </a:r>
-          </a:p>
-          <a:p>
-            <a:r>
-              <a:rPr lang="en-US" sz="1200" kern="1200" dirty="0" smtClean="0">
-                <a:solidFill>
-                  <a:schemeClr val="tx1"/>
-                </a:solidFill>
-                <a:effectLst/>
-                <a:latin typeface="+mn-lt"/>
-                <a:ea typeface="+mn-ea"/>
-                <a:cs typeface="+mn-cs"/>
-              </a:rPr>
-              <a:t> </a:t>
-            </a:r>
-          </a:p>
-          <a:p>
-            <a:r>
-              <a:rPr lang="en-US" sz="1200" kern="1200" dirty="0" smtClean="0">
-                <a:solidFill>
-                  <a:schemeClr val="tx1"/>
-                </a:solidFill>
-                <a:effectLst/>
-                <a:latin typeface="+mn-lt"/>
-                <a:ea typeface="+mn-ea"/>
-                <a:cs typeface="+mn-cs"/>
-              </a:rPr>
-              <a:t>Costs can grow astronomically when you talk about clusters with hundreds or even thousands of cores. But cost isn’t really the point. The point is having massive amounts of computing power at your fingertips. Besides, the cost of “renting” even the largest virtual cluster pales in comparison to the cost of purchasing, setting up, and maintaining a similarly sized cluster of your own.</a:t>
-            </a:r>
-          </a:p>
-          <a:p>
-            <a:endParaRPr lang="en-US" dirty="0" smtClean="0"/>
-          </a:p>
-          <a:p>
+            <a:pPr marL="0" marR="0" lvl="0" indent="0" algn="l" defTabSz="914400" rtl="0" eaLnBrk="1" fontAlgn="auto" latinLnBrk="0" hangingPunct="1">
+              <a:lnSpc>
+                <a:spcPct val="100000"/>
+              </a:lnSpc>
+              <a:spcBef>
+                <a:spcPts val="0"/>
+              </a:spcBef>
+              <a:spcAft>
+                <a:spcPts val="0"/>
+              </a:spcAft>
+              <a:buClrTx/>
+              <a:buSzTx/>
+              <a:buFontTx/>
+              <a:buNone/>
+              <a:tabLst/>
+              <a:defRPr/>
+            </a:pPr>
             <a:r>
               <a:rPr lang="en-US" dirty="0" smtClean="0"/>
-              <a:t>Not all VM sizes are available in all data centers. For the latest pricing information and availability, see https://azure.microsoft.com/en-us/pricing/details/virtual-machines.</a:t>
-            </a:r>
-          </a:p>
-          <a:p>
-            <a:endParaRPr lang="en-US" dirty="0" smtClean="0"/>
-          </a:p>
-          <a:p>
-            <a:r>
-              <a:rPr lang="en-US" dirty="0" smtClean="0"/>
-              <a:t>N-series VMs are currently in preview</a:t>
+              <a:t>High</a:t>
             </a:r>
             <a:r>
               <a:rPr lang="en-US" baseline="0" dirty="0" smtClean="0"/>
-              <a:t> and are an answer to researchers who need GPU power to perform complex calculations. They are equipped with NVIDIA Tesla GPUs.</a:t>
+              <a:t>-performance computing is typically performed on a cluster of computers interconnected by a high-speed network. Workloads are sent to a master node which delegates tasks to the worker nodes. Historically, clusters were built using proprietary, often purpose-built computers. Recent trends though have shifted to using commodity hardware – the same kind of components used to build desktop computers – to construct HPC clusters. Engineers are getting even more clever with how they build clusters, too. The latest trend in HPC has been to use GPUs in addition to CPUs to created HPC clusters. While a typical desktop CPU has 2, 4, or 8 cores, graphics cards have usually hundreds of cores. These cores, while not as powerful as CPU cores, can still perform computations. HPC clusters are combining CPUs and GPUs to squeeze even more performance out of computer hardware for heavy workloads.</a:t>
             </a:r>
             <a:endParaRPr lang="en-US" dirty="0" smtClean="0"/>
           </a:p>
@@ -1995,7 +2230,7 @@
     </p:spTree>
     <p:extLst>
       <p:ext uri="{BB962C8B-B14F-4D97-AF65-F5344CB8AC3E}">
-        <p14:creationId xmlns:p14="http://schemas.microsoft.com/office/powerpoint/2010/main" val="2171044667"/>
+        <p14:creationId xmlns:p14="http://schemas.microsoft.com/office/powerpoint/2010/main" val="3654422300"/>
       </p:ext>
     </p:extLst>
   </p:cSld>
@@ -2049,30 +2284,45 @@
           <a:bodyPr/>
           <a:lstStyle/>
           <a:p>
-            <a:pPr marL="0" marR="0" lvl="0" indent="0" algn="l" defTabSz="914400" rtl="0" eaLnBrk="1" fontAlgn="auto" latinLnBrk="0" hangingPunct="1">
-              <a:lnSpc>
-                <a:spcPct val="100000"/>
-              </a:lnSpc>
-              <a:spcBef>
-                <a:spcPts val="0"/>
-              </a:spcBef>
-              <a:spcAft>
-                <a:spcPts val="0"/>
-              </a:spcAft>
-              <a:buClrTx/>
-              <a:buSzTx/>
-              <a:buFontTx/>
-              <a:buNone/>
-              <a:tabLst/>
-              <a:defRPr/>
-            </a:pPr>
-            <a:r>
-              <a:rPr lang="en-US" dirty="0" smtClean="0"/>
-              <a:t>For background,</a:t>
-            </a:r>
-            <a:r>
-              <a:rPr lang="en-US" baseline="0" dirty="0" smtClean="0"/>
-              <a:t> see https://blogs.msdn.microsoft.com/uk_faculty_connection/2016/09/12/choosing-the-most-appropiate-azure-virtual-machine-specification/?wt.mc_id=DX_873849. Not shown here are H machines, which are optimized for extremely heavy computing workloads.</a:t>
+            <a:r>
+              <a:rPr lang="en-US" sz="1200" kern="1200" dirty="0" smtClean="0">
+                <a:solidFill>
+                  <a:schemeClr val="tx1"/>
+                </a:solidFill>
+                <a:effectLst/>
+                <a:latin typeface="+mn-lt"/>
+                <a:ea typeface="+mn-ea"/>
+                <a:cs typeface="+mn-cs"/>
+              </a:rPr>
+              <a:t>With Azure, you deploy a cluster of VMs to the cloud in minutes and scale it up and down as needed. They can be Windows VMs or Linux VMs; Azure doesn’t care. In fact, Linux VMs are slightly less expensive because you don’t pay Windows licensing fees for them. You can also choose from a variety of virtual-machine sizes, and you can use deployment templates – something I’ll say more about shortly – to automate your deployments.</a:t>
+            </a:r>
+          </a:p>
+          <a:p>
+            <a:r>
+              <a:rPr lang="en-US" sz="1200" kern="1200" dirty="0" smtClean="0">
+                <a:solidFill>
+                  <a:schemeClr val="tx1"/>
+                </a:solidFill>
+                <a:effectLst/>
+                <a:latin typeface="+mn-lt"/>
+                <a:ea typeface="+mn-ea"/>
+                <a:cs typeface="+mn-cs"/>
+              </a:rPr>
+              <a:t> </a:t>
+            </a:r>
+          </a:p>
+          <a:p>
+            <a:r>
+              <a:rPr lang="en-US" sz="1200" kern="1200" dirty="0" smtClean="0">
+                <a:solidFill>
+                  <a:schemeClr val="tx1"/>
+                </a:solidFill>
+                <a:effectLst/>
+                <a:latin typeface="+mn-lt"/>
+                <a:ea typeface="+mn-ea"/>
+                <a:cs typeface="+mn-cs"/>
+              </a:rPr>
+              <a:t>Azure Batch can also play a role in HPC by allowing you to schedule jobs to run across a pool of VMs, much like the batch-processing services frequently used on mainframes and supercomputers.</a:t>
             </a:r>
           </a:p>
         </p:txBody>
@@ -2103,7 +2353,7 @@
     </p:spTree>
     <p:extLst>
       <p:ext uri="{BB962C8B-B14F-4D97-AF65-F5344CB8AC3E}">
-        <p14:creationId xmlns:p14="http://schemas.microsoft.com/office/powerpoint/2010/main" val="928529220"/>
+        <p14:creationId xmlns:p14="http://schemas.microsoft.com/office/powerpoint/2010/main" val="976261457"/>
       </p:ext>
     </p:extLst>
   </p:cSld>
@@ -2157,23 +2407,6 @@
           <a:bodyPr/>
           <a:lstStyle/>
           <a:p>
-            <a:pPr marL="0" marR="0" indent="0" algn="l" defTabSz="914400" rtl="0" eaLnBrk="1" fontAlgn="auto" latinLnBrk="0" hangingPunct="1">
-              <a:lnSpc>
-                <a:spcPct val="100000"/>
-              </a:lnSpc>
-              <a:spcBef>
-                <a:spcPts val="0"/>
-              </a:spcBef>
-              <a:spcAft>
-                <a:spcPts val="0"/>
-              </a:spcAft>
-              <a:buClrTx/>
-              <a:buSzTx/>
-              <a:buFontTx/>
-              <a:buNone/>
-              <a:tabLst/>
-              <a:defRPr/>
-            </a:pPr>
             <a:r>
               <a:rPr lang="en-US" sz="1200" kern="1200" dirty="0" smtClean="0">
                 <a:solidFill>
@@ -2184,7 +2417,57 @@
                 <a:ea typeface="+mn-ea"/>
                 <a:cs typeface="+mn-cs"/>
               </a:rPr>
-              <a:t>Here’s a quick look at three of the Azure VM sizes so you can see how they differ in cost and capability. One thing to keep in mind when deploying VMs is that you get charged for them whether they’re in use or not. When you’re finished using a VM or a cluster of VMs, it behooves you to go into the Azure portal and suspend each VM to avoid unnecessary charges. Once suspended, a VM is easily restarted so you can pick up where you left off and continue using it. I’ll show you how to start and stop VMs in the demo coming up shortly. I’ll also show you how to delete them so you can avoid even incurring storage charges for VMs that are no longer needed.</a:t>
+              <a:t>Azure offers a variety of VM sizes in an effort to make sure there’s something to fit everyone’s needs. Each size is identified by a letter and a number: A0, D1, G2, and so on. There is documentation online detailing the specs for each machine – number of cores, amount of RAM, type and size of hard disk, for example – as well as the cost. Not surprisingly, more powerful machines are most costly as well. Prices range from as little as 7 cents an hour for a single core machine running Linux to almost $10 an hour for a machine with 32 cores and almost half a terabyte of RAM. The G-series machines are reserved for the most power-hungry applications.</a:t>
+            </a:r>
+          </a:p>
+          <a:p>
+            <a:r>
+              <a:rPr lang="en-US" sz="1200" kern="1200" dirty="0" smtClean="0">
+                <a:solidFill>
+                  <a:schemeClr val="tx1"/>
+                </a:solidFill>
+                <a:effectLst/>
+                <a:latin typeface="+mn-lt"/>
+                <a:ea typeface="+mn-ea"/>
+                <a:cs typeface="+mn-cs"/>
+              </a:rPr>
+              <a:t> </a:t>
+            </a:r>
+          </a:p>
+          <a:p>
+            <a:r>
+              <a:rPr lang="en-US" sz="1200" kern="1200" dirty="0" smtClean="0">
+                <a:solidFill>
+                  <a:schemeClr val="tx1"/>
+                </a:solidFill>
+                <a:effectLst/>
+                <a:latin typeface="+mn-lt"/>
+                <a:ea typeface="+mn-ea"/>
+                <a:cs typeface="+mn-cs"/>
+              </a:rPr>
+              <a:t>Costs can grow astronomically when you talk about clusters with hundreds or even thousands of cores. But cost isn’t really the point. The point is having massive amounts of computing power at your fingertips. Besides, the cost of “renting” even the largest virtual cluster pales in comparison to the cost of purchasing, setting up, and maintaining a similarly sized cluster of your own.</a:t>
+            </a:r>
+          </a:p>
+          <a:p>
+            <a:endParaRPr lang="en-US" dirty="0" smtClean="0"/>
+          </a:p>
+          <a:p>
+            <a:r>
+              <a:rPr lang="en-US" dirty="0" smtClean="0"/>
+              <a:t>Not all VM sizes are available in all data centers. For the latest pricing information and availability, see https://azure.microsoft.com/en-us/pricing/details/virtual-machines.</a:t>
+            </a:r>
+          </a:p>
+          <a:p>
+            <a:endParaRPr lang="en-US" dirty="0" smtClean="0"/>
+          </a:p>
+          <a:p>
+            <a:r>
+              <a:rPr lang="en-US" dirty="0" smtClean="0"/>
+              <a:t>N-series VMs are currently in preview</a:t>
+            </a:r>
+            <a:r>
+              <a:rPr lang="en-US" baseline="0" dirty="0" smtClean="0"/>
+              <a:t> and are an answer to researchers who need GPU power to perform complex calculations. They are equipped with NVIDIA Tesla GPUs.</a:t>
             </a:r>
             <a:endParaRPr lang="en-US" dirty="0" smtClean="0"/>
           </a:p>
@@ -2216,7 +2499,7 @@
     </p:spTree>
     <p:extLst>
       <p:ext uri="{BB962C8B-B14F-4D97-AF65-F5344CB8AC3E}">
-        <p14:creationId xmlns:p14="http://schemas.microsoft.com/office/powerpoint/2010/main" val="2655584646"/>
+        <p14:creationId xmlns:p14="http://schemas.microsoft.com/office/powerpoint/2010/main" val="2171044667"/>
       </p:ext>
     </p:extLst>
   </p:cSld>
@@ -2270,123 +2553,31 @@
           <a:bodyPr/>
           <a:lstStyle/>
           <a:p>
-            <a:r>
-              <a:rPr lang="en-US" sz="1200" kern="1200" dirty="0" smtClean="0">
-                <a:solidFill>
-                  <a:schemeClr val="tx1"/>
-                </a:solidFill>
-                <a:effectLst/>
-                <a:latin typeface="+mn-lt"/>
-                <a:ea typeface="+mn-ea"/>
-                <a:cs typeface="+mn-cs"/>
-              </a:rPr>
-              <a:t>An important element of HPC in Azure is the Azure Resource Manager. The Azure Resource Manager is a relatively recent addition to Azure. It lets you combine the resources that comprise an application – resources such as VMs, databases, virtual networks, and storage accounts – into </a:t>
-            </a:r>
-            <a:r>
-              <a:rPr lang="en-US" sz="1200" i="1" kern="1200" dirty="0" smtClean="0">
-                <a:solidFill>
-                  <a:schemeClr val="tx1"/>
-                </a:solidFill>
-                <a:effectLst/>
-                <a:latin typeface="+mn-lt"/>
-                <a:ea typeface="+mn-ea"/>
-                <a:cs typeface="+mn-cs"/>
-              </a:rPr>
-              <a:t>resource groups</a:t>
-            </a:r>
-            <a:r>
-              <a:rPr lang="en-US" sz="1200" kern="1200" dirty="0" smtClean="0">
-                <a:solidFill>
-                  <a:schemeClr val="tx1"/>
-                </a:solidFill>
-                <a:effectLst/>
-                <a:latin typeface="+mn-lt"/>
-                <a:ea typeface="+mn-ea"/>
-                <a:cs typeface="+mn-cs"/>
-              </a:rPr>
-              <a:t> so entire applications can be deployed, managed, and even deleted with a single step. Prior to Resource Manager, resources had to be created (and deleted) one by one, which quickly became onerous with large deployments.</a:t>
-            </a:r>
-          </a:p>
-          <a:p>
-            <a:r>
-              <a:rPr lang="en-US" sz="1200" kern="1200" dirty="0" smtClean="0">
-                <a:solidFill>
-                  <a:schemeClr val="tx1"/>
-                </a:solidFill>
-                <a:effectLst/>
-                <a:latin typeface="+mn-lt"/>
-                <a:ea typeface="+mn-ea"/>
-                <a:cs typeface="+mn-cs"/>
-              </a:rPr>
-              <a:t> </a:t>
-            </a:r>
-          </a:p>
-          <a:p>
-            <a:r>
-              <a:rPr lang="en-US" sz="1200" kern="1200" dirty="0" smtClean="0">
-                <a:solidFill>
-                  <a:schemeClr val="tx1"/>
-                </a:solidFill>
-                <a:effectLst/>
-                <a:latin typeface="+mn-lt"/>
-                <a:ea typeface="+mn-ea"/>
-                <a:cs typeface="+mn-cs"/>
-              </a:rPr>
-              <a:t>The Azure Resource Manager allows you to deploy applications using declarative templates called </a:t>
-            </a:r>
-            <a:r>
-              <a:rPr lang="en-US" sz="1200" i="1" kern="1200" dirty="0" smtClean="0">
-                <a:solidFill>
-                  <a:schemeClr val="tx1"/>
-                </a:solidFill>
-                <a:effectLst/>
-                <a:latin typeface="+mn-lt"/>
-                <a:ea typeface="+mn-ea"/>
-                <a:cs typeface="+mn-cs"/>
-              </a:rPr>
-              <a:t>deployment templates</a:t>
-            </a:r>
-            <a:r>
-              <a:rPr lang="en-US" sz="1200" kern="1200" dirty="0" smtClean="0">
-                <a:solidFill>
-                  <a:schemeClr val="tx1"/>
-                </a:solidFill>
-                <a:effectLst/>
-                <a:latin typeface="+mn-lt"/>
-                <a:ea typeface="+mn-ea"/>
-                <a:cs typeface="+mn-cs"/>
-              </a:rPr>
-              <a:t>. A template contains a complete description of all the resources that make up the application. Templates can include parameters that users will be prompted to fill in each time an application is deployed. Templates can also run scripts to initialize resources to a known and consistent state.</a:t>
-            </a:r>
-          </a:p>
-          <a:p>
-            <a:r>
-              <a:rPr lang="en-US" sz="1200" kern="1200" dirty="0" smtClean="0">
-                <a:solidFill>
-                  <a:schemeClr val="tx1"/>
-                </a:solidFill>
-                <a:effectLst/>
-                <a:latin typeface="+mn-lt"/>
-                <a:ea typeface="+mn-ea"/>
-                <a:cs typeface="+mn-cs"/>
-              </a:rPr>
-              <a:t> </a:t>
-            </a:r>
-          </a:p>
-          <a:p>
-            <a:r>
-              <a:rPr lang="en-US" sz="1200" kern="1200" dirty="0" smtClean="0">
-                <a:solidFill>
-                  <a:schemeClr val="tx1"/>
-                </a:solidFill>
-                <a:effectLst/>
-                <a:latin typeface="+mn-lt"/>
-                <a:ea typeface="+mn-ea"/>
-                <a:cs typeface="+mn-cs"/>
-              </a:rPr>
-              <a:t>As an example, suppose you have built an HPC cluster that includes virtual machines and other Azure resources. With a template, you can script the creation of the entire cluster and optionally the data that goes with it. This makes it easy for others to spin up instances of the cluster, or for you to recreate it if you deleted it thinking you wouldn’t be needing it again.</a:t>
-            </a:r>
-            <a:endParaRPr lang="en-US" dirty="0" smtClean="0"/>
+            <a:pPr marL="0" marR="0" lvl="0" indent="0" algn="l" defTabSz="914400" rtl="0" eaLnBrk="1" fontAlgn="auto" latinLnBrk="0" hangingPunct="1">
+              <a:lnSpc>
+                <a:spcPct val="100000"/>
+              </a:lnSpc>
+              <a:spcBef>
+                <a:spcPts val="0"/>
+              </a:spcBef>
+              <a:spcAft>
+                <a:spcPts val="0"/>
+              </a:spcAft>
+              <a:buClrTx/>
+              <a:buSzTx/>
+              <a:buFontTx/>
+              <a:buNone/>
+              <a:tabLst/>
+              <a:defRPr/>
+            </a:pPr>
+            <a:r>
+              <a:rPr lang="en-US" dirty="0" smtClean="0"/>
+              <a:t>For background,</a:t>
+            </a:r>
+            <a:r>
+              <a:rPr lang="en-US" baseline="0" dirty="0" smtClean="0"/>
+              <a:t> see https://blogs.msdn.microsoft.com/uk_faculty_connection/2016/09/12/choosing-the-most-appropiate-azure-virtual-machine-specification/?wt.mc_id=DX_873849. Not shown here are H machines, which are optimized for extremely heavy computing workloads.</a:t>
+            </a:r>
           </a:p>
         </p:txBody>
       </p:sp>
@@ -2416,7 +2607,7 @@
     </p:spTree>
     <p:extLst>
       <p:ext uri="{BB962C8B-B14F-4D97-AF65-F5344CB8AC3E}">
-        <p14:creationId xmlns:p14="http://schemas.microsoft.com/office/powerpoint/2010/main" val="988917755"/>
+        <p14:creationId xmlns:p14="http://schemas.microsoft.com/office/powerpoint/2010/main" val="928529220"/>
       </p:ext>
     </p:extLst>
   </p:cSld>
@@ -2470,91 +2661,36 @@
           <a:bodyPr/>
           <a:lstStyle/>
           <a:p>
-            <a:r>
-              <a:rPr lang="en-US" dirty="0"/>
-              <a:t>Notes:</a:t>
-            </a:r>
-          </a:p>
-          <a:p>
-            <a:pPr marL="171450" indent="-171450">
-              <a:buFont typeface="Arial" panose="020B0604020202020204" pitchFamily="34" charset="0"/>
-              <a:buChar char="•"/>
+            <a:pPr marL="0" marR="0" indent="0" algn="l" defTabSz="914400" rtl="0" eaLnBrk="1" fontAlgn="auto" latinLnBrk="0" hangingPunct="1">
+              <a:lnSpc>
+                <a:spcPct val="100000"/>
+              </a:lnSpc>
+              <a:spcBef>
+                <a:spcPts val="0"/>
+              </a:spcBef>
+              <a:spcAft>
+                <a:spcPts val="0"/>
+              </a:spcAft>
+              <a:buClrTx/>
+              <a:buSzTx/>
+              <a:buFontTx/>
+              <a:buNone/>
+              <a:tabLst/>
+              <a:defRPr/>
             </a:pPr>
             <a:r>
-              <a:rPr lang="en-US" dirty="0"/>
-              <a:t>Another deployment option is to use ARM Templates</a:t>
-            </a:r>
-          </a:p>
-          <a:p>
-            <a:pPr marL="171450" indent="-171450">
-              <a:buFont typeface="Arial" panose="020B0604020202020204" pitchFamily="34" charset="0"/>
-              <a:buChar char="•"/>
-            </a:pPr>
-            <a:r>
-              <a:rPr lang="en-US" dirty="0"/>
-              <a:t>ARM Templates are declarative</a:t>
-            </a:r>
-            <a:r>
-              <a:rPr lang="en-US" baseline="0" dirty="0"/>
-              <a:t> files that define the resources to deploy and the inter-relationships between deployed resources</a:t>
-            </a:r>
-            <a:endParaRPr lang="en-US" dirty="0"/>
-          </a:p>
-          <a:p>
-            <a:pPr marL="171450" indent="-171450">
-              <a:buFont typeface="Arial" panose="020B0604020202020204" pitchFamily="34" charset="0"/>
-              <a:buChar char="•"/>
-            </a:pPr>
-            <a:r>
-              <a:rPr lang="en-US" dirty="0"/>
-              <a:t>Specify input parameters and variables, use expressions</a:t>
-            </a:r>
-          </a:p>
-          <a:p>
-            <a:pPr marL="171450" indent="-171450">
-              <a:buFont typeface="Arial" panose="020B0604020202020204" pitchFamily="34" charset="0"/>
-              <a:buChar char="•"/>
-            </a:pPr>
-            <a:r>
-              <a:rPr lang="en-US" dirty="0"/>
-              <a:t>Use Azure </a:t>
-            </a:r>
-            <a:r>
-              <a:rPr lang="en-US" dirty="0" err="1"/>
-              <a:t>Quickstart</a:t>
-            </a:r>
-            <a:r>
-              <a:rPr lang="en-US" dirty="0"/>
-              <a:t> templates, with source in GitHub</a:t>
-            </a:r>
-          </a:p>
-          <a:p>
-            <a:pPr marL="171450" indent="-171450">
-              <a:buFont typeface="Arial" panose="020B0604020202020204" pitchFamily="34" charset="0"/>
-              <a:buChar char="•"/>
-            </a:pPr>
-            <a:r>
-              <a:rPr lang="en-US" dirty="0"/>
-              <a:t>Edit in Azure online editor, use Visual Studio tooling, use Visual Studio Code</a:t>
-            </a:r>
-          </a:p>
-          <a:p>
-            <a:pPr marL="171450" indent="-171450">
-              <a:buFont typeface="Arial" panose="020B0604020202020204" pitchFamily="34" charset="0"/>
-              <a:buChar char="•"/>
-            </a:pPr>
-            <a:r>
-              <a:rPr lang="en-US" dirty="0"/>
-              <a:t>They can be checked into source</a:t>
-            </a:r>
-            <a:r>
-              <a:rPr lang="en-US" baseline="0" dirty="0"/>
-              <a:t> control in order to simplify deployment management</a:t>
-            </a:r>
-            <a:endParaRPr lang="en-US" dirty="0"/>
-          </a:p>
-          <a:p>
-            <a:endParaRPr lang="en-US" dirty="0"/>
+              <a:rPr lang="en-US" sz="1200" kern="1200" dirty="0" smtClean="0">
+                <a:solidFill>
+                  <a:schemeClr val="tx1"/>
+                </a:solidFill>
+                <a:effectLst/>
+                <a:latin typeface="+mn-lt"/>
+                <a:ea typeface="+mn-ea"/>
+                <a:cs typeface="+mn-cs"/>
+              </a:rPr>
+              <a:t>Here’s a quick look at three of the Azure VM sizes so you can see how they differ in cost and capability. One thing to keep in mind when deploying VMs is that you get charged for them whether they’re in use or not. When you’re finished using a VM or a cluster of VMs, it behooves you to go into the Azure portal and suspend each VM to avoid unnecessary charges. Once suspended, a VM is easily restarted so you can pick up where you left off and continue using it. I’ll show you how to start and stop VMs in the demo coming up shortly. I’ll also show you how to delete them so you can avoid even incurring storage charges for VMs that are no longer needed.</a:t>
+            </a:r>
+            <a:endParaRPr lang="en-US" dirty="0" smtClean="0"/>
           </a:p>
         </p:txBody>
       </p:sp>
@@ -2584,7 +2720,7 @@
     </p:spTree>
     <p:extLst>
       <p:ext uri="{BB962C8B-B14F-4D97-AF65-F5344CB8AC3E}">
-        <p14:creationId xmlns:p14="http://schemas.microsoft.com/office/powerpoint/2010/main" val="1674096139"/>
+        <p14:creationId xmlns:p14="http://schemas.microsoft.com/office/powerpoint/2010/main" val="2655584646"/>
       </p:ext>
     </p:extLst>
   </p:cSld>
@@ -2648,10 +2784,10 @@
                 <a:ea typeface="+mn-ea"/>
                 <a:cs typeface="+mn-cs"/>
               </a:rPr>
-              <a:t>You can build deployment templates of your own, or you can use ones that have already been built. An assortment of templates built by the Azure team and by others in the community can be found on the Azure </a:t>
-            </a:r>
-            <a:r>
-              <a:rPr lang="en-US" sz="1200" kern="1200" dirty="0" err="1" smtClean="0">
+              <a:t>An important element of HPC in Azure is the Azure Resource Manager. The Azure Resource Manager is a relatively recent addition to Azure. It lets you combine the resources that comprise an application – resources such as VMs, databases, virtual networks, and storage accounts – into </a:t>
+            </a:r>
+            <a:r>
+              <a:rPr lang="en-US" sz="1200" i="1" kern="1200" dirty="0" smtClean="0">
                 <a:solidFill>
                   <a:schemeClr val="tx1"/>
                 </a:solidFill>
@@ -2660,7 +2796,7 @@
                 <a:ea typeface="+mn-ea"/>
                 <a:cs typeface="+mn-cs"/>
               </a:rPr>
-              <a:t>Quickstart</a:t>
+              <a:t>resource groups</a:t>
             </a:r>
             <a:r>
               <a:rPr lang="en-US" sz="1200" kern="1200" dirty="0" smtClean="0">
@@ -2672,31 +2808,7 @@
                 <a:ea typeface="+mn-ea"/>
                 <a:cs typeface="+mn-cs"/>
               </a:rPr>
-              <a:t> Templates Web site or on GitHub. There are templates for creating clusters of Linux VMs, deploying </a:t>
-            </a:r>
-            <a:r>
-              <a:rPr lang="en-US" sz="1200" kern="1200" dirty="0" err="1" smtClean="0">
-                <a:solidFill>
-                  <a:schemeClr val="tx1"/>
-                </a:solidFill>
-                <a:effectLst/>
-                <a:latin typeface="+mn-lt"/>
-                <a:ea typeface="+mn-ea"/>
-                <a:cs typeface="+mn-cs"/>
-              </a:rPr>
-              <a:t>Redis</a:t>
-            </a:r>
-            <a:r>
-              <a:rPr lang="en-US" sz="1200" kern="1200" dirty="0" smtClean="0">
-                <a:solidFill>
-                  <a:schemeClr val="tx1"/>
-                </a:solidFill>
-                <a:effectLst/>
-                <a:latin typeface="+mn-lt"/>
-                <a:ea typeface="+mn-ea"/>
-                <a:cs typeface="+mn-cs"/>
-              </a:rPr>
-              <a:t> clusters of Ubuntu VMs, deploying MySQL servers, creating Windows VMs provisioned with IIS, and a whole lot more. There is even a template that deploys Minecraft Server in an Ubuntu VM.</a:t>
+              <a:t> so entire applications can be deployed, managed, and even deleted with a single step. Prior to Resource Manager, resources had to be created (and deleted) one by one, which quickly became onerous with large deployments.</a:t>
             </a:r>
           </a:p>
           <a:p>
@@ -2724,17 +2836,61 @@
                 <a:ea typeface="+mn-ea"/>
                 <a:cs typeface="+mn-cs"/>
               </a:rPr>
-              <a:t>Using any of these templates requires nothing more than a button click. Each template comes with documentation that tells you what parameters it requires and whether the template was created by Microsoft or by someone in the community. Best of all, you can view each template’s source code, which is little more than a JSON script, and customize it to fit your needs or even build upon it to create templates of your own.</a:t>
-            </a:r>
-          </a:p>
-          <a:p>
+              <a:t>The Azure Resource Manager allows you to deploy applications using declarative templates called </a:t>
+            </a:r>
+            <a:r>
+              <a:rPr lang="en-US" sz="1200" i="1" kern="1200" dirty="0" smtClean="0">
+                <a:solidFill>
+                  <a:schemeClr val="tx1"/>
+                </a:solidFill>
+                <a:effectLst/>
+                <a:latin typeface="+mn-lt"/>
+                <a:ea typeface="+mn-ea"/>
+                <a:cs typeface="+mn-cs"/>
+              </a:rPr>
+              <a:t>deployment templates</a:t>
+            </a:r>
+            <a:r>
+              <a:rPr lang="en-US" sz="1200" kern="1200" dirty="0" smtClean="0">
+                <a:solidFill>
+                  <a:schemeClr val="tx1"/>
+                </a:solidFill>
+                <a:effectLst/>
+                <a:latin typeface="+mn-lt"/>
+                <a:ea typeface="+mn-ea"/>
+                <a:cs typeface="+mn-cs"/>
+              </a:rPr>
+              <a:t>. A template contains a complete description of all the resources that make up the application. Templates can include parameters that users will be prompted to fill in each time an application is deployed. Templates can also run scripts to initialize resources to a known and consistent state.</a:t>
+            </a:r>
+          </a:p>
+          <a:p>
+            <a:r>
+              <a:rPr lang="en-US" sz="1200" kern="1200" dirty="0" smtClean="0">
+                <a:solidFill>
+                  <a:schemeClr val="tx1"/>
+                </a:solidFill>
+                <a:effectLst/>
+                <a:latin typeface="+mn-lt"/>
+                <a:ea typeface="+mn-ea"/>
+                <a:cs typeface="+mn-cs"/>
+              </a:rPr>
+              <a:t> </a:t>
+            </a:r>
+          </a:p>
+          <a:p>
+            <a:r>
+              <a:rPr lang="en-US" sz="1200" kern="1200" dirty="0" smtClean="0">
+                <a:solidFill>
+                  <a:schemeClr val="tx1"/>
+                </a:solidFill>
+                <a:effectLst/>
+                <a:latin typeface="+mn-lt"/>
+                <a:ea typeface="+mn-ea"/>
+                <a:cs typeface="+mn-cs"/>
+              </a:rPr>
+              <a:t>As an example, suppose you have built an HPC cluster that includes virtual machines and other Azure resources. With a template, you can script the creation of the entire cluster and optionally the data that goes with it. This makes it easy for others to spin up instances of the cluster, or for you to recreate it if you deleted it thinking you wouldn’t be needing it again.</a:t>
+            </a:r>
             <a:endParaRPr lang="en-US" dirty="0" smtClean="0"/>
-          </a:p>
-          <a:p>
-            <a:r>
-              <a:rPr lang="en-US" dirty="0" smtClean="0"/>
-              <a:t>The three templates pictured here are just a few of the many dozens of templates currently available.</a:t>
-            </a:r>
           </a:p>
         </p:txBody>
       </p:sp>
@@ -2764,7 +2920,7 @@
     </p:spTree>
     <p:extLst>
       <p:ext uri="{BB962C8B-B14F-4D97-AF65-F5344CB8AC3E}">
-        <p14:creationId xmlns:p14="http://schemas.microsoft.com/office/powerpoint/2010/main" val="3998187520"/>
+        <p14:creationId xmlns:p14="http://schemas.microsoft.com/office/powerpoint/2010/main" val="988917755"/>
       </p:ext>
     </p:extLst>
   </p:cSld>
@@ -2818,27 +2974,91 @@
           <a:bodyPr/>
           <a:lstStyle/>
           <a:p>
-            <a:pPr marL="0" marR="0" indent="0" algn="l" defTabSz="914400" rtl="0" eaLnBrk="1" fontAlgn="auto" latinLnBrk="0" hangingPunct="1">
-              <a:lnSpc>
-                <a:spcPct val="100000"/>
-              </a:lnSpc>
-              <a:spcBef>
-                <a:spcPts val="0"/>
-              </a:spcBef>
-              <a:spcAft>
-                <a:spcPts val="0"/>
-              </a:spcAft>
-              <a:buClrTx/>
-              <a:buSzTx/>
-              <a:buFontTx/>
-              <a:buNone/>
-              <a:tabLst/>
-              <a:defRPr/>
+            <a:r>
+              <a:rPr lang="en-US" dirty="0"/>
+              <a:t>Notes:</a:t>
+            </a:r>
+          </a:p>
+          <a:p>
+            <a:pPr marL="171450" indent="-171450">
+              <a:buFont typeface="Arial" panose="020B0604020202020204" pitchFamily="34" charset="0"/>
+              <a:buChar char="•"/>
             </a:pPr>
             <a:r>
-              <a:rPr lang="en-US" dirty="0" smtClean="0"/>
-              <a:t>The Simple Linux Utility for Resource Management (SLURM), also known as the SLURM Workload Manager, is a free and open-source job scheduler for Linux that excels at distributing heavy computing workloads across clusters of machines and processors. It is used on more than half of the world's largest supercomputers and High-Performance Computing (HPC) clusters, and it enjoys widespread use in the research community for jobs that require significant CPU resources.</a:t>
-            </a:r>
+              <a:rPr lang="en-US" dirty="0"/>
+              <a:t>Another deployment option is to use ARM Templates</a:t>
+            </a:r>
+          </a:p>
+          <a:p>
+            <a:pPr marL="171450" indent="-171450">
+              <a:buFont typeface="Arial" panose="020B0604020202020204" pitchFamily="34" charset="0"/>
+              <a:buChar char="•"/>
+            </a:pPr>
+            <a:r>
+              <a:rPr lang="en-US" dirty="0"/>
+              <a:t>ARM Templates are declarative</a:t>
+            </a:r>
+            <a:r>
+              <a:rPr lang="en-US" baseline="0" dirty="0"/>
+              <a:t> files that define the resources to deploy and the inter-relationships between deployed resources</a:t>
+            </a:r>
+            <a:endParaRPr lang="en-US" dirty="0"/>
+          </a:p>
+          <a:p>
+            <a:pPr marL="171450" indent="-171450">
+              <a:buFont typeface="Arial" panose="020B0604020202020204" pitchFamily="34" charset="0"/>
+              <a:buChar char="•"/>
+            </a:pPr>
+            <a:r>
+              <a:rPr lang="en-US" dirty="0"/>
+              <a:t>Specify input parameters and variables, use expressions</a:t>
+            </a:r>
+          </a:p>
+          <a:p>
+            <a:pPr marL="171450" indent="-171450">
+              <a:buFont typeface="Arial" panose="020B0604020202020204" pitchFamily="34" charset="0"/>
+              <a:buChar char="•"/>
+            </a:pPr>
+            <a:r>
+              <a:rPr lang="en-US" dirty="0"/>
+              <a:t>Use Azure </a:t>
+            </a:r>
+            <a:r>
+              <a:rPr lang="en-US" dirty="0" err="1"/>
+              <a:t>Quickstart</a:t>
+            </a:r>
+            <a:r>
+              <a:rPr lang="en-US" dirty="0"/>
+              <a:t> templates, with source in GitHub</a:t>
+            </a:r>
+          </a:p>
+          <a:p>
+            <a:pPr marL="171450" indent="-171450">
+              <a:buFont typeface="Arial" panose="020B0604020202020204" pitchFamily="34" charset="0"/>
+              <a:buChar char="•"/>
+            </a:pPr>
+            <a:r>
+              <a:rPr lang="en-US" dirty="0"/>
+              <a:t>Edit in Azure online editor, use Visual Studio tooling, use Visual Studio Code</a:t>
+            </a:r>
+          </a:p>
+          <a:p>
+            <a:pPr marL="171450" indent="-171450">
+              <a:buFont typeface="Arial" panose="020B0604020202020204" pitchFamily="34" charset="0"/>
+              <a:buChar char="•"/>
+            </a:pPr>
+            <a:r>
+              <a:rPr lang="en-US" dirty="0"/>
+              <a:t>They can be checked into source</a:t>
+            </a:r>
+            <a:r>
+              <a:rPr lang="en-US" baseline="0" dirty="0"/>
+              <a:t> control in order to simplify deployment management</a:t>
+            </a:r>
+            <a:endParaRPr lang="en-US" dirty="0"/>
+          </a:p>
+          <a:p>
+            <a:endParaRPr lang="en-US" dirty="0"/>
           </a:p>
         </p:txBody>
       </p:sp>
@@ -2868,7 +3088,7 @@
     </p:spTree>
     <p:extLst>
       <p:ext uri="{BB962C8B-B14F-4D97-AF65-F5344CB8AC3E}">
-        <p14:creationId xmlns:p14="http://schemas.microsoft.com/office/powerpoint/2010/main" val="2236143850"/>
+        <p14:creationId xmlns:p14="http://schemas.microsoft.com/office/powerpoint/2010/main" val="1674096139"/>
       </p:ext>
     </p:extLst>
   </p:cSld>
@@ -3025,7 +3245,7 @@
           <a:p>
             <a:fld id="{0459C166-16D3-4A25-A2F8-C51E0E346B22}" type="datetimeFigureOut">
               <a:rPr lang="en-US" smtClean="0"/>
-              <a:t>10/24/2016</a:t>
+              <a:t>12/20/2016</a:t>
             </a:fld>
             <a:endParaRPr lang="en-US"/>
           </a:p>
@@ -3120,7 +3340,7 @@
           <a:p>
             <a:fld id="{0459C166-16D3-4A25-A2F8-C51E0E346B22}" type="datetimeFigureOut">
               <a:rPr lang="en-US" smtClean="0"/>
-              <a:t>10/24/2016</a:t>
+              <a:t>12/20/2016</a:t>
             </a:fld>
             <a:endParaRPr lang="en-US"/>
           </a:p>
@@ -3395,7 +3615,7 @@
           <a:p>
             <a:fld id="{0459C166-16D3-4A25-A2F8-C51E0E346B22}" type="datetimeFigureOut">
               <a:rPr lang="en-US" smtClean="0"/>
-              <a:t>10/24/2016</a:t>
+              <a:t>12/20/2016</a:t>
             </a:fld>
             <a:endParaRPr lang="en-US"/>
           </a:p>
@@ -3647,7 +3867,7 @@
           <a:p>
             <a:fld id="{0459C166-16D3-4A25-A2F8-C51E0E346B22}" type="datetimeFigureOut">
               <a:rPr lang="en-US" smtClean="0"/>
-              <a:t>10/24/2016</a:t>
+              <a:t>12/20/2016</a:t>
             </a:fld>
             <a:endParaRPr lang="en-US"/>
           </a:p>
@@ -3815,7 +4035,7 @@
           <a:p>
             <a:fld id="{0459C166-16D3-4A25-A2F8-C51E0E346B22}" type="datetimeFigureOut">
               <a:rPr lang="en-US" smtClean="0"/>
-              <a:t>10/24/2016</a:t>
+              <a:t>12/20/2016</a:t>
             </a:fld>
             <a:endParaRPr lang="en-US"/>
           </a:p>
@@ -3993,7 +4213,7 @@
           <a:p>
             <a:fld id="{0459C166-16D3-4A25-A2F8-C51E0E346B22}" type="datetimeFigureOut">
               <a:rPr lang="en-US" smtClean="0"/>
-              <a:t>10/24/2016</a:t>
+              <a:t>12/20/2016</a:t>
             </a:fld>
             <a:endParaRPr lang="en-US"/>
           </a:p>
@@ -5920,7 +6140,7 @@
           <a:p>
             <a:fld id="{0459C166-16D3-4A25-A2F8-C51E0E346B22}" type="datetimeFigureOut">
               <a:rPr lang="en-US" smtClean="0"/>
-              <a:t>10/24/2016</a:t>
+              <a:t>12/20/2016</a:t>
             </a:fld>
             <a:endParaRPr lang="en-US"/>
           </a:p>
@@ -11547,7 +11767,7 @@
             <a:fld id="{0459C166-16D3-4A25-A2F8-C51E0E346B22}" type="datetimeFigureOut">
               <a:rPr lang="en-US" smtClean="0"/>
               <a:pPr/>
-              <a:t>10/24/2016</a:t>
+              <a:t>12/20/2016</a:t>
             </a:fld>
             <a:endParaRPr lang="en-US"/>
           </a:p>
@@ -15609,7 +15829,7 @@
           <a:p>
             <a:fld id="{0459C166-16D3-4A25-A2F8-C51E0E346B22}" type="datetimeFigureOut">
               <a:rPr lang="en-US" smtClean="0"/>
-              <a:t>10/24/2016</a:t>
+              <a:t>12/20/2016</a:t>
             </a:fld>
             <a:endParaRPr lang="en-US"/>
           </a:p>
@@ -15973,7 +16193,7 @@
           <a:p>
             <a:fld id="{0459C166-16D3-4A25-A2F8-C51E0E346B22}" type="datetimeFigureOut">
               <a:rPr lang="en-US" smtClean="0"/>
-              <a:t>10/24/2016</a:t>
+              <a:t>12/20/2016</a:t>
             </a:fld>
             <a:endParaRPr lang="en-US"/>
           </a:p>
@@ -16090,7 +16310,7 @@
           <a:p>
             <a:fld id="{0459C166-16D3-4A25-A2F8-C51E0E346B22}" type="datetimeFigureOut">
               <a:rPr lang="en-US" smtClean="0"/>
-              <a:t>10/24/2016</a:t>
+              <a:t>12/20/2016</a:t>
             </a:fld>
             <a:endParaRPr lang="en-US"/>
           </a:p>
@@ -16301,7 +16521,7 @@
           <a:p>
             <a:fld id="{0459C166-16D3-4A25-A2F8-C51E0E346B22}" type="datetimeFigureOut">
               <a:rPr lang="en-US" smtClean="0"/>
-              <a:t>10/24/2016</a:t>
+              <a:t>12/20/2016</a:t>
             </a:fld>
             <a:endParaRPr lang="en-US"/>
           </a:p>
@@ -17710,6 +17930,367 @@
           <a:p>
             <a:r>
               <a:rPr lang="en-US" dirty="0" smtClean="0"/>
+              <a:t>Azure </a:t>
+            </a:r>
+            <a:r>
+              <a:rPr lang="en-US" dirty="0" err="1" smtClean="0"/>
+              <a:t>Quickstart</a:t>
+            </a:r>
+            <a:r>
+              <a:rPr lang="en-US" dirty="0" smtClean="0"/>
+              <a:t> Templates</a:t>
+            </a:r>
+            <a:endParaRPr lang="en-US" dirty="0"/>
+          </a:p>
+        </p:txBody>
+      </p:sp>
+      <p:sp>
+        <p:nvSpPr>
+          <p:cNvPr id="3" name="Content Placeholder 2"/>
+          <p:cNvSpPr>
+            <a:spLocks noGrp="1"/>
+          </p:cNvSpPr>
+          <p:nvPr>
+            <p:ph idx="1"/>
+          </p:nvPr>
+        </p:nvSpPr>
+        <p:spPr/>
+        <p:txBody>
+          <a:bodyPr/>
+          <a:lstStyle/>
+          <a:p>
+            <a:r>
+              <a:rPr lang="en-US" dirty="0"/>
+              <a:t>Free, open-source deployment templates</a:t>
+            </a:r>
+          </a:p>
+          <a:p>
+            <a:endParaRPr lang="en-US" dirty="0"/>
+          </a:p>
+          <a:p>
+            <a:endParaRPr lang="en-US" dirty="0"/>
+          </a:p>
+          <a:p>
+            <a:endParaRPr lang="en-US" dirty="0"/>
+          </a:p>
+          <a:p>
+            <a:endParaRPr lang="en-US" dirty="0"/>
+          </a:p>
+          <a:p>
+            <a:endParaRPr lang="en-US" dirty="0"/>
+          </a:p>
+          <a:p>
+            <a:r>
+              <a:rPr lang="en-US" dirty="0"/>
+              <a:t>Find them on the Azure site (</a:t>
+            </a:r>
+            <a:r>
+              <a:rPr lang="en-US" dirty="0">
+                <a:hlinkClick r:id="rId3"/>
+              </a:rPr>
+              <a:t>http://bit.ly/a4r-quickstart</a:t>
+            </a:r>
+            <a:r>
+              <a:rPr lang="en-US" dirty="0"/>
+              <a:t>)</a:t>
+            </a:r>
+          </a:p>
+          <a:p>
+            <a:r>
+              <a:rPr lang="en-US" dirty="0"/>
+              <a:t>Or browse them on GitHub (</a:t>
+            </a:r>
+            <a:r>
+              <a:rPr lang="en-US" dirty="0">
+                <a:hlinkClick r:id="rId4"/>
+              </a:rPr>
+              <a:t>http://</a:t>
+            </a:r>
+            <a:r>
+              <a:rPr lang="en-US" dirty="0" smtClean="0">
+                <a:hlinkClick r:id="rId4"/>
+              </a:rPr>
+              <a:t>bit.ly/a4r-github</a:t>
+            </a:r>
+            <a:r>
+              <a:rPr lang="en-US" dirty="0" smtClean="0"/>
+              <a:t>)</a:t>
+            </a:r>
+          </a:p>
+          <a:p>
+            <a:pPr marL="0" indent="0">
+              <a:buNone/>
+            </a:pPr>
+            <a:endParaRPr lang="en-US" dirty="0"/>
+          </a:p>
+        </p:txBody>
+      </p:sp>
+      <p:pic>
+        <p:nvPicPr>
+          <p:cNvPr id="4" name="Picture 3"/>
+          <p:cNvPicPr>
+            <a:picLocks noChangeAspect="1"/>
+          </p:cNvPicPr>
+          <p:nvPr/>
+        </p:nvPicPr>
+        <p:blipFill>
+          <a:blip r:embed="rId5"/>
+          <a:stretch>
+            <a:fillRect/>
+          </a:stretch>
+        </p:blipFill>
+        <p:spPr>
+          <a:xfrm>
+            <a:off x="981075" y="2716411"/>
+            <a:ext cx="2914650" cy="1666875"/>
+          </a:xfrm>
+          <a:prstGeom prst="rect">
+            <a:avLst/>
+          </a:prstGeom>
+          <a:ln>
+            <a:solidFill>
+              <a:schemeClr val="accent2"/>
+            </a:solidFill>
+          </a:ln>
+        </p:spPr>
+      </p:pic>
+      <p:pic>
+        <p:nvPicPr>
+          <p:cNvPr id="5" name="Picture 4"/>
+          <p:cNvPicPr>
+            <a:picLocks noChangeAspect="1"/>
+          </p:cNvPicPr>
+          <p:nvPr/>
+        </p:nvPicPr>
+        <p:blipFill>
+          <a:blip r:embed="rId6"/>
+          <a:stretch>
+            <a:fillRect/>
+          </a:stretch>
+        </p:blipFill>
+        <p:spPr>
+          <a:xfrm>
+            <a:off x="4564226" y="2716411"/>
+            <a:ext cx="2924175" cy="1666875"/>
+          </a:xfrm>
+          <a:prstGeom prst="rect">
+            <a:avLst/>
+          </a:prstGeom>
+          <a:ln>
+            <a:solidFill>
+              <a:schemeClr val="accent2"/>
+            </a:solidFill>
+          </a:ln>
+        </p:spPr>
+      </p:pic>
+      <p:pic>
+        <p:nvPicPr>
+          <p:cNvPr id="6" name="Picture 5"/>
+          <p:cNvPicPr>
+            <a:picLocks noChangeAspect="1"/>
+          </p:cNvPicPr>
+          <p:nvPr/>
+        </p:nvPicPr>
+        <p:blipFill>
+          <a:blip r:embed="rId7"/>
+          <a:stretch>
+            <a:fillRect/>
+          </a:stretch>
+        </p:blipFill>
+        <p:spPr>
+          <a:xfrm>
+            <a:off x="8156903" y="2716411"/>
+            <a:ext cx="2914650" cy="1666875"/>
+          </a:xfrm>
+          <a:prstGeom prst="rect">
+            <a:avLst/>
+          </a:prstGeom>
+          <a:ln>
+            <a:solidFill>
+              <a:schemeClr val="accent2"/>
+            </a:solidFill>
+          </a:ln>
+        </p:spPr>
+      </p:pic>
+    </p:spTree>
+    <p:extLst>
+      <p:ext uri="{BB962C8B-B14F-4D97-AF65-F5344CB8AC3E}">
+        <p14:creationId xmlns:p14="http://schemas.microsoft.com/office/powerpoint/2010/main" val="3324523628"/>
+      </p:ext>
+    </p:extLst>
+  </p:cSld>
+  <p:clrMapOvr>
+    <a:masterClrMapping/>
+  </p:clrMapOvr>
+</p:sld>
+</file>
+
+<file path=ppt/slides/slide11.xml><?xml version="1.0" encoding="utf-8"?>
+<p:sld xmlns:a="http://schemas.openxmlformats.org/drawingml/2006/main" xmlns:r="http://schemas.openxmlformats.org/officeDocument/2006/relationships" xmlns:p="http://schemas.openxmlformats.org/presentationml/2006/main">
+  <p:cSld>
+    <p:spTree>
+      <p:nvGrpSpPr>
+        <p:cNvPr id="1" name=""/>
+        <p:cNvGrpSpPr/>
+        <p:nvPr/>
+      </p:nvGrpSpPr>
+      <p:grpSpPr>
+        <a:xfrm>
+          <a:off x="0" y="0"/>
+          <a:ext cx="0" cy="0"/>
+          <a:chOff x="0" y="0"/>
+          <a:chExt cx="0" cy="0"/>
+        </a:xfrm>
+      </p:grpSpPr>
+      <p:sp>
+        <p:nvSpPr>
+          <p:cNvPr id="2" name="Title 1"/>
+          <p:cNvSpPr>
+            <a:spLocks noGrp="1"/>
+          </p:cNvSpPr>
+          <p:nvPr>
+            <p:ph type="title"/>
+          </p:nvPr>
+        </p:nvSpPr>
+        <p:spPr/>
+        <p:txBody>
+          <a:bodyPr/>
+          <a:lstStyle/>
+          <a:p>
+            <a:r>
+              <a:rPr lang="en-US" dirty="0" smtClean="0"/>
+              <a:t>SLURM Clusters</a:t>
+            </a:r>
+            <a:endParaRPr lang="en-US" dirty="0"/>
+          </a:p>
+        </p:txBody>
+      </p:sp>
+      <p:sp>
+        <p:nvSpPr>
+          <p:cNvPr id="3" name="Content Placeholder 2"/>
+          <p:cNvSpPr>
+            <a:spLocks noGrp="1"/>
+          </p:cNvSpPr>
+          <p:nvPr>
+            <p:ph idx="1"/>
+          </p:nvPr>
+        </p:nvSpPr>
+        <p:spPr/>
+        <p:txBody>
+          <a:bodyPr/>
+          <a:lstStyle/>
+          <a:p>
+            <a:r>
+              <a:rPr lang="en-US" dirty="0"/>
+              <a:t>Simple Linux Utility for Resource Management (SLURM)</a:t>
+            </a:r>
+          </a:p>
+          <a:p>
+            <a:r>
+              <a:rPr lang="en-US" dirty="0" err="1"/>
+              <a:t>Quickstart</a:t>
+            </a:r>
+            <a:r>
+              <a:rPr lang="en-US" dirty="0"/>
+              <a:t> template at </a:t>
+            </a:r>
+            <a:r>
+              <a:rPr lang="en-US" dirty="0">
+                <a:hlinkClick r:id="rId3"/>
+              </a:rPr>
+              <a:t>http://bit.ly/a4r-slurm</a:t>
+            </a:r>
+            <a:r>
+              <a:rPr lang="en-US" dirty="0"/>
+              <a:t> enables easy deployment of SLURM clusters of user-specified </a:t>
+            </a:r>
+            <a:r>
+              <a:rPr lang="en-US" dirty="0" smtClean="0"/>
+              <a:t>sizes</a:t>
+            </a:r>
+            <a:endParaRPr lang="en-US" dirty="0"/>
+          </a:p>
+        </p:txBody>
+      </p:sp>
+      <p:pic>
+        <p:nvPicPr>
+          <p:cNvPr id="4" name="Picture 3"/>
+          <p:cNvPicPr>
+            <a:picLocks noChangeAspect="1"/>
+          </p:cNvPicPr>
+          <p:nvPr/>
+        </p:nvPicPr>
+        <p:blipFill>
+          <a:blip r:embed="rId4"/>
+          <a:stretch>
+            <a:fillRect/>
+          </a:stretch>
+        </p:blipFill>
+        <p:spPr>
+          <a:xfrm>
+            <a:off x="3174205" y="3542756"/>
+            <a:ext cx="5842001" cy="2769144"/>
+          </a:xfrm>
+          <a:prstGeom prst="rect">
+            <a:avLst/>
+          </a:prstGeom>
+          <a:ln>
+            <a:solidFill>
+              <a:schemeClr val="bg1">
+                <a:lumMod val="75000"/>
+              </a:schemeClr>
+            </a:solidFill>
+          </a:ln>
+          <a:effectLst/>
+        </p:spPr>
+      </p:pic>
+    </p:spTree>
+    <p:extLst>
+      <p:ext uri="{BB962C8B-B14F-4D97-AF65-F5344CB8AC3E}">
+        <p14:creationId xmlns:p14="http://schemas.microsoft.com/office/powerpoint/2010/main" val="2739371626"/>
+      </p:ext>
+    </p:extLst>
+  </p:cSld>
+  <p:clrMapOvr>
+    <a:masterClrMapping/>
+  </p:clrMapOvr>
+</p:sld>
+</file>
+
+<file path=ppt/slides/slide12.xml><?xml version="1.0" encoding="utf-8"?>
+<p:sld xmlns:a="http://schemas.openxmlformats.org/drawingml/2006/main" xmlns:r="http://schemas.openxmlformats.org/officeDocument/2006/relationships" xmlns:p="http://schemas.openxmlformats.org/presentationml/2006/main">
+  <p:cSld>
+    <p:spTree>
+      <p:nvGrpSpPr>
+        <p:cNvPr id="1" name=""/>
+        <p:cNvGrpSpPr/>
+        <p:nvPr/>
+      </p:nvGrpSpPr>
+      <p:grpSpPr>
+        <a:xfrm>
+          <a:off x="0" y="0"/>
+          <a:ext cx="0" cy="0"/>
+          <a:chOff x="0" y="0"/>
+          <a:chExt cx="0" cy="0"/>
+        </a:xfrm>
+      </p:grpSpPr>
+      <p:sp>
+        <p:nvSpPr>
+          <p:cNvPr id="2" name="Title 1"/>
+          <p:cNvSpPr>
+            <a:spLocks noGrp="1"/>
+          </p:cNvSpPr>
+          <p:nvPr>
+            <p:ph type="title"/>
+          </p:nvPr>
+        </p:nvSpPr>
+        <p:spPr/>
+        <p:txBody>
+          <a:bodyPr/>
+          <a:lstStyle/>
+          <a:p>
+            <a:r>
+              <a:rPr lang="en-US" dirty="0" smtClean="0"/>
               <a:t>Containers</a:t>
             </a:r>
             <a:endParaRPr lang="en-US" dirty="0"/>
@@ -18874,7 +19455,7 @@
 </p:sld>
 </file>
 
-<file path=ppt/slides/slide11.xml><?xml version="1.0" encoding="utf-8"?>
+<file path=ppt/slides/slide13.xml><?xml version="1.0" encoding="utf-8"?>
 <p:sld xmlns:a="http://schemas.openxmlformats.org/drawingml/2006/main" xmlns:r="http://schemas.openxmlformats.org/officeDocument/2006/relationships" xmlns:p="http://schemas.openxmlformats.org/presentationml/2006/main">
   <p:cSld>
     <p:spTree>
@@ -19041,7 +19622,7 @@
 </p:sld>
 </file>
 
-<file path=ppt/slides/slide12.xml><?xml version="1.0" encoding="utf-8"?>
+<file path=ppt/slides/slide14.xml><?xml version="1.0" encoding="utf-8"?>
 <p:sld xmlns:a="http://schemas.openxmlformats.org/drawingml/2006/main" xmlns:r="http://schemas.openxmlformats.org/officeDocument/2006/relationships" xmlns:p="http://schemas.openxmlformats.org/presentationml/2006/main">
   <p:cSld>
     <p:spTree>
@@ -19118,7 +19699,7 @@
 </p:sld>
 </file>
 
-<file path=ppt/slides/slide13.xml><?xml version="1.0" encoding="utf-8"?>
+<file path=ppt/slides/slide15.xml><?xml version="1.0" encoding="utf-8"?>
 <p:sld xmlns:a="http://schemas.openxmlformats.org/drawingml/2006/main" xmlns:r="http://schemas.openxmlformats.org/officeDocument/2006/relationships" xmlns:p="http://schemas.openxmlformats.org/presentationml/2006/main">
   <p:cSld>
     <p:spTree>
@@ -19218,7 +19799,7 @@
 </p:sld>
 </file>
 
-<file path=ppt/slides/slide14.xml><?xml version="1.0" encoding="utf-8"?>
+<file path=ppt/slides/slide16.xml><?xml version="1.0" encoding="utf-8"?>
 <p:sld xmlns:a="http://schemas.openxmlformats.org/drawingml/2006/main" xmlns:r="http://schemas.openxmlformats.org/officeDocument/2006/relationships" xmlns:p="http://schemas.openxmlformats.org/presentationml/2006/main">
   <p:cSld>
     <p:spTree>
@@ -19957,7 +20538,7 @@
 </p:sld>
 </file>
 
-<file path=ppt/slides/slide15.xml><?xml version="1.0" encoding="utf-8"?>
+<file path=ppt/slides/slide17.xml><?xml version="1.0" encoding="utf-8"?>
 <p:sld xmlns:a="http://schemas.openxmlformats.org/drawingml/2006/main" xmlns:r="http://schemas.openxmlformats.org/officeDocument/2006/relationships" xmlns:p="http://schemas.openxmlformats.org/presentationml/2006/main">
   <p:cSld>
     <p:spTree>
@@ -20451,7 +21032,7 @@
 </p:sld>
 </file>
 
-<file path=ppt/slides/slide16.xml><?xml version="1.0" encoding="utf-8"?>
+<file path=ppt/slides/slide18.xml><?xml version="1.0" encoding="utf-8"?>
 <p:sld xmlns:a="http://schemas.openxmlformats.org/drawingml/2006/main" xmlns:r="http://schemas.openxmlformats.org/officeDocument/2006/relationships" xmlns:p="http://schemas.openxmlformats.org/presentationml/2006/main">
   <p:cSld>
     <p:spTree>
@@ -20556,7 +21137,7 @@
 </p:sld>
 </file>
 
-<file path=ppt/slides/slide17.xml><?xml version="1.0" encoding="utf-8"?>
+<file path=ppt/slides/slide19.xml><?xml version="1.0" encoding="utf-8"?>
 <p:sld xmlns:a="http://schemas.openxmlformats.org/drawingml/2006/main" xmlns:r="http://schemas.openxmlformats.org/officeDocument/2006/relationships" xmlns:p="http://schemas.openxmlformats.org/presentationml/2006/main">
   <p:cSld>
     <p:spTree>
@@ -20639,7 +21220,187 @@
 </p:sld>
 </file>
 
-<file path=ppt/slides/slide18.xml><?xml version="1.0" encoding="utf-8"?>
+<file path=ppt/slides/slide2.xml><?xml version="1.0" encoding="utf-8"?>
+<p:sld xmlns:a="http://schemas.openxmlformats.org/drawingml/2006/main" xmlns:r="http://schemas.openxmlformats.org/officeDocument/2006/relationships" xmlns:p="http://schemas.openxmlformats.org/presentationml/2006/main">
+  <p:cSld>
+    <p:spTree>
+      <p:nvGrpSpPr>
+        <p:cNvPr id="1" name=""/>
+        <p:cNvGrpSpPr/>
+        <p:nvPr/>
+      </p:nvGrpSpPr>
+      <p:grpSpPr>
+        <a:xfrm>
+          <a:off x="0" y="0"/>
+          <a:ext cx="0" cy="0"/>
+          <a:chOff x="0" y="0"/>
+          <a:chExt cx="0" cy="0"/>
+        </a:xfrm>
+      </p:grpSpPr>
+      <p:sp>
+        <p:nvSpPr>
+          <p:cNvPr id="2" name="Title 1"/>
+          <p:cNvSpPr>
+            <a:spLocks noGrp="1"/>
+          </p:cNvSpPr>
+          <p:nvPr>
+            <p:ph type="title"/>
+          </p:nvPr>
+        </p:nvSpPr>
+        <p:spPr/>
+        <p:txBody>
+          <a:bodyPr/>
+          <a:lstStyle/>
+          <a:p>
+            <a:r>
+              <a:rPr lang="en-US" dirty="0" smtClean="0"/>
+              <a:t>High-Performance Computing</a:t>
+            </a:r>
+            <a:endParaRPr lang="en-US" dirty="0"/>
+          </a:p>
+        </p:txBody>
+      </p:sp>
+      <p:sp>
+        <p:nvSpPr>
+          <p:cNvPr id="4" name="TextBox 3"/>
+          <p:cNvSpPr txBox="1"/>
+          <p:nvPr/>
+        </p:nvSpPr>
+        <p:spPr>
+          <a:xfrm>
+            <a:off x="1806235" y="2140504"/>
+            <a:ext cx="8577943" cy="4185761"/>
+          </a:xfrm>
+          <a:prstGeom prst="rect">
+            <a:avLst/>
+          </a:prstGeom>
+          <a:noFill/>
+        </p:spPr>
+        <p:txBody>
+          <a:bodyPr wrap="square" lIns="0" tIns="0" rIns="0" bIns="0" rtlCol="0">
+            <a:spAutoFit/>
+          </a:bodyPr>
+          <a:lstStyle/>
+          <a:p>
+            <a:pPr>
+              <a:lnSpc>
+                <a:spcPct val="90000"/>
+              </a:lnSpc>
+              <a:spcBef>
+                <a:spcPct val="20000"/>
+              </a:spcBef>
+              <a:buSzPct val="80000"/>
+            </a:pPr>
+            <a:r>
+              <a:rPr lang="en-US" sz="3200" dirty="0">
+                <a:solidFill>
+                  <a:srgbClr val="5095D1"/>
+                </a:solidFill>
+              </a:rPr>
+              <a:t>“High-Performance Computing most generally refers to the practice of aggregating computing power in a way that delivers much higher performance than one could get out of a typical desktop computer or workstation in order to solve large problems in science, engineering, or business.”</a:t>
+            </a:r>
+          </a:p>
+          <a:p>
+            <a:pPr>
+              <a:lnSpc>
+                <a:spcPct val="90000"/>
+              </a:lnSpc>
+              <a:spcBef>
+                <a:spcPct val="20000"/>
+              </a:spcBef>
+              <a:buSzPct val="80000"/>
+            </a:pPr>
+            <a:r>
+              <a:rPr lang="en-US" sz="3200" dirty="0" smtClean="0">
+                <a:gradFill>
+                  <a:gsLst>
+                    <a:gs pos="0">
+                      <a:srgbClr val="292929">
+                        <a:lumMod val="90000"/>
+                        <a:lumOff val="10000"/>
+                      </a:srgbClr>
+                    </a:gs>
+                    <a:gs pos="86000">
+                      <a:srgbClr val="292929">
+                        <a:lumMod val="90000"/>
+                        <a:lumOff val="10000"/>
+                      </a:srgbClr>
+                    </a:gs>
+                  </a:gsLst>
+                  <a:lin ang="5400000" scaled="0"/>
+                </a:gradFill>
+              </a:rPr>
+              <a:t>						--</a:t>
+            </a:r>
+            <a:r>
+              <a:rPr lang="en-US" sz="3200" dirty="0">
+                <a:gradFill>
+                  <a:gsLst>
+                    <a:gs pos="0">
+                      <a:srgbClr val="292929">
+                        <a:lumMod val="90000"/>
+                        <a:lumOff val="10000"/>
+                      </a:srgbClr>
+                    </a:gs>
+                    <a:gs pos="86000">
+                      <a:srgbClr val="292929">
+                        <a:lumMod val="90000"/>
+                        <a:lumOff val="10000"/>
+                      </a:srgbClr>
+                    </a:gs>
+                  </a:gsLst>
+                  <a:lin ang="5400000" scaled="0"/>
+                </a:gradFill>
+              </a:rPr>
+              <a:t>Inside HPC</a:t>
+            </a:r>
+          </a:p>
+          <a:p>
+            <a:pPr>
+              <a:lnSpc>
+                <a:spcPct val="90000"/>
+              </a:lnSpc>
+              <a:spcBef>
+                <a:spcPct val="20000"/>
+              </a:spcBef>
+              <a:buSzPct val="80000"/>
+            </a:pPr>
+            <a:endParaRPr lang="en-US" sz="3200" dirty="0">
+              <a:gradFill>
+                <a:gsLst>
+                  <a:gs pos="0">
+                    <a:srgbClr val="292929">
+                      <a:lumMod val="90000"/>
+                      <a:lumOff val="10000"/>
+                    </a:srgbClr>
+                  </a:gs>
+                  <a:gs pos="86000">
+                    <a:srgbClr val="292929">
+                      <a:lumMod val="90000"/>
+                      <a:lumOff val="10000"/>
+                    </a:srgbClr>
+                  </a:gs>
+                </a:gsLst>
+                <a:lin ang="5400000" scaled="0"/>
+              </a:gradFill>
+            </a:endParaRPr>
+          </a:p>
+        </p:txBody>
+      </p:sp>
+    </p:spTree>
+    <p:extLst>
+      <p:ext uri="{BB962C8B-B14F-4D97-AF65-F5344CB8AC3E}">
+        <p14:creationId xmlns:p14="http://schemas.microsoft.com/office/powerpoint/2010/main" val="1319533140"/>
+      </p:ext>
+    </p:extLst>
+  </p:cSld>
+  <p:clrMapOvr>
+    <a:masterClrMapping/>
+  </p:clrMapOvr>
+</p:sld>
+</file>
+
+<file path=ppt/slides/slide20.xml><?xml version="1.0" encoding="utf-8"?>
 <p:sld xmlns:a="http://schemas.openxmlformats.org/drawingml/2006/main" xmlns:r="http://schemas.openxmlformats.org/officeDocument/2006/relationships" xmlns:p="http://schemas.openxmlformats.org/presentationml/2006/main">
   <p:cSld>
     <p:spTree>
@@ -21105,7 +21866,7 @@
 </p:sld>
 </file>
 
-<file path=ppt/slides/slide19.xml><?xml version="1.0" encoding="utf-8"?>
+<file path=ppt/slides/slide21.xml><?xml version="1.0" encoding="utf-8"?>
 <p:sld xmlns:a="http://schemas.openxmlformats.org/drawingml/2006/main" xmlns:r="http://schemas.openxmlformats.org/officeDocument/2006/relationships" xmlns:p="http://schemas.openxmlformats.org/presentationml/2006/main">
   <p:cSld>
     <p:spTree>
@@ -21187,150 +21948,7 @@
 </p:sld>
 </file>
 
-<file path=ppt/slides/slide2.xml><?xml version="1.0" encoding="utf-8"?>
-<p:sld xmlns:a="http://schemas.openxmlformats.org/drawingml/2006/main" xmlns:r="http://schemas.openxmlformats.org/officeDocument/2006/relationships" xmlns:p="http://schemas.openxmlformats.org/presentationml/2006/main">
-  <p:cSld>
-    <p:spTree>
-      <p:nvGrpSpPr>
-        <p:cNvPr id="1" name=""/>
-        <p:cNvGrpSpPr/>
-        <p:nvPr/>
-      </p:nvGrpSpPr>
-      <p:grpSpPr>
-        <a:xfrm>
-          <a:off x="0" y="0"/>
-          <a:ext cx="0" cy="0"/>
-          <a:chOff x="0" y="0"/>
-          <a:chExt cx="0" cy="0"/>
-        </a:xfrm>
-      </p:grpSpPr>
-      <p:sp>
-        <p:nvSpPr>
-          <p:cNvPr id="2" name="Title 1"/>
-          <p:cNvSpPr>
-            <a:spLocks noGrp="1"/>
-          </p:cNvSpPr>
-          <p:nvPr>
-            <p:ph type="title"/>
-          </p:nvPr>
-        </p:nvSpPr>
-        <p:spPr/>
-        <p:txBody>
-          <a:bodyPr/>
-          <a:lstStyle/>
-          <a:p>
-            <a:r>
-              <a:rPr lang="en-US" dirty="0" smtClean="0"/>
-              <a:t>Azure HPC</a:t>
-            </a:r>
-            <a:endParaRPr lang="en-US" dirty="0"/>
-          </a:p>
-        </p:txBody>
-      </p:sp>
-      <p:sp>
-        <p:nvSpPr>
-          <p:cNvPr id="3" name="Content Placeholder 2"/>
-          <p:cNvSpPr>
-            <a:spLocks noGrp="1"/>
-          </p:cNvSpPr>
-          <p:nvPr>
-            <p:ph idx="1"/>
-          </p:nvPr>
-        </p:nvSpPr>
-        <p:spPr/>
-        <p:txBody>
-          <a:bodyPr/>
-          <a:lstStyle/>
-          <a:p>
-            <a:r>
-              <a:rPr lang="en-US" dirty="0"/>
-              <a:t>Run massively parallel compute jobs in the cloud</a:t>
-            </a:r>
-          </a:p>
-          <a:p>
-            <a:pPr lvl="1"/>
-            <a:r>
-              <a:rPr lang="en-US" dirty="0"/>
-              <a:t>Photorealistic 3D rendering</a:t>
-            </a:r>
-          </a:p>
-          <a:p>
-            <a:pPr lvl="1"/>
-            <a:r>
-              <a:rPr lang="en-US" dirty="0"/>
-              <a:t>Brute force </a:t>
-            </a:r>
-            <a:r>
-              <a:rPr lang="en-US" dirty="0" err="1"/>
-              <a:t>cryptographical</a:t>
-            </a:r>
-            <a:r>
-              <a:rPr lang="en-US" dirty="0"/>
-              <a:t> analysis</a:t>
-            </a:r>
-          </a:p>
-          <a:p>
-            <a:pPr lvl="1"/>
-            <a:r>
-              <a:rPr lang="en-US" dirty="0" smtClean="0"/>
-              <a:t>Financial </a:t>
-            </a:r>
-            <a:r>
-              <a:rPr lang="en-US" dirty="0"/>
-              <a:t>risk modeling, genomics research, and more</a:t>
-            </a:r>
-          </a:p>
-          <a:p>
-            <a:r>
-              <a:rPr lang="en-US" dirty="0"/>
-              <a:t>Deploy an HPC cluster in minutes and scale as needed</a:t>
-            </a:r>
-          </a:p>
-          <a:p>
-            <a:r>
-              <a:rPr lang="en-US" dirty="0"/>
-              <a:t>Automate deployments with deployment templates</a:t>
-            </a:r>
-          </a:p>
-          <a:p>
-            <a:r>
-              <a:rPr lang="en-US" dirty="0"/>
-              <a:t>Combine with Azure Batch for batch scheduling and compute management (</a:t>
-            </a:r>
-            <a:r>
-              <a:rPr lang="en-US" dirty="0">
-                <a:hlinkClick r:id="rId3"/>
-              </a:rPr>
-              <a:t>http://bit.ly/a4r-batch</a:t>
-            </a:r>
-            <a:r>
-              <a:rPr lang="en-US" dirty="0" smtClean="0"/>
-              <a:t>)</a:t>
-            </a:r>
-          </a:p>
-          <a:p>
-            <a:r>
-              <a:rPr lang="en-US" dirty="0" smtClean="0"/>
-              <a:t>Linux or Windows</a:t>
-            </a:r>
-            <a:endParaRPr lang="en-US" dirty="0"/>
-          </a:p>
-        </p:txBody>
-      </p:sp>
-    </p:spTree>
-    <p:extLst>
-      <p:ext uri="{BB962C8B-B14F-4D97-AF65-F5344CB8AC3E}">
-        <p14:creationId xmlns:p14="http://schemas.microsoft.com/office/powerpoint/2010/main" val="2410609805"/>
-      </p:ext>
-    </p:extLst>
-  </p:cSld>
-  <p:clrMapOvr>
-    <a:masterClrMapping/>
-  </p:clrMapOvr>
-</p:sld>
-</file>
-
-<file path=ppt/slides/slide20.xml><?xml version="1.0" encoding="utf-8"?>
+<file path=ppt/slides/slide22.xml><?xml version="1.0" encoding="utf-8"?>
 <p:sld xmlns:a="http://schemas.openxmlformats.org/drawingml/2006/main" xmlns:r="http://schemas.openxmlformats.org/officeDocument/2006/relationships" xmlns:p="http://schemas.openxmlformats.org/presentationml/2006/main">
   <p:cSld>
     <p:spTree>
@@ -21371,6 +21989,370 @@
 </file>
 
 <file path=ppt/slides/slide3.xml><?xml version="1.0" encoding="utf-8"?>
+<p:sld xmlns:a="http://schemas.openxmlformats.org/drawingml/2006/main" xmlns:r="http://schemas.openxmlformats.org/officeDocument/2006/relationships" xmlns:p="http://schemas.openxmlformats.org/presentationml/2006/main">
+  <p:cSld>
+    <p:spTree>
+      <p:nvGrpSpPr>
+        <p:cNvPr id="1" name=""/>
+        <p:cNvGrpSpPr/>
+        <p:nvPr/>
+      </p:nvGrpSpPr>
+      <p:grpSpPr>
+        <a:xfrm>
+          <a:off x="0" y="0"/>
+          <a:ext cx="0" cy="0"/>
+          <a:chOff x="0" y="0"/>
+          <a:chExt cx="0" cy="0"/>
+        </a:xfrm>
+      </p:grpSpPr>
+      <p:sp>
+        <p:nvSpPr>
+          <p:cNvPr id="2" name="Title 1"/>
+          <p:cNvSpPr>
+            <a:spLocks noGrp="1"/>
+          </p:cNvSpPr>
+          <p:nvPr>
+            <p:ph type="title"/>
+          </p:nvPr>
+        </p:nvSpPr>
+        <p:spPr/>
+        <p:txBody>
+          <a:bodyPr/>
+          <a:lstStyle/>
+          <a:p>
+            <a:r>
+              <a:rPr lang="en-US" dirty="0" smtClean="0"/>
+              <a:t>HPC Clusters</a:t>
+            </a:r>
+            <a:endParaRPr lang="en-US" dirty="0"/>
+          </a:p>
+        </p:txBody>
+      </p:sp>
+      <p:sp>
+        <p:nvSpPr>
+          <p:cNvPr id="3" name="Content Placeholder 2"/>
+          <p:cNvSpPr>
+            <a:spLocks noGrp="1"/>
+          </p:cNvSpPr>
+          <p:nvPr>
+            <p:ph idx="1"/>
+          </p:nvPr>
+        </p:nvSpPr>
+        <p:spPr>
+          <a:xfrm>
+            <a:off x="838200" y="1825625"/>
+            <a:ext cx="6897491" cy="4351338"/>
+          </a:xfrm>
+        </p:spPr>
+        <p:txBody>
+          <a:bodyPr/>
+          <a:lstStyle/>
+          <a:p>
+            <a:pPr marL="571500" indent="-571500"/>
+            <a:r>
+              <a:rPr lang="en-US" dirty="0"/>
+              <a:t>HPC typically involves </a:t>
+            </a:r>
+            <a:r>
+              <a:rPr lang="en-US" b="1" dirty="0">
+                <a:solidFill>
+                  <a:schemeClr val="accent2"/>
+                </a:solidFill>
+              </a:rPr>
+              <a:t>clusters</a:t>
+            </a:r>
+            <a:r>
+              <a:rPr lang="en-US" dirty="0">
+                <a:solidFill>
+                  <a:schemeClr val="accent2"/>
+                </a:solidFill>
+              </a:rPr>
+              <a:t> </a:t>
+            </a:r>
+            <a:r>
+              <a:rPr lang="en-US" dirty="0"/>
+              <a:t>of computers interconnected by a high- speed network</a:t>
+            </a:r>
+          </a:p>
+          <a:p>
+            <a:pPr marL="571500" indent="-571500"/>
+            <a:r>
+              <a:rPr lang="en-US" dirty="0"/>
+              <a:t>A single computer in the cluster is called a </a:t>
+            </a:r>
+            <a:r>
+              <a:rPr lang="en-US" b="1" dirty="0">
+                <a:solidFill>
+                  <a:schemeClr val="accent2"/>
+                </a:solidFill>
+              </a:rPr>
+              <a:t>node</a:t>
+            </a:r>
+            <a:endParaRPr lang="en-US" dirty="0">
+              <a:solidFill>
+                <a:schemeClr val="accent2"/>
+              </a:solidFill>
+            </a:endParaRPr>
+          </a:p>
+          <a:p>
+            <a:pPr marL="571500" indent="-571500"/>
+            <a:r>
+              <a:rPr lang="en-US" b="1" dirty="0">
+                <a:solidFill>
+                  <a:schemeClr val="accent2"/>
+                </a:solidFill>
+              </a:rPr>
+              <a:t>Workloads</a:t>
+            </a:r>
+            <a:r>
+              <a:rPr lang="en-US" b="1" dirty="0"/>
+              <a:t> </a:t>
+            </a:r>
+            <a:r>
+              <a:rPr lang="en-US" dirty="0"/>
+              <a:t>are managed by </a:t>
+            </a:r>
+            <a:r>
+              <a:rPr lang="en-US" b="1" dirty="0">
+                <a:solidFill>
+                  <a:schemeClr val="accent2"/>
+                </a:solidFill>
+              </a:rPr>
+              <a:t>master</a:t>
+            </a:r>
+            <a:r>
+              <a:rPr lang="en-US" dirty="0">
+                <a:solidFill>
+                  <a:schemeClr val="accent2"/>
+                </a:solidFill>
+              </a:rPr>
+              <a:t> </a:t>
+            </a:r>
+            <a:r>
+              <a:rPr lang="en-US" dirty="0"/>
+              <a:t>nodes that distribute workloads across </a:t>
+            </a:r>
+            <a:r>
+              <a:rPr lang="en-US" b="1" dirty="0">
+                <a:solidFill>
+                  <a:schemeClr val="accent2"/>
+                </a:solidFill>
+              </a:rPr>
+              <a:t>worker</a:t>
+            </a:r>
+            <a:r>
+              <a:rPr lang="en-US" dirty="0">
+                <a:solidFill>
+                  <a:schemeClr val="accent2"/>
+                </a:solidFill>
+              </a:rPr>
+              <a:t> </a:t>
+            </a:r>
+            <a:r>
+              <a:rPr lang="en-US" dirty="0"/>
+              <a:t>nodes</a:t>
+            </a:r>
+            <a:endParaRPr lang="en-US" b="1" dirty="0"/>
+          </a:p>
+          <a:p>
+            <a:endParaRPr lang="en-US" dirty="0"/>
+          </a:p>
+        </p:txBody>
+      </p:sp>
+      <p:pic>
+        <p:nvPicPr>
+          <p:cNvPr id="4" name="Picture 3"/>
+          <p:cNvPicPr>
+            <a:picLocks noChangeAspect="1"/>
+          </p:cNvPicPr>
+          <p:nvPr/>
+        </p:nvPicPr>
+        <p:blipFill>
+          <a:blip r:embed="rId3">
+            <a:extLst>
+              <a:ext uri="{28A0092B-C50C-407E-A947-70E740481C1C}">
+                <a14:useLocalDpi xmlns:a14="http://schemas.microsoft.com/office/drawing/2010/main" val="0"/>
+              </a:ext>
+            </a:extLst>
+          </a:blip>
+          <a:stretch>
+            <a:fillRect/>
+          </a:stretch>
+        </p:blipFill>
+        <p:spPr>
+          <a:xfrm>
+            <a:off x="8216008" y="976500"/>
+            <a:ext cx="2657475" cy="4886325"/>
+          </a:xfrm>
+          <a:prstGeom prst="rect">
+            <a:avLst/>
+          </a:prstGeom>
+          <a:ln>
+            <a:solidFill>
+              <a:schemeClr val="bg1">
+                <a:lumMod val="75000"/>
+              </a:schemeClr>
+            </a:solidFill>
+          </a:ln>
+        </p:spPr>
+      </p:pic>
+    </p:spTree>
+    <p:extLst>
+      <p:ext uri="{BB962C8B-B14F-4D97-AF65-F5344CB8AC3E}">
+        <p14:creationId xmlns:p14="http://schemas.microsoft.com/office/powerpoint/2010/main" val="678717861"/>
+      </p:ext>
+    </p:extLst>
+  </p:cSld>
+  <p:clrMapOvr>
+    <a:masterClrMapping/>
+  </p:clrMapOvr>
+</p:sld>
+</file>
+
+<file path=ppt/slides/slide4.xml><?xml version="1.0" encoding="utf-8"?>
+<p:sld xmlns:a="http://schemas.openxmlformats.org/drawingml/2006/main" xmlns:r="http://schemas.openxmlformats.org/officeDocument/2006/relationships" xmlns:p="http://schemas.openxmlformats.org/presentationml/2006/main">
+  <p:cSld>
+    <p:spTree>
+      <p:nvGrpSpPr>
+        <p:cNvPr id="1" name=""/>
+        <p:cNvGrpSpPr/>
+        <p:nvPr/>
+      </p:nvGrpSpPr>
+      <p:grpSpPr>
+        <a:xfrm>
+          <a:off x="0" y="0"/>
+          <a:ext cx="0" cy="0"/>
+          <a:chOff x="0" y="0"/>
+          <a:chExt cx="0" cy="0"/>
+        </a:xfrm>
+      </p:grpSpPr>
+      <p:sp>
+        <p:nvSpPr>
+          <p:cNvPr id="2" name="Title 1"/>
+          <p:cNvSpPr>
+            <a:spLocks noGrp="1"/>
+          </p:cNvSpPr>
+          <p:nvPr>
+            <p:ph type="title"/>
+          </p:nvPr>
+        </p:nvSpPr>
+        <p:spPr/>
+        <p:txBody>
+          <a:bodyPr/>
+          <a:lstStyle/>
+          <a:p>
+            <a:r>
+              <a:rPr lang="en-US" dirty="0" smtClean="0"/>
+              <a:t>HPC in Azure</a:t>
+            </a:r>
+            <a:endParaRPr lang="en-US" dirty="0"/>
+          </a:p>
+        </p:txBody>
+      </p:sp>
+      <p:sp>
+        <p:nvSpPr>
+          <p:cNvPr id="3" name="Content Placeholder 2"/>
+          <p:cNvSpPr>
+            <a:spLocks noGrp="1"/>
+          </p:cNvSpPr>
+          <p:nvPr>
+            <p:ph idx="1"/>
+          </p:nvPr>
+        </p:nvSpPr>
+        <p:spPr/>
+        <p:txBody>
+          <a:bodyPr/>
+          <a:lstStyle/>
+          <a:p>
+            <a:r>
+              <a:rPr lang="en-US" dirty="0"/>
+              <a:t>Run massively parallel compute jobs in the cloud</a:t>
+            </a:r>
+          </a:p>
+          <a:p>
+            <a:pPr lvl="1"/>
+            <a:r>
+              <a:rPr lang="en-US" dirty="0"/>
+              <a:t>Photorealistic 3D rendering</a:t>
+            </a:r>
+          </a:p>
+          <a:p>
+            <a:pPr lvl="1"/>
+            <a:r>
+              <a:rPr lang="en-US" dirty="0"/>
+              <a:t>Brute force </a:t>
+            </a:r>
+            <a:r>
+              <a:rPr lang="en-US" dirty="0" err="1"/>
+              <a:t>cryptographical</a:t>
+            </a:r>
+            <a:r>
+              <a:rPr lang="en-US" dirty="0"/>
+              <a:t> analysis</a:t>
+            </a:r>
+          </a:p>
+          <a:p>
+            <a:pPr lvl="1"/>
+            <a:r>
+              <a:rPr lang="en-US" dirty="0" smtClean="0"/>
+              <a:t>Financial </a:t>
+            </a:r>
+            <a:r>
+              <a:rPr lang="en-US" dirty="0"/>
+              <a:t>risk modeling, genomics research, and more</a:t>
+            </a:r>
+          </a:p>
+          <a:p>
+            <a:r>
+              <a:rPr lang="en-US" dirty="0"/>
+              <a:t>Deploy an HPC cluster in minutes and scale as needed</a:t>
+            </a:r>
+          </a:p>
+          <a:p>
+            <a:r>
+              <a:rPr lang="en-US" dirty="0"/>
+              <a:t>Automate deployments with deployment templates</a:t>
+            </a:r>
+          </a:p>
+          <a:p>
+            <a:r>
+              <a:rPr lang="en-US" dirty="0"/>
+              <a:t>Combine with Azure Batch for batch scheduling and compute management (</a:t>
+            </a:r>
+            <a:r>
+              <a:rPr lang="en-US" dirty="0">
+                <a:hlinkClick r:id="rId3"/>
+              </a:rPr>
+              <a:t>http://bit.ly/a4r-batch</a:t>
+            </a:r>
+            <a:r>
+              <a:rPr lang="en-US" dirty="0" smtClean="0"/>
+              <a:t>)</a:t>
+            </a:r>
+          </a:p>
+          <a:p>
+            <a:r>
+              <a:rPr lang="en-US" dirty="0" smtClean="0"/>
+              <a:t>Linux or Windows</a:t>
+            </a:r>
+            <a:endParaRPr lang="en-US" dirty="0"/>
+          </a:p>
+        </p:txBody>
+      </p:sp>
+    </p:spTree>
+    <p:extLst>
+      <p:ext uri="{BB962C8B-B14F-4D97-AF65-F5344CB8AC3E}">
+        <p14:creationId xmlns:p14="http://schemas.microsoft.com/office/powerpoint/2010/main" val="3204493886"/>
+      </p:ext>
+    </p:extLst>
+  </p:cSld>
+  <p:clrMapOvr>
+    <a:masterClrMapping/>
+  </p:clrMapOvr>
+</p:sld>
+</file>
+
+<file path=ppt/slides/slide5.xml><?xml version="1.0" encoding="utf-8"?>
 <p:sld xmlns:a="http://schemas.openxmlformats.org/drawingml/2006/main" xmlns:r="http://schemas.openxmlformats.org/officeDocument/2006/relationships" xmlns:p="http://schemas.openxmlformats.org/presentationml/2006/main">
   <p:cSld>
     <p:spTree>
@@ -26113,7 +27095,7 @@
 </p:sld>
 </file>
 
-<file path=ppt/slides/slide4.xml><?xml version="1.0" encoding="utf-8"?>
+<file path=ppt/slides/slide6.xml><?xml version="1.0" encoding="utf-8"?>
 <p:sld xmlns:a="http://schemas.openxmlformats.org/drawingml/2006/main" xmlns:r="http://schemas.openxmlformats.org/officeDocument/2006/relationships" xmlns:p="http://schemas.openxmlformats.org/presentationml/2006/main">
   <p:cSld>
     <p:spTree>
@@ -27699,7 +28681,7 @@
 </p:sld>
 </file>
 
-<file path=ppt/slides/slide5.xml><?xml version="1.0" encoding="utf-8"?>
+<file path=ppt/slides/slide7.xml><?xml version="1.0" encoding="utf-8"?>
 <p:sld xmlns:a="http://schemas.openxmlformats.org/drawingml/2006/main" xmlns:r="http://schemas.openxmlformats.org/officeDocument/2006/relationships" xmlns:p="http://schemas.openxmlformats.org/presentationml/2006/main">
   <p:cSld>
     <p:spTree>
@@ -29105,7 +30087,7 @@
 </p:sld>
 </file>
 
-<file path=ppt/slides/slide6.xml><?xml version="1.0" encoding="utf-8"?>
+<file path=ppt/slides/slide8.xml><?xml version="1.0" encoding="utf-8"?>
 <p:sld xmlns:a="http://schemas.openxmlformats.org/drawingml/2006/main" xmlns:r="http://schemas.openxmlformats.org/officeDocument/2006/relationships" xmlns:p="http://schemas.openxmlformats.org/presentationml/2006/main">
   <p:cSld>
     <p:spTree>
@@ -29235,7 +30217,7 @@
 </p:sld>
 </file>
 
-<file path=ppt/slides/slide7.xml><?xml version="1.0" encoding="utf-8"?>
+<file path=ppt/slides/slide9.xml><?xml version="1.0" encoding="utf-8"?>
 <p:sld xmlns:a="http://schemas.openxmlformats.org/drawingml/2006/main" xmlns:r="http://schemas.openxmlformats.org/officeDocument/2006/relationships" xmlns:p="http://schemas.openxmlformats.org/presentationml/2006/main">
   <p:cSld>
     <p:spTree>
@@ -29363,367 +30345,6 @@
     <p:extLst>
       <p:ext uri="{BB962C8B-B14F-4D97-AF65-F5344CB8AC3E}">
         <p14:creationId xmlns:p14="http://schemas.microsoft.com/office/powerpoint/2010/main" val="2812936699"/>
-      </p:ext>
-    </p:extLst>
-  </p:cSld>
-  <p:clrMapOvr>
-    <a:masterClrMapping/>
-  </p:clrMapOvr>
-</p:sld>
-</file>
-
-<file path=ppt/slides/slide8.xml><?xml version="1.0" encoding="utf-8"?>
-<p:sld xmlns:a="http://schemas.openxmlformats.org/drawingml/2006/main" xmlns:r="http://schemas.openxmlformats.org/officeDocument/2006/relationships" xmlns:p="http://schemas.openxmlformats.org/presentationml/2006/main">
-  <p:cSld>
-    <p:spTree>
-      <p:nvGrpSpPr>
-        <p:cNvPr id="1" name=""/>
-        <p:cNvGrpSpPr/>
-        <p:nvPr/>
-      </p:nvGrpSpPr>
-      <p:grpSpPr>
-        <a:xfrm>
-          <a:off x="0" y="0"/>
-          <a:ext cx="0" cy="0"/>
-          <a:chOff x="0" y="0"/>
-          <a:chExt cx="0" cy="0"/>
-        </a:xfrm>
-      </p:grpSpPr>
-      <p:sp>
-        <p:nvSpPr>
-          <p:cNvPr id="2" name="Title 1"/>
-          <p:cNvSpPr>
-            <a:spLocks noGrp="1"/>
-          </p:cNvSpPr>
-          <p:nvPr>
-            <p:ph type="title"/>
-          </p:nvPr>
-        </p:nvSpPr>
-        <p:spPr/>
-        <p:txBody>
-          <a:bodyPr/>
-          <a:lstStyle/>
-          <a:p>
-            <a:r>
-              <a:rPr lang="en-US" dirty="0" smtClean="0"/>
-              <a:t>Azure </a:t>
-            </a:r>
-            <a:r>
-              <a:rPr lang="en-US" dirty="0" err="1" smtClean="0"/>
-              <a:t>Quickstart</a:t>
-            </a:r>
-            <a:r>
-              <a:rPr lang="en-US" dirty="0" smtClean="0"/>
-              <a:t> Templates</a:t>
-            </a:r>
-            <a:endParaRPr lang="en-US" dirty="0"/>
-          </a:p>
-        </p:txBody>
-      </p:sp>
-      <p:sp>
-        <p:nvSpPr>
-          <p:cNvPr id="3" name="Content Placeholder 2"/>
-          <p:cNvSpPr>
-            <a:spLocks noGrp="1"/>
-          </p:cNvSpPr>
-          <p:nvPr>
-            <p:ph idx="1"/>
-          </p:nvPr>
-        </p:nvSpPr>
-        <p:spPr/>
-        <p:txBody>
-          <a:bodyPr/>
-          <a:lstStyle/>
-          <a:p>
-            <a:r>
-              <a:rPr lang="en-US" dirty="0"/>
-              <a:t>Free, open-source deployment templates</a:t>
-            </a:r>
-          </a:p>
-          <a:p>
-            <a:endParaRPr lang="en-US" dirty="0"/>
-          </a:p>
-          <a:p>
-            <a:endParaRPr lang="en-US" dirty="0"/>
-          </a:p>
-          <a:p>
-            <a:endParaRPr lang="en-US" dirty="0"/>
-          </a:p>
-          <a:p>
-            <a:endParaRPr lang="en-US" dirty="0"/>
-          </a:p>
-          <a:p>
-            <a:endParaRPr lang="en-US" dirty="0"/>
-          </a:p>
-          <a:p>
-            <a:r>
-              <a:rPr lang="en-US" dirty="0"/>
-              <a:t>Find them on the Azure site (</a:t>
-            </a:r>
-            <a:r>
-              <a:rPr lang="en-US" dirty="0">
-                <a:hlinkClick r:id="rId3"/>
-              </a:rPr>
-              <a:t>http://bit.ly/a4r-quickstart</a:t>
-            </a:r>
-            <a:r>
-              <a:rPr lang="en-US" dirty="0"/>
-              <a:t>)</a:t>
-            </a:r>
-          </a:p>
-          <a:p>
-            <a:r>
-              <a:rPr lang="en-US" dirty="0"/>
-              <a:t>Or browse them on GitHub (</a:t>
-            </a:r>
-            <a:r>
-              <a:rPr lang="en-US" dirty="0">
-                <a:hlinkClick r:id="rId4"/>
-              </a:rPr>
-              <a:t>http://</a:t>
-            </a:r>
-            <a:r>
-              <a:rPr lang="en-US" dirty="0" smtClean="0">
-                <a:hlinkClick r:id="rId4"/>
-              </a:rPr>
-              <a:t>bit.ly/a4r-github</a:t>
-            </a:r>
-            <a:r>
-              <a:rPr lang="en-US" dirty="0" smtClean="0"/>
-              <a:t>)</a:t>
-            </a:r>
-          </a:p>
-          <a:p>
-            <a:pPr marL="0" indent="0">
-              <a:buNone/>
-            </a:pPr>
-            <a:endParaRPr lang="en-US" dirty="0"/>
-          </a:p>
-        </p:txBody>
-      </p:sp>
-      <p:pic>
-        <p:nvPicPr>
-          <p:cNvPr id="4" name="Picture 3"/>
-          <p:cNvPicPr>
-            <a:picLocks noChangeAspect="1"/>
-          </p:cNvPicPr>
-          <p:nvPr/>
-        </p:nvPicPr>
-        <p:blipFill>
-          <a:blip r:embed="rId5"/>
-          <a:stretch>
-            <a:fillRect/>
-          </a:stretch>
-        </p:blipFill>
-        <p:spPr>
-          <a:xfrm>
-            <a:off x="981075" y="2716411"/>
-            <a:ext cx="2914650" cy="1666875"/>
-          </a:xfrm>
-          <a:prstGeom prst="rect">
-            <a:avLst/>
-          </a:prstGeom>
-          <a:ln>
-            <a:solidFill>
-              <a:schemeClr val="accent2"/>
-            </a:solidFill>
-          </a:ln>
-        </p:spPr>
-      </p:pic>
-      <p:pic>
-        <p:nvPicPr>
-          <p:cNvPr id="5" name="Picture 4"/>
-          <p:cNvPicPr>
-            <a:picLocks noChangeAspect="1"/>
-          </p:cNvPicPr>
-          <p:nvPr/>
-        </p:nvPicPr>
-        <p:blipFill>
-          <a:blip r:embed="rId6"/>
-          <a:stretch>
-            <a:fillRect/>
-          </a:stretch>
-        </p:blipFill>
-        <p:spPr>
-          <a:xfrm>
-            <a:off x="4564226" y="2716411"/>
-            <a:ext cx="2924175" cy="1666875"/>
-          </a:xfrm>
-          <a:prstGeom prst="rect">
-            <a:avLst/>
-          </a:prstGeom>
-          <a:ln>
-            <a:solidFill>
-              <a:schemeClr val="accent2"/>
-            </a:solidFill>
-          </a:ln>
-        </p:spPr>
-      </p:pic>
-      <p:pic>
-        <p:nvPicPr>
-          <p:cNvPr id="6" name="Picture 5"/>
-          <p:cNvPicPr>
-            <a:picLocks noChangeAspect="1"/>
-          </p:cNvPicPr>
-          <p:nvPr/>
-        </p:nvPicPr>
-        <p:blipFill>
-          <a:blip r:embed="rId7"/>
-          <a:stretch>
-            <a:fillRect/>
-          </a:stretch>
-        </p:blipFill>
-        <p:spPr>
-          <a:xfrm>
-            <a:off x="8156903" y="2716411"/>
-            <a:ext cx="2914650" cy="1666875"/>
-          </a:xfrm>
-          <a:prstGeom prst="rect">
-            <a:avLst/>
-          </a:prstGeom>
-          <a:ln>
-            <a:solidFill>
-              <a:schemeClr val="accent2"/>
-            </a:solidFill>
-          </a:ln>
-        </p:spPr>
-      </p:pic>
-    </p:spTree>
-    <p:extLst>
-      <p:ext uri="{BB962C8B-B14F-4D97-AF65-F5344CB8AC3E}">
-        <p14:creationId xmlns:p14="http://schemas.microsoft.com/office/powerpoint/2010/main" val="3324523628"/>
-      </p:ext>
-    </p:extLst>
-  </p:cSld>
-  <p:clrMapOvr>
-    <a:masterClrMapping/>
-  </p:clrMapOvr>
-</p:sld>
-</file>
-
-<file path=ppt/slides/slide9.xml><?xml version="1.0" encoding="utf-8"?>
-<p:sld xmlns:a="http://schemas.openxmlformats.org/drawingml/2006/main" xmlns:r="http://schemas.openxmlformats.org/officeDocument/2006/relationships" xmlns:p="http://schemas.openxmlformats.org/presentationml/2006/main">
-  <p:cSld>
-    <p:spTree>
-      <p:nvGrpSpPr>
-        <p:cNvPr id="1" name=""/>
-        <p:cNvGrpSpPr/>
-        <p:nvPr/>
-      </p:nvGrpSpPr>
-      <p:grpSpPr>
-        <a:xfrm>
-          <a:off x="0" y="0"/>
-          <a:ext cx="0" cy="0"/>
-          <a:chOff x="0" y="0"/>
-          <a:chExt cx="0" cy="0"/>
-        </a:xfrm>
-      </p:grpSpPr>
-      <p:sp>
-        <p:nvSpPr>
-          <p:cNvPr id="2" name="Title 1"/>
-          <p:cNvSpPr>
-            <a:spLocks noGrp="1"/>
-          </p:cNvSpPr>
-          <p:nvPr>
-            <p:ph type="title"/>
-          </p:nvPr>
-        </p:nvSpPr>
-        <p:spPr/>
-        <p:txBody>
-          <a:bodyPr/>
-          <a:lstStyle/>
-          <a:p>
-            <a:r>
-              <a:rPr lang="en-US" dirty="0" smtClean="0"/>
-              <a:t>SLURM Clusters</a:t>
-            </a:r>
-            <a:endParaRPr lang="en-US" dirty="0"/>
-          </a:p>
-        </p:txBody>
-      </p:sp>
-      <p:sp>
-        <p:nvSpPr>
-          <p:cNvPr id="3" name="Content Placeholder 2"/>
-          <p:cNvSpPr>
-            <a:spLocks noGrp="1"/>
-          </p:cNvSpPr>
-          <p:nvPr>
-            <p:ph idx="1"/>
-          </p:nvPr>
-        </p:nvSpPr>
-        <p:spPr/>
-        <p:txBody>
-          <a:bodyPr/>
-          <a:lstStyle/>
-          <a:p>
-            <a:r>
-              <a:rPr lang="en-US" dirty="0"/>
-              <a:t>Simple Linux Utility for Resource Management (SLURM)</a:t>
-            </a:r>
-          </a:p>
-          <a:p>
-            <a:r>
-              <a:rPr lang="en-US" dirty="0" err="1"/>
-              <a:t>Quickstart</a:t>
-            </a:r>
-            <a:r>
-              <a:rPr lang="en-US" dirty="0"/>
-              <a:t> template at </a:t>
-            </a:r>
-            <a:r>
-              <a:rPr lang="en-US" dirty="0">
-                <a:hlinkClick r:id="rId3"/>
-              </a:rPr>
-              <a:t>http://bit.ly/a4r-slurm</a:t>
-            </a:r>
-            <a:r>
-              <a:rPr lang="en-US" dirty="0"/>
-              <a:t> enables easy deployment of SLURM clusters of user-specified </a:t>
-            </a:r>
-            <a:r>
-              <a:rPr lang="en-US" dirty="0" smtClean="0"/>
-              <a:t>sizes</a:t>
-            </a:r>
-            <a:endParaRPr lang="en-US" dirty="0"/>
-          </a:p>
-        </p:txBody>
-      </p:sp>
-      <p:pic>
-        <p:nvPicPr>
-          <p:cNvPr id="4" name="Picture 3"/>
-          <p:cNvPicPr>
-            <a:picLocks noChangeAspect="1"/>
-          </p:cNvPicPr>
-          <p:nvPr/>
-        </p:nvPicPr>
-        <p:blipFill>
-          <a:blip r:embed="rId4"/>
-          <a:stretch>
-            <a:fillRect/>
-          </a:stretch>
-        </p:blipFill>
-        <p:spPr>
-          <a:xfrm>
-            <a:off x="3174205" y="3542756"/>
-            <a:ext cx="5842001" cy="2769144"/>
-          </a:xfrm>
-          <a:prstGeom prst="rect">
-            <a:avLst/>
-          </a:prstGeom>
-          <a:ln>
-            <a:solidFill>
-              <a:schemeClr val="bg1">
-                <a:lumMod val="75000"/>
-              </a:schemeClr>
-            </a:solidFill>
-          </a:ln>
-          <a:effectLst/>
-        </p:spPr>
-      </p:pic>
-    </p:spTree>
-    <p:extLst>
-      <p:ext uri="{BB962C8B-B14F-4D97-AF65-F5344CB8AC3E}">
-        <p14:creationId xmlns:p14="http://schemas.microsoft.com/office/powerpoint/2010/main" val="2739371626"/>
       </p:ext>
     </p:extLst>
   </p:cSld>

</xml_diff>

<commit_message>
Revert "Updating Complimentary Course Content Module 2"
This reverts commit 78f215cdfa3ce676dc1b4d8885b105fffc17dedb, reversing
changes made to 8ef3f4f35aadf8f7396948d18b26d083857b18e3.
</commit_message>
<xml_diff>
--- a/Workshop/6. HPC and Containers/HPC and Azure Container Service.pptx
+++ b/Workshop/6. HPC and Containers/HPC and Azure Container Service.pptx
@@ -6,31 +6,29 @@
     <p:sldMasterId id="2147483663" r:id="rId2"/>
   </p:sldMasterIdLst>
   <p:notesMasterIdLst>
-    <p:notesMasterId r:id="rId25"/>
+    <p:notesMasterId r:id="rId23"/>
   </p:notesMasterIdLst>
   <p:sldIdLst>
     <p:sldId id="256" r:id="rId3"/>
-    <p:sldId id="323" r:id="rId4"/>
-    <p:sldId id="324" r:id="rId5"/>
-    <p:sldId id="325" r:id="rId6"/>
-    <p:sldId id="318" r:id="rId7"/>
-    <p:sldId id="319" r:id="rId8"/>
-    <p:sldId id="320" r:id="rId9"/>
-    <p:sldId id="304" r:id="rId10"/>
-    <p:sldId id="322" r:id="rId11"/>
-    <p:sldId id="305" r:id="rId12"/>
-    <p:sldId id="306" r:id="rId13"/>
-    <p:sldId id="307" r:id="rId14"/>
-    <p:sldId id="308" r:id="rId15"/>
-    <p:sldId id="314" r:id="rId16"/>
-    <p:sldId id="313" r:id="rId17"/>
-    <p:sldId id="315" r:id="rId18"/>
-    <p:sldId id="316" r:id="rId19"/>
-    <p:sldId id="309" r:id="rId20"/>
-    <p:sldId id="311" r:id="rId21"/>
-    <p:sldId id="317" r:id="rId22"/>
-    <p:sldId id="295" r:id="rId23"/>
-    <p:sldId id="299" r:id="rId24"/>
+    <p:sldId id="321" r:id="rId4"/>
+    <p:sldId id="318" r:id="rId5"/>
+    <p:sldId id="319" r:id="rId6"/>
+    <p:sldId id="320" r:id="rId7"/>
+    <p:sldId id="304" r:id="rId8"/>
+    <p:sldId id="322" r:id="rId9"/>
+    <p:sldId id="305" r:id="rId10"/>
+    <p:sldId id="306" r:id="rId11"/>
+    <p:sldId id="307" r:id="rId12"/>
+    <p:sldId id="308" r:id="rId13"/>
+    <p:sldId id="314" r:id="rId14"/>
+    <p:sldId id="313" r:id="rId15"/>
+    <p:sldId id="315" r:id="rId16"/>
+    <p:sldId id="316" r:id="rId17"/>
+    <p:sldId id="309" r:id="rId18"/>
+    <p:sldId id="311" r:id="rId19"/>
+    <p:sldId id="317" r:id="rId20"/>
+    <p:sldId id="295" r:id="rId21"/>
+    <p:sldId id="299" r:id="rId22"/>
   </p:sldIdLst>
   <p:sldSz cx="12192000" cy="6858000"/>
   <p:notesSz cx="6858000" cy="9144000"/>
@@ -219,7 +217,7 @@
           <a:p>
             <a:fld id="{49B60EF2-7028-489F-85D8-FE86CD7CF2A0}" type="datetimeFigureOut">
               <a:rPr lang="en-US" smtClean="0"/>
-              <a:t>12/20/2016</a:t>
+              <a:t>10/24/2016</a:t>
             </a:fld>
             <a:endParaRPr lang="en-US"/>
           </a:p>
@@ -615,102 +613,22 @@
           <a:lstStyle/>
           <a:p>
             <a:r>
-              <a:rPr lang="en-US" sz="1200" kern="1200" dirty="0" smtClean="0">
-                <a:solidFill>
-                  <a:schemeClr val="tx1"/>
-                </a:solidFill>
-                <a:effectLst/>
-                <a:latin typeface="+mn-lt"/>
-                <a:ea typeface="+mn-ea"/>
-                <a:cs typeface="+mn-cs"/>
-              </a:rPr>
-              <a:t>You can build deployment templates of your own, or you can use ones that have already been built. An assortment of templates built by the Azure team and by others in the community can be found on the Azure </a:t>
-            </a:r>
-            <a:r>
-              <a:rPr lang="en-US" sz="1200" kern="1200" dirty="0" err="1" smtClean="0">
-                <a:solidFill>
-                  <a:schemeClr val="tx1"/>
-                </a:solidFill>
-                <a:effectLst/>
-                <a:latin typeface="+mn-lt"/>
-                <a:ea typeface="+mn-ea"/>
-                <a:cs typeface="+mn-cs"/>
-              </a:rPr>
-              <a:t>Quickstart</a:t>
-            </a:r>
-            <a:r>
-              <a:rPr lang="en-US" sz="1200" kern="1200" dirty="0" smtClean="0">
-                <a:solidFill>
-                  <a:schemeClr val="tx1"/>
-                </a:solidFill>
-                <a:effectLst/>
-                <a:latin typeface="+mn-lt"/>
-                <a:ea typeface="+mn-ea"/>
-                <a:cs typeface="+mn-cs"/>
-              </a:rPr>
-              <a:t> Templates Web site or on GitHub. There are templates for creating clusters of Linux VMs, deploying </a:t>
-            </a:r>
-            <a:r>
-              <a:rPr lang="en-US" sz="1200" kern="1200" dirty="0" err="1" smtClean="0">
-                <a:solidFill>
-                  <a:schemeClr val="tx1"/>
-                </a:solidFill>
-                <a:effectLst/>
-                <a:latin typeface="+mn-lt"/>
-                <a:ea typeface="+mn-ea"/>
-                <a:cs typeface="+mn-cs"/>
-              </a:rPr>
-              <a:t>Redis</a:t>
-            </a:r>
-            <a:r>
-              <a:rPr lang="en-US" sz="1200" kern="1200" dirty="0" smtClean="0">
-                <a:solidFill>
-                  <a:schemeClr val="tx1"/>
-                </a:solidFill>
-                <a:effectLst/>
-                <a:latin typeface="+mn-lt"/>
-                <a:ea typeface="+mn-ea"/>
-                <a:cs typeface="+mn-cs"/>
-              </a:rPr>
-              <a:t> clusters of Ubuntu VMs, deploying MySQL servers, creating Windows VMs provisioned with IIS, and a whole lot more. There is even a template that deploys Minecraft Server in an Ubuntu VM.</a:t>
-            </a:r>
-          </a:p>
-          <a:p>
-            <a:r>
-              <a:rPr lang="en-US" sz="1200" kern="1200" dirty="0" smtClean="0">
-                <a:solidFill>
-                  <a:schemeClr val="tx1"/>
-                </a:solidFill>
-                <a:effectLst/>
-                <a:latin typeface="+mn-lt"/>
-                <a:ea typeface="+mn-ea"/>
-                <a:cs typeface="+mn-cs"/>
-              </a:rPr>
-              <a:t> </a:t>
-            </a:r>
-          </a:p>
-          <a:p>
-            <a:r>
-              <a:rPr lang="en-US" sz="1200" kern="1200" dirty="0" smtClean="0">
-                <a:solidFill>
-                  <a:schemeClr val="tx1"/>
-                </a:solidFill>
-                <a:effectLst/>
-                <a:latin typeface="+mn-lt"/>
-                <a:ea typeface="+mn-ea"/>
-                <a:cs typeface="+mn-cs"/>
-              </a:rPr>
-              <a:t>Using any of these templates requires nothing more than a button click. Each template comes with documentation that tells you what parameters it requires and whether the template was created by Microsoft or by someone in the community. Best of all, you can view each template’s source code, which is little more than a JSON script, and customize it to fit your needs or even build upon it to create templates of your own.</a:t>
-            </a:r>
-          </a:p>
-          <a:p>
-            <a:endParaRPr lang="en-US" dirty="0" smtClean="0"/>
-          </a:p>
-          <a:p>
-            <a:r>
               <a:rPr lang="en-US" dirty="0" smtClean="0"/>
-              <a:t>The three templates pictured here are just a few of the many dozens of templates currently available.</a:t>
-            </a:r>
+              <a:t>A</a:t>
+            </a:r>
+            <a:r>
+              <a:rPr lang="en-US" baseline="0" dirty="0" smtClean="0"/>
+              <a:t> virtual machine is -- well -- a virtualized machine created and managed by a hypervisor such as </a:t>
+            </a:r>
+            <a:r>
+              <a:rPr lang="en-US" baseline="0" dirty="0" err="1" smtClean="0"/>
+              <a:t>VirtualBox</a:t>
+            </a:r>
+            <a:r>
+              <a:rPr lang="en-US" baseline="0" dirty="0" smtClean="0"/>
+              <a:t> or Hyper-V. Even though a VM runs on a machine that has an operating system, each VM requires its own complete operating system, even if it's the same operating system as the host OS. VMs offer a very high degree of isolation, but at a cost: longer startup times, lower portability (ever tried to move a 127 GB virtual hard disk, or VHD, from one PC to another?), and higher memory requirements. Containers, by contrast, leverage the operating system that is already in place but offer nearly as much separation. RAM requirements are lower since the OS isn't being duplicated in each container, and cost is lower, too, because while cloud platforms typically charge for each VM, a single VM can host multiple container instances.</a:t>
+            </a:r>
+            <a:endParaRPr lang="en-US" dirty="0"/>
           </a:p>
         </p:txBody>
       </p:sp>
@@ -740,7 +658,7 @@
     </p:spTree>
     <p:extLst>
       <p:ext uri="{BB962C8B-B14F-4D97-AF65-F5344CB8AC3E}">
-        <p14:creationId xmlns:p14="http://schemas.microsoft.com/office/powerpoint/2010/main" val="3998187520"/>
+        <p14:creationId xmlns:p14="http://schemas.microsoft.com/office/powerpoint/2010/main" val="3918904550"/>
       </p:ext>
     </p:extLst>
   </p:cSld>
@@ -794,27 +712,23 @@
           <a:bodyPr/>
           <a:lstStyle/>
           <a:p>
-            <a:pPr marL="0" marR="0" indent="0" algn="l" defTabSz="914400" rtl="0" eaLnBrk="1" fontAlgn="auto" latinLnBrk="0" hangingPunct="1">
-              <a:lnSpc>
-                <a:spcPct val="100000"/>
-              </a:lnSpc>
-              <a:spcBef>
-                <a:spcPts val="0"/>
-              </a:spcBef>
-              <a:spcAft>
-                <a:spcPts val="0"/>
-              </a:spcAft>
-              <a:buClrTx/>
-              <a:buSzTx/>
-              <a:buFontTx/>
-              <a:buNone/>
-              <a:tabLst/>
-              <a:defRPr/>
-            </a:pPr>
             <a:r>
               <a:rPr lang="en-US" dirty="0" smtClean="0"/>
-              <a:t>The Simple Linux Utility for Resource Management (SLURM), also known as the SLURM Workload Manager, is a free and open-source job scheduler for Linux that excels at distributing heavy computing workloads across clusters of machines and processors. It is used on more than half of the world's largest supercomputers and High-Performance Computing (HPC) clusters, and it enjoys widespread use in the research community for jobs that require significant CPU resources.</a:t>
-            </a:r>
+              <a:t>Docker (www.docker.com) isn't the world's only containerization platform, but it is the most popular. It is free, open-source,</a:t>
+            </a:r>
+            <a:r>
+              <a:rPr lang="en-US" baseline="0" dirty="0" smtClean="0"/>
+              <a:t> and Linux-based, with Windows support (Windows Server 2016) in the works. </a:t>
+            </a:r>
+            <a:r>
+              <a:rPr lang="en-US" dirty="0" smtClean="0"/>
+              <a:t>It has earned massive</a:t>
+            </a:r>
+            <a:r>
+              <a:rPr lang="en-US" baseline="0" dirty="0" smtClean="0"/>
+              <a:t> mindshare in the developer community. And with Azure Container Service, you can deploy Docker containers to Azure with minimal effort. Moreover, Docker containers are easily moved between Azure and Amazon Web Services (AWS), affording developers portability between cloud platforms.</a:t>
+            </a:r>
+            <a:endParaRPr lang="en-US" dirty="0"/>
           </a:p>
         </p:txBody>
       </p:sp>
@@ -844,7 +758,7 @@
     </p:spTree>
     <p:extLst>
       <p:ext uri="{BB962C8B-B14F-4D97-AF65-F5344CB8AC3E}">
-        <p14:creationId xmlns:p14="http://schemas.microsoft.com/office/powerpoint/2010/main" val="2236143850"/>
+        <p14:creationId xmlns:p14="http://schemas.microsoft.com/office/powerpoint/2010/main" val="4017007276"/>
       </p:ext>
     </p:extLst>
   </p:cSld>
@@ -898,23 +812,76 @@
           <a:bodyPr/>
           <a:lstStyle/>
           <a:p>
+            <a:pPr marL="0" marR="0" lvl="0" indent="0" algn="l" defTabSz="914400" rtl="0" eaLnBrk="1" fontAlgn="auto" latinLnBrk="0" hangingPunct="1">
+              <a:lnSpc>
+                <a:spcPct val="100000"/>
+              </a:lnSpc>
+              <a:spcBef>
+                <a:spcPts val="0"/>
+              </a:spcBef>
+              <a:spcAft>
+                <a:spcPts val="0"/>
+              </a:spcAft>
+              <a:buClrTx/>
+              <a:buSzTx/>
+              <a:buFontTx/>
+              <a:buNone/>
+              <a:tabLst/>
+              <a:defRPr/>
+            </a:pPr>
             <a:r>
               <a:rPr lang="en-US" dirty="0" smtClean="0"/>
-              <a:t>A</a:t>
+              <a:t>Docker utilizes</a:t>
             </a:r>
             <a:r>
               <a:rPr lang="en-US" baseline="0" dirty="0" smtClean="0"/>
-              <a:t> virtual machine is -- well -- a virtualized machine created and managed by a hypervisor such as </a:t>
+              <a:t> a client-server architecture. You execute Docker commands through a Docker client such as the Docker CLI or </a:t>
             </a:r>
             <a:r>
               <a:rPr lang="en-US" baseline="0" dirty="0" err="1" smtClean="0"/>
-              <a:t>VirtualBox</a:t>
+              <a:t>Kitematic</a:t>
             </a:r>
             <a:r>
               <a:rPr lang="en-US" baseline="0" dirty="0" smtClean="0"/>
-              <a:t> or Hyper-V. Even though a VM runs on a machine that has an operating system, each VM requires its own complete operating system, even if it's the same operating system as the host OS. VMs offer a very high degree of isolation, but at a cost: longer startup times, lower portability (ever tried to move a 127 GB virtual hard disk, or VHD, from one PC to another?), and higher memory requirements. Containers, by contrast, leverage the operating system that is already in place but offer nearly as much separation. RAM requirements are lower since the OS isn't being duplicated in each container, and cost is lower, too, because while cloud platforms typically charge for each VM, a single VM can host multiple container instances.</a:t>
-            </a:r>
-            <a:endParaRPr lang="en-US" dirty="0"/>
+              <a:t>. The client uses REST commands to communicate with the Docker daemon running on a Docker host such as the Azure Container services. These commands can be used to push, pull (</a:t>
+            </a:r>
+            <a:r>
+              <a:rPr lang="en-US" b="1" baseline="0" dirty="0" err="1" smtClean="0"/>
+              <a:t>docker</a:t>
+            </a:r>
+            <a:r>
+              <a:rPr lang="en-US" b="1" baseline="0" dirty="0" smtClean="0"/>
+              <a:t> pull</a:t>
+            </a:r>
+            <a:r>
+              <a:rPr lang="en-US" baseline="0" dirty="0" smtClean="0"/>
+              <a:t>), and create Docker images, to run them in containers, and to manage those containers. Images can be built with the </a:t>
+            </a:r>
+            <a:r>
+              <a:rPr lang="en-US" b="1" baseline="0" dirty="0" err="1" smtClean="0"/>
+              <a:t>docker</a:t>
+            </a:r>
+            <a:r>
+              <a:rPr lang="en-US" b="1" baseline="0" dirty="0" smtClean="0"/>
+              <a:t> build</a:t>
+            </a:r>
+            <a:r>
+              <a:rPr lang="en-US" baseline="0" dirty="0" smtClean="0"/>
+              <a:t> command, and they can be stand-alone, or they can "inherit" from other images. Images are stored in Docker registries, which can be public or private, local or remote. Docker Hub is a popular public registry that is managed by Docker; it contains a "huge collection" of images that anyone may use. The </a:t>
+            </a:r>
+            <a:r>
+              <a:rPr lang="en-US" b="1" baseline="0" dirty="0" err="1" smtClean="0"/>
+              <a:t>docker</a:t>
+            </a:r>
+            <a:r>
+              <a:rPr lang="en-US" b="1" baseline="0" dirty="0" smtClean="0"/>
+              <a:t> run</a:t>
+            </a:r>
+            <a:r>
+              <a:rPr lang="en-US" baseline="0" dirty="0" smtClean="0"/>
+              <a:t> command runs a container using an image as a template.</a:t>
+            </a:r>
+            <a:endParaRPr lang="en-US" dirty="0" smtClean="0"/>
           </a:p>
         </p:txBody>
       </p:sp>
@@ -944,7 +911,7 @@
     </p:spTree>
     <p:extLst>
       <p:ext uri="{BB962C8B-B14F-4D97-AF65-F5344CB8AC3E}">
-        <p14:creationId xmlns:p14="http://schemas.microsoft.com/office/powerpoint/2010/main" val="3918904550"/>
+        <p14:creationId xmlns:p14="http://schemas.microsoft.com/office/powerpoint/2010/main" val="2815615228"/>
       </p:ext>
     </p:extLst>
   </p:cSld>
@@ -1000,19 +967,19 @@
           <a:p>
             <a:r>
               <a:rPr lang="en-US" dirty="0" smtClean="0"/>
-              <a:t>Docker (www.docker.com) isn't the world's only containerization platform, but it is the most popular. It is free, open-source,</a:t>
+              <a:t>The Docker Client,</a:t>
             </a:r>
             <a:r>
               <a:rPr lang="en-US" baseline="0" dirty="0" smtClean="0"/>
-              <a:t> and Linux-based, with Windows support (Windows Server 2016) in the works. </a:t>
-            </a:r>
-            <a:r>
-              <a:rPr lang="en-US" dirty="0" smtClean="0"/>
-              <a:t>It has earned massive</a:t>
+              <a:t> also known as the Docker CLI, is the primary tool you use to manage Docker containers. You can download container images from repositories such as Docker Hub, build container images, run container instances, list container images and instances, and much more. After connecting to Azure Container Service using SSH, you can use port forwarding to execute commands locally that act on an Azure Container Service running in the cloud. In this example, the -H switch used with the </a:t>
+            </a:r>
+            <a:r>
+              <a:rPr lang="en-US" b="1" baseline="0" dirty="0" err="1" smtClean="0"/>
+              <a:t>docker</a:t>
             </a:r>
             <a:r>
               <a:rPr lang="en-US" baseline="0" dirty="0" smtClean="0"/>
-              <a:t> mindshare in the developer community. And with Azure Container Service, you can deploy Docker containers to Azure with minimal effort. Moreover, Docker containers are easily moved between Azure and Amazon Web Services (AWS), affording developers portability between cloud platforms.</a:t>
+              <a:t> commands forwards commands sent to port 22375 on localhost to the Azure Container Services via SSH.</a:t>
             </a:r>
             <a:endParaRPr lang="en-US" dirty="0"/>
           </a:p>
@@ -1044,7 +1011,7 @@
     </p:spTree>
     <p:extLst>
       <p:ext uri="{BB962C8B-B14F-4D97-AF65-F5344CB8AC3E}">
-        <p14:creationId xmlns:p14="http://schemas.microsoft.com/office/powerpoint/2010/main" val="4017007276"/>
+        <p14:creationId xmlns:p14="http://schemas.microsoft.com/office/powerpoint/2010/main" val="999235491"/>
       </p:ext>
     </p:extLst>
   </p:cSld>
@@ -1117,19 +1084,11 @@
             </a:pPr>
             <a:r>
               <a:rPr lang="en-US" dirty="0" smtClean="0"/>
-              <a:t>Docker utilizes</a:t>
+              <a:t>This command pulls the image</a:t>
             </a:r>
             <a:r>
               <a:rPr lang="en-US" baseline="0" dirty="0" smtClean="0"/>
-              <a:t> a client-server architecture. You execute Docker commands through a Docker client such as the Docker CLI or </a:t>
-            </a:r>
-            <a:r>
-              <a:rPr lang="en-US" baseline="0" dirty="0" err="1" smtClean="0"/>
-              <a:t>Kitematic</a:t>
-            </a:r>
-            <a:r>
-              <a:rPr lang="en-US" baseline="0" dirty="0" smtClean="0"/>
-              <a:t>. The client uses REST commands to communicate with the Docker daemon running on a Docker host such as the Azure Container services. These commands can be used to push, pull (</a:t>
+              <a:t> named "Ubuntu" from Docker Hub (or a local registry if the image is cached there) and runs it interactively in a container. "Interactively" means standard input, output, and error are connected locally so you can provide input to the container and see its output. Of course, you are not limited to the "Ubuntu" image. You can specify other images and even create images of your own with </a:t>
             </a:r>
             <a:r>
               <a:rPr lang="en-US" b="1" baseline="0" dirty="0" err="1" smtClean="0"/>
@@ -1137,35 +1096,27 @@
             </a:r>
             <a:r>
               <a:rPr lang="en-US" b="1" baseline="0" dirty="0" smtClean="0"/>
-              <a:t> pull</a:t>
+              <a:t> build</a:t>
             </a:r>
             <a:r>
               <a:rPr lang="en-US" baseline="0" dirty="0" smtClean="0"/>
-              <a:t>), and create Docker images, to run them in containers, and to manage those containers. Images can be built with the </a:t>
+              <a:t>. Where the container runs depends on the context. The container can run locally in a </a:t>
+            </a:r>
+            <a:r>
+              <a:rPr lang="en-US" baseline="0" dirty="0" err="1" smtClean="0"/>
+              <a:t>docker</a:t>
+            </a:r>
+            <a:r>
+              <a:rPr lang="en-US" baseline="0" dirty="0" smtClean="0"/>
+              <a:t> host (for example, a VM on Windows), or it can remotely if you connect to a remote Docker daemon (for example, one running in Azure) via SSH tunneling and use port forwarding to forward </a:t>
             </a:r>
             <a:r>
               <a:rPr lang="en-US" b="1" baseline="0" dirty="0" err="1" smtClean="0"/>
               <a:t>docker</a:t>
             </a:r>
             <a:r>
-              <a:rPr lang="en-US" b="1" baseline="0" dirty="0" smtClean="0"/>
-              <a:t> build</a:t>
-            </a:r>
-            <a:r>
               <a:rPr lang="en-US" baseline="0" dirty="0" smtClean="0"/>
-              <a:t> command, and they can be stand-alone, or they can "inherit" from other images. Images are stored in Docker registries, which can be public or private, local or remote. Docker Hub is a popular public registry that is managed by Docker; it contains a "huge collection" of images that anyone may use. The </a:t>
-            </a:r>
-            <a:r>
-              <a:rPr lang="en-US" b="1" baseline="0" dirty="0" err="1" smtClean="0"/>
-              <a:t>docker</a:t>
-            </a:r>
-            <a:r>
-              <a:rPr lang="en-US" b="1" baseline="0" dirty="0" smtClean="0"/>
-              <a:t> run</a:t>
-            </a:r>
-            <a:r>
-              <a:rPr lang="en-US" baseline="0" dirty="0" smtClean="0"/>
-              <a:t> command runs a container using an image as a template.</a:t>
+              <a:t> commands to the daemon.</a:t>
             </a:r>
             <a:endParaRPr lang="en-US" dirty="0" smtClean="0"/>
           </a:p>
@@ -1197,7 +1148,7 @@
     </p:spTree>
     <p:extLst>
       <p:ext uri="{BB962C8B-B14F-4D97-AF65-F5344CB8AC3E}">
-        <p14:creationId xmlns:p14="http://schemas.microsoft.com/office/powerpoint/2010/main" val="2815615228"/>
+        <p14:creationId xmlns:p14="http://schemas.microsoft.com/office/powerpoint/2010/main" val="2246746569"/>
       </p:ext>
     </p:extLst>
   </p:cSld>
@@ -1251,23 +1202,128 @@
           <a:bodyPr/>
           <a:lstStyle/>
           <a:p>
+            <a:pPr marL="0" marR="0" lvl="0" indent="0" algn="l" defTabSz="914400" rtl="0" eaLnBrk="1" fontAlgn="auto" latinLnBrk="0" hangingPunct="1">
+              <a:lnSpc>
+                <a:spcPct val="100000"/>
+              </a:lnSpc>
+              <a:spcBef>
+                <a:spcPts val="0"/>
+              </a:spcBef>
+              <a:spcAft>
+                <a:spcPts val="0"/>
+              </a:spcAft>
+              <a:buClrTx/>
+              <a:buSzTx/>
+              <a:buFontTx/>
+              <a:buNone/>
+              <a:tabLst/>
+              <a:defRPr/>
+            </a:pPr>
             <a:r>
               <a:rPr lang="en-US" dirty="0" smtClean="0"/>
-              <a:t>The Docker Client,</a:t>
+              <a:t>These are some of the most commonly used </a:t>
+            </a:r>
+            <a:r>
+              <a:rPr lang="en-US" b="1" dirty="0" err="1" smtClean="0"/>
+              <a:t>docker</a:t>
+            </a:r>
+            <a:r>
+              <a:rPr lang="en-US" dirty="0" smtClean="0"/>
+              <a:t> commands. You can also use </a:t>
+            </a:r>
+            <a:r>
+              <a:rPr lang="en-US" b="1" dirty="0" err="1" smtClean="0"/>
+              <a:t>docker</a:t>
+            </a:r>
+            <a:r>
+              <a:rPr lang="en-US" b="1" dirty="0" smtClean="0"/>
+              <a:t> push</a:t>
+            </a:r>
+            <a:r>
+              <a:rPr lang="en-US" dirty="0" smtClean="0"/>
+              <a:t> to push an image to a registry</a:t>
             </a:r>
             <a:r>
               <a:rPr lang="en-US" baseline="0" dirty="0" smtClean="0"/>
-              <a:t> also known as the Docker CLI, is the primary tool you use to manage Docker containers. You can download container images from repositories such as Docker Hub, build container images, run container instances, list container images and instances, and much more. After connecting to Azure Container Service using SSH, you can use port forwarding to execute commands locally that act on an Azure Container Service running in the cloud. In this example, the -H switch used with the </a:t>
+              <a:t> such as Docker Hub. Also, </a:t>
             </a:r>
             <a:r>
               <a:rPr lang="en-US" b="1" baseline="0" dirty="0" err="1" smtClean="0"/>
               <a:t>docker</a:t>
             </a:r>
             <a:r>
+              <a:rPr lang="en-US" b="1" baseline="0" dirty="0" smtClean="0"/>
+              <a:t> </a:t>
+            </a:r>
+            <a:r>
+              <a:rPr lang="en-US" b="1" baseline="0" dirty="0" err="1" smtClean="0"/>
+              <a:t>ps</a:t>
+            </a:r>
+            <a:r>
               <a:rPr lang="en-US" baseline="0" dirty="0" smtClean="0"/>
-              <a:t> commands forwards commands sent to port 22375 on localhost to the Azure Container Services via SSH.</a:t>
-            </a:r>
-            <a:endParaRPr lang="en-US" dirty="0"/>
+              <a:t> is often accompanied by a </a:t>
+            </a:r>
+            <a:r>
+              <a:rPr lang="en-US" b="1" baseline="0" dirty="0" smtClean="0"/>
+              <a:t>-a</a:t>
+            </a:r>
+            <a:r>
+              <a:rPr lang="en-US" baseline="0" dirty="0" smtClean="0"/>
+              <a:t> switch to list all containers, including those that are no longer running, while </a:t>
+            </a:r>
+            <a:r>
+              <a:rPr lang="en-US" b="1" baseline="0" dirty="0" err="1" smtClean="0"/>
+              <a:t>docker</a:t>
+            </a:r>
+            <a:r>
+              <a:rPr lang="en-US" b="1" baseline="0" dirty="0" smtClean="0"/>
+              <a:t> </a:t>
+            </a:r>
+            <a:r>
+              <a:rPr lang="en-US" b="1" baseline="0" dirty="0" err="1" smtClean="0"/>
+              <a:t>rm</a:t>
+            </a:r>
+            <a:r>
+              <a:rPr lang="en-US" baseline="0" dirty="0" smtClean="0"/>
+              <a:t> and </a:t>
+            </a:r>
+            <a:r>
+              <a:rPr lang="en-US" b="1" baseline="0" dirty="0" err="1" smtClean="0"/>
+              <a:t>docker</a:t>
+            </a:r>
+            <a:r>
+              <a:rPr lang="en-US" b="1" baseline="0" dirty="0" smtClean="0"/>
+              <a:t> </a:t>
+            </a:r>
+            <a:r>
+              <a:rPr lang="en-US" b="1" baseline="0" dirty="0" err="1" smtClean="0"/>
+              <a:t>rmi</a:t>
+            </a:r>
+            <a:r>
+              <a:rPr lang="en-US" baseline="0" dirty="0" smtClean="0"/>
+              <a:t> are used to delete (remove) containers and images, respectively. The </a:t>
+            </a:r>
+            <a:r>
+              <a:rPr lang="en-US" b="1" baseline="0" dirty="0" err="1" smtClean="0"/>
+              <a:t>docker</a:t>
+            </a:r>
+            <a:r>
+              <a:rPr lang="en-US" b="1" baseline="0" dirty="0" smtClean="0"/>
+              <a:t> build</a:t>
+            </a:r>
+            <a:r>
+              <a:rPr lang="en-US" baseline="0" dirty="0" smtClean="0"/>
+              <a:t> command uses a </a:t>
+            </a:r>
+            <a:r>
+              <a:rPr lang="en-US" baseline="0" dirty="0" err="1" smtClean="0"/>
+              <a:t>Dockerfile</a:t>
+            </a:r>
+            <a:r>
+              <a:rPr lang="en-US" baseline="0" dirty="0" smtClean="0"/>
+              <a:t> (a text file containing build commands) and a "context" -- for example, a specified directory in the file system -- to build Docker images.</a:t>
+            </a:r>
+            <a:endParaRPr lang="en-US" dirty="0" smtClean="0"/>
           </a:p>
         </p:txBody>
       </p:sp>
@@ -1297,7 +1353,7 @@
     </p:spTree>
     <p:extLst>
       <p:ext uri="{BB962C8B-B14F-4D97-AF65-F5344CB8AC3E}">
-        <p14:creationId xmlns:p14="http://schemas.microsoft.com/office/powerpoint/2010/main" val="999235491"/>
+        <p14:creationId xmlns:p14="http://schemas.microsoft.com/office/powerpoint/2010/main" val="1832625065"/>
       </p:ext>
     </p:extLst>
   </p:cSld>
@@ -1351,60 +1407,19 @@
           <a:bodyPr/>
           <a:lstStyle/>
           <a:p>
-            <a:pPr marL="0" marR="0" lvl="0" indent="0" algn="l" defTabSz="914400" rtl="0" eaLnBrk="1" fontAlgn="auto" latinLnBrk="0" hangingPunct="1">
-              <a:lnSpc>
-                <a:spcPct val="100000"/>
-              </a:lnSpc>
-              <a:spcBef>
-                <a:spcPts val="0"/>
-              </a:spcBef>
-              <a:spcAft>
-                <a:spcPts val="0"/>
-              </a:spcAft>
-              <a:buClrTx/>
-              <a:buSzTx/>
-              <a:buFontTx/>
-              <a:buNone/>
-              <a:tabLst/>
-              <a:defRPr/>
-            </a:pPr>
             <a:r>
               <a:rPr lang="en-US" dirty="0" smtClean="0"/>
-              <a:t>This command pulls the image</a:t>
+              <a:t>From the documentation: "Azure Container Service makes it simpler for you to create, configure, and manage a cluster of virtual machines that are preconfigured to run containerized applications. It uses an optimized configuration of popular open-source scheduling and orchestration tools. This enables you to use your existing skills, or draw upon a large and growing body of community expertise, to deploy and manage container-based applications on Microsoft Azure." ACS supports Linux containers and Windows containers. The latter rely</a:t>
             </a:r>
             <a:r>
               <a:rPr lang="en-US" baseline="0" dirty="0" smtClean="0"/>
-              <a:t> named "Ubuntu" from Docker Hub (or a local registry if the image is cached there) and runs it interactively in a container. "Interactively" means standard input, output, and error are connected locally so you can provide input to the container and see its output. Of course, you are not limited to the "Ubuntu" image. You can specify other images and even create images of your own with </a:t>
-            </a:r>
-            <a:r>
-              <a:rPr lang="en-US" b="1" baseline="0" dirty="0" err="1" smtClean="0"/>
-              <a:t>docker</a:t>
-            </a:r>
-            <a:r>
-              <a:rPr lang="en-US" b="1" baseline="0" dirty="0" smtClean="0"/>
-              <a:t> build</a:t>
-            </a:r>
-            <a:r>
-              <a:rPr lang="en-US" baseline="0" dirty="0" smtClean="0"/>
-              <a:t>. Where the container runs depends on the context. The container can run locally in a </a:t>
-            </a:r>
-            <a:r>
-              <a:rPr lang="en-US" baseline="0" dirty="0" err="1" smtClean="0"/>
-              <a:t>docker</a:t>
-            </a:r>
-            <a:r>
-              <a:rPr lang="en-US" baseline="0" dirty="0" smtClean="0"/>
-              <a:t> host (for example, a VM on Windows), or it can remotely if you connect to a remote Docker daemon (for example, one running in Azure) via SSH tunneling and use port forwarding to forward </a:t>
-            </a:r>
-            <a:r>
-              <a:rPr lang="en-US" b="1" baseline="0" dirty="0" err="1" smtClean="0"/>
-              <a:t>docker</a:t>
-            </a:r>
-            <a:r>
-              <a:rPr lang="en-US" baseline="0" dirty="0" smtClean="0"/>
-              <a:t> commands to the daemon.</a:t>
-            </a:r>
-            <a:endParaRPr lang="en-US" dirty="0" smtClean="0"/>
+              <a:t> on </a:t>
+            </a:r>
+            <a:r>
+              <a:rPr lang="en-US" dirty="0" smtClean="0"/>
+              <a:t>Windows Server 2016.</a:t>
+            </a:r>
+            <a:endParaRPr lang="en-US" dirty="0"/>
           </a:p>
         </p:txBody>
       </p:sp>
@@ -1434,7 +1449,7 @@
     </p:spTree>
     <p:extLst>
       <p:ext uri="{BB962C8B-B14F-4D97-AF65-F5344CB8AC3E}">
-        <p14:creationId xmlns:p14="http://schemas.microsoft.com/office/powerpoint/2010/main" val="2246746569"/>
+        <p14:creationId xmlns:p14="http://schemas.microsoft.com/office/powerpoint/2010/main" val="36852900"/>
       </p:ext>
     </p:extLst>
   </p:cSld>
@@ -1488,128 +1503,15 @@
           <a:bodyPr/>
           <a:lstStyle/>
           <a:p>
-            <a:pPr marL="0" marR="0" lvl="0" indent="0" algn="l" defTabSz="914400" rtl="0" eaLnBrk="1" fontAlgn="auto" latinLnBrk="0" hangingPunct="1">
-              <a:lnSpc>
-                <a:spcPct val="100000"/>
-              </a:lnSpc>
-              <a:spcBef>
-                <a:spcPts val="0"/>
-              </a:spcBef>
-              <a:spcAft>
-                <a:spcPts val="0"/>
-              </a:spcAft>
-              <a:buClrTx/>
-              <a:buSzTx/>
-              <a:buFontTx/>
-              <a:buNone/>
-              <a:tabLst/>
-              <a:defRPr/>
-            </a:pPr>
             <a:r>
               <a:rPr lang="en-US" dirty="0" smtClean="0"/>
-              <a:t>These are some of the most commonly used </a:t>
-            </a:r>
-            <a:r>
-              <a:rPr lang="en-US" b="1" dirty="0" err="1" smtClean="0"/>
-              <a:t>docker</a:t>
-            </a:r>
-            <a:r>
-              <a:rPr lang="en-US" dirty="0" smtClean="0"/>
-              <a:t> commands. You can also use </a:t>
-            </a:r>
-            <a:r>
-              <a:rPr lang="en-US" b="1" dirty="0" err="1" smtClean="0"/>
-              <a:t>docker</a:t>
-            </a:r>
-            <a:r>
-              <a:rPr lang="en-US" b="1" dirty="0" smtClean="0"/>
-              <a:t> push</a:t>
-            </a:r>
-            <a:r>
-              <a:rPr lang="en-US" dirty="0" smtClean="0"/>
-              <a:t> to push an image to a registry</a:t>
+              <a:t>Here's what happens in Azure</a:t>
             </a:r>
             <a:r>
               <a:rPr lang="en-US" baseline="0" dirty="0" smtClean="0"/>
-              <a:t> such as Docker Hub. Also, </a:t>
-            </a:r>
-            <a:r>
-              <a:rPr lang="en-US" b="1" baseline="0" dirty="0" err="1" smtClean="0"/>
-              <a:t>docker</a:t>
-            </a:r>
-            <a:r>
-              <a:rPr lang="en-US" b="1" baseline="0" dirty="0" smtClean="0"/>
-              <a:t> </a:t>
-            </a:r>
-            <a:r>
-              <a:rPr lang="en-US" b="1" baseline="0" dirty="0" err="1" smtClean="0"/>
-              <a:t>ps</a:t>
-            </a:r>
-            <a:r>
-              <a:rPr lang="en-US" baseline="0" dirty="0" smtClean="0"/>
-              <a:t> is often accompanied by a </a:t>
-            </a:r>
-            <a:r>
-              <a:rPr lang="en-US" b="1" baseline="0" dirty="0" smtClean="0"/>
-              <a:t>-a</a:t>
-            </a:r>
-            <a:r>
-              <a:rPr lang="en-US" baseline="0" dirty="0" smtClean="0"/>
-              <a:t> switch to list all containers, including those that are no longer running, while </a:t>
-            </a:r>
-            <a:r>
-              <a:rPr lang="en-US" b="1" baseline="0" dirty="0" err="1" smtClean="0"/>
-              <a:t>docker</a:t>
-            </a:r>
-            <a:r>
-              <a:rPr lang="en-US" b="1" baseline="0" dirty="0" smtClean="0"/>
-              <a:t> </a:t>
-            </a:r>
-            <a:r>
-              <a:rPr lang="en-US" b="1" baseline="0" dirty="0" err="1" smtClean="0"/>
-              <a:t>rm</a:t>
-            </a:r>
-            <a:r>
-              <a:rPr lang="en-US" baseline="0" dirty="0" smtClean="0"/>
-              <a:t> and </a:t>
-            </a:r>
-            <a:r>
-              <a:rPr lang="en-US" b="1" baseline="0" dirty="0" err="1" smtClean="0"/>
-              <a:t>docker</a:t>
-            </a:r>
-            <a:r>
-              <a:rPr lang="en-US" b="1" baseline="0" dirty="0" smtClean="0"/>
-              <a:t> </a:t>
-            </a:r>
-            <a:r>
-              <a:rPr lang="en-US" b="1" baseline="0" dirty="0" err="1" smtClean="0"/>
-              <a:t>rmi</a:t>
-            </a:r>
-            <a:r>
-              <a:rPr lang="en-US" baseline="0" dirty="0" smtClean="0"/>
-              <a:t> are used to delete (remove) containers and images, respectively. The </a:t>
-            </a:r>
-            <a:r>
-              <a:rPr lang="en-US" b="1" baseline="0" dirty="0" err="1" smtClean="0"/>
-              <a:t>docker</a:t>
-            </a:r>
-            <a:r>
-              <a:rPr lang="en-US" b="1" baseline="0" dirty="0" smtClean="0"/>
-              <a:t> build</a:t>
-            </a:r>
-            <a:r>
-              <a:rPr lang="en-US" baseline="0" dirty="0" smtClean="0"/>
-              <a:t> command uses a </a:t>
-            </a:r>
-            <a:r>
-              <a:rPr lang="en-US" baseline="0" dirty="0" err="1" smtClean="0"/>
-              <a:t>Dockerfile</a:t>
-            </a:r>
-            <a:r>
-              <a:rPr lang="en-US" baseline="0" dirty="0" smtClean="0"/>
-              <a:t> (a text file containing build commands) and a "context" -- for example, a specified directory in the file system -- to build Docker images.</a:t>
-            </a:r>
-            <a:endParaRPr lang="en-US" dirty="0" smtClean="0"/>
+              <a:t> when you create an Azure Container Service with Docker Swarm as the orchestrator. Azure creates one or more master VMs to control the "swarm" of containers, as well as a Virtual Machine Scale Set, which provides the "agent" VMs in which containers run. All these VMs communicate over a private virtual network. To communicate with Docker Swarm in a master VM from a Docker client running on a local machine, you establish an SSH tunnel that forwards the local port 22375 to port 2375 in the VM (via SSH port 2200). This allows you to execute local commands that load container images and run containers in the cloud. Docker Swarm manages the container instances in the agent VMs as well as the agent VMs themselves. You don't have to know this to use Azure Container Service, but it does help explain various port forwarding commands that you employ when running the Docker client on a local machine connected to Azure.</a:t>
+            </a:r>
+            <a:endParaRPr lang="en-US" dirty="0"/>
           </a:p>
         </p:txBody>
       </p:sp>
@@ -1639,7 +1541,7 @@
     </p:spTree>
     <p:extLst>
       <p:ext uri="{BB962C8B-B14F-4D97-AF65-F5344CB8AC3E}">
-        <p14:creationId xmlns:p14="http://schemas.microsoft.com/office/powerpoint/2010/main" val="1832625065"/>
+        <p14:creationId xmlns:p14="http://schemas.microsoft.com/office/powerpoint/2010/main" val="2302495390"/>
       </p:ext>
     </p:extLst>
   </p:cSld>
@@ -1693,19 +1595,108 @@
           <a:bodyPr/>
           <a:lstStyle/>
           <a:p>
-            <a:r>
-              <a:rPr lang="en-US" dirty="0" smtClean="0"/>
-              <a:t>From the documentation: "Azure Container Service makes it simpler for you to create, configure, and manage a cluster of virtual machines that are preconfigured to run containerized applications. It uses an optimized configuration of popular open-source scheduling and orchestration tools. This enables you to use your existing skills, or draw upon a large and growing body of community expertise, to deploy and manage container-based applications on Microsoft Azure." ACS supports Linux containers and Windows containers. The latter rely</a:t>
-            </a:r>
-            <a:r>
-              <a:rPr lang="en-US" baseline="0" dirty="0" smtClean="0"/>
-              <a:t> on </a:t>
-            </a:r>
-            <a:r>
-              <a:rPr lang="en-US" dirty="0" smtClean="0"/>
-              <a:t>Windows Server 2016.</a:t>
-            </a:r>
-            <a:endParaRPr lang="en-US" dirty="0"/>
+            <a:pPr marL="0" marR="0" lvl="0" indent="0" algn="l" defTabSz="914400" rtl="0" eaLnBrk="1" fontAlgn="auto" latinLnBrk="0" hangingPunct="1">
+              <a:lnSpc>
+                <a:spcPct val="100000"/>
+              </a:lnSpc>
+              <a:spcBef>
+                <a:spcPts val="0"/>
+              </a:spcBef>
+              <a:spcAft>
+                <a:spcPts val="0"/>
+              </a:spcAft>
+              <a:buClrTx/>
+              <a:buSzTx/>
+              <a:buFontTx/>
+              <a:buNone/>
+              <a:tabLst/>
+              <a:defRPr/>
+            </a:pPr>
+            <a:r>
+              <a:rPr lang="en-US" sz="1200" b="0" i="0" kern="1200" dirty="0" smtClean="0">
+                <a:solidFill>
+                  <a:schemeClr val="tx1"/>
+                </a:solidFill>
+                <a:effectLst/>
+                <a:latin typeface="+mn-lt"/>
+                <a:ea typeface="+mn-ea"/>
+                <a:cs typeface="+mn-cs"/>
+              </a:rPr>
+              <a:t>This command works</a:t>
+            </a:r>
+            <a:r>
+              <a:rPr lang="en-US" sz="1200" b="0" i="0" kern="1200" baseline="0" dirty="0" smtClean="0">
+                <a:solidFill>
+                  <a:schemeClr val="tx1"/>
+                </a:solidFill>
+                <a:effectLst/>
+                <a:latin typeface="+mn-lt"/>
+                <a:ea typeface="+mn-ea"/>
+                <a:cs typeface="+mn-cs"/>
+              </a:rPr>
+              <a:t> in a terminal window on OS X or Linux. (Windows users need to use a third-party SSH tool such as </a:t>
+            </a:r>
+            <a:r>
+              <a:rPr lang="en-US" sz="1200" b="0" i="0" kern="1200" baseline="0" dirty="0" err="1" smtClean="0">
+                <a:solidFill>
+                  <a:schemeClr val="tx1"/>
+                </a:solidFill>
+                <a:effectLst/>
+                <a:latin typeface="+mn-lt"/>
+                <a:ea typeface="+mn-ea"/>
+                <a:cs typeface="+mn-cs"/>
+              </a:rPr>
+              <a:t>PuTTY</a:t>
+            </a:r>
+            <a:r>
+              <a:rPr lang="en-US" sz="1200" b="0" i="0" kern="1200" baseline="0" dirty="0" smtClean="0">
+                <a:solidFill>
+                  <a:schemeClr val="tx1"/>
+                </a:solidFill>
+                <a:effectLst/>
+                <a:latin typeface="+mn-lt"/>
+                <a:ea typeface="+mn-ea"/>
+                <a:cs typeface="+mn-cs"/>
+              </a:rPr>
+              <a:t>.) </a:t>
+            </a:r>
+            <a:r>
+              <a:rPr lang="en-US" sz="1200" b="0" i="0" kern="1200" dirty="0" smtClean="0">
+                <a:solidFill>
+                  <a:schemeClr val="tx1"/>
+                </a:solidFill>
+                <a:effectLst/>
+                <a:latin typeface="+mn-lt"/>
+                <a:ea typeface="+mn-ea"/>
+                <a:cs typeface="+mn-cs"/>
+              </a:rPr>
+              <a:t>The purpose of the -L switch is to forward traffic transmitted through port 22375 on the local machine (that's the port used by the</a:t>
+            </a:r>
+            <a:r>
+              <a:rPr lang="en-US" sz="1200" b="0" i="0" kern="1200" baseline="0" dirty="0" smtClean="0">
+                <a:solidFill>
+                  <a:schemeClr val="tx1"/>
+                </a:solidFill>
+                <a:effectLst/>
+                <a:latin typeface="+mn-lt"/>
+                <a:ea typeface="+mn-ea"/>
+                <a:cs typeface="+mn-cs"/>
+              </a:rPr>
+              <a:t> Docker</a:t>
+            </a:r>
+            <a:r>
+              <a:rPr lang="en-US" sz="1200" b="0" i="0" kern="1200" dirty="0" smtClean="0">
+                <a:solidFill>
+                  <a:schemeClr val="tx1"/>
+                </a:solidFill>
+                <a:effectLst/>
+                <a:latin typeface="+mn-lt"/>
+                <a:ea typeface="+mn-ea"/>
+                <a:cs typeface="+mn-cs"/>
+              </a:rPr>
+              <a:t> CLI) to port 2375 at the other end. Docker Swarm listens on port 2375. The -p switch instructs SSH to use port 2200 rather than the default 22. The load balancer you're connecting to listens on port 2200 and forwards the SSH messages it receives to port 22 on the master VM.</a:t>
+            </a:r>
+            <a:endParaRPr lang="en-US" dirty="0" smtClean="0"/>
           </a:p>
         </p:txBody>
       </p:sp>
@@ -1735,99 +1726,7 @@
     </p:spTree>
     <p:extLst>
       <p:ext uri="{BB962C8B-B14F-4D97-AF65-F5344CB8AC3E}">
-        <p14:creationId xmlns:p14="http://schemas.microsoft.com/office/powerpoint/2010/main" val="36852900"/>
-      </p:ext>
-    </p:extLst>
-  </p:cSld>
-  <p:clrMapOvr>
-    <a:masterClrMapping/>
-  </p:clrMapOvr>
-</p:notes>
-</file>
-
-<file path=ppt/notesSlides/notesSlide19.xml><?xml version="1.0" encoding="utf-8"?>
-<p:notes xmlns:a="http://schemas.openxmlformats.org/drawingml/2006/main" xmlns:r="http://schemas.openxmlformats.org/officeDocument/2006/relationships" xmlns:p="http://schemas.openxmlformats.org/presentationml/2006/main">
-  <p:cSld>
-    <p:spTree>
-      <p:nvGrpSpPr>
-        <p:cNvPr id="1" name=""/>
-        <p:cNvGrpSpPr/>
-        <p:nvPr/>
-      </p:nvGrpSpPr>
-      <p:grpSpPr>
-        <a:xfrm>
-          <a:off x="0" y="0"/>
-          <a:ext cx="0" cy="0"/>
-          <a:chOff x="0" y="0"/>
-          <a:chExt cx="0" cy="0"/>
-        </a:xfrm>
-      </p:grpSpPr>
-      <p:sp>
-        <p:nvSpPr>
-          <p:cNvPr id="2" name="Slide Image Placeholder 1"/>
-          <p:cNvSpPr>
-            <a:spLocks noGrp="1" noRot="1" noChangeAspect="1"/>
-          </p:cNvSpPr>
-          <p:nvPr>
-            <p:ph type="sldImg"/>
-          </p:nvPr>
-        </p:nvSpPr>
-        <p:spPr/>
-      </p:sp>
-      <p:sp>
-        <p:nvSpPr>
-          <p:cNvPr id="3" name="Notes Placeholder 2"/>
-          <p:cNvSpPr>
-            <a:spLocks noGrp="1"/>
-          </p:cNvSpPr>
-          <p:nvPr>
-            <p:ph type="body" idx="1"/>
-          </p:nvPr>
-        </p:nvSpPr>
-        <p:spPr/>
-        <p:txBody>
-          <a:bodyPr/>
-          <a:lstStyle/>
-          <a:p>
-            <a:r>
-              <a:rPr lang="en-US" dirty="0" smtClean="0"/>
-              <a:t>Here's what happens in Azure</a:t>
-            </a:r>
-            <a:r>
-              <a:rPr lang="en-US" baseline="0" dirty="0" smtClean="0"/>
-              <a:t> when you create an Azure Container Service with Docker Swarm as the orchestrator. Azure creates one or more master VMs to control the "swarm" of containers, as well as a Virtual Machine Scale Set, which provides the "agent" VMs in which containers run. All these VMs communicate over a private virtual network. To communicate with Docker Swarm in a master VM from a Docker client running on a local machine, you establish an SSH tunnel that forwards the local port 22375 to port 2375 in the VM (via SSH port 2200). This allows you to execute local commands that load container images and run containers in the cloud. Docker Swarm manages the container instances in the agent VMs as well as the agent VMs themselves. You don't have to know this to use Azure Container Service, but it does help explain various port forwarding commands that you employ when running the Docker client on a local machine connected to Azure.</a:t>
-            </a:r>
-            <a:endParaRPr lang="en-US" dirty="0"/>
-          </a:p>
-        </p:txBody>
-      </p:sp>
-      <p:sp>
-        <p:nvSpPr>
-          <p:cNvPr id="4" name="Slide Number Placeholder 3"/>
-          <p:cNvSpPr>
-            <a:spLocks noGrp="1"/>
-          </p:cNvSpPr>
-          <p:nvPr>
-            <p:ph type="sldNum" sz="quarter" idx="10"/>
-          </p:nvPr>
-        </p:nvSpPr>
-        <p:spPr/>
-        <p:txBody>
-          <a:bodyPr/>
-          <a:lstStyle/>
-          <a:p>
-            <a:fld id="{01283FAC-A721-45A3-BBDE-EAF2B09B7CD9}" type="slidenum">
-              <a:rPr lang="en-US" smtClean="0"/>
-              <a:t>19</a:t>
-            </a:fld>
-            <a:endParaRPr lang="en-US"/>
-          </a:p>
-        </p:txBody>
-      </p:sp>
-    </p:spTree>
-    <p:extLst>
-      <p:ext uri="{BB962C8B-B14F-4D97-AF65-F5344CB8AC3E}">
-        <p14:creationId xmlns:p14="http://schemas.microsoft.com/office/powerpoint/2010/main" val="2302495390"/>
+        <p14:creationId xmlns:p14="http://schemas.microsoft.com/office/powerpoint/2010/main" val="3975244300"/>
       </p:ext>
     </p:extLst>
   </p:cSld>
@@ -1881,134 +1780,8 @@
           <a:bodyPr/>
           <a:lstStyle/>
           <a:p>
-            <a:pPr marL="0" marR="0" lvl="0" indent="0" algn="l" defTabSz="914400" rtl="0" eaLnBrk="1" fontAlgn="auto" latinLnBrk="0" hangingPunct="1">
-              <a:lnSpc>
-                <a:spcPct val="100000"/>
-              </a:lnSpc>
-              <a:spcBef>
-                <a:spcPts val="0"/>
-              </a:spcBef>
-              <a:spcAft>
-                <a:spcPts val="0"/>
-              </a:spcAft>
-              <a:buClrTx/>
-              <a:buSzTx/>
-              <a:buFontTx/>
-              <a:buNone/>
-              <a:tabLst/>
-              <a:defRPr/>
-            </a:pPr>
-            <a:r>
-              <a:rPr lang="en-US" dirty="0" smtClean="0"/>
-              <a:t>High-performance computing (HPC)</a:t>
-            </a:r>
-            <a:r>
-              <a:rPr lang="en-US" baseline="0" dirty="0" smtClean="0"/>
-              <a:t> typically refers to computing power beyond that of a typical desktop computer. Obviously, the definition of high-performance changes with time as more computing power is crammed into smaller spaces, making the supercomputers of today commodity computers of tomorrow. Regardless though, the concepts of HPC have remained the same since the early days of computing wherein scientists and engineers worked to figure out how aggregate more computing resources to perform computing tasks.</a:t>
-            </a:r>
-            <a:endParaRPr lang="en-US" dirty="0" smtClean="0"/>
-          </a:p>
-        </p:txBody>
-      </p:sp>
-      <p:sp>
-        <p:nvSpPr>
-          <p:cNvPr id="4" name="Slide Number Placeholder 3"/>
-          <p:cNvSpPr>
-            <a:spLocks noGrp="1"/>
-          </p:cNvSpPr>
-          <p:nvPr>
-            <p:ph type="sldNum" sz="quarter" idx="10"/>
-          </p:nvPr>
-        </p:nvSpPr>
-        <p:spPr/>
-        <p:txBody>
-          <a:bodyPr/>
-          <a:lstStyle/>
-          <a:p>
-            <a:fld id="{01283FAC-A721-45A3-BBDE-EAF2B09B7CD9}" type="slidenum">
-              <a:rPr lang="en-US" smtClean="0"/>
-              <a:t>2</a:t>
-            </a:fld>
-            <a:endParaRPr lang="en-US"/>
-          </a:p>
-        </p:txBody>
-      </p:sp>
-    </p:spTree>
-    <p:extLst>
-      <p:ext uri="{BB962C8B-B14F-4D97-AF65-F5344CB8AC3E}">
-        <p14:creationId xmlns:p14="http://schemas.microsoft.com/office/powerpoint/2010/main" val="3514575438"/>
-      </p:ext>
-    </p:extLst>
-  </p:cSld>
-  <p:clrMapOvr>
-    <a:masterClrMapping/>
-  </p:clrMapOvr>
-</p:notes>
-</file>
-
-<file path=ppt/notesSlides/notesSlide20.xml><?xml version="1.0" encoding="utf-8"?>
-<p:notes xmlns:a="http://schemas.openxmlformats.org/drawingml/2006/main" xmlns:r="http://schemas.openxmlformats.org/officeDocument/2006/relationships" xmlns:p="http://schemas.openxmlformats.org/presentationml/2006/main">
-  <p:cSld>
-    <p:spTree>
-      <p:nvGrpSpPr>
-        <p:cNvPr id="1" name=""/>
-        <p:cNvGrpSpPr/>
-        <p:nvPr/>
-      </p:nvGrpSpPr>
-      <p:grpSpPr>
-        <a:xfrm>
-          <a:off x="0" y="0"/>
-          <a:ext cx="0" cy="0"/>
-          <a:chOff x="0" y="0"/>
-          <a:chExt cx="0" cy="0"/>
-        </a:xfrm>
-      </p:grpSpPr>
-      <p:sp>
-        <p:nvSpPr>
-          <p:cNvPr id="2" name="Slide Image Placeholder 1"/>
-          <p:cNvSpPr>
-            <a:spLocks noGrp="1" noRot="1" noChangeAspect="1"/>
-          </p:cNvSpPr>
-          <p:nvPr>
-            <p:ph type="sldImg"/>
-          </p:nvPr>
-        </p:nvSpPr>
-        <p:spPr/>
-      </p:sp>
-      <p:sp>
-        <p:nvSpPr>
-          <p:cNvPr id="3" name="Notes Placeholder 2"/>
-          <p:cNvSpPr>
-            <a:spLocks noGrp="1"/>
-          </p:cNvSpPr>
-          <p:nvPr>
-            <p:ph type="body" idx="1"/>
-          </p:nvPr>
-        </p:nvSpPr>
-        <p:spPr/>
-        <p:txBody>
-          <a:bodyPr/>
-          <a:lstStyle/>
-          <a:p>
-            <a:pPr marL="0" marR="0" lvl="0" indent="0" algn="l" defTabSz="914400" rtl="0" eaLnBrk="1" fontAlgn="auto" latinLnBrk="0" hangingPunct="1">
-              <a:lnSpc>
-                <a:spcPct val="100000"/>
-              </a:lnSpc>
-              <a:spcBef>
-                <a:spcPts val="0"/>
-              </a:spcBef>
-              <a:spcAft>
-                <a:spcPts val="0"/>
-              </a:spcAft>
-              <a:buClrTx/>
-              <a:buSzTx/>
-              <a:buFontTx/>
-              <a:buNone/>
-              <a:tabLst/>
-              <a:defRPr/>
-            </a:pPr>
-            <a:r>
-              <a:rPr lang="en-US" sz="1200" b="0" i="0" kern="1200" dirty="0" smtClean="0">
+            <a:r>
+              <a:rPr lang="en-US" sz="1200" kern="1200" dirty="0" smtClean="0">
                 <a:solidFill>
                   <a:schemeClr val="tx1"/>
                 </a:solidFill>
@@ -2017,10 +1790,12 @@
                 <a:ea typeface="+mn-ea"/>
                 <a:cs typeface="+mn-cs"/>
               </a:rPr>
-              <a:t>This command works</a:t>
-            </a:r>
-            <a:r>
-              <a:rPr lang="en-US" sz="1200" b="0" i="0" kern="1200" baseline="0" dirty="0" smtClean="0">
+              <a:t>With Azure, you deploy a cluster of VMs to the cloud in minutes and scale it up and down as needed. They can be Windows VMs or Linux VMs; Azure doesn’t care. In fact, Linux VMs are slightly less expensive because you don’t pay Windows licensing fees for them. You can also choose from a variety of virtual-machine sizes, and you can use deployment templates – something I’ll say more about shortly – to automate your deployments.</a:t>
+            </a:r>
+          </a:p>
+          <a:p>
+            <a:r>
+              <a:rPr lang="en-US" sz="1200" kern="1200" dirty="0" smtClean="0">
                 <a:solidFill>
                   <a:schemeClr val="tx1"/>
                 </a:solidFill>
@@ -2029,10 +1804,12 @@
                 <a:ea typeface="+mn-ea"/>
                 <a:cs typeface="+mn-cs"/>
               </a:rPr>
-              <a:t> in a terminal window on OS X or Linux. (Windows users need to use a third-party SSH tool such as </a:t>
-            </a:r>
-            <a:r>
-              <a:rPr lang="en-US" sz="1200" b="0" i="0" kern="1200" baseline="0" dirty="0" err="1" smtClean="0">
+              <a:t> </a:t>
+            </a:r>
+          </a:p>
+          <a:p>
+            <a:r>
+              <a:rPr lang="en-US" sz="1200" kern="1200" dirty="0" smtClean="0">
                 <a:solidFill>
                   <a:schemeClr val="tx1"/>
                 </a:solidFill>
@@ -2041,57 +1818,8 @@
                 <a:ea typeface="+mn-ea"/>
                 <a:cs typeface="+mn-cs"/>
               </a:rPr>
-              <a:t>PuTTY</a:t>
-            </a:r>
-            <a:r>
-              <a:rPr lang="en-US" sz="1200" b="0" i="0" kern="1200" baseline="0" dirty="0" smtClean="0">
-                <a:solidFill>
-                  <a:schemeClr val="tx1"/>
-                </a:solidFill>
-                <a:effectLst/>
-                <a:latin typeface="+mn-lt"/>
-                <a:ea typeface="+mn-ea"/>
-                <a:cs typeface="+mn-cs"/>
-              </a:rPr>
-              <a:t>.) </a:t>
-            </a:r>
-            <a:r>
-              <a:rPr lang="en-US" sz="1200" b="0" i="0" kern="1200" dirty="0" smtClean="0">
-                <a:solidFill>
-                  <a:schemeClr val="tx1"/>
-                </a:solidFill>
-                <a:effectLst/>
-                <a:latin typeface="+mn-lt"/>
-                <a:ea typeface="+mn-ea"/>
-                <a:cs typeface="+mn-cs"/>
-              </a:rPr>
-              <a:t>The purpose of the -L switch is to forward traffic transmitted through port 22375 on the local machine (that's the port used by the</a:t>
-            </a:r>
-            <a:r>
-              <a:rPr lang="en-US" sz="1200" b="0" i="0" kern="1200" baseline="0" dirty="0" smtClean="0">
-                <a:solidFill>
-                  <a:schemeClr val="tx1"/>
-                </a:solidFill>
-                <a:effectLst/>
-                <a:latin typeface="+mn-lt"/>
-                <a:ea typeface="+mn-ea"/>
-                <a:cs typeface="+mn-cs"/>
-              </a:rPr>
-              <a:t> Docker</a:t>
-            </a:r>
-            <a:r>
-              <a:rPr lang="en-US" sz="1200" b="0" i="0" kern="1200" dirty="0" smtClean="0">
-                <a:solidFill>
-                  <a:schemeClr val="tx1"/>
-                </a:solidFill>
-                <a:effectLst/>
-                <a:latin typeface="+mn-lt"/>
-                <a:ea typeface="+mn-ea"/>
-                <a:cs typeface="+mn-cs"/>
-              </a:rPr>
-              <a:t> CLI) to port 2375 at the other end. Docker Swarm listens on port 2375. The -p switch instructs SSH to use port 2200 rather than the default 22. The load balancer you're connecting to listens on port 2200 and forwards the SSH messages it receives to port 22 on the master VM.</a:t>
-            </a:r>
-            <a:endParaRPr lang="en-US" dirty="0" smtClean="0"/>
+              <a:t>Azure Batch can also play a role in HPC by allowing you to schedule jobs to run across a pool of VMs, much like the batch-processing services frequently used on mainframes and supercomputers.</a:t>
+            </a:r>
           </a:p>
         </p:txBody>
       </p:sp>
@@ -2112,7 +1840,7 @@
           <a:p>
             <a:fld id="{01283FAC-A721-45A3-BBDE-EAF2B09B7CD9}" type="slidenum">
               <a:rPr lang="en-US" smtClean="0"/>
-              <a:t>20</a:t>
+              <a:t>2</a:t>
             </a:fld>
             <a:endParaRPr lang="en-US"/>
           </a:p>
@@ -2121,7 +1849,7 @@
     </p:spTree>
     <p:extLst>
       <p:ext uri="{BB962C8B-B14F-4D97-AF65-F5344CB8AC3E}">
-        <p14:creationId xmlns:p14="http://schemas.microsoft.com/office/powerpoint/2010/main" val="3975244300"/>
+        <p14:creationId xmlns:p14="http://schemas.microsoft.com/office/powerpoint/2010/main" val="2710204306"/>
       </p:ext>
     </p:extLst>
   </p:cSld>
@@ -2175,30 +1903,67 @@
           <a:bodyPr/>
           <a:lstStyle/>
           <a:p>
-            <a:pPr marL="0" marR="0" lvl="0" indent="0" algn="l" defTabSz="914400" rtl="0" eaLnBrk="1" fontAlgn="auto" latinLnBrk="0" hangingPunct="1">
-              <a:lnSpc>
-                <a:spcPct val="100000"/>
-              </a:lnSpc>
-              <a:spcBef>
-                <a:spcPts val="0"/>
-              </a:spcBef>
-              <a:spcAft>
-                <a:spcPts val="0"/>
-              </a:spcAft>
-              <a:buClrTx/>
-              <a:buSzTx/>
-              <a:buFontTx/>
-              <a:buNone/>
-              <a:tabLst/>
-              <a:defRPr/>
-            </a:pPr>
+            <a:r>
+              <a:rPr lang="en-US" sz="1200" kern="1200" dirty="0" smtClean="0">
+                <a:solidFill>
+                  <a:schemeClr val="tx1"/>
+                </a:solidFill>
+                <a:effectLst/>
+                <a:latin typeface="+mn-lt"/>
+                <a:ea typeface="+mn-ea"/>
+                <a:cs typeface="+mn-cs"/>
+              </a:rPr>
+              <a:t>Azure offers a variety of VM sizes in an effort to make sure there’s something to fit everyone’s needs. Each size is identified by a letter and a number: A0, D1, G2, and so on. There is documentation online detailing the specs for each machine – number of cores, amount of RAM, type and size of hard disk, for example – as well as the cost. Not surprisingly, more powerful machines are most costly as well. Prices range from as little as 7 cents an hour for a single core machine running Linux to almost $10 an hour for a machine with 32 cores and almost half a terabyte of RAM. The G-series machines are reserved for the most power-hungry applications.</a:t>
+            </a:r>
+          </a:p>
+          <a:p>
+            <a:r>
+              <a:rPr lang="en-US" sz="1200" kern="1200" dirty="0" smtClean="0">
+                <a:solidFill>
+                  <a:schemeClr val="tx1"/>
+                </a:solidFill>
+                <a:effectLst/>
+                <a:latin typeface="+mn-lt"/>
+                <a:ea typeface="+mn-ea"/>
+                <a:cs typeface="+mn-cs"/>
+              </a:rPr>
+              <a:t> </a:t>
+            </a:r>
+          </a:p>
+          <a:p>
+            <a:r>
+              <a:rPr lang="en-US" sz="1200" kern="1200" dirty="0" smtClean="0">
+                <a:solidFill>
+                  <a:schemeClr val="tx1"/>
+                </a:solidFill>
+                <a:effectLst/>
+                <a:latin typeface="+mn-lt"/>
+                <a:ea typeface="+mn-ea"/>
+                <a:cs typeface="+mn-cs"/>
+              </a:rPr>
+              <a:t>Costs can grow astronomically when you talk about clusters with hundreds or even thousands of cores. But cost isn’t really the point. The point is having massive amounts of computing power at your fingertips. Besides, the cost of “renting” even the largest virtual cluster pales in comparison to the cost of purchasing, setting up, and maintaining a similarly sized cluster of your own.</a:t>
+            </a:r>
+          </a:p>
+          <a:p>
+            <a:endParaRPr lang="en-US" dirty="0" smtClean="0"/>
+          </a:p>
+          <a:p>
             <a:r>
               <a:rPr lang="en-US" dirty="0" smtClean="0"/>
-              <a:t>High</a:t>
+              <a:t>Not all VM sizes are available in all data centers. For the latest pricing information and availability, see https://azure.microsoft.com/en-us/pricing/details/virtual-machines.</a:t>
+            </a:r>
+          </a:p>
+          <a:p>
+            <a:endParaRPr lang="en-US" dirty="0" smtClean="0"/>
+          </a:p>
+          <a:p>
+            <a:r>
+              <a:rPr lang="en-US" dirty="0" smtClean="0"/>
+              <a:t>N-series VMs are currently in preview</a:t>
             </a:r>
             <a:r>
               <a:rPr lang="en-US" baseline="0" dirty="0" smtClean="0"/>
-              <a:t>-performance computing is typically performed on a cluster of computers interconnected by a high-speed network. Workloads are sent to a master node which delegates tasks to the worker nodes. Historically, clusters were built using proprietary, often purpose-built computers. Recent trends though have shifted to using commodity hardware – the same kind of components used to build desktop computers – to construct HPC clusters. Engineers are getting even more clever with how they build clusters, too. The latest trend in HPC has been to use GPUs in addition to CPUs to created HPC clusters. While a typical desktop CPU has 2, 4, or 8 cores, graphics cards have usually hundreds of cores. These cores, while not as powerful as CPU cores, can still perform computations. HPC clusters are combining CPUs and GPUs to squeeze even more performance out of computer hardware for heavy workloads.</a:t>
+              <a:t> and are an answer to researchers who need GPU power to perform complex calculations. They are equipped with NVIDIA Tesla GPUs.</a:t>
             </a:r>
             <a:endParaRPr lang="en-US" dirty="0" smtClean="0"/>
           </a:p>
@@ -2230,7 +1995,7 @@
     </p:spTree>
     <p:extLst>
       <p:ext uri="{BB962C8B-B14F-4D97-AF65-F5344CB8AC3E}">
-        <p14:creationId xmlns:p14="http://schemas.microsoft.com/office/powerpoint/2010/main" val="3654422300"/>
+        <p14:creationId xmlns:p14="http://schemas.microsoft.com/office/powerpoint/2010/main" val="2171044667"/>
       </p:ext>
     </p:extLst>
   </p:cSld>
@@ -2284,45 +2049,30 @@
           <a:bodyPr/>
           <a:lstStyle/>
           <a:p>
-            <a:r>
-              <a:rPr lang="en-US" sz="1200" kern="1200" dirty="0" smtClean="0">
-                <a:solidFill>
-                  <a:schemeClr val="tx1"/>
-                </a:solidFill>
-                <a:effectLst/>
-                <a:latin typeface="+mn-lt"/>
-                <a:ea typeface="+mn-ea"/>
-                <a:cs typeface="+mn-cs"/>
-              </a:rPr>
-              <a:t>With Azure, you deploy a cluster of VMs to the cloud in minutes and scale it up and down as needed. They can be Windows VMs or Linux VMs; Azure doesn’t care. In fact, Linux VMs are slightly less expensive because you don’t pay Windows licensing fees for them. You can also choose from a variety of virtual-machine sizes, and you can use deployment templates – something I’ll say more about shortly – to automate your deployments.</a:t>
-            </a:r>
-          </a:p>
-          <a:p>
-            <a:r>
-              <a:rPr lang="en-US" sz="1200" kern="1200" dirty="0" smtClean="0">
-                <a:solidFill>
-                  <a:schemeClr val="tx1"/>
-                </a:solidFill>
-                <a:effectLst/>
-                <a:latin typeface="+mn-lt"/>
-                <a:ea typeface="+mn-ea"/>
-                <a:cs typeface="+mn-cs"/>
-              </a:rPr>
-              <a:t> </a:t>
-            </a:r>
-          </a:p>
-          <a:p>
-            <a:r>
-              <a:rPr lang="en-US" sz="1200" kern="1200" dirty="0" smtClean="0">
-                <a:solidFill>
-                  <a:schemeClr val="tx1"/>
-                </a:solidFill>
-                <a:effectLst/>
-                <a:latin typeface="+mn-lt"/>
-                <a:ea typeface="+mn-ea"/>
-                <a:cs typeface="+mn-cs"/>
-              </a:rPr>
-              <a:t>Azure Batch can also play a role in HPC by allowing you to schedule jobs to run across a pool of VMs, much like the batch-processing services frequently used on mainframes and supercomputers.</a:t>
+            <a:pPr marL="0" marR="0" lvl="0" indent="0" algn="l" defTabSz="914400" rtl="0" eaLnBrk="1" fontAlgn="auto" latinLnBrk="0" hangingPunct="1">
+              <a:lnSpc>
+                <a:spcPct val="100000"/>
+              </a:lnSpc>
+              <a:spcBef>
+                <a:spcPts val="0"/>
+              </a:spcBef>
+              <a:spcAft>
+                <a:spcPts val="0"/>
+              </a:spcAft>
+              <a:buClrTx/>
+              <a:buSzTx/>
+              <a:buFontTx/>
+              <a:buNone/>
+              <a:tabLst/>
+              <a:defRPr/>
+            </a:pPr>
+            <a:r>
+              <a:rPr lang="en-US" dirty="0" smtClean="0"/>
+              <a:t>For background,</a:t>
+            </a:r>
+            <a:r>
+              <a:rPr lang="en-US" baseline="0" dirty="0" smtClean="0"/>
+              <a:t> see https://blogs.msdn.microsoft.com/uk_faculty_connection/2016/09/12/choosing-the-most-appropiate-azure-virtual-machine-specification/?wt.mc_id=DX_873849. Not shown here are H machines, which are optimized for extremely heavy computing workloads.</a:t>
             </a:r>
           </a:p>
         </p:txBody>
@@ -2353,7 +2103,7 @@
     </p:spTree>
     <p:extLst>
       <p:ext uri="{BB962C8B-B14F-4D97-AF65-F5344CB8AC3E}">
-        <p14:creationId xmlns:p14="http://schemas.microsoft.com/office/powerpoint/2010/main" val="976261457"/>
+        <p14:creationId xmlns:p14="http://schemas.microsoft.com/office/powerpoint/2010/main" val="928529220"/>
       </p:ext>
     </p:extLst>
   </p:cSld>
@@ -2407,6 +2157,23 @@
           <a:bodyPr/>
           <a:lstStyle/>
           <a:p>
+            <a:pPr marL="0" marR="0" indent="0" algn="l" defTabSz="914400" rtl="0" eaLnBrk="1" fontAlgn="auto" latinLnBrk="0" hangingPunct="1">
+              <a:lnSpc>
+                <a:spcPct val="100000"/>
+              </a:lnSpc>
+              <a:spcBef>
+                <a:spcPts val="0"/>
+              </a:spcBef>
+              <a:spcAft>
+                <a:spcPts val="0"/>
+              </a:spcAft>
+              <a:buClrTx/>
+              <a:buSzTx/>
+              <a:buFontTx/>
+              <a:buNone/>
+              <a:tabLst/>
+              <a:defRPr/>
+            </a:pPr>
             <a:r>
               <a:rPr lang="en-US" sz="1200" kern="1200" dirty="0" smtClean="0">
                 <a:solidFill>
@@ -2417,57 +2184,7 @@
                 <a:ea typeface="+mn-ea"/>
                 <a:cs typeface="+mn-cs"/>
               </a:rPr>
-              <a:t>Azure offers a variety of VM sizes in an effort to make sure there’s something to fit everyone’s needs. Each size is identified by a letter and a number: A0, D1, G2, and so on. There is documentation online detailing the specs for each machine – number of cores, amount of RAM, type and size of hard disk, for example – as well as the cost. Not surprisingly, more powerful machines are most costly as well. Prices range from as little as 7 cents an hour for a single core machine running Linux to almost $10 an hour for a machine with 32 cores and almost half a terabyte of RAM. The G-series machines are reserved for the most power-hungry applications.</a:t>
-            </a:r>
-          </a:p>
-          <a:p>
-            <a:r>
-              <a:rPr lang="en-US" sz="1200" kern="1200" dirty="0" smtClean="0">
-                <a:solidFill>
-                  <a:schemeClr val="tx1"/>
-                </a:solidFill>
-                <a:effectLst/>
-                <a:latin typeface="+mn-lt"/>
-                <a:ea typeface="+mn-ea"/>
-                <a:cs typeface="+mn-cs"/>
-              </a:rPr>
-              <a:t> </a:t>
-            </a:r>
-          </a:p>
-          <a:p>
-            <a:r>
-              <a:rPr lang="en-US" sz="1200" kern="1200" dirty="0" smtClean="0">
-                <a:solidFill>
-                  <a:schemeClr val="tx1"/>
-                </a:solidFill>
-                <a:effectLst/>
-                <a:latin typeface="+mn-lt"/>
-                <a:ea typeface="+mn-ea"/>
-                <a:cs typeface="+mn-cs"/>
-              </a:rPr>
-              <a:t>Costs can grow astronomically when you talk about clusters with hundreds or even thousands of cores. But cost isn’t really the point. The point is having massive amounts of computing power at your fingertips. Besides, the cost of “renting” even the largest virtual cluster pales in comparison to the cost of purchasing, setting up, and maintaining a similarly sized cluster of your own.</a:t>
-            </a:r>
-          </a:p>
-          <a:p>
-            <a:endParaRPr lang="en-US" dirty="0" smtClean="0"/>
-          </a:p>
-          <a:p>
-            <a:r>
-              <a:rPr lang="en-US" dirty="0" smtClean="0"/>
-              <a:t>Not all VM sizes are available in all data centers. For the latest pricing information and availability, see https://azure.microsoft.com/en-us/pricing/details/virtual-machines.</a:t>
-            </a:r>
-          </a:p>
-          <a:p>
-            <a:endParaRPr lang="en-US" dirty="0" smtClean="0"/>
-          </a:p>
-          <a:p>
-            <a:r>
-              <a:rPr lang="en-US" dirty="0" smtClean="0"/>
-              <a:t>N-series VMs are currently in preview</a:t>
-            </a:r>
-            <a:r>
-              <a:rPr lang="en-US" baseline="0" dirty="0" smtClean="0"/>
-              <a:t> and are an answer to researchers who need GPU power to perform complex calculations. They are equipped with NVIDIA Tesla GPUs.</a:t>
+              <a:t>Here’s a quick look at three of the Azure VM sizes so you can see how they differ in cost and capability. One thing to keep in mind when deploying VMs is that you get charged for them whether they’re in use or not. When you’re finished using a VM or a cluster of VMs, it behooves you to go into the Azure portal and suspend each VM to avoid unnecessary charges. Once suspended, a VM is easily restarted so you can pick up where you left off and continue using it. I’ll show you how to start and stop VMs in the demo coming up shortly. I’ll also show you how to delete them so you can avoid even incurring storage charges for VMs that are no longer needed.</a:t>
             </a:r>
             <a:endParaRPr lang="en-US" dirty="0" smtClean="0"/>
           </a:p>
@@ -2499,7 +2216,7 @@
     </p:spTree>
     <p:extLst>
       <p:ext uri="{BB962C8B-B14F-4D97-AF65-F5344CB8AC3E}">
-        <p14:creationId xmlns:p14="http://schemas.microsoft.com/office/powerpoint/2010/main" val="2171044667"/>
+        <p14:creationId xmlns:p14="http://schemas.microsoft.com/office/powerpoint/2010/main" val="2655584646"/>
       </p:ext>
     </p:extLst>
   </p:cSld>
@@ -2553,31 +2270,123 @@
           <a:bodyPr/>
           <a:lstStyle/>
           <a:p>
-            <a:pPr marL="0" marR="0" lvl="0" indent="0" algn="l" defTabSz="914400" rtl="0" eaLnBrk="1" fontAlgn="auto" latinLnBrk="0" hangingPunct="1">
-              <a:lnSpc>
-                <a:spcPct val="100000"/>
-              </a:lnSpc>
-              <a:spcBef>
-                <a:spcPts val="0"/>
-              </a:spcBef>
-              <a:spcAft>
-                <a:spcPts val="0"/>
-              </a:spcAft>
-              <a:buClrTx/>
-              <a:buSzTx/>
-              <a:buFontTx/>
-              <a:buNone/>
-              <a:tabLst/>
-              <a:defRPr/>
-            </a:pPr>
-            <a:r>
-              <a:rPr lang="en-US" dirty="0" smtClean="0"/>
-              <a:t>For background,</a:t>
-            </a:r>
-            <a:r>
-              <a:rPr lang="en-US" baseline="0" dirty="0" smtClean="0"/>
-              <a:t> see https://blogs.msdn.microsoft.com/uk_faculty_connection/2016/09/12/choosing-the-most-appropiate-azure-virtual-machine-specification/?wt.mc_id=DX_873849. Not shown here are H machines, which are optimized for extremely heavy computing workloads.</a:t>
-            </a:r>
+            <a:r>
+              <a:rPr lang="en-US" sz="1200" kern="1200" dirty="0" smtClean="0">
+                <a:solidFill>
+                  <a:schemeClr val="tx1"/>
+                </a:solidFill>
+                <a:effectLst/>
+                <a:latin typeface="+mn-lt"/>
+                <a:ea typeface="+mn-ea"/>
+                <a:cs typeface="+mn-cs"/>
+              </a:rPr>
+              <a:t>An important element of HPC in Azure is the Azure Resource Manager. The Azure Resource Manager is a relatively recent addition to Azure. It lets you combine the resources that comprise an application – resources such as VMs, databases, virtual networks, and storage accounts – into </a:t>
+            </a:r>
+            <a:r>
+              <a:rPr lang="en-US" sz="1200" i="1" kern="1200" dirty="0" smtClean="0">
+                <a:solidFill>
+                  <a:schemeClr val="tx1"/>
+                </a:solidFill>
+                <a:effectLst/>
+                <a:latin typeface="+mn-lt"/>
+                <a:ea typeface="+mn-ea"/>
+                <a:cs typeface="+mn-cs"/>
+              </a:rPr>
+              <a:t>resource groups</a:t>
+            </a:r>
+            <a:r>
+              <a:rPr lang="en-US" sz="1200" kern="1200" dirty="0" smtClean="0">
+                <a:solidFill>
+                  <a:schemeClr val="tx1"/>
+                </a:solidFill>
+                <a:effectLst/>
+                <a:latin typeface="+mn-lt"/>
+                <a:ea typeface="+mn-ea"/>
+                <a:cs typeface="+mn-cs"/>
+              </a:rPr>
+              <a:t> so entire applications can be deployed, managed, and even deleted with a single step. Prior to Resource Manager, resources had to be created (and deleted) one by one, which quickly became onerous with large deployments.</a:t>
+            </a:r>
+          </a:p>
+          <a:p>
+            <a:r>
+              <a:rPr lang="en-US" sz="1200" kern="1200" dirty="0" smtClean="0">
+                <a:solidFill>
+                  <a:schemeClr val="tx1"/>
+                </a:solidFill>
+                <a:effectLst/>
+                <a:latin typeface="+mn-lt"/>
+                <a:ea typeface="+mn-ea"/>
+                <a:cs typeface="+mn-cs"/>
+              </a:rPr>
+              <a:t> </a:t>
+            </a:r>
+          </a:p>
+          <a:p>
+            <a:r>
+              <a:rPr lang="en-US" sz="1200" kern="1200" dirty="0" smtClean="0">
+                <a:solidFill>
+                  <a:schemeClr val="tx1"/>
+                </a:solidFill>
+                <a:effectLst/>
+                <a:latin typeface="+mn-lt"/>
+                <a:ea typeface="+mn-ea"/>
+                <a:cs typeface="+mn-cs"/>
+              </a:rPr>
+              <a:t>The Azure Resource Manager allows you to deploy applications using declarative templates called </a:t>
+            </a:r>
+            <a:r>
+              <a:rPr lang="en-US" sz="1200" i="1" kern="1200" dirty="0" smtClean="0">
+                <a:solidFill>
+                  <a:schemeClr val="tx1"/>
+                </a:solidFill>
+                <a:effectLst/>
+                <a:latin typeface="+mn-lt"/>
+                <a:ea typeface="+mn-ea"/>
+                <a:cs typeface="+mn-cs"/>
+              </a:rPr>
+              <a:t>deployment templates</a:t>
+            </a:r>
+            <a:r>
+              <a:rPr lang="en-US" sz="1200" kern="1200" dirty="0" smtClean="0">
+                <a:solidFill>
+                  <a:schemeClr val="tx1"/>
+                </a:solidFill>
+                <a:effectLst/>
+                <a:latin typeface="+mn-lt"/>
+                <a:ea typeface="+mn-ea"/>
+                <a:cs typeface="+mn-cs"/>
+              </a:rPr>
+              <a:t>. A template contains a complete description of all the resources that make up the application. Templates can include parameters that users will be prompted to fill in each time an application is deployed. Templates can also run scripts to initialize resources to a known and consistent state.</a:t>
+            </a:r>
+          </a:p>
+          <a:p>
+            <a:r>
+              <a:rPr lang="en-US" sz="1200" kern="1200" dirty="0" smtClean="0">
+                <a:solidFill>
+                  <a:schemeClr val="tx1"/>
+                </a:solidFill>
+                <a:effectLst/>
+                <a:latin typeface="+mn-lt"/>
+                <a:ea typeface="+mn-ea"/>
+                <a:cs typeface="+mn-cs"/>
+              </a:rPr>
+              <a:t> </a:t>
+            </a:r>
+          </a:p>
+          <a:p>
+            <a:r>
+              <a:rPr lang="en-US" sz="1200" kern="1200" dirty="0" smtClean="0">
+                <a:solidFill>
+                  <a:schemeClr val="tx1"/>
+                </a:solidFill>
+                <a:effectLst/>
+                <a:latin typeface="+mn-lt"/>
+                <a:ea typeface="+mn-ea"/>
+                <a:cs typeface="+mn-cs"/>
+              </a:rPr>
+              <a:t>As an example, suppose you have built an HPC cluster that includes virtual machines and other Azure resources. With a template, you can script the creation of the entire cluster and optionally the data that goes with it. This makes it easy for others to spin up instances of the cluster, or for you to recreate it if you deleted it thinking you wouldn’t be needing it again.</a:t>
+            </a:r>
+            <a:endParaRPr lang="en-US" dirty="0" smtClean="0"/>
           </a:p>
         </p:txBody>
       </p:sp>
@@ -2607,7 +2416,7 @@
     </p:spTree>
     <p:extLst>
       <p:ext uri="{BB962C8B-B14F-4D97-AF65-F5344CB8AC3E}">
-        <p14:creationId xmlns:p14="http://schemas.microsoft.com/office/powerpoint/2010/main" val="928529220"/>
+        <p14:creationId xmlns:p14="http://schemas.microsoft.com/office/powerpoint/2010/main" val="988917755"/>
       </p:ext>
     </p:extLst>
   </p:cSld>
@@ -2661,36 +2470,91 @@
           <a:bodyPr/>
           <a:lstStyle/>
           <a:p>
-            <a:pPr marL="0" marR="0" indent="0" algn="l" defTabSz="914400" rtl="0" eaLnBrk="1" fontAlgn="auto" latinLnBrk="0" hangingPunct="1">
-              <a:lnSpc>
-                <a:spcPct val="100000"/>
-              </a:lnSpc>
-              <a:spcBef>
-                <a:spcPts val="0"/>
-              </a:spcBef>
-              <a:spcAft>
-                <a:spcPts val="0"/>
-              </a:spcAft>
-              <a:buClrTx/>
-              <a:buSzTx/>
-              <a:buFontTx/>
-              <a:buNone/>
-              <a:tabLst/>
-              <a:defRPr/>
+            <a:r>
+              <a:rPr lang="en-US" dirty="0"/>
+              <a:t>Notes:</a:t>
+            </a:r>
+          </a:p>
+          <a:p>
+            <a:pPr marL="171450" indent="-171450">
+              <a:buFont typeface="Arial" panose="020B0604020202020204" pitchFamily="34" charset="0"/>
+              <a:buChar char="•"/>
             </a:pPr>
             <a:r>
-              <a:rPr lang="en-US" sz="1200" kern="1200" dirty="0" smtClean="0">
-                <a:solidFill>
-                  <a:schemeClr val="tx1"/>
-                </a:solidFill>
-                <a:effectLst/>
-                <a:latin typeface="+mn-lt"/>
-                <a:ea typeface="+mn-ea"/>
-                <a:cs typeface="+mn-cs"/>
-              </a:rPr>
-              <a:t>Here’s a quick look at three of the Azure VM sizes so you can see how they differ in cost and capability. One thing to keep in mind when deploying VMs is that you get charged for them whether they’re in use or not. When you’re finished using a VM or a cluster of VMs, it behooves you to go into the Azure portal and suspend each VM to avoid unnecessary charges. Once suspended, a VM is easily restarted so you can pick up where you left off and continue using it. I’ll show you how to start and stop VMs in the demo coming up shortly. I’ll also show you how to delete them so you can avoid even incurring storage charges for VMs that are no longer needed.</a:t>
-            </a:r>
-            <a:endParaRPr lang="en-US" dirty="0" smtClean="0"/>
+              <a:rPr lang="en-US" dirty="0"/>
+              <a:t>Another deployment option is to use ARM Templates</a:t>
+            </a:r>
+          </a:p>
+          <a:p>
+            <a:pPr marL="171450" indent="-171450">
+              <a:buFont typeface="Arial" panose="020B0604020202020204" pitchFamily="34" charset="0"/>
+              <a:buChar char="•"/>
+            </a:pPr>
+            <a:r>
+              <a:rPr lang="en-US" dirty="0"/>
+              <a:t>ARM Templates are declarative</a:t>
+            </a:r>
+            <a:r>
+              <a:rPr lang="en-US" baseline="0" dirty="0"/>
+              <a:t> files that define the resources to deploy and the inter-relationships between deployed resources</a:t>
+            </a:r>
+            <a:endParaRPr lang="en-US" dirty="0"/>
+          </a:p>
+          <a:p>
+            <a:pPr marL="171450" indent="-171450">
+              <a:buFont typeface="Arial" panose="020B0604020202020204" pitchFamily="34" charset="0"/>
+              <a:buChar char="•"/>
+            </a:pPr>
+            <a:r>
+              <a:rPr lang="en-US" dirty="0"/>
+              <a:t>Specify input parameters and variables, use expressions</a:t>
+            </a:r>
+          </a:p>
+          <a:p>
+            <a:pPr marL="171450" indent="-171450">
+              <a:buFont typeface="Arial" panose="020B0604020202020204" pitchFamily="34" charset="0"/>
+              <a:buChar char="•"/>
+            </a:pPr>
+            <a:r>
+              <a:rPr lang="en-US" dirty="0"/>
+              <a:t>Use Azure </a:t>
+            </a:r>
+            <a:r>
+              <a:rPr lang="en-US" dirty="0" err="1"/>
+              <a:t>Quickstart</a:t>
+            </a:r>
+            <a:r>
+              <a:rPr lang="en-US" dirty="0"/>
+              <a:t> templates, with source in GitHub</a:t>
+            </a:r>
+          </a:p>
+          <a:p>
+            <a:pPr marL="171450" indent="-171450">
+              <a:buFont typeface="Arial" panose="020B0604020202020204" pitchFamily="34" charset="0"/>
+              <a:buChar char="•"/>
+            </a:pPr>
+            <a:r>
+              <a:rPr lang="en-US" dirty="0"/>
+              <a:t>Edit in Azure online editor, use Visual Studio tooling, use Visual Studio Code</a:t>
+            </a:r>
+          </a:p>
+          <a:p>
+            <a:pPr marL="171450" indent="-171450">
+              <a:buFont typeface="Arial" panose="020B0604020202020204" pitchFamily="34" charset="0"/>
+              <a:buChar char="•"/>
+            </a:pPr>
+            <a:r>
+              <a:rPr lang="en-US" dirty="0"/>
+              <a:t>They can be checked into source</a:t>
+            </a:r>
+            <a:r>
+              <a:rPr lang="en-US" baseline="0" dirty="0"/>
+              <a:t> control in order to simplify deployment management</a:t>
+            </a:r>
+            <a:endParaRPr lang="en-US" dirty="0"/>
+          </a:p>
+          <a:p>
+            <a:endParaRPr lang="en-US" dirty="0"/>
           </a:p>
         </p:txBody>
       </p:sp>
@@ -2720,7 +2584,7 @@
     </p:spTree>
     <p:extLst>
       <p:ext uri="{BB962C8B-B14F-4D97-AF65-F5344CB8AC3E}">
-        <p14:creationId xmlns:p14="http://schemas.microsoft.com/office/powerpoint/2010/main" val="2655584646"/>
+        <p14:creationId xmlns:p14="http://schemas.microsoft.com/office/powerpoint/2010/main" val="1674096139"/>
       </p:ext>
     </p:extLst>
   </p:cSld>
@@ -2784,10 +2648,10 @@
                 <a:ea typeface="+mn-ea"/>
                 <a:cs typeface="+mn-cs"/>
               </a:rPr>
-              <a:t>An important element of HPC in Azure is the Azure Resource Manager. The Azure Resource Manager is a relatively recent addition to Azure. It lets you combine the resources that comprise an application – resources such as VMs, databases, virtual networks, and storage accounts – into </a:t>
-            </a:r>
-            <a:r>
-              <a:rPr lang="en-US" sz="1200" i="1" kern="1200" dirty="0" smtClean="0">
+              <a:t>You can build deployment templates of your own, or you can use ones that have already been built. An assortment of templates built by the Azure team and by others in the community can be found on the Azure </a:t>
+            </a:r>
+            <a:r>
+              <a:rPr lang="en-US" sz="1200" kern="1200" dirty="0" err="1" smtClean="0">
                 <a:solidFill>
                   <a:schemeClr val="tx1"/>
                 </a:solidFill>
@@ -2796,7 +2660,7 @@
                 <a:ea typeface="+mn-ea"/>
                 <a:cs typeface="+mn-cs"/>
               </a:rPr>
-              <a:t>resource groups</a:t>
+              <a:t>Quickstart</a:t>
             </a:r>
             <a:r>
               <a:rPr lang="en-US" sz="1200" kern="1200" dirty="0" smtClean="0">
@@ -2808,7 +2672,31 @@
                 <a:ea typeface="+mn-ea"/>
                 <a:cs typeface="+mn-cs"/>
               </a:rPr>
-              <a:t> so entire applications can be deployed, managed, and even deleted with a single step. Prior to Resource Manager, resources had to be created (and deleted) one by one, which quickly became onerous with large deployments.</a:t>
+              <a:t> Templates Web site or on GitHub. There are templates for creating clusters of Linux VMs, deploying </a:t>
+            </a:r>
+            <a:r>
+              <a:rPr lang="en-US" sz="1200" kern="1200" dirty="0" err="1" smtClean="0">
+                <a:solidFill>
+                  <a:schemeClr val="tx1"/>
+                </a:solidFill>
+                <a:effectLst/>
+                <a:latin typeface="+mn-lt"/>
+                <a:ea typeface="+mn-ea"/>
+                <a:cs typeface="+mn-cs"/>
+              </a:rPr>
+              <a:t>Redis</a:t>
+            </a:r>
+            <a:r>
+              <a:rPr lang="en-US" sz="1200" kern="1200" dirty="0" smtClean="0">
+                <a:solidFill>
+                  <a:schemeClr val="tx1"/>
+                </a:solidFill>
+                <a:effectLst/>
+                <a:latin typeface="+mn-lt"/>
+                <a:ea typeface="+mn-ea"/>
+                <a:cs typeface="+mn-cs"/>
+              </a:rPr>
+              <a:t> clusters of Ubuntu VMs, deploying MySQL servers, creating Windows VMs provisioned with IIS, and a whole lot more. There is even a template that deploys Minecraft Server in an Ubuntu VM.</a:t>
             </a:r>
           </a:p>
           <a:p>
@@ -2836,61 +2724,17 @@
                 <a:ea typeface="+mn-ea"/>
                 <a:cs typeface="+mn-cs"/>
               </a:rPr>
-              <a:t>The Azure Resource Manager allows you to deploy applications using declarative templates called </a:t>
-            </a:r>
-            <a:r>
-              <a:rPr lang="en-US" sz="1200" i="1" kern="1200" dirty="0" smtClean="0">
-                <a:solidFill>
-                  <a:schemeClr val="tx1"/>
-                </a:solidFill>
-                <a:effectLst/>
-                <a:latin typeface="+mn-lt"/>
-                <a:ea typeface="+mn-ea"/>
-                <a:cs typeface="+mn-cs"/>
-              </a:rPr>
-              <a:t>deployment templates</a:t>
-            </a:r>
-            <a:r>
-              <a:rPr lang="en-US" sz="1200" kern="1200" dirty="0" smtClean="0">
-                <a:solidFill>
-                  <a:schemeClr val="tx1"/>
-                </a:solidFill>
-                <a:effectLst/>
-                <a:latin typeface="+mn-lt"/>
-                <a:ea typeface="+mn-ea"/>
-                <a:cs typeface="+mn-cs"/>
-              </a:rPr>
-              <a:t>. A template contains a complete description of all the resources that make up the application. Templates can include parameters that users will be prompted to fill in each time an application is deployed. Templates can also run scripts to initialize resources to a known and consistent state.</a:t>
-            </a:r>
-          </a:p>
-          <a:p>
-            <a:r>
-              <a:rPr lang="en-US" sz="1200" kern="1200" dirty="0" smtClean="0">
-                <a:solidFill>
-                  <a:schemeClr val="tx1"/>
-                </a:solidFill>
-                <a:effectLst/>
-                <a:latin typeface="+mn-lt"/>
-                <a:ea typeface="+mn-ea"/>
-                <a:cs typeface="+mn-cs"/>
-              </a:rPr>
-              <a:t> </a:t>
-            </a:r>
-          </a:p>
-          <a:p>
-            <a:r>
-              <a:rPr lang="en-US" sz="1200" kern="1200" dirty="0" smtClean="0">
-                <a:solidFill>
-                  <a:schemeClr val="tx1"/>
-                </a:solidFill>
-                <a:effectLst/>
-                <a:latin typeface="+mn-lt"/>
-                <a:ea typeface="+mn-ea"/>
-                <a:cs typeface="+mn-cs"/>
-              </a:rPr>
-              <a:t>As an example, suppose you have built an HPC cluster that includes virtual machines and other Azure resources. With a template, you can script the creation of the entire cluster and optionally the data that goes with it. This makes it easy for others to spin up instances of the cluster, or for you to recreate it if you deleted it thinking you wouldn’t be needing it again.</a:t>
-            </a:r>
+              <a:t>Using any of these templates requires nothing more than a button click. Each template comes with documentation that tells you what parameters it requires and whether the template was created by Microsoft or by someone in the community. Best of all, you can view each template’s source code, which is little more than a JSON script, and customize it to fit your needs or even build upon it to create templates of your own.</a:t>
+            </a:r>
+          </a:p>
+          <a:p>
             <a:endParaRPr lang="en-US" dirty="0" smtClean="0"/>
+          </a:p>
+          <a:p>
+            <a:r>
+              <a:rPr lang="en-US" dirty="0" smtClean="0"/>
+              <a:t>The three templates pictured here are just a few of the many dozens of templates currently available.</a:t>
+            </a:r>
           </a:p>
         </p:txBody>
       </p:sp>
@@ -2920,7 +2764,7 @@
     </p:spTree>
     <p:extLst>
       <p:ext uri="{BB962C8B-B14F-4D97-AF65-F5344CB8AC3E}">
-        <p14:creationId xmlns:p14="http://schemas.microsoft.com/office/powerpoint/2010/main" val="988917755"/>
+        <p14:creationId xmlns:p14="http://schemas.microsoft.com/office/powerpoint/2010/main" val="3998187520"/>
       </p:ext>
     </p:extLst>
   </p:cSld>
@@ -2974,91 +2818,27 @@
           <a:bodyPr/>
           <a:lstStyle/>
           <a:p>
-            <a:r>
-              <a:rPr lang="en-US" dirty="0"/>
-              <a:t>Notes:</a:t>
-            </a:r>
-          </a:p>
-          <a:p>
-            <a:pPr marL="171450" indent="-171450">
-              <a:buFont typeface="Arial" panose="020B0604020202020204" pitchFamily="34" charset="0"/>
-              <a:buChar char="•"/>
+            <a:pPr marL="0" marR="0" indent="0" algn="l" defTabSz="914400" rtl="0" eaLnBrk="1" fontAlgn="auto" latinLnBrk="0" hangingPunct="1">
+              <a:lnSpc>
+                <a:spcPct val="100000"/>
+              </a:lnSpc>
+              <a:spcBef>
+                <a:spcPts val="0"/>
+              </a:spcBef>
+              <a:spcAft>
+                <a:spcPts val="0"/>
+              </a:spcAft>
+              <a:buClrTx/>
+              <a:buSzTx/>
+              <a:buFontTx/>
+              <a:buNone/>
+              <a:tabLst/>
+              <a:defRPr/>
             </a:pPr>
             <a:r>
-              <a:rPr lang="en-US" dirty="0"/>
-              <a:t>Another deployment option is to use ARM Templates</a:t>
-            </a:r>
-          </a:p>
-          <a:p>
-            <a:pPr marL="171450" indent="-171450">
-              <a:buFont typeface="Arial" panose="020B0604020202020204" pitchFamily="34" charset="0"/>
-              <a:buChar char="•"/>
-            </a:pPr>
-            <a:r>
-              <a:rPr lang="en-US" dirty="0"/>
-              <a:t>ARM Templates are declarative</a:t>
-            </a:r>
-            <a:r>
-              <a:rPr lang="en-US" baseline="0" dirty="0"/>
-              <a:t> files that define the resources to deploy and the inter-relationships between deployed resources</a:t>
-            </a:r>
-            <a:endParaRPr lang="en-US" dirty="0"/>
-          </a:p>
-          <a:p>
-            <a:pPr marL="171450" indent="-171450">
-              <a:buFont typeface="Arial" panose="020B0604020202020204" pitchFamily="34" charset="0"/>
-              <a:buChar char="•"/>
-            </a:pPr>
-            <a:r>
-              <a:rPr lang="en-US" dirty="0"/>
-              <a:t>Specify input parameters and variables, use expressions</a:t>
-            </a:r>
-          </a:p>
-          <a:p>
-            <a:pPr marL="171450" indent="-171450">
-              <a:buFont typeface="Arial" panose="020B0604020202020204" pitchFamily="34" charset="0"/>
-              <a:buChar char="•"/>
-            </a:pPr>
-            <a:r>
-              <a:rPr lang="en-US" dirty="0"/>
-              <a:t>Use Azure </a:t>
-            </a:r>
-            <a:r>
-              <a:rPr lang="en-US" dirty="0" err="1"/>
-              <a:t>Quickstart</a:t>
-            </a:r>
-            <a:r>
-              <a:rPr lang="en-US" dirty="0"/>
-              <a:t> templates, with source in GitHub</a:t>
-            </a:r>
-          </a:p>
-          <a:p>
-            <a:pPr marL="171450" indent="-171450">
-              <a:buFont typeface="Arial" panose="020B0604020202020204" pitchFamily="34" charset="0"/>
-              <a:buChar char="•"/>
-            </a:pPr>
-            <a:r>
-              <a:rPr lang="en-US" dirty="0"/>
-              <a:t>Edit in Azure online editor, use Visual Studio tooling, use Visual Studio Code</a:t>
-            </a:r>
-          </a:p>
-          <a:p>
-            <a:pPr marL="171450" indent="-171450">
-              <a:buFont typeface="Arial" panose="020B0604020202020204" pitchFamily="34" charset="0"/>
-              <a:buChar char="•"/>
-            </a:pPr>
-            <a:r>
-              <a:rPr lang="en-US" dirty="0"/>
-              <a:t>They can be checked into source</a:t>
-            </a:r>
-            <a:r>
-              <a:rPr lang="en-US" baseline="0" dirty="0"/>
-              <a:t> control in order to simplify deployment management</a:t>
-            </a:r>
-            <a:endParaRPr lang="en-US" dirty="0"/>
-          </a:p>
-          <a:p>
-            <a:endParaRPr lang="en-US" dirty="0"/>
+              <a:rPr lang="en-US" dirty="0" smtClean="0"/>
+              <a:t>The Simple Linux Utility for Resource Management (SLURM), also known as the SLURM Workload Manager, is a free and open-source job scheduler for Linux that excels at distributing heavy computing workloads across clusters of machines and processors. It is used on more than half of the world's largest supercomputers and High-Performance Computing (HPC) clusters, and it enjoys widespread use in the research community for jobs that require significant CPU resources.</a:t>
+            </a:r>
           </a:p>
         </p:txBody>
       </p:sp>
@@ -3088,7 +2868,7 @@
     </p:spTree>
     <p:extLst>
       <p:ext uri="{BB962C8B-B14F-4D97-AF65-F5344CB8AC3E}">
-        <p14:creationId xmlns:p14="http://schemas.microsoft.com/office/powerpoint/2010/main" val="1674096139"/>
+        <p14:creationId xmlns:p14="http://schemas.microsoft.com/office/powerpoint/2010/main" val="2236143850"/>
       </p:ext>
     </p:extLst>
   </p:cSld>
@@ -3245,7 +3025,7 @@
           <a:p>
             <a:fld id="{0459C166-16D3-4A25-A2F8-C51E0E346B22}" type="datetimeFigureOut">
               <a:rPr lang="en-US" smtClean="0"/>
-              <a:t>12/20/2016</a:t>
+              <a:t>10/24/2016</a:t>
             </a:fld>
             <a:endParaRPr lang="en-US"/>
           </a:p>
@@ -3340,7 +3120,7 @@
           <a:p>
             <a:fld id="{0459C166-16D3-4A25-A2F8-C51E0E346B22}" type="datetimeFigureOut">
               <a:rPr lang="en-US" smtClean="0"/>
-              <a:t>12/20/2016</a:t>
+              <a:t>10/24/2016</a:t>
             </a:fld>
             <a:endParaRPr lang="en-US"/>
           </a:p>
@@ -3615,7 +3395,7 @@
           <a:p>
             <a:fld id="{0459C166-16D3-4A25-A2F8-C51E0E346B22}" type="datetimeFigureOut">
               <a:rPr lang="en-US" smtClean="0"/>
-              <a:t>12/20/2016</a:t>
+              <a:t>10/24/2016</a:t>
             </a:fld>
             <a:endParaRPr lang="en-US"/>
           </a:p>
@@ -3867,7 +3647,7 @@
           <a:p>
             <a:fld id="{0459C166-16D3-4A25-A2F8-C51E0E346B22}" type="datetimeFigureOut">
               <a:rPr lang="en-US" smtClean="0"/>
-              <a:t>12/20/2016</a:t>
+              <a:t>10/24/2016</a:t>
             </a:fld>
             <a:endParaRPr lang="en-US"/>
           </a:p>
@@ -4035,7 +3815,7 @@
           <a:p>
             <a:fld id="{0459C166-16D3-4A25-A2F8-C51E0E346B22}" type="datetimeFigureOut">
               <a:rPr lang="en-US" smtClean="0"/>
-              <a:t>12/20/2016</a:t>
+              <a:t>10/24/2016</a:t>
             </a:fld>
             <a:endParaRPr lang="en-US"/>
           </a:p>
@@ -4213,7 +3993,7 @@
           <a:p>
             <a:fld id="{0459C166-16D3-4A25-A2F8-C51E0E346B22}" type="datetimeFigureOut">
               <a:rPr lang="en-US" smtClean="0"/>
-              <a:t>12/20/2016</a:t>
+              <a:t>10/24/2016</a:t>
             </a:fld>
             <a:endParaRPr lang="en-US"/>
           </a:p>
@@ -6140,7 +5920,7 @@
           <a:p>
             <a:fld id="{0459C166-16D3-4A25-A2F8-C51E0E346B22}" type="datetimeFigureOut">
               <a:rPr lang="en-US" smtClean="0"/>
-              <a:t>12/20/2016</a:t>
+              <a:t>10/24/2016</a:t>
             </a:fld>
             <a:endParaRPr lang="en-US"/>
           </a:p>
@@ -11767,7 +11547,7 @@
             <a:fld id="{0459C166-16D3-4A25-A2F8-C51E0E346B22}" type="datetimeFigureOut">
               <a:rPr lang="en-US" smtClean="0"/>
               <a:pPr/>
-              <a:t>12/20/2016</a:t>
+              <a:t>10/24/2016</a:t>
             </a:fld>
             <a:endParaRPr lang="en-US"/>
           </a:p>
@@ -15829,7 +15609,7 @@
           <a:p>
             <a:fld id="{0459C166-16D3-4A25-A2F8-C51E0E346B22}" type="datetimeFigureOut">
               <a:rPr lang="en-US" smtClean="0"/>
-              <a:t>12/20/2016</a:t>
+              <a:t>10/24/2016</a:t>
             </a:fld>
             <a:endParaRPr lang="en-US"/>
           </a:p>
@@ -16193,7 +15973,7 @@
           <a:p>
             <a:fld id="{0459C166-16D3-4A25-A2F8-C51E0E346B22}" type="datetimeFigureOut">
               <a:rPr lang="en-US" smtClean="0"/>
-              <a:t>12/20/2016</a:t>
+              <a:t>10/24/2016</a:t>
             </a:fld>
             <a:endParaRPr lang="en-US"/>
           </a:p>
@@ -16310,7 +16090,7 @@
           <a:p>
             <a:fld id="{0459C166-16D3-4A25-A2F8-C51E0E346B22}" type="datetimeFigureOut">
               <a:rPr lang="en-US" smtClean="0"/>
-              <a:t>12/20/2016</a:t>
+              <a:t>10/24/2016</a:t>
             </a:fld>
             <a:endParaRPr lang="en-US"/>
           </a:p>
@@ -16521,7 +16301,7 @@
           <a:p>
             <a:fld id="{0459C166-16D3-4A25-A2F8-C51E0E346B22}" type="datetimeFigureOut">
               <a:rPr lang="en-US" smtClean="0"/>
-              <a:t>12/20/2016</a:t>
+              <a:t>10/24/2016</a:t>
             </a:fld>
             <a:endParaRPr lang="en-US"/>
           </a:p>
@@ -17930,367 +17710,6 @@
           <a:p>
             <a:r>
               <a:rPr lang="en-US" dirty="0" smtClean="0"/>
-              <a:t>Azure </a:t>
-            </a:r>
-            <a:r>
-              <a:rPr lang="en-US" dirty="0" err="1" smtClean="0"/>
-              <a:t>Quickstart</a:t>
-            </a:r>
-            <a:r>
-              <a:rPr lang="en-US" dirty="0" smtClean="0"/>
-              <a:t> Templates</a:t>
-            </a:r>
-            <a:endParaRPr lang="en-US" dirty="0"/>
-          </a:p>
-        </p:txBody>
-      </p:sp>
-      <p:sp>
-        <p:nvSpPr>
-          <p:cNvPr id="3" name="Content Placeholder 2"/>
-          <p:cNvSpPr>
-            <a:spLocks noGrp="1"/>
-          </p:cNvSpPr>
-          <p:nvPr>
-            <p:ph idx="1"/>
-          </p:nvPr>
-        </p:nvSpPr>
-        <p:spPr/>
-        <p:txBody>
-          <a:bodyPr/>
-          <a:lstStyle/>
-          <a:p>
-            <a:r>
-              <a:rPr lang="en-US" dirty="0"/>
-              <a:t>Free, open-source deployment templates</a:t>
-            </a:r>
-          </a:p>
-          <a:p>
-            <a:endParaRPr lang="en-US" dirty="0"/>
-          </a:p>
-          <a:p>
-            <a:endParaRPr lang="en-US" dirty="0"/>
-          </a:p>
-          <a:p>
-            <a:endParaRPr lang="en-US" dirty="0"/>
-          </a:p>
-          <a:p>
-            <a:endParaRPr lang="en-US" dirty="0"/>
-          </a:p>
-          <a:p>
-            <a:endParaRPr lang="en-US" dirty="0"/>
-          </a:p>
-          <a:p>
-            <a:r>
-              <a:rPr lang="en-US" dirty="0"/>
-              <a:t>Find them on the Azure site (</a:t>
-            </a:r>
-            <a:r>
-              <a:rPr lang="en-US" dirty="0">
-                <a:hlinkClick r:id="rId3"/>
-              </a:rPr>
-              <a:t>http://bit.ly/a4r-quickstart</a:t>
-            </a:r>
-            <a:r>
-              <a:rPr lang="en-US" dirty="0"/>
-              <a:t>)</a:t>
-            </a:r>
-          </a:p>
-          <a:p>
-            <a:r>
-              <a:rPr lang="en-US" dirty="0"/>
-              <a:t>Or browse them on GitHub (</a:t>
-            </a:r>
-            <a:r>
-              <a:rPr lang="en-US" dirty="0">
-                <a:hlinkClick r:id="rId4"/>
-              </a:rPr>
-              <a:t>http://</a:t>
-            </a:r>
-            <a:r>
-              <a:rPr lang="en-US" dirty="0" smtClean="0">
-                <a:hlinkClick r:id="rId4"/>
-              </a:rPr>
-              <a:t>bit.ly/a4r-github</a:t>
-            </a:r>
-            <a:r>
-              <a:rPr lang="en-US" dirty="0" smtClean="0"/>
-              <a:t>)</a:t>
-            </a:r>
-          </a:p>
-          <a:p>
-            <a:pPr marL="0" indent="0">
-              <a:buNone/>
-            </a:pPr>
-            <a:endParaRPr lang="en-US" dirty="0"/>
-          </a:p>
-        </p:txBody>
-      </p:sp>
-      <p:pic>
-        <p:nvPicPr>
-          <p:cNvPr id="4" name="Picture 3"/>
-          <p:cNvPicPr>
-            <a:picLocks noChangeAspect="1"/>
-          </p:cNvPicPr>
-          <p:nvPr/>
-        </p:nvPicPr>
-        <p:blipFill>
-          <a:blip r:embed="rId5"/>
-          <a:stretch>
-            <a:fillRect/>
-          </a:stretch>
-        </p:blipFill>
-        <p:spPr>
-          <a:xfrm>
-            <a:off x="981075" y="2716411"/>
-            <a:ext cx="2914650" cy="1666875"/>
-          </a:xfrm>
-          <a:prstGeom prst="rect">
-            <a:avLst/>
-          </a:prstGeom>
-          <a:ln>
-            <a:solidFill>
-              <a:schemeClr val="accent2"/>
-            </a:solidFill>
-          </a:ln>
-        </p:spPr>
-      </p:pic>
-      <p:pic>
-        <p:nvPicPr>
-          <p:cNvPr id="5" name="Picture 4"/>
-          <p:cNvPicPr>
-            <a:picLocks noChangeAspect="1"/>
-          </p:cNvPicPr>
-          <p:nvPr/>
-        </p:nvPicPr>
-        <p:blipFill>
-          <a:blip r:embed="rId6"/>
-          <a:stretch>
-            <a:fillRect/>
-          </a:stretch>
-        </p:blipFill>
-        <p:spPr>
-          <a:xfrm>
-            <a:off x="4564226" y="2716411"/>
-            <a:ext cx="2924175" cy="1666875"/>
-          </a:xfrm>
-          <a:prstGeom prst="rect">
-            <a:avLst/>
-          </a:prstGeom>
-          <a:ln>
-            <a:solidFill>
-              <a:schemeClr val="accent2"/>
-            </a:solidFill>
-          </a:ln>
-        </p:spPr>
-      </p:pic>
-      <p:pic>
-        <p:nvPicPr>
-          <p:cNvPr id="6" name="Picture 5"/>
-          <p:cNvPicPr>
-            <a:picLocks noChangeAspect="1"/>
-          </p:cNvPicPr>
-          <p:nvPr/>
-        </p:nvPicPr>
-        <p:blipFill>
-          <a:blip r:embed="rId7"/>
-          <a:stretch>
-            <a:fillRect/>
-          </a:stretch>
-        </p:blipFill>
-        <p:spPr>
-          <a:xfrm>
-            <a:off x="8156903" y="2716411"/>
-            <a:ext cx="2914650" cy="1666875"/>
-          </a:xfrm>
-          <a:prstGeom prst="rect">
-            <a:avLst/>
-          </a:prstGeom>
-          <a:ln>
-            <a:solidFill>
-              <a:schemeClr val="accent2"/>
-            </a:solidFill>
-          </a:ln>
-        </p:spPr>
-      </p:pic>
-    </p:spTree>
-    <p:extLst>
-      <p:ext uri="{BB962C8B-B14F-4D97-AF65-F5344CB8AC3E}">
-        <p14:creationId xmlns:p14="http://schemas.microsoft.com/office/powerpoint/2010/main" val="3324523628"/>
-      </p:ext>
-    </p:extLst>
-  </p:cSld>
-  <p:clrMapOvr>
-    <a:masterClrMapping/>
-  </p:clrMapOvr>
-</p:sld>
-</file>
-
-<file path=ppt/slides/slide11.xml><?xml version="1.0" encoding="utf-8"?>
-<p:sld xmlns:a="http://schemas.openxmlformats.org/drawingml/2006/main" xmlns:r="http://schemas.openxmlformats.org/officeDocument/2006/relationships" xmlns:p="http://schemas.openxmlformats.org/presentationml/2006/main">
-  <p:cSld>
-    <p:spTree>
-      <p:nvGrpSpPr>
-        <p:cNvPr id="1" name=""/>
-        <p:cNvGrpSpPr/>
-        <p:nvPr/>
-      </p:nvGrpSpPr>
-      <p:grpSpPr>
-        <a:xfrm>
-          <a:off x="0" y="0"/>
-          <a:ext cx="0" cy="0"/>
-          <a:chOff x="0" y="0"/>
-          <a:chExt cx="0" cy="0"/>
-        </a:xfrm>
-      </p:grpSpPr>
-      <p:sp>
-        <p:nvSpPr>
-          <p:cNvPr id="2" name="Title 1"/>
-          <p:cNvSpPr>
-            <a:spLocks noGrp="1"/>
-          </p:cNvSpPr>
-          <p:nvPr>
-            <p:ph type="title"/>
-          </p:nvPr>
-        </p:nvSpPr>
-        <p:spPr/>
-        <p:txBody>
-          <a:bodyPr/>
-          <a:lstStyle/>
-          <a:p>
-            <a:r>
-              <a:rPr lang="en-US" dirty="0" smtClean="0"/>
-              <a:t>SLURM Clusters</a:t>
-            </a:r>
-            <a:endParaRPr lang="en-US" dirty="0"/>
-          </a:p>
-        </p:txBody>
-      </p:sp>
-      <p:sp>
-        <p:nvSpPr>
-          <p:cNvPr id="3" name="Content Placeholder 2"/>
-          <p:cNvSpPr>
-            <a:spLocks noGrp="1"/>
-          </p:cNvSpPr>
-          <p:nvPr>
-            <p:ph idx="1"/>
-          </p:nvPr>
-        </p:nvSpPr>
-        <p:spPr/>
-        <p:txBody>
-          <a:bodyPr/>
-          <a:lstStyle/>
-          <a:p>
-            <a:r>
-              <a:rPr lang="en-US" dirty="0"/>
-              <a:t>Simple Linux Utility for Resource Management (SLURM)</a:t>
-            </a:r>
-          </a:p>
-          <a:p>
-            <a:r>
-              <a:rPr lang="en-US" dirty="0" err="1"/>
-              <a:t>Quickstart</a:t>
-            </a:r>
-            <a:r>
-              <a:rPr lang="en-US" dirty="0"/>
-              <a:t> template at </a:t>
-            </a:r>
-            <a:r>
-              <a:rPr lang="en-US" dirty="0">
-                <a:hlinkClick r:id="rId3"/>
-              </a:rPr>
-              <a:t>http://bit.ly/a4r-slurm</a:t>
-            </a:r>
-            <a:r>
-              <a:rPr lang="en-US" dirty="0"/>
-              <a:t> enables easy deployment of SLURM clusters of user-specified </a:t>
-            </a:r>
-            <a:r>
-              <a:rPr lang="en-US" dirty="0" smtClean="0"/>
-              <a:t>sizes</a:t>
-            </a:r>
-            <a:endParaRPr lang="en-US" dirty="0"/>
-          </a:p>
-        </p:txBody>
-      </p:sp>
-      <p:pic>
-        <p:nvPicPr>
-          <p:cNvPr id="4" name="Picture 3"/>
-          <p:cNvPicPr>
-            <a:picLocks noChangeAspect="1"/>
-          </p:cNvPicPr>
-          <p:nvPr/>
-        </p:nvPicPr>
-        <p:blipFill>
-          <a:blip r:embed="rId4"/>
-          <a:stretch>
-            <a:fillRect/>
-          </a:stretch>
-        </p:blipFill>
-        <p:spPr>
-          <a:xfrm>
-            <a:off x="3174205" y="3542756"/>
-            <a:ext cx="5842001" cy="2769144"/>
-          </a:xfrm>
-          <a:prstGeom prst="rect">
-            <a:avLst/>
-          </a:prstGeom>
-          <a:ln>
-            <a:solidFill>
-              <a:schemeClr val="bg1">
-                <a:lumMod val="75000"/>
-              </a:schemeClr>
-            </a:solidFill>
-          </a:ln>
-          <a:effectLst/>
-        </p:spPr>
-      </p:pic>
-    </p:spTree>
-    <p:extLst>
-      <p:ext uri="{BB962C8B-B14F-4D97-AF65-F5344CB8AC3E}">
-        <p14:creationId xmlns:p14="http://schemas.microsoft.com/office/powerpoint/2010/main" val="2739371626"/>
-      </p:ext>
-    </p:extLst>
-  </p:cSld>
-  <p:clrMapOvr>
-    <a:masterClrMapping/>
-  </p:clrMapOvr>
-</p:sld>
-</file>
-
-<file path=ppt/slides/slide12.xml><?xml version="1.0" encoding="utf-8"?>
-<p:sld xmlns:a="http://schemas.openxmlformats.org/drawingml/2006/main" xmlns:r="http://schemas.openxmlformats.org/officeDocument/2006/relationships" xmlns:p="http://schemas.openxmlformats.org/presentationml/2006/main">
-  <p:cSld>
-    <p:spTree>
-      <p:nvGrpSpPr>
-        <p:cNvPr id="1" name=""/>
-        <p:cNvGrpSpPr/>
-        <p:nvPr/>
-      </p:nvGrpSpPr>
-      <p:grpSpPr>
-        <a:xfrm>
-          <a:off x="0" y="0"/>
-          <a:ext cx="0" cy="0"/>
-          <a:chOff x="0" y="0"/>
-          <a:chExt cx="0" cy="0"/>
-        </a:xfrm>
-      </p:grpSpPr>
-      <p:sp>
-        <p:nvSpPr>
-          <p:cNvPr id="2" name="Title 1"/>
-          <p:cNvSpPr>
-            <a:spLocks noGrp="1"/>
-          </p:cNvSpPr>
-          <p:nvPr>
-            <p:ph type="title"/>
-          </p:nvPr>
-        </p:nvSpPr>
-        <p:spPr/>
-        <p:txBody>
-          <a:bodyPr/>
-          <a:lstStyle/>
-          <a:p>
-            <a:r>
-              <a:rPr lang="en-US" dirty="0" smtClean="0"/>
               <a:t>Containers</a:t>
             </a:r>
             <a:endParaRPr lang="en-US" dirty="0"/>
@@ -19455,7 +18874,7 @@
 </p:sld>
 </file>
 
-<file path=ppt/slides/slide13.xml><?xml version="1.0" encoding="utf-8"?>
+<file path=ppt/slides/slide11.xml><?xml version="1.0" encoding="utf-8"?>
 <p:sld xmlns:a="http://schemas.openxmlformats.org/drawingml/2006/main" xmlns:r="http://schemas.openxmlformats.org/officeDocument/2006/relationships" xmlns:p="http://schemas.openxmlformats.org/presentationml/2006/main">
   <p:cSld>
     <p:spTree>
@@ -19622,7 +19041,7 @@
 </p:sld>
 </file>
 
-<file path=ppt/slides/slide14.xml><?xml version="1.0" encoding="utf-8"?>
+<file path=ppt/slides/slide12.xml><?xml version="1.0" encoding="utf-8"?>
 <p:sld xmlns:a="http://schemas.openxmlformats.org/drawingml/2006/main" xmlns:r="http://schemas.openxmlformats.org/officeDocument/2006/relationships" xmlns:p="http://schemas.openxmlformats.org/presentationml/2006/main">
   <p:cSld>
     <p:spTree>
@@ -19699,7 +19118,7 @@
 </p:sld>
 </file>
 
-<file path=ppt/slides/slide15.xml><?xml version="1.0" encoding="utf-8"?>
+<file path=ppt/slides/slide13.xml><?xml version="1.0" encoding="utf-8"?>
 <p:sld xmlns:a="http://schemas.openxmlformats.org/drawingml/2006/main" xmlns:r="http://schemas.openxmlformats.org/officeDocument/2006/relationships" xmlns:p="http://schemas.openxmlformats.org/presentationml/2006/main">
   <p:cSld>
     <p:spTree>
@@ -19799,7 +19218,7 @@
 </p:sld>
 </file>
 
-<file path=ppt/slides/slide16.xml><?xml version="1.0" encoding="utf-8"?>
+<file path=ppt/slides/slide14.xml><?xml version="1.0" encoding="utf-8"?>
 <p:sld xmlns:a="http://schemas.openxmlformats.org/drawingml/2006/main" xmlns:r="http://schemas.openxmlformats.org/officeDocument/2006/relationships" xmlns:p="http://schemas.openxmlformats.org/presentationml/2006/main">
   <p:cSld>
     <p:spTree>
@@ -20538,7 +19957,7 @@
 </p:sld>
 </file>
 
-<file path=ppt/slides/slide17.xml><?xml version="1.0" encoding="utf-8"?>
+<file path=ppt/slides/slide15.xml><?xml version="1.0" encoding="utf-8"?>
 <p:sld xmlns:a="http://schemas.openxmlformats.org/drawingml/2006/main" xmlns:r="http://schemas.openxmlformats.org/officeDocument/2006/relationships" xmlns:p="http://schemas.openxmlformats.org/presentationml/2006/main">
   <p:cSld>
     <p:spTree>
@@ -21032,7 +20451,7 @@
 </p:sld>
 </file>
 
-<file path=ppt/slides/slide18.xml><?xml version="1.0" encoding="utf-8"?>
+<file path=ppt/slides/slide16.xml><?xml version="1.0" encoding="utf-8"?>
 <p:sld xmlns:a="http://schemas.openxmlformats.org/drawingml/2006/main" xmlns:r="http://schemas.openxmlformats.org/officeDocument/2006/relationships" xmlns:p="http://schemas.openxmlformats.org/presentationml/2006/main">
   <p:cSld>
     <p:spTree>
@@ -21137,7 +20556,7 @@
 </p:sld>
 </file>
 
-<file path=ppt/slides/slide19.xml><?xml version="1.0" encoding="utf-8"?>
+<file path=ppt/slides/slide17.xml><?xml version="1.0" encoding="utf-8"?>
 <p:sld xmlns:a="http://schemas.openxmlformats.org/drawingml/2006/main" xmlns:r="http://schemas.openxmlformats.org/officeDocument/2006/relationships" xmlns:p="http://schemas.openxmlformats.org/presentationml/2006/main">
   <p:cSld>
     <p:spTree>
@@ -21220,187 +20639,7 @@
 </p:sld>
 </file>
 
-<file path=ppt/slides/slide2.xml><?xml version="1.0" encoding="utf-8"?>
-<p:sld xmlns:a="http://schemas.openxmlformats.org/drawingml/2006/main" xmlns:r="http://schemas.openxmlformats.org/officeDocument/2006/relationships" xmlns:p="http://schemas.openxmlformats.org/presentationml/2006/main">
-  <p:cSld>
-    <p:spTree>
-      <p:nvGrpSpPr>
-        <p:cNvPr id="1" name=""/>
-        <p:cNvGrpSpPr/>
-        <p:nvPr/>
-      </p:nvGrpSpPr>
-      <p:grpSpPr>
-        <a:xfrm>
-          <a:off x="0" y="0"/>
-          <a:ext cx="0" cy="0"/>
-          <a:chOff x="0" y="0"/>
-          <a:chExt cx="0" cy="0"/>
-        </a:xfrm>
-      </p:grpSpPr>
-      <p:sp>
-        <p:nvSpPr>
-          <p:cNvPr id="2" name="Title 1"/>
-          <p:cNvSpPr>
-            <a:spLocks noGrp="1"/>
-          </p:cNvSpPr>
-          <p:nvPr>
-            <p:ph type="title"/>
-          </p:nvPr>
-        </p:nvSpPr>
-        <p:spPr/>
-        <p:txBody>
-          <a:bodyPr/>
-          <a:lstStyle/>
-          <a:p>
-            <a:r>
-              <a:rPr lang="en-US" dirty="0" smtClean="0"/>
-              <a:t>High-Performance Computing</a:t>
-            </a:r>
-            <a:endParaRPr lang="en-US" dirty="0"/>
-          </a:p>
-        </p:txBody>
-      </p:sp>
-      <p:sp>
-        <p:nvSpPr>
-          <p:cNvPr id="4" name="TextBox 3"/>
-          <p:cNvSpPr txBox="1"/>
-          <p:nvPr/>
-        </p:nvSpPr>
-        <p:spPr>
-          <a:xfrm>
-            <a:off x="1806235" y="2140504"/>
-            <a:ext cx="8577943" cy="4185761"/>
-          </a:xfrm>
-          <a:prstGeom prst="rect">
-            <a:avLst/>
-          </a:prstGeom>
-          <a:noFill/>
-        </p:spPr>
-        <p:txBody>
-          <a:bodyPr wrap="square" lIns="0" tIns="0" rIns="0" bIns="0" rtlCol="0">
-            <a:spAutoFit/>
-          </a:bodyPr>
-          <a:lstStyle/>
-          <a:p>
-            <a:pPr>
-              <a:lnSpc>
-                <a:spcPct val="90000"/>
-              </a:lnSpc>
-              <a:spcBef>
-                <a:spcPct val="20000"/>
-              </a:spcBef>
-              <a:buSzPct val="80000"/>
-            </a:pPr>
-            <a:r>
-              <a:rPr lang="en-US" sz="3200" dirty="0">
-                <a:solidFill>
-                  <a:srgbClr val="5095D1"/>
-                </a:solidFill>
-              </a:rPr>
-              <a:t>“High-Performance Computing most generally refers to the practice of aggregating computing power in a way that delivers much higher performance than one could get out of a typical desktop computer or workstation in order to solve large problems in science, engineering, or business.”</a:t>
-            </a:r>
-          </a:p>
-          <a:p>
-            <a:pPr>
-              <a:lnSpc>
-                <a:spcPct val="90000"/>
-              </a:lnSpc>
-              <a:spcBef>
-                <a:spcPct val="20000"/>
-              </a:spcBef>
-              <a:buSzPct val="80000"/>
-            </a:pPr>
-            <a:r>
-              <a:rPr lang="en-US" sz="3200" dirty="0" smtClean="0">
-                <a:gradFill>
-                  <a:gsLst>
-                    <a:gs pos="0">
-                      <a:srgbClr val="292929">
-                        <a:lumMod val="90000"/>
-                        <a:lumOff val="10000"/>
-                      </a:srgbClr>
-                    </a:gs>
-                    <a:gs pos="86000">
-                      <a:srgbClr val="292929">
-                        <a:lumMod val="90000"/>
-                        <a:lumOff val="10000"/>
-                      </a:srgbClr>
-                    </a:gs>
-                  </a:gsLst>
-                  <a:lin ang="5400000" scaled="0"/>
-                </a:gradFill>
-              </a:rPr>
-              <a:t>						--</a:t>
-            </a:r>
-            <a:r>
-              <a:rPr lang="en-US" sz="3200" dirty="0">
-                <a:gradFill>
-                  <a:gsLst>
-                    <a:gs pos="0">
-                      <a:srgbClr val="292929">
-                        <a:lumMod val="90000"/>
-                        <a:lumOff val="10000"/>
-                      </a:srgbClr>
-                    </a:gs>
-                    <a:gs pos="86000">
-                      <a:srgbClr val="292929">
-                        <a:lumMod val="90000"/>
-                        <a:lumOff val="10000"/>
-                      </a:srgbClr>
-                    </a:gs>
-                  </a:gsLst>
-                  <a:lin ang="5400000" scaled="0"/>
-                </a:gradFill>
-              </a:rPr>
-              <a:t>Inside HPC</a:t>
-            </a:r>
-          </a:p>
-          <a:p>
-            <a:pPr>
-              <a:lnSpc>
-                <a:spcPct val="90000"/>
-              </a:lnSpc>
-              <a:spcBef>
-                <a:spcPct val="20000"/>
-              </a:spcBef>
-              <a:buSzPct val="80000"/>
-            </a:pPr>
-            <a:endParaRPr lang="en-US" sz="3200" dirty="0">
-              <a:gradFill>
-                <a:gsLst>
-                  <a:gs pos="0">
-                    <a:srgbClr val="292929">
-                      <a:lumMod val="90000"/>
-                      <a:lumOff val="10000"/>
-                    </a:srgbClr>
-                  </a:gs>
-                  <a:gs pos="86000">
-                    <a:srgbClr val="292929">
-                      <a:lumMod val="90000"/>
-                      <a:lumOff val="10000"/>
-                    </a:srgbClr>
-                  </a:gs>
-                </a:gsLst>
-                <a:lin ang="5400000" scaled="0"/>
-              </a:gradFill>
-            </a:endParaRPr>
-          </a:p>
-        </p:txBody>
-      </p:sp>
-    </p:spTree>
-    <p:extLst>
-      <p:ext uri="{BB962C8B-B14F-4D97-AF65-F5344CB8AC3E}">
-        <p14:creationId xmlns:p14="http://schemas.microsoft.com/office/powerpoint/2010/main" val="1319533140"/>
-      </p:ext>
-    </p:extLst>
-  </p:cSld>
-  <p:clrMapOvr>
-    <a:masterClrMapping/>
-  </p:clrMapOvr>
-</p:sld>
-</file>
-
-<file path=ppt/slides/slide20.xml><?xml version="1.0" encoding="utf-8"?>
+<file path=ppt/slides/slide18.xml><?xml version="1.0" encoding="utf-8"?>
 <p:sld xmlns:a="http://schemas.openxmlformats.org/drawingml/2006/main" xmlns:r="http://schemas.openxmlformats.org/officeDocument/2006/relationships" xmlns:p="http://schemas.openxmlformats.org/presentationml/2006/main">
   <p:cSld>
     <p:spTree>
@@ -21866,7 +21105,7 @@
 </p:sld>
 </file>
 
-<file path=ppt/slides/slide21.xml><?xml version="1.0" encoding="utf-8"?>
+<file path=ppt/slides/slide19.xml><?xml version="1.0" encoding="utf-8"?>
 <p:sld xmlns:a="http://schemas.openxmlformats.org/drawingml/2006/main" xmlns:r="http://schemas.openxmlformats.org/officeDocument/2006/relationships" xmlns:p="http://schemas.openxmlformats.org/presentationml/2006/main">
   <p:cSld>
     <p:spTree>
@@ -21948,7 +21187,150 @@
 </p:sld>
 </file>
 
-<file path=ppt/slides/slide22.xml><?xml version="1.0" encoding="utf-8"?>
+<file path=ppt/slides/slide2.xml><?xml version="1.0" encoding="utf-8"?>
+<p:sld xmlns:a="http://schemas.openxmlformats.org/drawingml/2006/main" xmlns:r="http://schemas.openxmlformats.org/officeDocument/2006/relationships" xmlns:p="http://schemas.openxmlformats.org/presentationml/2006/main">
+  <p:cSld>
+    <p:spTree>
+      <p:nvGrpSpPr>
+        <p:cNvPr id="1" name=""/>
+        <p:cNvGrpSpPr/>
+        <p:nvPr/>
+      </p:nvGrpSpPr>
+      <p:grpSpPr>
+        <a:xfrm>
+          <a:off x="0" y="0"/>
+          <a:ext cx="0" cy="0"/>
+          <a:chOff x="0" y="0"/>
+          <a:chExt cx="0" cy="0"/>
+        </a:xfrm>
+      </p:grpSpPr>
+      <p:sp>
+        <p:nvSpPr>
+          <p:cNvPr id="2" name="Title 1"/>
+          <p:cNvSpPr>
+            <a:spLocks noGrp="1"/>
+          </p:cNvSpPr>
+          <p:nvPr>
+            <p:ph type="title"/>
+          </p:nvPr>
+        </p:nvSpPr>
+        <p:spPr/>
+        <p:txBody>
+          <a:bodyPr/>
+          <a:lstStyle/>
+          <a:p>
+            <a:r>
+              <a:rPr lang="en-US" dirty="0" smtClean="0"/>
+              <a:t>Azure HPC</a:t>
+            </a:r>
+            <a:endParaRPr lang="en-US" dirty="0"/>
+          </a:p>
+        </p:txBody>
+      </p:sp>
+      <p:sp>
+        <p:nvSpPr>
+          <p:cNvPr id="3" name="Content Placeholder 2"/>
+          <p:cNvSpPr>
+            <a:spLocks noGrp="1"/>
+          </p:cNvSpPr>
+          <p:nvPr>
+            <p:ph idx="1"/>
+          </p:nvPr>
+        </p:nvSpPr>
+        <p:spPr/>
+        <p:txBody>
+          <a:bodyPr/>
+          <a:lstStyle/>
+          <a:p>
+            <a:r>
+              <a:rPr lang="en-US" dirty="0"/>
+              <a:t>Run massively parallel compute jobs in the cloud</a:t>
+            </a:r>
+          </a:p>
+          <a:p>
+            <a:pPr lvl="1"/>
+            <a:r>
+              <a:rPr lang="en-US" dirty="0"/>
+              <a:t>Photorealistic 3D rendering</a:t>
+            </a:r>
+          </a:p>
+          <a:p>
+            <a:pPr lvl="1"/>
+            <a:r>
+              <a:rPr lang="en-US" dirty="0"/>
+              <a:t>Brute force </a:t>
+            </a:r>
+            <a:r>
+              <a:rPr lang="en-US" dirty="0" err="1"/>
+              <a:t>cryptographical</a:t>
+            </a:r>
+            <a:r>
+              <a:rPr lang="en-US" dirty="0"/>
+              <a:t> analysis</a:t>
+            </a:r>
+          </a:p>
+          <a:p>
+            <a:pPr lvl="1"/>
+            <a:r>
+              <a:rPr lang="en-US" dirty="0" smtClean="0"/>
+              <a:t>Financial </a:t>
+            </a:r>
+            <a:r>
+              <a:rPr lang="en-US" dirty="0"/>
+              <a:t>risk modeling, genomics research, and more</a:t>
+            </a:r>
+          </a:p>
+          <a:p>
+            <a:r>
+              <a:rPr lang="en-US" dirty="0"/>
+              <a:t>Deploy an HPC cluster in minutes and scale as needed</a:t>
+            </a:r>
+          </a:p>
+          <a:p>
+            <a:r>
+              <a:rPr lang="en-US" dirty="0"/>
+              <a:t>Automate deployments with deployment templates</a:t>
+            </a:r>
+          </a:p>
+          <a:p>
+            <a:r>
+              <a:rPr lang="en-US" dirty="0"/>
+              <a:t>Combine with Azure Batch for batch scheduling and compute management (</a:t>
+            </a:r>
+            <a:r>
+              <a:rPr lang="en-US" dirty="0">
+                <a:hlinkClick r:id="rId3"/>
+              </a:rPr>
+              <a:t>http://bit.ly/a4r-batch</a:t>
+            </a:r>
+            <a:r>
+              <a:rPr lang="en-US" dirty="0" smtClean="0"/>
+              <a:t>)</a:t>
+            </a:r>
+          </a:p>
+          <a:p>
+            <a:r>
+              <a:rPr lang="en-US" dirty="0" smtClean="0"/>
+              <a:t>Linux or Windows</a:t>
+            </a:r>
+            <a:endParaRPr lang="en-US" dirty="0"/>
+          </a:p>
+        </p:txBody>
+      </p:sp>
+    </p:spTree>
+    <p:extLst>
+      <p:ext uri="{BB962C8B-B14F-4D97-AF65-F5344CB8AC3E}">
+        <p14:creationId xmlns:p14="http://schemas.microsoft.com/office/powerpoint/2010/main" val="2410609805"/>
+      </p:ext>
+    </p:extLst>
+  </p:cSld>
+  <p:clrMapOvr>
+    <a:masterClrMapping/>
+  </p:clrMapOvr>
+</p:sld>
+</file>
+
+<file path=ppt/slides/slide20.xml><?xml version="1.0" encoding="utf-8"?>
 <p:sld xmlns:a="http://schemas.openxmlformats.org/drawingml/2006/main" xmlns:r="http://schemas.openxmlformats.org/officeDocument/2006/relationships" xmlns:p="http://schemas.openxmlformats.org/presentationml/2006/main">
   <p:cSld>
     <p:spTree>
@@ -21989,370 +21371,6 @@
 </file>
 
 <file path=ppt/slides/slide3.xml><?xml version="1.0" encoding="utf-8"?>
-<p:sld xmlns:a="http://schemas.openxmlformats.org/drawingml/2006/main" xmlns:r="http://schemas.openxmlformats.org/officeDocument/2006/relationships" xmlns:p="http://schemas.openxmlformats.org/presentationml/2006/main">
-  <p:cSld>
-    <p:spTree>
-      <p:nvGrpSpPr>
-        <p:cNvPr id="1" name=""/>
-        <p:cNvGrpSpPr/>
-        <p:nvPr/>
-      </p:nvGrpSpPr>
-      <p:grpSpPr>
-        <a:xfrm>
-          <a:off x="0" y="0"/>
-          <a:ext cx="0" cy="0"/>
-          <a:chOff x="0" y="0"/>
-          <a:chExt cx="0" cy="0"/>
-        </a:xfrm>
-      </p:grpSpPr>
-      <p:sp>
-        <p:nvSpPr>
-          <p:cNvPr id="2" name="Title 1"/>
-          <p:cNvSpPr>
-            <a:spLocks noGrp="1"/>
-          </p:cNvSpPr>
-          <p:nvPr>
-            <p:ph type="title"/>
-          </p:nvPr>
-        </p:nvSpPr>
-        <p:spPr/>
-        <p:txBody>
-          <a:bodyPr/>
-          <a:lstStyle/>
-          <a:p>
-            <a:r>
-              <a:rPr lang="en-US" dirty="0" smtClean="0"/>
-              <a:t>HPC Clusters</a:t>
-            </a:r>
-            <a:endParaRPr lang="en-US" dirty="0"/>
-          </a:p>
-        </p:txBody>
-      </p:sp>
-      <p:sp>
-        <p:nvSpPr>
-          <p:cNvPr id="3" name="Content Placeholder 2"/>
-          <p:cNvSpPr>
-            <a:spLocks noGrp="1"/>
-          </p:cNvSpPr>
-          <p:nvPr>
-            <p:ph idx="1"/>
-          </p:nvPr>
-        </p:nvSpPr>
-        <p:spPr>
-          <a:xfrm>
-            <a:off x="838200" y="1825625"/>
-            <a:ext cx="6897491" cy="4351338"/>
-          </a:xfrm>
-        </p:spPr>
-        <p:txBody>
-          <a:bodyPr/>
-          <a:lstStyle/>
-          <a:p>
-            <a:pPr marL="571500" indent="-571500"/>
-            <a:r>
-              <a:rPr lang="en-US" dirty="0"/>
-              <a:t>HPC typically involves </a:t>
-            </a:r>
-            <a:r>
-              <a:rPr lang="en-US" b="1" dirty="0">
-                <a:solidFill>
-                  <a:schemeClr val="accent2"/>
-                </a:solidFill>
-              </a:rPr>
-              <a:t>clusters</a:t>
-            </a:r>
-            <a:r>
-              <a:rPr lang="en-US" dirty="0">
-                <a:solidFill>
-                  <a:schemeClr val="accent2"/>
-                </a:solidFill>
-              </a:rPr>
-              <a:t> </a:t>
-            </a:r>
-            <a:r>
-              <a:rPr lang="en-US" dirty="0"/>
-              <a:t>of computers interconnected by a high- speed network</a:t>
-            </a:r>
-          </a:p>
-          <a:p>
-            <a:pPr marL="571500" indent="-571500"/>
-            <a:r>
-              <a:rPr lang="en-US" dirty="0"/>
-              <a:t>A single computer in the cluster is called a </a:t>
-            </a:r>
-            <a:r>
-              <a:rPr lang="en-US" b="1" dirty="0">
-                <a:solidFill>
-                  <a:schemeClr val="accent2"/>
-                </a:solidFill>
-              </a:rPr>
-              <a:t>node</a:t>
-            </a:r>
-            <a:endParaRPr lang="en-US" dirty="0">
-              <a:solidFill>
-                <a:schemeClr val="accent2"/>
-              </a:solidFill>
-            </a:endParaRPr>
-          </a:p>
-          <a:p>
-            <a:pPr marL="571500" indent="-571500"/>
-            <a:r>
-              <a:rPr lang="en-US" b="1" dirty="0">
-                <a:solidFill>
-                  <a:schemeClr val="accent2"/>
-                </a:solidFill>
-              </a:rPr>
-              <a:t>Workloads</a:t>
-            </a:r>
-            <a:r>
-              <a:rPr lang="en-US" b="1" dirty="0"/>
-              <a:t> </a:t>
-            </a:r>
-            <a:r>
-              <a:rPr lang="en-US" dirty="0"/>
-              <a:t>are managed by </a:t>
-            </a:r>
-            <a:r>
-              <a:rPr lang="en-US" b="1" dirty="0">
-                <a:solidFill>
-                  <a:schemeClr val="accent2"/>
-                </a:solidFill>
-              </a:rPr>
-              <a:t>master</a:t>
-            </a:r>
-            <a:r>
-              <a:rPr lang="en-US" dirty="0">
-                <a:solidFill>
-                  <a:schemeClr val="accent2"/>
-                </a:solidFill>
-              </a:rPr>
-              <a:t> </a:t>
-            </a:r>
-            <a:r>
-              <a:rPr lang="en-US" dirty="0"/>
-              <a:t>nodes that distribute workloads across </a:t>
-            </a:r>
-            <a:r>
-              <a:rPr lang="en-US" b="1" dirty="0">
-                <a:solidFill>
-                  <a:schemeClr val="accent2"/>
-                </a:solidFill>
-              </a:rPr>
-              <a:t>worker</a:t>
-            </a:r>
-            <a:r>
-              <a:rPr lang="en-US" dirty="0">
-                <a:solidFill>
-                  <a:schemeClr val="accent2"/>
-                </a:solidFill>
-              </a:rPr>
-              <a:t> </a:t>
-            </a:r>
-            <a:r>
-              <a:rPr lang="en-US" dirty="0"/>
-              <a:t>nodes</a:t>
-            </a:r>
-            <a:endParaRPr lang="en-US" b="1" dirty="0"/>
-          </a:p>
-          <a:p>
-            <a:endParaRPr lang="en-US" dirty="0"/>
-          </a:p>
-        </p:txBody>
-      </p:sp>
-      <p:pic>
-        <p:nvPicPr>
-          <p:cNvPr id="4" name="Picture 3"/>
-          <p:cNvPicPr>
-            <a:picLocks noChangeAspect="1"/>
-          </p:cNvPicPr>
-          <p:nvPr/>
-        </p:nvPicPr>
-        <p:blipFill>
-          <a:blip r:embed="rId3">
-            <a:extLst>
-              <a:ext uri="{28A0092B-C50C-407E-A947-70E740481C1C}">
-                <a14:useLocalDpi xmlns:a14="http://schemas.microsoft.com/office/drawing/2010/main" val="0"/>
-              </a:ext>
-            </a:extLst>
-          </a:blip>
-          <a:stretch>
-            <a:fillRect/>
-          </a:stretch>
-        </p:blipFill>
-        <p:spPr>
-          <a:xfrm>
-            <a:off x="8216008" y="976500"/>
-            <a:ext cx="2657475" cy="4886325"/>
-          </a:xfrm>
-          <a:prstGeom prst="rect">
-            <a:avLst/>
-          </a:prstGeom>
-          <a:ln>
-            <a:solidFill>
-              <a:schemeClr val="bg1">
-                <a:lumMod val="75000"/>
-              </a:schemeClr>
-            </a:solidFill>
-          </a:ln>
-        </p:spPr>
-      </p:pic>
-    </p:spTree>
-    <p:extLst>
-      <p:ext uri="{BB962C8B-B14F-4D97-AF65-F5344CB8AC3E}">
-        <p14:creationId xmlns:p14="http://schemas.microsoft.com/office/powerpoint/2010/main" val="678717861"/>
-      </p:ext>
-    </p:extLst>
-  </p:cSld>
-  <p:clrMapOvr>
-    <a:masterClrMapping/>
-  </p:clrMapOvr>
-</p:sld>
-</file>
-
-<file path=ppt/slides/slide4.xml><?xml version="1.0" encoding="utf-8"?>
-<p:sld xmlns:a="http://schemas.openxmlformats.org/drawingml/2006/main" xmlns:r="http://schemas.openxmlformats.org/officeDocument/2006/relationships" xmlns:p="http://schemas.openxmlformats.org/presentationml/2006/main">
-  <p:cSld>
-    <p:spTree>
-      <p:nvGrpSpPr>
-        <p:cNvPr id="1" name=""/>
-        <p:cNvGrpSpPr/>
-        <p:nvPr/>
-      </p:nvGrpSpPr>
-      <p:grpSpPr>
-        <a:xfrm>
-          <a:off x="0" y="0"/>
-          <a:ext cx="0" cy="0"/>
-          <a:chOff x="0" y="0"/>
-          <a:chExt cx="0" cy="0"/>
-        </a:xfrm>
-      </p:grpSpPr>
-      <p:sp>
-        <p:nvSpPr>
-          <p:cNvPr id="2" name="Title 1"/>
-          <p:cNvSpPr>
-            <a:spLocks noGrp="1"/>
-          </p:cNvSpPr>
-          <p:nvPr>
-            <p:ph type="title"/>
-          </p:nvPr>
-        </p:nvSpPr>
-        <p:spPr/>
-        <p:txBody>
-          <a:bodyPr/>
-          <a:lstStyle/>
-          <a:p>
-            <a:r>
-              <a:rPr lang="en-US" dirty="0" smtClean="0"/>
-              <a:t>HPC in Azure</a:t>
-            </a:r>
-            <a:endParaRPr lang="en-US" dirty="0"/>
-          </a:p>
-        </p:txBody>
-      </p:sp>
-      <p:sp>
-        <p:nvSpPr>
-          <p:cNvPr id="3" name="Content Placeholder 2"/>
-          <p:cNvSpPr>
-            <a:spLocks noGrp="1"/>
-          </p:cNvSpPr>
-          <p:nvPr>
-            <p:ph idx="1"/>
-          </p:nvPr>
-        </p:nvSpPr>
-        <p:spPr/>
-        <p:txBody>
-          <a:bodyPr/>
-          <a:lstStyle/>
-          <a:p>
-            <a:r>
-              <a:rPr lang="en-US" dirty="0"/>
-              <a:t>Run massively parallel compute jobs in the cloud</a:t>
-            </a:r>
-          </a:p>
-          <a:p>
-            <a:pPr lvl="1"/>
-            <a:r>
-              <a:rPr lang="en-US" dirty="0"/>
-              <a:t>Photorealistic 3D rendering</a:t>
-            </a:r>
-          </a:p>
-          <a:p>
-            <a:pPr lvl="1"/>
-            <a:r>
-              <a:rPr lang="en-US" dirty="0"/>
-              <a:t>Brute force </a:t>
-            </a:r>
-            <a:r>
-              <a:rPr lang="en-US" dirty="0" err="1"/>
-              <a:t>cryptographical</a:t>
-            </a:r>
-            <a:r>
-              <a:rPr lang="en-US" dirty="0"/>
-              <a:t> analysis</a:t>
-            </a:r>
-          </a:p>
-          <a:p>
-            <a:pPr lvl="1"/>
-            <a:r>
-              <a:rPr lang="en-US" dirty="0" smtClean="0"/>
-              <a:t>Financial </a:t>
-            </a:r>
-            <a:r>
-              <a:rPr lang="en-US" dirty="0"/>
-              <a:t>risk modeling, genomics research, and more</a:t>
-            </a:r>
-          </a:p>
-          <a:p>
-            <a:r>
-              <a:rPr lang="en-US" dirty="0"/>
-              <a:t>Deploy an HPC cluster in minutes and scale as needed</a:t>
-            </a:r>
-          </a:p>
-          <a:p>
-            <a:r>
-              <a:rPr lang="en-US" dirty="0"/>
-              <a:t>Automate deployments with deployment templates</a:t>
-            </a:r>
-          </a:p>
-          <a:p>
-            <a:r>
-              <a:rPr lang="en-US" dirty="0"/>
-              <a:t>Combine with Azure Batch for batch scheduling and compute management (</a:t>
-            </a:r>
-            <a:r>
-              <a:rPr lang="en-US" dirty="0">
-                <a:hlinkClick r:id="rId3"/>
-              </a:rPr>
-              <a:t>http://bit.ly/a4r-batch</a:t>
-            </a:r>
-            <a:r>
-              <a:rPr lang="en-US" dirty="0" smtClean="0"/>
-              <a:t>)</a:t>
-            </a:r>
-          </a:p>
-          <a:p>
-            <a:r>
-              <a:rPr lang="en-US" dirty="0" smtClean="0"/>
-              <a:t>Linux or Windows</a:t>
-            </a:r>
-            <a:endParaRPr lang="en-US" dirty="0"/>
-          </a:p>
-        </p:txBody>
-      </p:sp>
-    </p:spTree>
-    <p:extLst>
-      <p:ext uri="{BB962C8B-B14F-4D97-AF65-F5344CB8AC3E}">
-        <p14:creationId xmlns:p14="http://schemas.microsoft.com/office/powerpoint/2010/main" val="3204493886"/>
-      </p:ext>
-    </p:extLst>
-  </p:cSld>
-  <p:clrMapOvr>
-    <a:masterClrMapping/>
-  </p:clrMapOvr>
-</p:sld>
-</file>
-
-<file path=ppt/slides/slide5.xml><?xml version="1.0" encoding="utf-8"?>
 <p:sld xmlns:a="http://schemas.openxmlformats.org/drawingml/2006/main" xmlns:r="http://schemas.openxmlformats.org/officeDocument/2006/relationships" xmlns:p="http://schemas.openxmlformats.org/presentationml/2006/main">
   <p:cSld>
     <p:spTree>
@@ -27095,7 +26113,7 @@
 </p:sld>
 </file>
 
-<file path=ppt/slides/slide6.xml><?xml version="1.0" encoding="utf-8"?>
+<file path=ppt/slides/slide4.xml><?xml version="1.0" encoding="utf-8"?>
 <p:sld xmlns:a="http://schemas.openxmlformats.org/drawingml/2006/main" xmlns:r="http://schemas.openxmlformats.org/officeDocument/2006/relationships" xmlns:p="http://schemas.openxmlformats.org/presentationml/2006/main">
   <p:cSld>
     <p:spTree>
@@ -28681,7 +27699,7 @@
 </p:sld>
 </file>
 
-<file path=ppt/slides/slide7.xml><?xml version="1.0" encoding="utf-8"?>
+<file path=ppt/slides/slide5.xml><?xml version="1.0" encoding="utf-8"?>
 <p:sld xmlns:a="http://schemas.openxmlformats.org/drawingml/2006/main" xmlns:r="http://schemas.openxmlformats.org/officeDocument/2006/relationships" xmlns:p="http://schemas.openxmlformats.org/presentationml/2006/main">
   <p:cSld>
     <p:spTree>
@@ -30087,7 +29105,7 @@
 </p:sld>
 </file>
 
-<file path=ppt/slides/slide8.xml><?xml version="1.0" encoding="utf-8"?>
+<file path=ppt/slides/slide6.xml><?xml version="1.0" encoding="utf-8"?>
 <p:sld xmlns:a="http://schemas.openxmlformats.org/drawingml/2006/main" xmlns:r="http://schemas.openxmlformats.org/officeDocument/2006/relationships" xmlns:p="http://schemas.openxmlformats.org/presentationml/2006/main">
   <p:cSld>
     <p:spTree>
@@ -30217,7 +29235,7 @@
 </p:sld>
 </file>
 
-<file path=ppt/slides/slide9.xml><?xml version="1.0" encoding="utf-8"?>
+<file path=ppt/slides/slide7.xml><?xml version="1.0" encoding="utf-8"?>
 <p:sld xmlns:a="http://schemas.openxmlformats.org/drawingml/2006/main" xmlns:r="http://schemas.openxmlformats.org/officeDocument/2006/relationships" xmlns:p="http://schemas.openxmlformats.org/presentationml/2006/main">
   <p:cSld>
     <p:spTree>
@@ -30345,6 +29363,367 @@
     <p:extLst>
       <p:ext uri="{BB962C8B-B14F-4D97-AF65-F5344CB8AC3E}">
         <p14:creationId xmlns:p14="http://schemas.microsoft.com/office/powerpoint/2010/main" val="2812936699"/>
+      </p:ext>
+    </p:extLst>
+  </p:cSld>
+  <p:clrMapOvr>
+    <a:masterClrMapping/>
+  </p:clrMapOvr>
+</p:sld>
+</file>
+
+<file path=ppt/slides/slide8.xml><?xml version="1.0" encoding="utf-8"?>
+<p:sld xmlns:a="http://schemas.openxmlformats.org/drawingml/2006/main" xmlns:r="http://schemas.openxmlformats.org/officeDocument/2006/relationships" xmlns:p="http://schemas.openxmlformats.org/presentationml/2006/main">
+  <p:cSld>
+    <p:spTree>
+      <p:nvGrpSpPr>
+        <p:cNvPr id="1" name=""/>
+        <p:cNvGrpSpPr/>
+        <p:nvPr/>
+      </p:nvGrpSpPr>
+      <p:grpSpPr>
+        <a:xfrm>
+          <a:off x="0" y="0"/>
+          <a:ext cx="0" cy="0"/>
+          <a:chOff x="0" y="0"/>
+          <a:chExt cx="0" cy="0"/>
+        </a:xfrm>
+      </p:grpSpPr>
+      <p:sp>
+        <p:nvSpPr>
+          <p:cNvPr id="2" name="Title 1"/>
+          <p:cNvSpPr>
+            <a:spLocks noGrp="1"/>
+          </p:cNvSpPr>
+          <p:nvPr>
+            <p:ph type="title"/>
+          </p:nvPr>
+        </p:nvSpPr>
+        <p:spPr/>
+        <p:txBody>
+          <a:bodyPr/>
+          <a:lstStyle/>
+          <a:p>
+            <a:r>
+              <a:rPr lang="en-US" dirty="0" smtClean="0"/>
+              <a:t>Azure </a:t>
+            </a:r>
+            <a:r>
+              <a:rPr lang="en-US" dirty="0" err="1" smtClean="0"/>
+              <a:t>Quickstart</a:t>
+            </a:r>
+            <a:r>
+              <a:rPr lang="en-US" dirty="0" smtClean="0"/>
+              <a:t> Templates</a:t>
+            </a:r>
+            <a:endParaRPr lang="en-US" dirty="0"/>
+          </a:p>
+        </p:txBody>
+      </p:sp>
+      <p:sp>
+        <p:nvSpPr>
+          <p:cNvPr id="3" name="Content Placeholder 2"/>
+          <p:cNvSpPr>
+            <a:spLocks noGrp="1"/>
+          </p:cNvSpPr>
+          <p:nvPr>
+            <p:ph idx="1"/>
+          </p:nvPr>
+        </p:nvSpPr>
+        <p:spPr/>
+        <p:txBody>
+          <a:bodyPr/>
+          <a:lstStyle/>
+          <a:p>
+            <a:r>
+              <a:rPr lang="en-US" dirty="0"/>
+              <a:t>Free, open-source deployment templates</a:t>
+            </a:r>
+          </a:p>
+          <a:p>
+            <a:endParaRPr lang="en-US" dirty="0"/>
+          </a:p>
+          <a:p>
+            <a:endParaRPr lang="en-US" dirty="0"/>
+          </a:p>
+          <a:p>
+            <a:endParaRPr lang="en-US" dirty="0"/>
+          </a:p>
+          <a:p>
+            <a:endParaRPr lang="en-US" dirty="0"/>
+          </a:p>
+          <a:p>
+            <a:endParaRPr lang="en-US" dirty="0"/>
+          </a:p>
+          <a:p>
+            <a:r>
+              <a:rPr lang="en-US" dirty="0"/>
+              <a:t>Find them on the Azure site (</a:t>
+            </a:r>
+            <a:r>
+              <a:rPr lang="en-US" dirty="0">
+                <a:hlinkClick r:id="rId3"/>
+              </a:rPr>
+              <a:t>http://bit.ly/a4r-quickstart</a:t>
+            </a:r>
+            <a:r>
+              <a:rPr lang="en-US" dirty="0"/>
+              <a:t>)</a:t>
+            </a:r>
+          </a:p>
+          <a:p>
+            <a:r>
+              <a:rPr lang="en-US" dirty="0"/>
+              <a:t>Or browse them on GitHub (</a:t>
+            </a:r>
+            <a:r>
+              <a:rPr lang="en-US" dirty="0">
+                <a:hlinkClick r:id="rId4"/>
+              </a:rPr>
+              <a:t>http://</a:t>
+            </a:r>
+            <a:r>
+              <a:rPr lang="en-US" dirty="0" smtClean="0">
+                <a:hlinkClick r:id="rId4"/>
+              </a:rPr>
+              <a:t>bit.ly/a4r-github</a:t>
+            </a:r>
+            <a:r>
+              <a:rPr lang="en-US" dirty="0" smtClean="0"/>
+              <a:t>)</a:t>
+            </a:r>
+          </a:p>
+          <a:p>
+            <a:pPr marL="0" indent="0">
+              <a:buNone/>
+            </a:pPr>
+            <a:endParaRPr lang="en-US" dirty="0"/>
+          </a:p>
+        </p:txBody>
+      </p:sp>
+      <p:pic>
+        <p:nvPicPr>
+          <p:cNvPr id="4" name="Picture 3"/>
+          <p:cNvPicPr>
+            <a:picLocks noChangeAspect="1"/>
+          </p:cNvPicPr>
+          <p:nvPr/>
+        </p:nvPicPr>
+        <p:blipFill>
+          <a:blip r:embed="rId5"/>
+          <a:stretch>
+            <a:fillRect/>
+          </a:stretch>
+        </p:blipFill>
+        <p:spPr>
+          <a:xfrm>
+            <a:off x="981075" y="2716411"/>
+            <a:ext cx="2914650" cy="1666875"/>
+          </a:xfrm>
+          <a:prstGeom prst="rect">
+            <a:avLst/>
+          </a:prstGeom>
+          <a:ln>
+            <a:solidFill>
+              <a:schemeClr val="accent2"/>
+            </a:solidFill>
+          </a:ln>
+        </p:spPr>
+      </p:pic>
+      <p:pic>
+        <p:nvPicPr>
+          <p:cNvPr id="5" name="Picture 4"/>
+          <p:cNvPicPr>
+            <a:picLocks noChangeAspect="1"/>
+          </p:cNvPicPr>
+          <p:nvPr/>
+        </p:nvPicPr>
+        <p:blipFill>
+          <a:blip r:embed="rId6"/>
+          <a:stretch>
+            <a:fillRect/>
+          </a:stretch>
+        </p:blipFill>
+        <p:spPr>
+          <a:xfrm>
+            <a:off x="4564226" y="2716411"/>
+            <a:ext cx="2924175" cy="1666875"/>
+          </a:xfrm>
+          <a:prstGeom prst="rect">
+            <a:avLst/>
+          </a:prstGeom>
+          <a:ln>
+            <a:solidFill>
+              <a:schemeClr val="accent2"/>
+            </a:solidFill>
+          </a:ln>
+        </p:spPr>
+      </p:pic>
+      <p:pic>
+        <p:nvPicPr>
+          <p:cNvPr id="6" name="Picture 5"/>
+          <p:cNvPicPr>
+            <a:picLocks noChangeAspect="1"/>
+          </p:cNvPicPr>
+          <p:nvPr/>
+        </p:nvPicPr>
+        <p:blipFill>
+          <a:blip r:embed="rId7"/>
+          <a:stretch>
+            <a:fillRect/>
+          </a:stretch>
+        </p:blipFill>
+        <p:spPr>
+          <a:xfrm>
+            <a:off x="8156903" y="2716411"/>
+            <a:ext cx="2914650" cy="1666875"/>
+          </a:xfrm>
+          <a:prstGeom prst="rect">
+            <a:avLst/>
+          </a:prstGeom>
+          <a:ln>
+            <a:solidFill>
+              <a:schemeClr val="accent2"/>
+            </a:solidFill>
+          </a:ln>
+        </p:spPr>
+      </p:pic>
+    </p:spTree>
+    <p:extLst>
+      <p:ext uri="{BB962C8B-B14F-4D97-AF65-F5344CB8AC3E}">
+        <p14:creationId xmlns:p14="http://schemas.microsoft.com/office/powerpoint/2010/main" val="3324523628"/>
+      </p:ext>
+    </p:extLst>
+  </p:cSld>
+  <p:clrMapOvr>
+    <a:masterClrMapping/>
+  </p:clrMapOvr>
+</p:sld>
+</file>
+
+<file path=ppt/slides/slide9.xml><?xml version="1.0" encoding="utf-8"?>
+<p:sld xmlns:a="http://schemas.openxmlformats.org/drawingml/2006/main" xmlns:r="http://schemas.openxmlformats.org/officeDocument/2006/relationships" xmlns:p="http://schemas.openxmlformats.org/presentationml/2006/main">
+  <p:cSld>
+    <p:spTree>
+      <p:nvGrpSpPr>
+        <p:cNvPr id="1" name=""/>
+        <p:cNvGrpSpPr/>
+        <p:nvPr/>
+      </p:nvGrpSpPr>
+      <p:grpSpPr>
+        <a:xfrm>
+          <a:off x="0" y="0"/>
+          <a:ext cx="0" cy="0"/>
+          <a:chOff x="0" y="0"/>
+          <a:chExt cx="0" cy="0"/>
+        </a:xfrm>
+      </p:grpSpPr>
+      <p:sp>
+        <p:nvSpPr>
+          <p:cNvPr id="2" name="Title 1"/>
+          <p:cNvSpPr>
+            <a:spLocks noGrp="1"/>
+          </p:cNvSpPr>
+          <p:nvPr>
+            <p:ph type="title"/>
+          </p:nvPr>
+        </p:nvSpPr>
+        <p:spPr/>
+        <p:txBody>
+          <a:bodyPr/>
+          <a:lstStyle/>
+          <a:p>
+            <a:r>
+              <a:rPr lang="en-US" dirty="0" smtClean="0"/>
+              <a:t>SLURM Clusters</a:t>
+            </a:r>
+            <a:endParaRPr lang="en-US" dirty="0"/>
+          </a:p>
+        </p:txBody>
+      </p:sp>
+      <p:sp>
+        <p:nvSpPr>
+          <p:cNvPr id="3" name="Content Placeholder 2"/>
+          <p:cNvSpPr>
+            <a:spLocks noGrp="1"/>
+          </p:cNvSpPr>
+          <p:nvPr>
+            <p:ph idx="1"/>
+          </p:nvPr>
+        </p:nvSpPr>
+        <p:spPr/>
+        <p:txBody>
+          <a:bodyPr/>
+          <a:lstStyle/>
+          <a:p>
+            <a:r>
+              <a:rPr lang="en-US" dirty="0"/>
+              <a:t>Simple Linux Utility for Resource Management (SLURM)</a:t>
+            </a:r>
+          </a:p>
+          <a:p>
+            <a:r>
+              <a:rPr lang="en-US" dirty="0" err="1"/>
+              <a:t>Quickstart</a:t>
+            </a:r>
+            <a:r>
+              <a:rPr lang="en-US" dirty="0"/>
+              <a:t> template at </a:t>
+            </a:r>
+            <a:r>
+              <a:rPr lang="en-US" dirty="0">
+                <a:hlinkClick r:id="rId3"/>
+              </a:rPr>
+              <a:t>http://bit.ly/a4r-slurm</a:t>
+            </a:r>
+            <a:r>
+              <a:rPr lang="en-US" dirty="0"/>
+              <a:t> enables easy deployment of SLURM clusters of user-specified </a:t>
+            </a:r>
+            <a:r>
+              <a:rPr lang="en-US" dirty="0" smtClean="0"/>
+              <a:t>sizes</a:t>
+            </a:r>
+            <a:endParaRPr lang="en-US" dirty="0"/>
+          </a:p>
+        </p:txBody>
+      </p:sp>
+      <p:pic>
+        <p:nvPicPr>
+          <p:cNvPr id="4" name="Picture 3"/>
+          <p:cNvPicPr>
+            <a:picLocks noChangeAspect="1"/>
+          </p:cNvPicPr>
+          <p:nvPr/>
+        </p:nvPicPr>
+        <p:blipFill>
+          <a:blip r:embed="rId4"/>
+          <a:stretch>
+            <a:fillRect/>
+          </a:stretch>
+        </p:blipFill>
+        <p:spPr>
+          <a:xfrm>
+            <a:off x="3174205" y="3542756"/>
+            <a:ext cx="5842001" cy="2769144"/>
+          </a:xfrm>
+          <a:prstGeom prst="rect">
+            <a:avLst/>
+          </a:prstGeom>
+          <a:ln>
+            <a:solidFill>
+              <a:schemeClr val="bg1">
+                <a:lumMod val="75000"/>
+              </a:schemeClr>
+            </a:solidFill>
+          </a:ln>
+          <a:effectLst/>
+        </p:spPr>
+      </p:pic>
+    </p:spTree>
+    <p:extLst>
+      <p:ext uri="{BB962C8B-B14F-4D97-AF65-F5344CB8AC3E}">
+        <p14:creationId xmlns:p14="http://schemas.microsoft.com/office/powerpoint/2010/main" val="2739371626"/>
       </p:ext>
     </p:extLst>
   </p:cSld>

</xml_diff>

<commit_message>
Revert "Revert "Updating Complimentary Course Content Module 2""
This reverts commit dc67f53fc16e6559dbf1a59dadad5b84173c7820.
</commit_message>
<xml_diff>
--- a/Workshop/6. HPC and Containers/HPC and Azure Container Service.pptx
+++ b/Workshop/6. HPC and Containers/HPC and Azure Container Service.pptx
@@ -6,29 +6,31 @@
     <p:sldMasterId id="2147483663" r:id="rId2"/>
   </p:sldMasterIdLst>
   <p:notesMasterIdLst>
-    <p:notesMasterId r:id="rId23"/>
+    <p:notesMasterId r:id="rId25"/>
   </p:notesMasterIdLst>
   <p:sldIdLst>
     <p:sldId id="256" r:id="rId3"/>
-    <p:sldId id="321" r:id="rId4"/>
-    <p:sldId id="318" r:id="rId5"/>
-    <p:sldId id="319" r:id="rId6"/>
-    <p:sldId id="320" r:id="rId7"/>
-    <p:sldId id="304" r:id="rId8"/>
-    <p:sldId id="322" r:id="rId9"/>
-    <p:sldId id="305" r:id="rId10"/>
-    <p:sldId id="306" r:id="rId11"/>
-    <p:sldId id="307" r:id="rId12"/>
-    <p:sldId id="308" r:id="rId13"/>
-    <p:sldId id="314" r:id="rId14"/>
-    <p:sldId id="313" r:id="rId15"/>
-    <p:sldId id="315" r:id="rId16"/>
-    <p:sldId id="316" r:id="rId17"/>
-    <p:sldId id="309" r:id="rId18"/>
-    <p:sldId id="311" r:id="rId19"/>
-    <p:sldId id="317" r:id="rId20"/>
-    <p:sldId id="295" r:id="rId21"/>
-    <p:sldId id="299" r:id="rId22"/>
+    <p:sldId id="323" r:id="rId4"/>
+    <p:sldId id="324" r:id="rId5"/>
+    <p:sldId id="325" r:id="rId6"/>
+    <p:sldId id="318" r:id="rId7"/>
+    <p:sldId id="319" r:id="rId8"/>
+    <p:sldId id="320" r:id="rId9"/>
+    <p:sldId id="304" r:id="rId10"/>
+    <p:sldId id="322" r:id="rId11"/>
+    <p:sldId id="305" r:id="rId12"/>
+    <p:sldId id="306" r:id="rId13"/>
+    <p:sldId id="307" r:id="rId14"/>
+    <p:sldId id="308" r:id="rId15"/>
+    <p:sldId id="314" r:id="rId16"/>
+    <p:sldId id="313" r:id="rId17"/>
+    <p:sldId id="315" r:id="rId18"/>
+    <p:sldId id="316" r:id="rId19"/>
+    <p:sldId id="309" r:id="rId20"/>
+    <p:sldId id="311" r:id="rId21"/>
+    <p:sldId id="317" r:id="rId22"/>
+    <p:sldId id="295" r:id="rId23"/>
+    <p:sldId id="299" r:id="rId24"/>
   </p:sldIdLst>
   <p:sldSz cx="12192000" cy="6858000"/>
   <p:notesSz cx="6858000" cy="9144000"/>
@@ -217,7 +219,7 @@
           <a:p>
             <a:fld id="{49B60EF2-7028-489F-85D8-FE86CD7CF2A0}" type="datetimeFigureOut">
               <a:rPr lang="en-US" smtClean="0"/>
-              <a:t>10/24/2016</a:t>
+              <a:t>12/20/2016</a:t>
             </a:fld>
             <a:endParaRPr lang="en-US"/>
           </a:p>
@@ -613,22 +615,102 @@
           <a:lstStyle/>
           <a:p>
             <a:r>
+              <a:rPr lang="en-US" sz="1200" kern="1200" dirty="0" smtClean="0">
+                <a:solidFill>
+                  <a:schemeClr val="tx1"/>
+                </a:solidFill>
+                <a:effectLst/>
+                <a:latin typeface="+mn-lt"/>
+                <a:ea typeface="+mn-ea"/>
+                <a:cs typeface="+mn-cs"/>
+              </a:rPr>
+              <a:t>You can build deployment templates of your own, or you can use ones that have already been built. An assortment of templates built by the Azure team and by others in the community can be found on the Azure </a:t>
+            </a:r>
+            <a:r>
+              <a:rPr lang="en-US" sz="1200" kern="1200" dirty="0" err="1" smtClean="0">
+                <a:solidFill>
+                  <a:schemeClr val="tx1"/>
+                </a:solidFill>
+                <a:effectLst/>
+                <a:latin typeface="+mn-lt"/>
+                <a:ea typeface="+mn-ea"/>
+                <a:cs typeface="+mn-cs"/>
+              </a:rPr>
+              <a:t>Quickstart</a:t>
+            </a:r>
+            <a:r>
+              <a:rPr lang="en-US" sz="1200" kern="1200" dirty="0" smtClean="0">
+                <a:solidFill>
+                  <a:schemeClr val="tx1"/>
+                </a:solidFill>
+                <a:effectLst/>
+                <a:latin typeface="+mn-lt"/>
+                <a:ea typeface="+mn-ea"/>
+                <a:cs typeface="+mn-cs"/>
+              </a:rPr>
+              <a:t> Templates Web site or on GitHub. There are templates for creating clusters of Linux VMs, deploying </a:t>
+            </a:r>
+            <a:r>
+              <a:rPr lang="en-US" sz="1200" kern="1200" dirty="0" err="1" smtClean="0">
+                <a:solidFill>
+                  <a:schemeClr val="tx1"/>
+                </a:solidFill>
+                <a:effectLst/>
+                <a:latin typeface="+mn-lt"/>
+                <a:ea typeface="+mn-ea"/>
+                <a:cs typeface="+mn-cs"/>
+              </a:rPr>
+              <a:t>Redis</a:t>
+            </a:r>
+            <a:r>
+              <a:rPr lang="en-US" sz="1200" kern="1200" dirty="0" smtClean="0">
+                <a:solidFill>
+                  <a:schemeClr val="tx1"/>
+                </a:solidFill>
+                <a:effectLst/>
+                <a:latin typeface="+mn-lt"/>
+                <a:ea typeface="+mn-ea"/>
+                <a:cs typeface="+mn-cs"/>
+              </a:rPr>
+              <a:t> clusters of Ubuntu VMs, deploying MySQL servers, creating Windows VMs provisioned with IIS, and a whole lot more. There is even a template that deploys Minecraft Server in an Ubuntu VM.</a:t>
+            </a:r>
+          </a:p>
+          <a:p>
+            <a:r>
+              <a:rPr lang="en-US" sz="1200" kern="1200" dirty="0" smtClean="0">
+                <a:solidFill>
+                  <a:schemeClr val="tx1"/>
+                </a:solidFill>
+                <a:effectLst/>
+                <a:latin typeface="+mn-lt"/>
+                <a:ea typeface="+mn-ea"/>
+                <a:cs typeface="+mn-cs"/>
+              </a:rPr>
+              <a:t> </a:t>
+            </a:r>
+          </a:p>
+          <a:p>
+            <a:r>
+              <a:rPr lang="en-US" sz="1200" kern="1200" dirty="0" smtClean="0">
+                <a:solidFill>
+                  <a:schemeClr val="tx1"/>
+                </a:solidFill>
+                <a:effectLst/>
+                <a:latin typeface="+mn-lt"/>
+                <a:ea typeface="+mn-ea"/>
+                <a:cs typeface="+mn-cs"/>
+              </a:rPr>
+              <a:t>Using any of these templates requires nothing more than a button click. Each template comes with documentation that tells you what parameters it requires and whether the template was created by Microsoft or by someone in the community. Best of all, you can view each template’s source code, which is little more than a JSON script, and customize it to fit your needs or even build upon it to create templates of your own.</a:t>
+            </a:r>
+          </a:p>
+          <a:p>
+            <a:endParaRPr lang="en-US" dirty="0" smtClean="0"/>
+          </a:p>
+          <a:p>
+            <a:r>
               <a:rPr lang="en-US" dirty="0" smtClean="0"/>
-              <a:t>A</a:t>
-            </a:r>
-            <a:r>
-              <a:rPr lang="en-US" baseline="0" dirty="0" smtClean="0"/>
-              <a:t> virtual machine is -- well -- a virtualized machine created and managed by a hypervisor such as </a:t>
-            </a:r>
-            <a:r>
-              <a:rPr lang="en-US" baseline="0" dirty="0" err="1" smtClean="0"/>
-              <a:t>VirtualBox</a:t>
-            </a:r>
-            <a:r>
-              <a:rPr lang="en-US" baseline="0" dirty="0" smtClean="0"/>
-              <a:t> or Hyper-V. Even though a VM runs on a machine that has an operating system, each VM requires its own complete operating system, even if it's the same operating system as the host OS. VMs offer a very high degree of isolation, but at a cost: longer startup times, lower portability (ever tried to move a 127 GB virtual hard disk, or VHD, from one PC to another?), and higher memory requirements. Containers, by contrast, leverage the operating system that is already in place but offer nearly as much separation. RAM requirements are lower since the OS isn't being duplicated in each container, and cost is lower, too, because while cloud platforms typically charge for each VM, a single VM can host multiple container instances.</a:t>
-            </a:r>
-            <a:endParaRPr lang="en-US" dirty="0"/>
+              <a:t>The three templates pictured here are just a few of the many dozens of templates currently available.</a:t>
+            </a:r>
           </a:p>
         </p:txBody>
       </p:sp>
@@ -658,7 +740,7 @@
     </p:spTree>
     <p:extLst>
       <p:ext uri="{BB962C8B-B14F-4D97-AF65-F5344CB8AC3E}">
-        <p14:creationId xmlns:p14="http://schemas.microsoft.com/office/powerpoint/2010/main" val="3918904550"/>
+        <p14:creationId xmlns:p14="http://schemas.microsoft.com/office/powerpoint/2010/main" val="3998187520"/>
       </p:ext>
     </p:extLst>
   </p:cSld>
@@ -712,23 +794,27 @@
           <a:bodyPr/>
           <a:lstStyle/>
           <a:p>
+            <a:pPr marL="0" marR="0" indent="0" algn="l" defTabSz="914400" rtl="0" eaLnBrk="1" fontAlgn="auto" latinLnBrk="0" hangingPunct="1">
+              <a:lnSpc>
+                <a:spcPct val="100000"/>
+              </a:lnSpc>
+              <a:spcBef>
+                <a:spcPts val="0"/>
+              </a:spcBef>
+              <a:spcAft>
+                <a:spcPts val="0"/>
+              </a:spcAft>
+              <a:buClrTx/>
+              <a:buSzTx/>
+              <a:buFontTx/>
+              <a:buNone/>
+              <a:tabLst/>
+              <a:defRPr/>
+            </a:pPr>
             <a:r>
               <a:rPr lang="en-US" dirty="0" smtClean="0"/>
-              <a:t>Docker (www.docker.com) isn't the world's only containerization platform, but it is the most popular. It is free, open-source,</a:t>
-            </a:r>
-            <a:r>
-              <a:rPr lang="en-US" baseline="0" dirty="0" smtClean="0"/>
-              <a:t> and Linux-based, with Windows support (Windows Server 2016) in the works. </a:t>
-            </a:r>
-            <a:r>
-              <a:rPr lang="en-US" dirty="0" smtClean="0"/>
-              <a:t>It has earned massive</a:t>
-            </a:r>
-            <a:r>
-              <a:rPr lang="en-US" baseline="0" dirty="0" smtClean="0"/>
-              <a:t> mindshare in the developer community. And with Azure Container Service, you can deploy Docker containers to Azure with minimal effort. Moreover, Docker containers are easily moved between Azure and Amazon Web Services (AWS), affording developers portability between cloud platforms.</a:t>
-            </a:r>
-            <a:endParaRPr lang="en-US" dirty="0"/>
+              <a:t>The Simple Linux Utility for Resource Management (SLURM), also known as the SLURM Workload Manager, is a free and open-source job scheduler for Linux that excels at distributing heavy computing workloads across clusters of machines and processors. It is used on more than half of the world's largest supercomputers and High-Performance Computing (HPC) clusters, and it enjoys widespread use in the research community for jobs that require significant CPU resources.</a:t>
+            </a:r>
           </a:p>
         </p:txBody>
       </p:sp>
@@ -758,7 +844,7 @@
     </p:spTree>
     <p:extLst>
       <p:ext uri="{BB962C8B-B14F-4D97-AF65-F5344CB8AC3E}">
-        <p14:creationId xmlns:p14="http://schemas.microsoft.com/office/powerpoint/2010/main" val="4017007276"/>
+        <p14:creationId xmlns:p14="http://schemas.microsoft.com/office/powerpoint/2010/main" val="2236143850"/>
       </p:ext>
     </p:extLst>
   </p:cSld>
@@ -812,76 +898,23 @@
           <a:bodyPr/>
           <a:lstStyle/>
           <a:p>
-            <a:pPr marL="0" marR="0" lvl="0" indent="0" algn="l" defTabSz="914400" rtl="0" eaLnBrk="1" fontAlgn="auto" latinLnBrk="0" hangingPunct="1">
-              <a:lnSpc>
-                <a:spcPct val="100000"/>
-              </a:lnSpc>
-              <a:spcBef>
-                <a:spcPts val="0"/>
-              </a:spcBef>
-              <a:spcAft>
-                <a:spcPts val="0"/>
-              </a:spcAft>
-              <a:buClrTx/>
-              <a:buSzTx/>
-              <a:buFontTx/>
-              <a:buNone/>
-              <a:tabLst/>
-              <a:defRPr/>
-            </a:pPr>
             <a:r>
               <a:rPr lang="en-US" dirty="0" smtClean="0"/>
-              <a:t>Docker utilizes</a:t>
+              <a:t>A</a:t>
             </a:r>
             <a:r>
               <a:rPr lang="en-US" baseline="0" dirty="0" smtClean="0"/>
-              <a:t> a client-server architecture. You execute Docker commands through a Docker client such as the Docker CLI or </a:t>
+              <a:t> virtual machine is -- well -- a virtualized machine created and managed by a hypervisor such as </a:t>
             </a:r>
             <a:r>
               <a:rPr lang="en-US" baseline="0" dirty="0" err="1" smtClean="0"/>
-              <a:t>Kitematic</a:t>
+              <a:t>VirtualBox</a:t>
             </a:r>
             <a:r>
               <a:rPr lang="en-US" baseline="0" dirty="0" smtClean="0"/>
-              <a:t>. The client uses REST commands to communicate with the Docker daemon running on a Docker host such as the Azure Container services. These commands can be used to push, pull (</a:t>
-            </a:r>
-            <a:r>
-              <a:rPr lang="en-US" b="1" baseline="0" dirty="0" err="1" smtClean="0"/>
-              <a:t>docker</a:t>
-            </a:r>
-            <a:r>
-              <a:rPr lang="en-US" b="1" baseline="0" dirty="0" smtClean="0"/>
-              <a:t> pull</a:t>
-            </a:r>
-            <a:r>
-              <a:rPr lang="en-US" baseline="0" dirty="0" smtClean="0"/>
-              <a:t>), and create Docker images, to run them in containers, and to manage those containers. Images can be built with the </a:t>
-            </a:r>
-            <a:r>
-              <a:rPr lang="en-US" b="1" baseline="0" dirty="0" err="1" smtClean="0"/>
-              <a:t>docker</a:t>
-            </a:r>
-            <a:r>
-              <a:rPr lang="en-US" b="1" baseline="0" dirty="0" smtClean="0"/>
-              <a:t> build</a:t>
-            </a:r>
-            <a:r>
-              <a:rPr lang="en-US" baseline="0" dirty="0" smtClean="0"/>
-              <a:t> command, and they can be stand-alone, or they can "inherit" from other images. Images are stored in Docker registries, which can be public or private, local or remote. Docker Hub is a popular public registry that is managed by Docker; it contains a "huge collection" of images that anyone may use. The </a:t>
-            </a:r>
-            <a:r>
-              <a:rPr lang="en-US" b="1" baseline="0" dirty="0" err="1" smtClean="0"/>
-              <a:t>docker</a:t>
-            </a:r>
-            <a:r>
-              <a:rPr lang="en-US" b="1" baseline="0" dirty="0" smtClean="0"/>
-              <a:t> run</a:t>
-            </a:r>
-            <a:r>
-              <a:rPr lang="en-US" baseline="0" dirty="0" smtClean="0"/>
-              <a:t> command runs a container using an image as a template.</a:t>
-            </a:r>
-            <a:endParaRPr lang="en-US" dirty="0" smtClean="0"/>
+              <a:t> or Hyper-V. Even though a VM runs on a machine that has an operating system, each VM requires its own complete operating system, even if it's the same operating system as the host OS. VMs offer a very high degree of isolation, but at a cost: longer startup times, lower portability (ever tried to move a 127 GB virtual hard disk, or VHD, from one PC to another?), and higher memory requirements. Containers, by contrast, leverage the operating system that is already in place but offer nearly as much separation. RAM requirements are lower since the OS isn't being duplicated in each container, and cost is lower, too, because while cloud platforms typically charge for each VM, a single VM can host multiple container instances.</a:t>
+            </a:r>
+            <a:endParaRPr lang="en-US" dirty="0"/>
           </a:p>
         </p:txBody>
       </p:sp>
@@ -911,7 +944,7 @@
     </p:spTree>
     <p:extLst>
       <p:ext uri="{BB962C8B-B14F-4D97-AF65-F5344CB8AC3E}">
-        <p14:creationId xmlns:p14="http://schemas.microsoft.com/office/powerpoint/2010/main" val="2815615228"/>
+        <p14:creationId xmlns:p14="http://schemas.microsoft.com/office/powerpoint/2010/main" val="3918904550"/>
       </p:ext>
     </p:extLst>
   </p:cSld>
@@ -967,19 +1000,19 @@
           <a:p>
             <a:r>
               <a:rPr lang="en-US" dirty="0" smtClean="0"/>
-              <a:t>The Docker Client,</a:t>
+              <a:t>Docker (www.docker.com) isn't the world's only containerization platform, but it is the most popular. It is free, open-source,</a:t>
             </a:r>
             <a:r>
               <a:rPr lang="en-US" baseline="0" dirty="0" smtClean="0"/>
-              <a:t> also known as the Docker CLI, is the primary tool you use to manage Docker containers. You can download container images from repositories such as Docker Hub, build container images, run container instances, list container images and instances, and much more. After connecting to Azure Container Service using SSH, you can use port forwarding to execute commands locally that act on an Azure Container Service running in the cloud. In this example, the -H switch used with the </a:t>
-            </a:r>
-            <a:r>
-              <a:rPr lang="en-US" b="1" baseline="0" dirty="0" err="1" smtClean="0"/>
-              <a:t>docker</a:t>
+              <a:t> and Linux-based, with Windows support (Windows Server 2016) in the works. </a:t>
+            </a:r>
+            <a:r>
+              <a:rPr lang="en-US" dirty="0" smtClean="0"/>
+              <a:t>It has earned massive</a:t>
             </a:r>
             <a:r>
               <a:rPr lang="en-US" baseline="0" dirty="0" smtClean="0"/>
-              <a:t> commands forwards commands sent to port 22375 on localhost to the Azure Container Services via SSH.</a:t>
+              <a:t> mindshare in the developer community. And with Azure Container Service, you can deploy Docker containers to Azure with minimal effort. Moreover, Docker containers are easily moved between Azure and Amazon Web Services (AWS), affording developers portability between cloud platforms.</a:t>
             </a:r>
             <a:endParaRPr lang="en-US" dirty="0"/>
           </a:p>
@@ -1011,7 +1044,7 @@
     </p:spTree>
     <p:extLst>
       <p:ext uri="{BB962C8B-B14F-4D97-AF65-F5344CB8AC3E}">
-        <p14:creationId xmlns:p14="http://schemas.microsoft.com/office/powerpoint/2010/main" val="999235491"/>
+        <p14:creationId xmlns:p14="http://schemas.microsoft.com/office/powerpoint/2010/main" val="4017007276"/>
       </p:ext>
     </p:extLst>
   </p:cSld>
@@ -1084,11 +1117,19 @@
             </a:pPr>
             <a:r>
               <a:rPr lang="en-US" dirty="0" smtClean="0"/>
-              <a:t>This command pulls the image</a:t>
+              <a:t>Docker utilizes</a:t>
             </a:r>
             <a:r>
               <a:rPr lang="en-US" baseline="0" dirty="0" smtClean="0"/>
-              <a:t> named "Ubuntu" from Docker Hub (or a local registry if the image is cached there) and runs it interactively in a container. "Interactively" means standard input, output, and error are connected locally so you can provide input to the container and see its output. Of course, you are not limited to the "Ubuntu" image. You can specify other images and even create images of your own with </a:t>
+              <a:t> a client-server architecture. You execute Docker commands through a Docker client such as the Docker CLI or </a:t>
+            </a:r>
+            <a:r>
+              <a:rPr lang="en-US" baseline="0" dirty="0" err="1" smtClean="0"/>
+              <a:t>Kitematic</a:t>
+            </a:r>
+            <a:r>
+              <a:rPr lang="en-US" baseline="0" dirty="0" smtClean="0"/>
+              <a:t>. The client uses REST commands to communicate with the Docker daemon running on a Docker host such as the Azure Container services. These commands can be used to push, pull (</a:t>
             </a:r>
             <a:r>
               <a:rPr lang="en-US" b="1" baseline="0" dirty="0" err="1" smtClean="0"/>
@@ -1096,27 +1137,35 @@
             </a:r>
             <a:r>
               <a:rPr lang="en-US" b="1" baseline="0" dirty="0" smtClean="0"/>
-              <a:t> build</a:t>
+              <a:t> pull</a:t>
             </a:r>
             <a:r>
               <a:rPr lang="en-US" baseline="0" dirty="0" smtClean="0"/>
-              <a:t>. Where the container runs depends on the context. The container can run locally in a </a:t>
-            </a:r>
-            <a:r>
-              <a:rPr lang="en-US" baseline="0" dirty="0" err="1" smtClean="0"/>
-              <a:t>docker</a:t>
-            </a:r>
-            <a:r>
-              <a:rPr lang="en-US" baseline="0" dirty="0" smtClean="0"/>
-              <a:t> host (for example, a VM on Windows), or it can remotely if you connect to a remote Docker daemon (for example, one running in Azure) via SSH tunneling and use port forwarding to forward </a:t>
+              <a:t>), and create Docker images, to run them in containers, and to manage those containers. Images can be built with the </a:t>
             </a:r>
             <a:r>
               <a:rPr lang="en-US" b="1" baseline="0" dirty="0" err="1" smtClean="0"/>
               <a:t>docker</a:t>
             </a:r>
             <a:r>
+              <a:rPr lang="en-US" b="1" baseline="0" dirty="0" smtClean="0"/>
+              <a:t> build</a:t>
+            </a:r>
+            <a:r>
               <a:rPr lang="en-US" baseline="0" dirty="0" smtClean="0"/>
-              <a:t> commands to the daemon.</a:t>
+              <a:t> command, and they can be stand-alone, or they can "inherit" from other images. Images are stored in Docker registries, which can be public or private, local or remote. Docker Hub is a popular public registry that is managed by Docker; it contains a "huge collection" of images that anyone may use. The </a:t>
+            </a:r>
+            <a:r>
+              <a:rPr lang="en-US" b="1" baseline="0" dirty="0" err="1" smtClean="0"/>
+              <a:t>docker</a:t>
+            </a:r>
+            <a:r>
+              <a:rPr lang="en-US" b="1" baseline="0" dirty="0" smtClean="0"/>
+              <a:t> run</a:t>
+            </a:r>
+            <a:r>
+              <a:rPr lang="en-US" baseline="0" dirty="0" smtClean="0"/>
+              <a:t> command runs a container using an image as a template.</a:t>
             </a:r>
             <a:endParaRPr lang="en-US" dirty="0" smtClean="0"/>
           </a:p>
@@ -1148,7 +1197,7 @@
     </p:spTree>
     <p:extLst>
       <p:ext uri="{BB962C8B-B14F-4D97-AF65-F5344CB8AC3E}">
-        <p14:creationId xmlns:p14="http://schemas.microsoft.com/office/powerpoint/2010/main" val="2246746569"/>
+        <p14:creationId xmlns:p14="http://schemas.microsoft.com/office/powerpoint/2010/main" val="2815615228"/>
       </p:ext>
     </p:extLst>
   </p:cSld>
@@ -1202,128 +1251,23 @@
           <a:bodyPr/>
           <a:lstStyle/>
           <a:p>
-            <a:pPr marL="0" marR="0" lvl="0" indent="0" algn="l" defTabSz="914400" rtl="0" eaLnBrk="1" fontAlgn="auto" latinLnBrk="0" hangingPunct="1">
-              <a:lnSpc>
-                <a:spcPct val="100000"/>
-              </a:lnSpc>
-              <a:spcBef>
-                <a:spcPts val="0"/>
-              </a:spcBef>
-              <a:spcAft>
-                <a:spcPts val="0"/>
-              </a:spcAft>
-              <a:buClrTx/>
-              <a:buSzTx/>
-              <a:buFontTx/>
-              <a:buNone/>
-              <a:tabLst/>
-              <a:defRPr/>
-            </a:pPr>
             <a:r>
               <a:rPr lang="en-US" dirty="0" smtClean="0"/>
-              <a:t>These are some of the most commonly used </a:t>
-            </a:r>
-            <a:r>
-              <a:rPr lang="en-US" b="1" dirty="0" err="1" smtClean="0"/>
-              <a:t>docker</a:t>
-            </a:r>
-            <a:r>
-              <a:rPr lang="en-US" dirty="0" smtClean="0"/>
-              <a:t> commands. You can also use </a:t>
-            </a:r>
-            <a:r>
-              <a:rPr lang="en-US" b="1" dirty="0" err="1" smtClean="0"/>
-              <a:t>docker</a:t>
-            </a:r>
-            <a:r>
-              <a:rPr lang="en-US" b="1" dirty="0" smtClean="0"/>
-              <a:t> push</a:t>
-            </a:r>
-            <a:r>
-              <a:rPr lang="en-US" dirty="0" smtClean="0"/>
-              <a:t> to push an image to a registry</a:t>
+              <a:t>The Docker Client,</a:t>
             </a:r>
             <a:r>
               <a:rPr lang="en-US" baseline="0" dirty="0" smtClean="0"/>
-              <a:t> such as Docker Hub. Also, </a:t>
+              <a:t> also known as the Docker CLI, is the primary tool you use to manage Docker containers. You can download container images from repositories such as Docker Hub, build container images, run container instances, list container images and instances, and much more. After connecting to Azure Container Service using SSH, you can use port forwarding to execute commands locally that act on an Azure Container Service running in the cloud. In this example, the -H switch used with the </a:t>
             </a:r>
             <a:r>
               <a:rPr lang="en-US" b="1" baseline="0" dirty="0" err="1" smtClean="0"/>
               <a:t>docker</a:t>
             </a:r>
             <a:r>
-              <a:rPr lang="en-US" b="1" baseline="0" dirty="0" smtClean="0"/>
-              <a:t> </a:t>
-            </a:r>
-            <a:r>
-              <a:rPr lang="en-US" b="1" baseline="0" dirty="0" err="1" smtClean="0"/>
-              <a:t>ps</a:t>
-            </a:r>
-            <a:r>
               <a:rPr lang="en-US" baseline="0" dirty="0" smtClean="0"/>
-              <a:t> is often accompanied by a </a:t>
-            </a:r>
-            <a:r>
-              <a:rPr lang="en-US" b="1" baseline="0" dirty="0" smtClean="0"/>
-              <a:t>-a</a:t>
-            </a:r>
-            <a:r>
-              <a:rPr lang="en-US" baseline="0" dirty="0" smtClean="0"/>
-              <a:t> switch to list all containers, including those that are no longer running, while </a:t>
-            </a:r>
-            <a:r>
-              <a:rPr lang="en-US" b="1" baseline="0" dirty="0" err="1" smtClean="0"/>
-              <a:t>docker</a:t>
-            </a:r>
-            <a:r>
-              <a:rPr lang="en-US" b="1" baseline="0" dirty="0" smtClean="0"/>
-              <a:t> </a:t>
-            </a:r>
-            <a:r>
-              <a:rPr lang="en-US" b="1" baseline="0" dirty="0" err="1" smtClean="0"/>
-              <a:t>rm</a:t>
-            </a:r>
-            <a:r>
-              <a:rPr lang="en-US" baseline="0" dirty="0" smtClean="0"/>
-              <a:t> and </a:t>
-            </a:r>
-            <a:r>
-              <a:rPr lang="en-US" b="1" baseline="0" dirty="0" err="1" smtClean="0"/>
-              <a:t>docker</a:t>
-            </a:r>
-            <a:r>
-              <a:rPr lang="en-US" b="1" baseline="0" dirty="0" smtClean="0"/>
-              <a:t> </a:t>
-            </a:r>
-            <a:r>
-              <a:rPr lang="en-US" b="1" baseline="0" dirty="0" err="1" smtClean="0"/>
-              <a:t>rmi</a:t>
-            </a:r>
-            <a:r>
-              <a:rPr lang="en-US" baseline="0" dirty="0" smtClean="0"/>
-              <a:t> are used to delete (remove) containers and images, respectively. The </a:t>
-            </a:r>
-            <a:r>
-              <a:rPr lang="en-US" b="1" baseline="0" dirty="0" err="1" smtClean="0"/>
-              <a:t>docker</a:t>
-            </a:r>
-            <a:r>
-              <a:rPr lang="en-US" b="1" baseline="0" dirty="0" smtClean="0"/>
-              <a:t> build</a:t>
-            </a:r>
-            <a:r>
-              <a:rPr lang="en-US" baseline="0" dirty="0" smtClean="0"/>
-              <a:t> command uses a </a:t>
-            </a:r>
-            <a:r>
-              <a:rPr lang="en-US" baseline="0" dirty="0" err="1" smtClean="0"/>
-              <a:t>Dockerfile</a:t>
-            </a:r>
-            <a:r>
-              <a:rPr lang="en-US" baseline="0" dirty="0" smtClean="0"/>
-              <a:t> (a text file containing build commands) and a "context" -- for example, a specified directory in the file system -- to build Docker images.</a:t>
-            </a:r>
-            <a:endParaRPr lang="en-US" dirty="0" smtClean="0"/>
+              <a:t> commands forwards commands sent to port 22375 on localhost to the Azure Container Services via SSH.</a:t>
+            </a:r>
+            <a:endParaRPr lang="en-US" dirty="0"/>
           </a:p>
         </p:txBody>
       </p:sp>
@@ -1353,7 +1297,7 @@
     </p:spTree>
     <p:extLst>
       <p:ext uri="{BB962C8B-B14F-4D97-AF65-F5344CB8AC3E}">
-        <p14:creationId xmlns:p14="http://schemas.microsoft.com/office/powerpoint/2010/main" val="1832625065"/>
+        <p14:creationId xmlns:p14="http://schemas.microsoft.com/office/powerpoint/2010/main" val="999235491"/>
       </p:ext>
     </p:extLst>
   </p:cSld>
@@ -1407,19 +1351,60 @@
           <a:bodyPr/>
           <a:lstStyle/>
           <a:p>
+            <a:pPr marL="0" marR="0" lvl="0" indent="0" algn="l" defTabSz="914400" rtl="0" eaLnBrk="1" fontAlgn="auto" latinLnBrk="0" hangingPunct="1">
+              <a:lnSpc>
+                <a:spcPct val="100000"/>
+              </a:lnSpc>
+              <a:spcBef>
+                <a:spcPts val="0"/>
+              </a:spcBef>
+              <a:spcAft>
+                <a:spcPts val="0"/>
+              </a:spcAft>
+              <a:buClrTx/>
+              <a:buSzTx/>
+              <a:buFontTx/>
+              <a:buNone/>
+              <a:tabLst/>
+              <a:defRPr/>
+            </a:pPr>
             <a:r>
               <a:rPr lang="en-US" dirty="0" smtClean="0"/>
-              <a:t>From the documentation: "Azure Container Service makes it simpler for you to create, configure, and manage a cluster of virtual machines that are preconfigured to run containerized applications. It uses an optimized configuration of popular open-source scheduling and orchestration tools. This enables you to use your existing skills, or draw upon a large and growing body of community expertise, to deploy and manage container-based applications on Microsoft Azure." ACS supports Linux containers and Windows containers. The latter rely</a:t>
+              <a:t>This command pulls the image</a:t>
             </a:r>
             <a:r>
               <a:rPr lang="en-US" baseline="0" dirty="0" smtClean="0"/>
-              <a:t> on </a:t>
-            </a:r>
-            <a:r>
-              <a:rPr lang="en-US" dirty="0" smtClean="0"/>
-              <a:t>Windows Server 2016.</a:t>
-            </a:r>
-            <a:endParaRPr lang="en-US" dirty="0"/>
+              <a:t> named "Ubuntu" from Docker Hub (or a local registry if the image is cached there) and runs it interactively in a container. "Interactively" means standard input, output, and error are connected locally so you can provide input to the container and see its output. Of course, you are not limited to the "Ubuntu" image. You can specify other images and even create images of your own with </a:t>
+            </a:r>
+            <a:r>
+              <a:rPr lang="en-US" b="1" baseline="0" dirty="0" err="1" smtClean="0"/>
+              <a:t>docker</a:t>
+            </a:r>
+            <a:r>
+              <a:rPr lang="en-US" b="1" baseline="0" dirty="0" smtClean="0"/>
+              <a:t> build</a:t>
+            </a:r>
+            <a:r>
+              <a:rPr lang="en-US" baseline="0" dirty="0" smtClean="0"/>
+              <a:t>. Where the container runs depends on the context. The container can run locally in a </a:t>
+            </a:r>
+            <a:r>
+              <a:rPr lang="en-US" baseline="0" dirty="0" err="1" smtClean="0"/>
+              <a:t>docker</a:t>
+            </a:r>
+            <a:r>
+              <a:rPr lang="en-US" baseline="0" dirty="0" smtClean="0"/>
+              <a:t> host (for example, a VM on Windows), or it can remotely if you connect to a remote Docker daemon (for example, one running in Azure) via SSH tunneling and use port forwarding to forward </a:t>
+            </a:r>
+            <a:r>
+              <a:rPr lang="en-US" b="1" baseline="0" dirty="0" err="1" smtClean="0"/>
+              <a:t>docker</a:t>
+            </a:r>
+            <a:r>
+              <a:rPr lang="en-US" baseline="0" dirty="0" smtClean="0"/>
+              <a:t> commands to the daemon.</a:t>
+            </a:r>
+            <a:endParaRPr lang="en-US" dirty="0" smtClean="0"/>
           </a:p>
         </p:txBody>
       </p:sp>
@@ -1449,7 +1434,7 @@
     </p:spTree>
     <p:extLst>
       <p:ext uri="{BB962C8B-B14F-4D97-AF65-F5344CB8AC3E}">
-        <p14:creationId xmlns:p14="http://schemas.microsoft.com/office/powerpoint/2010/main" val="36852900"/>
+        <p14:creationId xmlns:p14="http://schemas.microsoft.com/office/powerpoint/2010/main" val="2246746569"/>
       </p:ext>
     </p:extLst>
   </p:cSld>
@@ -1503,15 +1488,128 @@
           <a:bodyPr/>
           <a:lstStyle/>
           <a:p>
+            <a:pPr marL="0" marR="0" lvl="0" indent="0" algn="l" defTabSz="914400" rtl="0" eaLnBrk="1" fontAlgn="auto" latinLnBrk="0" hangingPunct="1">
+              <a:lnSpc>
+                <a:spcPct val="100000"/>
+              </a:lnSpc>
+              <a:spcBef>
+                <a:spcPts val="0"/>
+              </a:spcBef>
+              <a:spcAft>
+                <a:spcPts val="0"/>
+              </a:spcAft>
+              <a:buClrTx/>
+              <a:buSzTx/>
+              <a:buFontTx/>
+              <a:buNone/>
+              <a:tabLst/>
+              <a:defRPr/>
+            </a:pPr>
             <a:r>
               <a:rPr lang="en-US" dirty="0" smtClean="0"/>
-              <a:t>Here's what happens in Azure</a:t>
+              <a:t>These are some of the most commonly used </a:t>
+            </a:r>
+            <a:r>
+              <a:rPr lang="en-US" b="1" dirty="0" err="1" smtClean="0"/>
+              <a:t>docker</a:t>
+            </a:r>
+            <a:r>
+              <a:rPr lang="en-US" dirty="0" smtClean="0"/>
+              <a:t> commands. You can also use </a:t>
+            </a:r>
+            <a:r>
+              <a:rPr lang="en-US" b="1" dirty="0" err="1" smtClean="0"/>
+              <a:t>docker</a:t>
+            </a:r>
+            <a:r>
+              <a:rPr lang="en-US" b="1" dirty="0" smtClean="0"/>
+              <a:t> push</a:t>
+            </a:r>
+            <a:r>
+              <a:rPr lang="en-US" dirty="0" smtClean="0"/>
+              <a:t> to push an image to a registry</a:t>
             </a:r>
             <a:r>
               <a:rPr lang="en-US" baseline="0" dirty="0" smtClean="0"/>
-              <a:t> when you create an Azure Container Service with Docker Swarm as the orchestrator. Azure creates one or more master VMs to control the "swarm" of containers, as well as a Virtual Machine Scale Set, which provides the "agent" VMs in which containers run. All these VMs communicate over a private virtual network. To communicate with Docker Swarm in a master VM from a Docker client running on a local machine, you establish an SSH tunnel that forwards the local port 22375 to port 2375 in the VM (via SSH port 2200). This allows you to execute local commands that load container images and run containers in the cloud. Docker Swarm manages the container instances in the agent VMs as well as the agent VMs themselves. You don't have to know this to use Azure Container Service, but it does help explain various port forwarding commands that you employ when running the Docker client on a local machine connected to Azure.</a:t>
-            </a:r>
-            <a:endParaRPr lang="en-US" dirty="0"/>
+              <a:t> such as Docker Hub. Also, </a:t>
+            </a:r>
+            <a:r>
+              <a:rPr lang="en-US" b="1" baseline="0" dirty="0" err="1" smtClean="0"/>
+              <a:t>docker</a:t>
+            </a:r>
+            <a:r>
+              <a:rPr lang="en-US" b="1" baseline="0" dirty="0" smtClean="0"/>
+              <a:t> </a:t>
+            </a:r>
+            <a:r>
+              <a:rPr lang="en-US" b="1" baseline="0" dirty="0" err="1" smtClean="0"/>
+              <a:t>ps</a:t>
+            </a:r>
+            <a:r>
+              <a:rPr lang="en-US" baseline="0" dirty="0" smtClean="0"/>
+              <a:t> is often accompanied by a </a:t>
+            </a:r>
+            <a:r>
+              <a:rPr lang="en-US" b="1" baseline="0" dirty="0" smtClean="0"/>
+              <a:t>-a</a:t>
+            </a:r>
+            <a:r>
+              <a:rPr lang="en-US" baseline="0" dirty="0" smtClean="0"/>
+              <a:t> switch to list all containers, including those that are no longer running, while </a:t>
+            </a:r>
+            <a:r>
+              <a:rPr lang="en-US" b="1" baseline="0" dirty="0" err="1" smtClean="0"/>
+              <a:t>docker</a:t>
+            </a:r>
+            <a:r>
+              <a:rPr lang="en-US" b="1" baseline="0" dirty="0" smtClean="0"/>
+              <a:t> </a:t>
+            </a:r>
+            <a:r>
+              <a:rPr lang="en-US" b="1" baseline="0" dirty="0" err="1" smtClean="0"/>
+              <a:t>rm</a:t>
+            </a:r>
+            <a:r>
+              <a:rPr lang="en-US" baseline="0" dirty="0" smtClean="0"/>
+              <a:t> and </a:t>
+            </a:r>
+            <a:r>
+              <a:rPr lang="en-US" b="1" baseline="0" dirty="0" err="1" smtClean="0"/>
+              <a:t>docker</a:t>
+            </a:r>
+            <a:r>
+              <a:rPr lang="en-US" b="1" baseline="0" dirty="0" smtClean="0"/>
+              <a:t> </a:t>
+            </a:r>
+            <a:r>
+              <a:rPr lang="en-US" b="1" baseline="0" dirty="0" err="1" smtClean="0"/>
+              <a:t>rmi</a:t>
+            </a:r>
+            <a:r>
+              <a:rPr lang="en-US" baseline="0" dirty="0" smtClean="0"/>
+              <a:t> are used to delete (remove) containers and images, respectively. The </a:t>
+            </a:r>
+            <a:r>
+              <a:rPr lang="en-US" b="1" baseline="0" dirty="0" err="1" smtClean="0"/>
+              <a:t>docker</a:t>
+            </a:r>
+            <a:r>
+              <a:rPr lang="en-US" b="1" baseline="0" dirty="0" smtClean="0"/>
+              <a:t> build</a:t>
+            </a:r>
+            <a:r>
+              <a:rPr lang="en-US" baseline="0" dirty="0" smtClean="0"/>
+              <a:t> command uses a </a:t>
+            </a:r>
+            <a:r>
+              <a:rPr lang="en-US" baseline="0" dirty="0" err="1" smtClean="0"/>
+              <a:t>Dockerfile</a:t>
+            </a:r>
+            <a:r>
+              <a:rPr lang="en-US" baseline="0" dirty="0" smtClean="0"/>
+              <a:t> (a text file containing build commands) and a "context" -- for example, a specified directory in the file system -- to build Docker images.</a:t>
+            </a:r>
+            <a:endParaRPr lang="en-US" dirty="0" smtClean="0"/>
           </a:p>
         </p:txBody>
       </p:sp>
@@ -1541,7 +1639,7 @@
     </p:spTree>
     <p:extLst>
       <p:ext uri="{BB962C8B-B14F-4D97-AF65-F5344CB8AC3E}">
-        <p14:creationId xmlns:p14="http://schemas.microsoft.com/office/powerpoint/2010/main" val="2302495390"/>
+        <p14:creationId xmlns:p14="http://schemas.microsoft.com/office/powerpoint/2010/main" val="1832625065"/>
       </p:ext>
     </p:extLst>
   </p:cSld>
@@ -1595,108 +1693,19 @@
           <a:bodyPr/>
           <a:lstStyle/>
           <a:p>
-            <a:pPr marL="0" marR="0" lvl="0" indent="0" algn="l" defTabSz="914400" rtl="0" eaLnBrk="1" fontAlgn="auto" latinLnBrk="0" hangingPunct="1">
-              <a:lnSpc>
-                <a:spcPct val="100000"/>
-              </a:lnSpc>
-              <a:spcBef>
-                <a:spcPts val="0"/>
-              </a:spcBef>
-              <a:spcAft>
-                <a:spcPts val="0"/>
-              </a:spcAft>
-              <a:buClrTx/>
-              <a:buSzTx/>
-              <a:buFontTx/>
-              <a:buNone/>
-              <a:tabLst/>
-              <a:defRPr/>
-            </a:pPr>
-            <a:r>
-              <a:rPr lang="en-US" sz="1200" b="0" i="0" kern="1200" dirty="0" smtClean="0">
-                <a:solidFill>
-                  <a:schemeClr val="tx1"/>
-                </a:solidFill>
-                <a:effectLst/>
-                <a:latin typeface="+mn-lt"/>
-                <a:ea typeface="+mn-ea"/>
-                <a:cs typeface="+mn-cs"/>
-              </a:rPr>
-              <a:t>This command works</a:t>
-            </a:r>
-            <a:r>
-              <a:rPr lang="en-US" sz="1200" b="0" i="0" kern="1200" baseline="0" dirty="0" smtClean="0">
-                <a:solidFill>
-                  <a:schemeClr val="tx1"/>
-                </a:solidFill>
-                <a:effectLst/>
-                <a:latin typeface="+mn-lt"/>
-                <a:ea typeface="+mn-ea"/>
-                <a:cs typeface="+mn-cs"/>
-              </a:rPr>
-              <a:t> in a terminal window on OS X or Linux. (Windows users need to use a third-party SSH tool such as </a:t>
-            </a:r>
-            <a:r>
-              <a:rPr lang="en-US" sz="1200" b="0" i="0" kern="1200" baseline="0" dirty="0" err="1" smtClean="0">
-                <a:solidFill>
-                  <a:schemeClr val="tx1"/>
-                </a:solidFill>
-                <a:effectLst/>
-                <a:latin typeface="+mn-lt"/>
-                <a:ea typeface="+mn-ea"/>
-                <a:cs typeface="+mn-cs"/>
-              </a:rPr>
-              <a:t>PuTTY</a:t>
-            </a:r>
-            <a:r>
-              <a:rPr lang="en-US" sz="1200" b="0" i="0" kern="1200" baseline="0" dirty="0" smtClean="0">
-                <a:solidFill>
-                  <a:schemeClr val="tx1"/>
-                </a:solidFill>
-                <a:effectLst/>
-                <a:latin typeface="+mn-lt"/>
-                <a:ea typeface="+mn-ea"/>
-                <a:cs typeface="+mn-cs"/>
-              </a:rPr>
-              <a:t>.) </a:t>
-            </a:r>
-            <a:r>
-              <a:rPr lang="en-US" sz="1200" b="0" i="0" kern="1200" dirty="0" smtClean="0">
-                <a:solidFill>
-                  <a:schemeClr val="tx1"/>
-                </a:solidFill>
-                <a:effectLst/>
-                <a:latin typeface="+mn-lt"/>
-                <a:ea typeface="+mn-ea"/>
-                <a:cs typeface="+mn-cs"/>
-              </a:rPr>
-              <a:t>The purpose of the -L switch is to forward traffic transmitted through port 22375 on the local machine (that's the port used by the</a:t>
-            </a:r>
-            <a:r>
-              <a:rPr lang="en-US" sz="1200" b="0" i="0" kern="1200" baseline="0" dirty="0" smtClean="0">
-                <a:solidFill>
-                  <a:schemeClr val="tx1"/>
-                </a:solidFill>
-                <a:effectLst/>
-                <a:latin typeface="+mn-lt"/>
-                <a:ea typeface="+mn-ea"/>
-                <a:cs typeface="+mn-cs"/>
-              </a:rPr>
-              <a:t> Docker</a:t>
-            </a:r>
-            <a:r>
-              <a:rPr lang="en-US" sz="1200" b="0" i="0" kern="1200" dirty="0" smtClean="0">
-                <a:solidFill>
-                  <a:schemeClr val="tx1"/>
-                </a:solidFill>
-                <a:effectLst/>
-                <a:latin typeface="+mn-lt"/>
-                <a:ea typeface="+mn-ea"/>
-                <a:cs typeface="+mn-cs"/>
-              </a:rPr>
-              <a:t> CLI) to port 2375 at the other end. Docker Swarm listens on port 2375. The -p switch instructs SSH to use port 2200 rather than the default 22. The load balancer you're connecting to listens on port 2200 and forwards the SSH messages it receives to port 22 on the master VM.</a:t>
-            </a:r>
-            <a:endParaRPr lang="en-US" dirty="0" smtClean="0"/>
+            <a:r>
+              <a:rPr lang="en-US" dirty="0" smtClean="0"/>
+              <a:t>From the documentation: "Azure Container Service makes it simpler for you to create, configure, and manage a cluster of virtual machines that are preconfigured to run containerized applications. It uses an optimized configuration of popular open-source scheduling and orchestration tools. This enables you to use your existing skills, or draw upon a large and growing body of community expertise, to deploy and manage container-based applications on Microsoft Azure." ACS supports Linux containers and Windows containers. The latter rely</a:t>
+            </a:r>
+            <a:r>
+              <a:rPr lang="en-US" baseline="0" dirty="0" smtClean="0"/>
+              <a:t> on </a:t>
+            </a:r>
+            <a:r>
+              <a:rPr lang="en-US" dirty="0" smtClean="0"/>
+              <a:t>Windows Server 2016.</a:t>
+            </a:r>
+            <a:endParaRPr lang="en-US" dirty="0"/>
           </a:p>
         </p:txBody>
       </p:sp>
@@ -1726,7 +1735,99 @@
     </p:spTree>
     <p:extLst>
       <p:ext uri="{BB962C8B-B14F-4D97-AF65-F5344CB8AC3E}">
-        <p14:creationId xmlns:p14="http://schemas.microsoft.com/office/powerpoint/2010/main" val="3975244300"/>
+        <p14:creationId xmlns:p14="http://schemas.microsoft.com/office/powerpoint/2010/main" val="36852900"/>
+      </p:ext>
+    </p:extLst>
+  </p:cSld>
+  <p:clrMapOvr>
+    <a:masterClrMapping/>
+  </p:clrMapOvr>
+</p:notes>
+</file>
+
+<file path=ppt/notesSlides/notesSlide19.xml><?xml version="1.0" encoding="utf-8"?>
+<p:notes xmlns:a="http://schemas.openxmlformats.org/drawingml/2006/main" xmlns:r="http://schemas.openxmlformats.org/officeDocument/2006/relationships" xmlns:p="http://schemas.openxmlformats.org/presentationml/2006/main">
+  <p:cSld>
+    <p:spTree>
+      <p:nvGrpSpPr>
+        <p:cNvPr id="1" name=""/>
+        <p:cNvGrpSpPr/>
+        <p:nvPr/>
+      </p:nvGrpSpPr>
+      <p:grpSpPr>
+        <a:xfrm>
+          <a:off x="0" y="0"/>
+          <a:ext cx="0" cy="0"/>
+          <a:chOff x="0" y="0"/>
+          <a:chExt cx="0" cy="0"/>
+        </a:xfrm>
+      </p:grpSpPr>
+      <p:sp>
+        <p:nvSpPr>
+          <p:cNvPr id="2" name="Slide Image Placeholder 1"/>
+          <p:cNvSpPr>
+            <a:spLocks noGrp="1" noRot="1" noChangeAspect="1"/>
+          </p:cNvSpPr>
+          <p:nvPr>
+            <p:ph type="sldImg"/>
+          </p:nvPr>
+        </p:nvSpPr>
+        <p:spPr/>
+      </p:sp>
+      <p:sp>
+        <p:nvSpPr>
+          <p:cNvPr id="3" name="Notes Placeholder 2"/>
+          <p:cNvSpPr>
+            <a:spLocks noGrp="1"/>
+          </p:cNvSpPr>
+          <p:nvPr>
+            <p:ph type="body" idx="1"/>
+          </p:nvPr>
+        </p:nvSpPr>
+        <p:spPr/>
+        <p:txBody>
+          <a:bodyPr/>
+          <a:lstStyle/>
+          <a:p>
+            <a:r>
+              <a:rPr lang="en-US" dirty="0" smtClean="0"/>
+              <a:t>Here's what happens in Azure</a:t>
+            </a:r>
+            <a:r>
+              <a:rPr lang="en-US" baseline="0" dirty="0" smtClean="0"/>
+              <a:t> when you create an Azure Container Service with Docker Swarm as the orchestrator. Azure creates one or more master VMs to control the "swarm" of containers, as well as a Virtual Machine Scale Set, which provides the "agent" VMs in which containers run. All these VMs communicate over a private virtual network. To communicate with Docker Swarm in a master VM from a Docker client running on a local machine, you establish an SSH tunnel that forwards the local port 22375 to port 2375 in the VM (via SSH port 2200). This allows you to execute local commands that load container images and run containers in the cloud. Docker Swarm manages the container instances in the agent VMs as well as the agent VMs themselves. You don't have to know this to use Azure Container Service, but it does help explain various port forwarding commands that you employ when running the Docker client on a local machine connected to Azure.</a:t>
+            </a:r>
+            <a:endParaRPr lang="en-US" dirty="0"/>
+          </a:p>
+        </p:txBody>
+      </p:sp>
+      <p:sp>
+        <p:nvSpPr>
+          <p:cNvPr id="4" name="Slide Number Placeholder 3"/>
+          <p:cNvSpPr>
+            <a:spLocks noGrp="1"/>
+          </p:cNvSpPr>
+          <p:nvPr>
+            <p:ph type="sldNum" sz="quarter" idx="10"/>
+          </p:nvPr>
+        </p:nvSpPr>
+        <p:spPr/>
+        <p:txBody>
+          <a:bodyPr/>
+          <a:lstStyle/>
+          <a:p>
+            <a:fld id="{01283FAC-A721-45A3-BBDE-EAF2B09B7CD9}" type="slidenum">
+              <a:rPr lang="en-US" smtClean="0"/>
+              <a:t>19</a:t>
+            </a:fld>
+            <a:endParaRPr lang="en-US"/>
+          </a:p>
+        </p:txBody>
+      </p:sp>
+    </p:spTree>
+    <p:extLst>
+      <p:ext uri="{BB962C8B-B14F-4D97-AF65-F5344CB8AC3E}">
+        <p14:creationId xmlns:p14="http://schemas.microsoft.com/office/powerpoint/2010/main" val="2302495390"/>
       </p:ext>
     </p:extLst>
   </p:cSld>
@@ -1780,8 +1881,134 @@
           <a:bodyPr/>
           <a:lstStyle/>
           <a:p>
-            <a:r>
-              <a:rPr lang="en-US" sz="1200" kern="1200" dirty="0" smtClean="0">
+            <a:pPr marL="0" marR="0" lvl="0" indent="0" algn="l" defTabSz="914400" rtl="0" eaLnBrk="1" fontAlgn="auto" latinLnBrk="0" hangingPunct="1">
+              <a:lnSpc>
+                <a:spcPct val="100000"/>
+              </a:lnSpc>
+              <a:spcBef>
+                <a:spcPts val="0"/>
+              </a:spcBef>
+              <a:spcAft>
+                <a:spcPts val="0"/>
+              </a:spcAft>
+              <a:buClrTx/>
+              <a:buSzTx/>
+              <a:buFontTx/>
+              <a:buNone/>
+              <a:tabLst/>
+              <a:defRPr/>
+            </a:pPr>
+            <a:r>
+              <a:rPr lang="en-US" dirty="0" smtClean="0"/>
+              <a:t>High-performance computing (HPC)</a:t>
+            </a:r>
+            <a:r>
+              <a:rPr lang="en-US" baseline="0" dirty="0" smtClean="0"/>
+              <a:t> typically refers to computing power beyond that of a typical desktop computer. Obviously, the definition of high-performance changes with time as more computing power is crammed into smaller spaces, making the supercomputers of today commodity computers of tomorrow. Regardless though, the concepts of HPC have remained the same since the early days of computing wherein scientists and engineers worked to figure out how aggregate more computing resources to perform computing tasks.</a:t>
+            </a:r>
+            <a:endParaRPr lang="en-US" dirty="0" smtClean="0"/>
+          </a:p>
+        </p:txBody>
+      </p:sp>
+      <p:sp>
+        <p:nvSpPr>
+          <p:cNvPr id="4" name="Slide Number Placeholder 3"/>
+          <p:cNvSpPr>
+            <a:spLocks noGrp="1"/>
+          </p:cNvSpPr>
+          <p:nvPr>
+            <p:ph type="sldNum" sz="quarter" idx="10"/>
+          </p:nvPr>
+        </p:nvSpPr>
+        <p:spPr/>
+        <p:txBody>
+          <a:bodyPr/>
+          <a:lstStyle/>
+          <a:p>
+            <a:fld id="{01283FAC-A721-45A3-BBDE-EAF2B09B7CD9}" type="slidenum">
+              <a:rPr lang="en-US" smtClean="0"/>
+              <a:t>2</a:t>
+            </a:fld>
+            <a:endParaRPr lang="en-US"/>
+          </a:p>
+        </p:txBody>
+      </p:sp>
+    </p:spTree>
+    <p:extLst>
+      <p:ext uri="{BB962C8B-B14F-4D97-AF65-F5344CB8AC3E}">
+        <p14:creationId xmlns:p14="http://schemas.microsoft.com/office/powerpoint/2010/main" val="3514575438"/>
+      </p:ext>
+    </p:extLst>
+  </p:cSld>
+  <p:clrMapOvr>
+    <a:masterClrMapping/>
+  </p:clrMapOvr>
+</p:notes>
+</file>
+
+<file path=ppt/notesSlides/notesSlide20.xml><?xml version="1.0" encoding="utf-8"?>
+<p:notes xmlns:a="http://schemas.openxmlformats.org/drawingml/2006/main" xmlns:r="http://schemas.openxmlformats.org/officeDocument/2006/relationships" xmlns:p="http://schemas.openxmlformats.org/presentationml/2006/main">
+  <p:cSld>
+    <p:spTree>
+      <p:nvGrpSpPr>
+        <p:cNvPr id="1" name=""/>
+        <p:cNvGrpSpPr/>
+        <p:nvPr/>
+      </p:nvGrpSpPr>
+      <p:grpSpPr>
+        <a:xfrm>
+          <a:off x="0" y="0"/>
+          <a:ext cx="0" cy="0"/>
+          <a:chOff x="0" y="0"/>
+          <a:chExt cx="0" cy="0"/>
+        </a:xfrm>
+      </p:grpSpPr>
+      <p:sp>
+        <p:nvSpPr>
+          <p:cNvPr id="2" name="Slide Image Placeholder 1"/>
+          <p:cNvSpPr>
+            <a:spLocks noGrp="1" noRot="1" noChangeAspect="1"/>
+          </p:cNvSpPr>
+          <p:nvPr>
+            <p:ph type="sldImg"/>
+          </p:nvPr>
+        </p:nvSpPr>
+        <p:spPr/>
+      </p:sp>
+      <p:sp>
+        <p:nvSpPr>
+          <p:cNvPr id="3" name="Notes Placeholder 2"/>
+          <p:cNvSpPr>
+            <a:spLocks noGrp="1"/>
+          </p:cNvSpPr>
+          <p:nvPr>
+            <p:ph type="body" idx="1"/>
+          </p:nvPr>
+        </p:nvSpPr>
+        <p:spPr/>
+        <p:txBody>
+          <a:bodyPr/>
+          <a:lstStyle/>
+          <a:p>
+            <a:pPr marL="0" marR="0" lvl="0" indent="0" algn="l" defTabSz="914400" rtl="0" eaLnBrk="1" fontAlgn="auto" latinLnBrk="0" hangingPunct="1">
+              <a:lnSpc>
+                <a:spcPct val="100000"/>
+              </a:lnSpc>
+              <a:spcBef>
+                <a:spcPts val="0"/>
+              </a:spcBef>
+              <a:spcAft>
+                <a:spcPts val="0"/>
+              </a:spcAft>
+              <a:buClrTx/>
+              <a:buSzTx/>
+              <a:buFontTx/>
+              <a:buNone/>
+              <a:tabLst/>
+              <a:defRPr/>
+            </a:pPr>
+            <a:r>
+              <a:rPr lang="en-US" sz="1200" b="0" i="0" kern="1200" dirty="0" smtClean="0">
                 <a:solidFill>
                   <a:schemeClr val="tx1"/>
                 </a:solidFill>
@@ -1790,12 +2017,10 @@
                 <a:ea typeface="+mn-ea"/>
                 <a:cs typeface="+mn-cs"/>
               </a:rPr>
-              <a:t>With Azure, you deploy a cluster of VMs to the cloud in minutes and scale it up and down as needed. They can be Windows VMs or Linux VMs; Azure doesn’t care. In fact, Linux VMs are slightly less expensive because you don’t pay Windows licensing fees for them. You can also choose from a variety of virtual-machine sizes, and you can use deployment templates – something I’ll say more about shortly – to automate your deployments.</a:t>
-            </a:r>
-          </a:p>
-          <a:p>
-            <a:r>
-              <a:rPr lang="en-US" sz="1200" kern="1200" dirty="0" smtClean="0">
+              <a:t>This command works</a:t>
+            </a:r>
+            <a:r>
+              <a:rPr lang="en-US" sz="1200" b="0" i="0" kern="1200" baseline="0" dirty="0" smtClean="0">
                 <a:solidFill>
                   <a:schemeClr val="tx1"/>
                 </a:solidFill>
@@ -1804,12 +2029,10 @@
                 <a:ea typeface="+mn-ea"/>
                 <a:cs typeface="+mn-cs"/>
               </a:rPr>
-              <a:t> </a:t>
-            </a:r>
-          </a:p>
-          <a:p>
-            <a:r>
-              <a:rPr lang="en-US" sz="1200" kern="1200" dirty="0" smtClean="0">
+              <a:t> in a terminal window on OS X or Linux. (Windows users need to use a third-party SSH tool such as </a:t>
+            </a:r>
+            <a:r>
+              <a:rPr lang="en-US" sz="1200" b="0" i="0" kern="1200" baseline="0" dirty="0" err="1" smtClean="0">
                 <a:solidFill>
                   <a:schemeClr val="tx1"/>
                 </a:solidFill>
@@ -1818,8 +2041,57 @@
                 <a:ea typeface="+mn-ea"/>
                 <a:cs typeface="+mn-cs"/>
               </a:rPr>
-              <a:t>Azure Batch can also play a role in HPC by allowing you to schedule jobs to run across a pool of VMs, much like the batch-processing services frequently used on mainframes and supercomputers.</a:t>
-            </a:r>
+              <a:t>PuTTY</a:t>
+            </a:r>
+            <a:r>
+              <a:rPr lang="en-US" sz="1200" b="0" i="0" kern="1200" baseline="0" dirty="0" smtClean="0">
+                <a:solidFill>
+                  <a:schemeClr val="tx1"/>
+                </a:solidFill>
+                <a:effectLst/>
+                <a:latin typeface="+mn-lt"/>
+                <a:ea typeface="+mn-ea"/>
+                <a:cs typeface="+mn-cs"/>
+              </a:rPr>
+              <a:t>.) </a:t>
+            </a:r>
+            <a:r>
+              <a:rPr lang="en-US" sz="1200" b="0" i="0" kern="1200" dirty="0" smtClean="0">
+                <a:solidFill>
+                  <a:schemeClr val="tx1"/>
+                </a:solidFill>
+                <a:effectLst/>
+                <a:latin typeface="+mn-lt"/>
+                <a:ea typeface="+mn-ea"/>
+                <a:cs typeface="+mn-cs"/>
+              </a:rPr>
+              <a:t>The purpose of the -L switch is to forward traffic transmitted through port 22375 on the local machine (that's the port used by the</a:t>
+            </a:r>
+            <a:r>
+              <a:rPr lang="en-US" sz="1200" b="0" i="0" kern="1200" baseline="0" dirty="0" smtClean="0">
+                <a:solidFill>
+                  <a:schemeClr val="tx1"/>
+                </a:solidFill>
+                <a:effectLst/>
+                <a:latin typeface="+mn-lt"/>
+                <a:ea typeface="+mn-ea"/>
+                <a:cs typeface="+mn-cs"/>
+              </a:rPr>
+              <a:t> Docker</a:t>
+            </a:r>
+            <a:r>
+              <a:rPr lang="en-US" sz="1200" b="0" i="0" kern="1200" dirty="0" smtClean="0">
+                <a:solidFill>
+                  <a:schemeClr val="tx1"/>
+                </a:solidFill>
+                <a:effectLst/>
+                <a:latin typeface="+mn-lt"/>
+                <a:ea typeface="+mn-ea"/>
+                <a:cs typeface="+mn-cs"/>
+              </a:rPr>
+              <a:t> CLI) to port 2375 at the other end. Docker Swarm listens on port 2375. The -p switch instructs SSH to use port 2200 rather than the default 22. The load balancer you're connecting to listens on port 2200 and forwards the SSH messages it receives to port 22 on the master VM.</a:t>
+            </a:r>
+            <a:endParaRPr lang="en-US" dirty="0" smtClean="0"/>
           </a:p>
         </p:txBody>
       </p:sp>
@@ -1840,7 +2112,7 @@
           <a:p>
             <a:fld id="{01283FAC-A721-45A3-BBDE-EAF2B09B7CD9}" type="slidenum">
               <a:rPr lang="en-US" smtClean="0"/>
-              <a:t>2</a:t>
+              <a:t>20</a:t>
             </a:fld>
             <a:endParaRPr lang="en-US"/>
           </a:p>
@@ -1849,7 +2121,7 @@
     </p:spTree>
     <p:extLst>
       <p:ext uri="{BB962C8B-B14F-4D97-AF65-F5344CB8AC3E}">
-        <p14:creationId xmlns:p14="http://schemas.microsoft.com/office/powerpoint/2010/main" val="2710204306"/>
+        <p14:creationId xmlns:p14="http://schemas.microsoft.com/office/powerpoint/2010/main" val="3975244300"/>
       </p:ext>
     </p:extLst>
   </p:cSld>
@@ -1903,67 +2175,30 @@
           <a:bodyPr/>
           <a:lstStyle/>
           <a:p>
-            <a:r>
-              <a:rPr lang="en-US" sz="1200" kern="1200" dirty="0" smtClean="0">
-                <a:solidFill>
-                  <a:schemeClr val="tx1"/>
-                </a:solidFill>
-                <a:effectLst/>
-                <a:latin typeface="+mn-lt"/>
-                <a:ea typeface="+mn-ea"/>
-                <a:cs typeface="+mn-cs"/>
-              </a:rPr>
-              <a:t>Azure offers a variety of VM sizes in an effort to make sure there’s something to fit everyone’s needs. Each size is identified by a letter and a number: A0, D1, G2, and so on. There is documentation online detailing the specs for each machine – number of cores, amount of RAM, type and size of hard disk, for example – as well as the cost. Not surprisingly, more powerful machines are most costly as well. Prices range from as little as 7 cents an hour for a single core machine running Linux to almost $10 an hour for a machine with 32 cores and almost half a terabyte of RAM. The G-series machines are reserved for the most power-hungry applications.</a:t>
-            </a:r>
-          </a:p>
-          <a:p>
-            <a:r>
-              <a:rPr lang="en-US" sz="1200" kern="1200" dirty="0" smtClean="0">
-                <a:solidFill>
-                  <a:schemeClr val="tx1"/>
-                </a:solidFill>
-                <a:effectLst/>
-                <a:latin typeface="+mn-lt"/>
-                <a:ea typeface="+mn-ea"/>
-                <a:cs typeface="+mn-cs"/>
-              </a:rPr>
-              <a:t> </a:t>
-            </a:r>
-          </a:p>
-          <a:p>
-            <a:r>
-              <a:rPr lang="en-US" sz="1200" kern="1200" dirty="0" smtClean="0">
-                <a:solidFill>
-                  <a:schemeClr val="tx1"/>
-                </a:solidFill>
-                <a:effectLst/>
-                <a:latin typeface="+mn-lt"/>
-                <a:ea typeface="+mn-ea"/>
-                <a:cs typeface="+mn-cs"/>
-              </a:rPr>
-              <a:t>Costs can grow astronomically when you talk about clusters with hundreds or even thousands of cores. But cost isn’t really the point. The point is having massive amounts of computing power at your fingertips. Besides, the cost of “renting” even the largest virtual cluster pales in comparison to the cost of purchasing, setting up, and maintaining a similarly sized cluster of your own.</a:t>
-            </a:r>
-          </a:p>
-          <a:p>
-            <a:endParaRPr lang="en-US" dirty="0" smtClean="0"/>
-          </a:p>
-          <a:p>
+            <a:pPr marL="0" marR="0" lvl="0" indent="0" algn="l" defTabSz="914400" rtl="0" eaLnBrk="1" fontAlgn="auto" latinLnBrk="0" hangingPunct="1">
+              <a:lnSpc>
+                <a:spcPct val="100000"/>
+              </a:lnSpc>
+              <a:spcBef>
+                <a:spcPts val="0"/>
+              </a:spcBef>
+              <a:spcAft>
+                <a:spcPts val="0"/>
+              </a:spcAft>
+              <a:buClrTx/>
+              <a:buSzTx/>
+              <a:buFontTx/>
+              <a:buNone/>
+              <a:tabLst/>
+              <a:defRPr/>
+            </a:pPr>
             <a:r>
               <a:rPr lang="en-US" dirty="0" smtClean="0"/>
-              <a:t>Not all VM sizes are available in all data centers. For the latest pricing information and availability, see https://azure.microsoft.com/en-us/pricing/details/virtual-machines.</a:t>
-            </a:r>
-          </a:p>
-          <a:p>
-            <a:endParaRPr lang="en-US" dirty="0" smtClean="0"/>
-          </a:p>
-          <a:p>
-            <a:r>
-              <a:rPr lang="en-US" dirty="0" smtClean="0"/>
-              <a:t>N-series VMs are currently in preview</a:t>
+              <a:t>High</a:t>
             </a:r>
             <a:r>
               <a:rPr lang="en-US" baseline="0" dirty="0" smtClean="0"/>
-              <a:t> and are an answer to researchers who need GPU power to perform complex calculations. They are equipped with NVIDIA Tesla GPUs.</a:t>
+              <a:t>-performance computing is typically performed on a cluster of computers interconnected by a high-speed network. Workloads are sent to a master node which delegates tasks to the worker nodes. Historically, clusters were built using proprietary, often purpose-built computers. Recent trends though have shifted to using commodity hardware – the same kind of components used to build desktop computers – to construct HPC clusters. Engineers are getting even more clever with how they build clusters, too. The latest trend in HPC has been to use GPUs in addition to CPUs to created HPC clusters. While a typical desktop CPU has 2, 4, or 8 cores, graphics cards have usually hundreds of cores. These cores, while not as powerful as CPU cores, can still perform computations. HPC clusters are combining CPUs and GPUs to squeeze even more performance out of computer hardware for heavy workloads.</a:t>
             </a:r>
             <a:endParaRPr lang="en-US" dirty="0" smtClean="0"/>
           </a:p>
@@ -1995,7 +2230,7 @@
     </p:spTree>
     <p:extLst>
       <p:ext uri="{BB962C8B-B14F-4D97-AF65-F5344CB8AC3E}">
-        <p14:creationId xmlns:p14="http://schemas.microsoft.com/office/powerpoint/2010/main" val="2171044667"/>
+        <p14:creationId xmlns:p14="http://schemas.microsoft.com/office/powerpoint/2010/main" val="3654422300"/>
       </p:ext>
     </p:extLst>
   </p:cSld>
@@ -2049,30 +2284,45 @@
           <a:bodyPr/>
           <a:lstStyle/>
           <a:p>
-            <a:pPr marL="0" marR="0" lvl="0" indent="0" algn="l" defTabSz="914400" rtl="0" eaLnBrk="1" fontAlgn="auto" latinLnBrk="0" hangingPunct="1">
-              <a:lnSpc>
-                <a:spcPct val="100000"/>
-              </a:lnSpc>
-              <a:spcBef>
-                <a:spcPts val="0"/>
-              </a:spcBef>
-              <a:spcAft>
-                <a:spcPts val="0"/>
-              </a:spcAft>
-              <a:buClrTx/>
-              <a:buSzTx/>
-              <a:buFontTx/>
-              <a:buNone/>
-              <a:tabLst/>
-              <a:defRPr/>
-            </a:pPr>
-            <a:r>
-              <a:rPr lang="en-US" dirty="0" smtClean="0"/>
-              <a:t>For background,</a:t>
-            </a:r>
-            <a:r>
-              <a:rPr lang="en-US" baseline="0" dirty="0" smtClean="0"/>
-              <a:t> see https://blogs.msdn.microsoft.com/uk_faculty_connection/2016/09/12/choosing-the-most-appropiate-azure-virtual-machine-specification/?wt.mc_id=DX_873849. Not shown here are H machines, which are optimized for extremely heavy computing workloads.</a:t>
+            <a:r>
+              <a:rPr lang="en-US" sz="1200" kern="1200" dirty="0" smtClean="0">
+                <a:solidFill>
+                  <a:schemeClr val="tx1"/>
+                </a:solidFill>
+                <a:effectLst/>
+                <a:latin typeface="+mn-lt"/>
+                <a:ea typeface="+mn-ea"/>
+                <a:cs typeface="+mn-cs"/>
+              </a:rPr>
+              <a:t>With Azure, you deploy a cluster of VMs to the cloud in minutes and scale it up and down as needed. They can be Windows VMs or Linux VMs; Azure doesn’t care. In fact, Linux VMs are slightly less expensive because you don’t pay Windows licensing fees for them. You can also choose from a variety of virtual-machine sizes, and you can use deployment templates – something I’ll say more about shortly – to automate your deployments.</a:t>
+            </a:r>
+          </a:p>
+          <a:p>
+            <a:r>
+              <a:rPr lang="en-US" sz="1200" kern="1200" dirty="0" smtClean="0">
+                <a:solidFill>
+                  <a:schemeClr val="tx1"/>
+                </a:solidFill>
+                <a:effectLst/>
+                <a:latin typeface="+mn-lt"/>
+                <a:ea typeface="+mn-ea"/>
+                <a:cs typeface="+mn-cs"/>
+              </a:rPr>
+              <a:t> </a:t>
+            </a:r>
+          </a:p>
+          <a:p>
+            <a:r>
+              <a:rPr lang="en-US" sz="1200" kern="1200" dirty="0" smtClean="0">
+                <a:solidFill>
+                  <a:schemeClr val="tx1"/>
+                </a:solidFill>
+                <a:effectLst/>
+                <a:latin typeface="+mn-lt"/>
+                <a:ea typeface="+mn-ea"/>
+                <a:cs typeface="+mn-cs"/>
+              </a:rPr>
+              <a:t>Azure Batch can also play a role in HPC by allowing you to schedule jobs to run across a pool of VMs, much like the batch-processing services frequently used on mainframes and supercomputers.</a:t>
             </a:r>
           </a:p>
         </p:txBody>
@@ -2103,7 +2353,7 @@
     </p:spTree>
     <p:extLst>
       <p:ext uri="{BB962C8B-B14F-4D97-AF65-F5344CB8AC3E}">
-        <p14:creationId xmlns:p14="http://schemas.microsoft.com/office/powerpoint/2010/main" val="928529220"/>
+        <p14:creationId xmlns:p14="http://schemas.microsoft.com/office/powerpoint/2010/main" val="976261457"/>
       </p:ext>
     </p:extLst>
   </p:cSld>
@@ -2157,23 +2407,6 @@
           <a:bodyPr/>
           <a:lstStyle/>
           <a:p>
-            <a:pPr marL="0" marR="0" indent="0" algn="l" defTabSz="914400" rtl="0" eaLnBrk="1" fontAlgn="auto" latinLnBrk="0" hangingPunct="1">
-              <a:lnSpc>
-                <a:spcPct val="100000"/>
-              </a:lnSpc>
-              <a:spcBef>
-                <a:spcPts val="0"/>
-              </a:spcBef>
-              <a:spcAft>
-                <a:spcPts val="0"/>
-              </a:spcAft>
-              <a:buClrTx/>
-              <a:buSzTx/>
-              <a:buFontTx/>
-              <a:buNone/>
-              <a:tabLst/>
-              <a:defRPr/>
-            </a:pPr>
             <a:r>
               <a:rPr lang="en-US" sz="1200" kern="1200" dirty="0" smtClean="0">
                 <a:solidFill>
@@ -2184,7 +2417,57 @@
                 <a:ea typeface="+mn-ea"/>
                 <a:cs typeface="+mn-cs"/>
               </a:rPr>
-              <a:t>Here’s a quick look at three of the Azure VM sizes so you can see how they differ in cost and capability. One thing to keep in mind when deploying VMs is that you get charged for them whether they’re in use or not. When you’re finished using a VM or a cluster of VMs, it behooves you to go into the Azure portal and suspend each VM to avoid unnecessary charges. Once suspended, a VM is easily restarted so you can pick up where you left off and continue using it. I’ll show you how to start and stop VMs in the demo coming up shortly. I’ll also show you how to delete them so you can avoid even incurring storage charges for VMs that are no longer needed.</a:t>
+              <a:t>Azure offers a variety of VM sizes in an effort to make sure there’s something to fit everyone’s needs. Each size is identified by a letter and a number: A0, D1, G2, and so on. There is documentation online detailing the specs for each machine – number of cores, amount of RAM, type and size of hard disk, for example – as well as the cost. Not surprisingly, more powerful machines are most costly as well. Prices range from as little as 7 cents an hour for a single core machine running Linux to almost $10 an hour for a machine with 32 cores and almost half a terabyte of RAM. The G-series machines are reserved for the most power-hungry applications.</a:t>
+            </a:r>
+          </a:p>
+          <a:p>
+            <a:r>
+              <a:rPr lang="en-US" sz="1200" kern="1200" dirty="0" smtClean="0">
+                <a:solidFill>
+                  <a:schemeClr val="tx1"/>
+                </a:solidFill>
+                <a:effectLst/>
+                <a:latin typeface="+mn-lt"/>
+                <a:ea typeface="+mn-ea"/>
+                <a:cs typeface="+mn-cs"/>
+              </a:rPr>
+              <a:t> </a:t>
+            </a:r>
+          </a:p>
+          <a:p>
+            <a:r>
+              <a:rPr lang="en-US" sz="1200" kern="1200" dirty="0" smtClean="0">
+                <a:solidFill>
+                  <a:schemeClr val="tx1"/>
+                </a:solidFill>
+                <a:effectLst/>
+                <a:latin typeface="+mn-lt"/>
+                <a:ea typeface="+mn-ea"/>
+                <a:cs typeface="+mn-cs"/>
+              </a:rPr>
+              <a:t>Costs can grow astronomically when you talk about clusters with hundreds or even thousands of cores. But cost isn’t really the point. The point is having massive amounts of computing power at your fingertips. Besides, the cost of “renting” even the largest virtual cluster pales in comparison to the cost of purchasing, setting up, and maintaining a similarly sized cluster of your own.</a:t>
+            </a:r>
+          </a:p>
+          <a:p>
+            <a:endParaRPr lang="en-US" dirty="0" smtClean="0"/>
+          </a:p>
+          <a:p>
+            <a:r>
+              <a:rPr lang="en-US" dirty="0" smtClean="0"/>
+              <a:t>Not all VM sizes are available in all data centers. For the latest pricing information and availability, see https://azure.microsoft.com/en-us/pricing/details/virtual-machines.</a:t>
+            </a:r>
+          </a:p>
+          <a:p>
+            <a:endParaRPr lang="en-US" dirty="0" smtClean="0"/>
+          </a:p>
+          <a:p>
+            <a:r>
+              <a:rPr lang="en-US" dirty="0" smtClean="0"/>
+              <a:t>N-series VMs are currently in preview</a:t>
+            </a:r>
+            <a:r>
+              <a:rPr lang="en-US" baseline="0" dirty="0" smtClean="0"/>
+              <a:t> and are an answer to researchers who need GPU power to perform complex calculations. They are equipped with NVIDIA Tesla GPUs.</a:t>
             </a:r>
             <a:endParaRPr lang="en-US" dirty="0" smtClean="0"/>
           </a:p>
@@ -2216,7 +2499,7 @@
     </p:spTree>
     <p:extLst>
       <p:ext uri="{BB962C8B-B14F-4D97-AF65-F5344CB8AC3E}">
-        <p14:creationId xmlns:p14="http://schemas.microsoft.com/office/powerpoint/2010/main" val="2655584646"/>
+        <p14:creationId xmlns:p14="http://schemas.microsoft.com/office/powerpoint/2010/main" val="2171044667"/>
       </p:ext>
     </p:extLst>
   </p:cSld>
@@ -2270,123 +2553,31 @@
           <a:bodyPr/>
           <a:lstStyle/>
           <a:p>
-            <a:r>
-              <a:rPr lang="en-US" sz="1200" kern="1200" dirty="0" smtClean="0">
-                <a:solidFill>
-                  <a:schemeClr val="tx1"/>
-                </a:solidFill>
-                <a:effectLst/>
-                <a:latin typeface="+mn-lt"/>
-                <a:ea typeface="+mn-ea"/>
-                <a:cs typeface="+mn-cs"/>
-              </a:rPr>
-              <a:t>An important element of HPC in Azure is the Azure Resource Manager. The Azure Resource Manager is a relatively recent addition to Azure. It lets you combine the resources that comprise an application – resources such as VMs, databases, virtual networks, and storage accounts – into </a:t>
-            </a:r>
-            <a:r>
-              <a:rPr lang="en-US" sz="1200" i="1" kern="1200" dirty="0" smtClean="0">
-                <a:solidFill>
-                  <a:schemeClr val="tx1"/>
-                </a:solidFill>
-                <a:effectLst/>
-                <a:latin typeface="+mn-lt"/>
-                <a:ea typeface="+mn-ea"/>
-                <a:cs typeface="+mn-cs"/>
-              </a:rPr>
-              <a:t>resource groups</a:t>
-            </a:r>
-            <a:r>
-              <a:rPr lang="en-US" sz="1200" kern="1200" dirty="0" smtClean="0">
-                <a:solidFill>
-                  <a:schemeClr val="tx1"/>
-                </a:solidFill>
-                <a:effectLst/>
-                <a:latin typeface="+mn-lt"/>
-                <a:ea typeface="+mn-ea"/>
-                <a:cs typeface="+mn-cs"/>
-              </a:rPr>
-              <a:t> so entire applications can be deployed, managed, and even deleted with a single step. Prior to Resource Manager, resources had to be created (and deleted) one by one, which quickly became onerous with large deployments.</a:t>
-            </a:r>
-          </a:p>
-          <a:p>
-            <a:r>
-              <a:rPr lang="en-US" sz="1200" kern="1200" dirty="0" smtClean="0">
-                <a:solidFill>
-                  <a:schemeClr val="tx1"/>
-                </a:solidFill>
-                <a:effectLst/>
-                <a:latin typeface="+mn-lt"/>
-                <a:ea typeface="+mn-ea"/>
-                <a:cs typeface="+mn-cs"/>
-              </a:rPr>
-              <a:t> </a:t>
-            </a:r>
-          </a:p>
-          <a:p>
-            <a:r>
-              <a:rPr lang="en-US" sz="1200" kern="1200" dirty="0" smtClean="0">
-                <a:solidFill>
-                  <a:schemeClr val="tx1"/>
-                </a:solidFill>
-                <a:effectLst/>
-                <a:latin typeface="+mn-lt"/>
-                <a:ea typeface="+mn-ea"/>
-                <a:cs typeface="+mn-cs"/>
-              </a:rPr>
-              <a:t>The Azure Resource Manager allows you to deploy applications using declarative templates called </a:t>
-            </a:r>
-            <a:r>
-              <a:rPr lang="en-US" sz="1200" i="1" kern="1200" dirty="0" smtClean="0">
-                <a:solidFill>
-                  <a:schemeClr val="tx1"/>
-                </a:solidFill>
-                <a:effectLst/>
-                <a:latin typeface="+mn-lt"/>
-                <a:ea typeface="+mn-ea"/>
-                <a:cs typeface="+mn-cs"/>
-              </a:rPr>
-              <a:t>deployment templates</a:t>
-            </a:r>
-            <a:r>
-              <a:rPr lang="en-US" sz="1200" kern="1200" dirty="0" smtClean="0">
-                <a:solidFill>
-                  <a:schemeClr val="tx1"/>
-                </a:solidFill>
-                <a:effectLst/>
-                <a:latin typeface="+mn-lt"/>
-                <a:ea typeface="+mn-ea"/>
-                <a:cs typeface="+mn-cs"/>
-              </a:rPr>
-              <a:t>. A template contains a complete description of all the resources that make up the application. Templates can include parameters that users will be prompted to fill in each time an application is deployed. Templates can also run scripts to initialize resources to a known and consistent state.</a:t>
-            </a:r>
-          </a:p>
-          <a:p>
-            <a:r>
-              <a:rPr lang="en-US" sz="1200" kern="1200" dirty="0" smtClean="0">
-                <a:solidFill>
-                  <a:schemeClr val="tx1"/>
-                </a:solidFill>
-                <a:effectLst/>
-                <a:latin typeface="+mn-lt"/>
-                <a:ea typeface="+mn-ea"/>
-                <a:cs typeface="+mn-cs"/>
-              </a:rPr>
-              <a:t> </a:t>
-            </a:r>
-          </a:p>
-          <a:p>
-            <a:r>
-              <a:rPr lang="en-US" sz="1200" kern="1200" dirty="0" smtClean="0">
-                <a:solidFill>
-                  <a:schemeClr val="tx1"/>
-                </a:solidFill>
-                <a:effectLst/>
-                <a:latin typeface="+mn-lt"/>
-                <a:ea typeface="+mn-ea"/>
-                <a:cs typeface="+mn-cs"/>
-              </a:rPr>
-              <a:t>As an example, suppose you have built an HPC cluster that includes virtual machines and other Azure resources. With a template, you can script the creation of the entire cluster and optionally the data that goes with it. This makes it easy for others to spin up instances of the cluster, or for you to recreate it if you deleted it thinking you wouldn’t be needing it again.</a:t>
-            </a:r>
-            <a:endParaRPr lang="en-US" dirty="0" smtClean="0"/>
+            <a:pPr marL="0" marR="0" lvl="0" indent="0" algn="l" defTabSz="914400" rtl="0" eaLnBrk="1" fontAlgn="auto" latinLnBrk="0" hangingPunct="1">
+              <a:lnSpc>
+                <a:spcPct val="100000"/>
+              </a:lnSpc>
+              <a:spcBef>
+                <a:spcPts val="0"/>
+              </a:spcBef>
+              <a:spcAft>
+                <a:spcPts val="0"/>
+              </a:spcAft>
+              <a:buClrTx/>
+              <a:buSzTx/>
+              <a:buFontTx/>
+              <a:buNone/>
+              <a:tabLst/>
+              <a:defRPr/>
+            </a:pPr>
+            <a:r>
+              <a:rPr lang="en-US" dirty="0" smtClean="0"/>
+              <a:t>For background,</a:t>
+            </a:r>
+            <a:r>
+              <a:rPr lang="en-US" baseline="0" dirty="0" smtClean="0"/>
+              <a:t> see https://blogs.msdn.microsoft.com/uk_faculty_connection/2016/09/12/choosing-the-most-appropiate-azure-virtual-machine-specification/?wt.mc_id=DX_873849. Not shown here are H machines, which are optimized for extremely heavy computing workloads.</a:t>
+            </a:r>
           </a:p>
         </p:txBody>
       </p:sp>
@@ -2416,7 +2607,7 @@
     </p:spTree>
     <p:extLst>
       <p:ext uri="{BB962C8B-B14F-4D97-AF65-F5344CB8AC3E}">
-        <p14:creationId xmlns:p14="http://schemas.microsoft.com/office/powerpoint/2010/main" val="988917755"/>
+        <p14:creationId xmlns:p14="http://schemas.microsoft.com/office/powerpoint/2010/main" val="928529220"/>
       </p:ext>
     </p:extLst>
   </p:cSld>
@@ -2470,91 +2661,36 @@
           <a:bodyPr/>
           <a:lstStyle/>
           <a:p>
-            <a:r>
-              <a:rPr lang="en-US" dirty="0"/>
-              <a:t>Notes:</a:t>
-            </a:r>
-          </a:p>
-          <a:p>
-            <a:pPr marL="171450" indent="-171450">
-              <a:buFont typeface="Arial" panose="020B0604020202020204" pitchFamily="34" charset="0"/>
-              <a:buChar char="•"/>
+            <a:pPr marL="0" marR="0" indent="0" algn="l" defTabSz="914400" rtl="0" eaLnBrk="1" fontAlgn="auto" latinLnBrk="0" hangingPunct="1">
+              <a:lnSpc>
+                <a:spcPct val="100000"/>
+              </a:lnSpc>
+              <a:spcBef>
+                <a:spcPts val="0"/>
+              </a:spcBef>
+              <a:spcAft>
+                <a:spcPts val="0"/>
+              </a:spcAft>
+              <a:buClrTx/>
+              <a:buSzTx/>
+              <a:buFontTx/>
+              <a:buNone/>
+              <a:tabLst/>
+              <a:defRPr/>
             </a:pPr>
             <a:r>
-              <a:rPr lang="en-US" dirty="0"/>
-              <a:t>Another deployment option is to use ARM Templates</a:t>
-            </a:r>
-          </a:p>
-          <a:p>
-            <a:pPr marL="171450" indent="-171450">
-              <a:buFont typeface="Arial" panose="020B0604020202020204" pitchFamily="34" charset="0"/>
-              <a:buChar char="•"/>
-            </a:pPr>
-            <a:r>
-              <a:rPr lang="en-US" dirty="0"/>
-              <a:t>ARM Templates are declarative</a:t>
-            </a:r>
-            <a:r>
-              <a:rPr lang="en-US" baseline="0" dirty="0"/>
-              <a:t> files that define the resources to deploy and the inter-relationships between deployed resources</a:t>
-            </a:r>
-            <a:endParaRPr lang="en-US" dirty="0"/>
-          </a:p>
-          <a:p>
-            <a:pPr marL="171450" indent="-171450">
-              <a:buFont typeface="Arial" panose="020B0604020202020204" pitchFamily="34" charset="0"/>
-              <a:buChar char="•"/>
-            </a:pPr>
-            <a:r>
-              <a:rPr lang="en-US" dirty="0"/>
-              <a:t>Specify input parameters and variables, use expressions</a:t>
-            </a:r>
-          </a:p>
-          <a:p>
-            <a:pPr marL="171450" indent="-171450">
-              <a:buFont typeface="Arial" panose="020B0604020202020204" pitchFamily="34" charset="0"/>
-              <a:buChar char="•"/>
-            </a:pPr>
-            <a:r>
-              <a:rPr lang="en-US" dirty="0"/>
-              <a:t>Use Azure </a:t>
-            </a:r>
-            <a:r>
-              <a:rPr lang="en-US" dirty="0" err="1"/>
-              <a:t>Quickstart</a:t>
-            </a:r>
-            <a:r>
-              <a:rPr lang="en-US" dirty="0"/>
-              <a:t> templates, with source in GitHub</a:t>
-            </a:r>
-          </a:p>
-          <a:p>
-            <a:pPr marL="171450" indent="-171450">
-              <a:buFont typeface="Arial" panose="020B0604020202020204" pitchFamily="34" charset="0"/>
-              <a:buChar char="•"/>
-            </a:pPr>
-            <a:r>
-              <a:rPr lang="en-US" dirty="0"/>
-              <a:t>Edit in Azure online editor, use Visual Studio tooling, use Visual Studio Code</a:t>
-            </a:r>
-          </a:p>
-          <a:p>
-            <a:pPr marL="171450" indent="-171450">
-              <a:buFont typeface="Arial" panose="020B0604020202020204" pitchFamily="34" charset="0"/>
-              <a:buChar char="•"/>
-            </a:pPr>
-            <a:r>
-              <a:rPr lang="en-US" dirty="0"/>
-              <a:t>They can be checked into source</a:t>
-            </a:r>
-            <a:r>
-              <a:rPr lang="en-US" baseline="0" dirty="0"/>
-              <a:t> control in order to simplify deployment management</a:t>
-            </a:r>
-            <a:endParaRPr lang="en-US" dirty="0"/>
-          </a:p>
-          <a:p>
-            <a:endParaRPr lang="en-US" dirty="0"/>
+              <a:rPr lang="en-US" sz="1200" kern="1200" dirty="0" smtClean="0">
+                <a:solidFill>
+                  <a:schemeClr val="tx1"/>
+                </a:solidFill>
+                <a:effectLst/>
+                <a:latin typeface="+mn-lt"/>
+                <a:ea typeface="+mn-ea"/>
+                <a:cs typeface="+mn-cs"/>
+              </a:rPr>
+              <a:t>Here’s a quick look at three of the Azure VM sizes so you can see how they differ in cost and capability. One thing to keep in mind when deploying VMs is that you get charged for them whether they’re in use or not. When you’re finished using a VM or a cluster of VMs, it behooves you to go into the Azure portal and suspend each VM to avoid unnecessary charges. Once suspended, a VM is easily restarted so you can pick up where you left off and continue using it. I’ll show you how to start and stop VMs in the demo coming up shortly. I’ll also show you how to delete them so you can avoid even incurring storage charges for VMs that are no longer needed.</a:t>
+            </a:r>
+            <a:endParaRPr lang="en-US" dirty="0" smtClean="0"/>
           </a:p>
         </p:txBody>
       </p:sp>
@@ -2584,7 +2720,7 @@
     </p:spTree>
     <p:extLst>
       <p:ext uri="{BB962C8B-B14F-4D97-AF65-F5344CB8AC3E}">
-        <p14:creationId xmlns:p14="http://schemas.microsoft.com/office/powerpoint/2010/main" val="1674096139"/>
+        <p14:creationId xmlns:p14="http://schemas.microsoft.com/office/powerpoint/2010/main" val="2655584646"/>
       </p:ext>
     </p:extLst>
   </p:cSld>
@@ -2648,10 +2784,10 @@
                 <a:ea typeface="+mn-ea"/>
                 <a:cs typeface="+mn-cs"/>
               </a:rPr>
-              <a:t>You can build deployment templates of your own, or you can use ones that have already been built. An assortment of templates built by the Azure team and by others in the community can be found on the Azure </a:t>
-            </a:r>
-            <a:r>
-              <a:rPr lang="en-US" sz="1200" kern="1200" dirty="0" err="1" smtClean="0">
+              <a:t>An important element of HPC in Azure is the Azure Resource Manager. The Azure Resource Manager is a relatively recent addition to Azure. It lets you combine the resources that comprise an application – resources such as VMs, databases, virtual networks, and storage accounts – into </a:t>
+            </a:r>
+            <a:r>
+              <a:rPr lang="en-US" sz="1200" i="1" kern="1200" dirty="0" smtClean="0">
                 <a:solidFill>
                   <a:schemeClr val="tx1"/>
                 </a:solidFill>
@@ -2660,7 +2796,7 @@
                 <a:ea typeface="+mn-ea"/>
                 <a:cs typeface="+mn-cs"/>
               </a:rPr>
-              <a:t>Quickstart</a:t>
+              <a:t>resource groups</a:t>
             </a:r>
             <a:r>
               <a:rPr lang="en-US" sz="1200" kern="1200" dirty="0" smtClean="0">
@@ -2672,31 +2808,7 @@
                 <a:ea typeface="+mn-ea"/>
                 <a:cs typeface="+mn-cs"/>
               </a:rPr>
-              <a:t> Templates Web site or on GitHub. There are templates for creating clusters of Linux VMs, deploying </a:t>
-            </a:r>
-            <a:r>
-              <a:rPr lang="en-US" sz="1200" kern="1200" dirty="0" err="1" smtClean="0">
-                <a:solidFill>
-                  <a:schemeClr val="tx1"/>
-                </a:solidFill>
-                <a:effectLst/>
-                <a:latin typeface="+mn-lt"/>
-                <a:ea typeface="+mn-ea"/>
-                <a:cs typeface="+mn-cs"/>
-              </a:rPr>
-              <a:t>Redis</a:t>
-            </a:r>
-            <a:r>
-              <a:rPr lang="en-US" sz="1200" kern="1200" dirty="0" smtClean="0">
-                <a:solidFill>
-                  <a:schemeClr val="tx1"/>
-                </a:solidFill>
-                <a:effectLst/>
-                <a:latin typeface="+mn-lt"/>
-                <a:ea typeface="+mn-ea"/>
-                <a:cs typeface="+mn-cs"/>
-              </a:rPr>
-              <a:t> clusters of Ubuntu VMs, deploying MySQL servers, creating Windows VMs provisioned with IIS, and a whole lot more. There is even a template that deploys Minecraft Server in an Ubuntu VM.</a:t>
+              <a:t> so entire applications can be deployed, managed, and even deleted with a single step. Prior to Resource Manager, resources had to be created (and deleted) one by one, which quickly became onerous with large deployments.</a:t>
             </a:r>
           </a:p>
           <a:p>
@@ -2724,17 +2836,61 @@
                 <a:ea typeface="+mn-ea"/>
                 <a:cs typeface="+mn-cs"/>
               </a:rPr>
-              <a:t>Using any of these templates requires nothing more than a button click. Each template comes with documentation that tells you what parameters it requires and whether the template was created by Microsoft or by someone in the community. Best of all, you can view each template’s source code, which is little more than a JSON script, and customize it to fit your needs or even build upon it to create templates of your own.</a:t>
-            </a:r>
-          </a:p>
-          <a:p>
+              <a:t>The Azure Resource Manager allows you to deploy applications using declarative templates called </a:t>
+            </a:r>
+            <a:r>
+              <a:rPr lang="en-US" sz="1200" i="1" kern="1200" dirty="0" smtClean="0">
+                <a:solidFill>
+                  <a:schemeClr val="tx1"/>
+                </a:solidFill>
+                <a:effectLst/>
+                <a:latin typeface="+mn-lt"/>
+                <a:ea typeface="+mn-ea"/>
+                <a:cs typeface="+mn-cs"/>
+              </a:rPr>
+              <a:t>deployment templates</a:t>
+            </a:r>
+            <a:r>
+              <a:rPr lang="en-US" sz="1200" kern="1200" dirty="0" smtClean="0">
+                <a:solidFill>
+                  <a:schemeClr val="tx1"/>
+                </a:solidFill>
+                <a:effectLst/>
+                <a:latin typeface="+mn-lt"/>
+                <a:ea typeface="+mn-ea"/>
+                <a:cs typeface="+mn-cs"/>
+              </a:rPr>
+              <a:t>. A template contains a complete description of all the resources that make up the application. Templates can include parameters that users will be prompted to fill in each time an application is deployed. Templates can also run scripts to initialize resources to a known and consistent state.</a:t>
+            </a:r>
+          </a:p>
+          <a:p>
+            <a:r>
+              <a:rPr lang="en-US" sz="1200" kern="1200" dirty="0" smtClean="0">
+                <a:solidFill>
+                  <a:schemeClr val="tx1"/>
+                </a:solidFill>
+                <a:effectLst/>
+                <a:latin typeface="+mn-lt"/>
+                <a:ea typeface="+mn-ea"/>
+                <a:cs typeface="+mn-cs"/>
+              </a:rPr>
+              <a:t> </a:t>
+            </a:r>
+          </a:p>
+          <a:p>
+            <a:r>
+              <a:rPr lang="en-US" sz="1200" kern="1200" dirty="0" smtClean="0">
+                <a:solidFill>
+                  <a:schemeClr val="tx1"/>
+                </a:solidFill>
+                <a:effectLst/>
+                <a:latin typeface="+mn-lt"/>
+                <a:ea typeface="+mn-ea"/>
+                <a:cs typeface="+mn-cs"/>
+              </a:rPr>
+              <a:t>As an example, suppose you have built an HPC cluster that includes virtual machines and other Azure resources. With a template, you can script the creation of the entire cluster and optionally the data that goes with it. This makes it easy for others to spin up instances of the cluster, or for you to recreate it if you deleted it thinking you wouldn’t be needing it again.</a:t>
+            </a:r>
             <a:endParaRPr lang="en-US" dirty="0" smtClean="0"/>
-          </a:p>
-          <a:p>
-            <a:r>
-              <a:rPr lang="en-US" dirty="0" smtClean="0"/>
-              <a:t>The three templates pictured here are just a few of the many dozens of templates currently available.</a:t>
-            </a:r>
           </a:p>
         </p:txBody>
       </p:sp>
@@ -2764,7 +2920,7 @@
     </p:spTree>
     <p:extLst>
       <p:ext uri="{BB962C8B-B14F-4D97-AF65-F5344CB8AC3E}">
-        <p14:creationId xmlns:p14="http://schemas.microsoft.com/office/powerpoint/2010/main" val="3998187520"/>
+        <p14:creationId xmlns:p14="http://schemas.microsoft.com/office/powerpoint/2010/main" val="988917755"/>
       </p:ext>
     </p:extLst>
   </p:cSld>
@@ -2818,27 +2974,91 @@
           <a:bodyPr/>
           <a:lstStyle/>
           <a:p>
-            <a:pPr marL="0" marR="0" indent="0" algn="l" defTabSz="914400" rtl="0" eaLnBrk="1" fontAlgn="auto" latinLnBrk="0" hangingPunct="1">
-              <a:lnSpc>
-                <a:spcPct val="100000"/>
-              </a:lnSpc>
-              <a:spcBef>
-                <a:spcPts val="0"/>
-              </a:spcBef>
-              <a:spcAft>
-                <a:spcPts val="0"/>
-              </a:spcAft>
-              <a:buClrTx/>
-              <a:buSzTx/>
-              <a:buFontTx/>
-              <a:buNone/>
-              <a:tabLst/>
-              <a:defRPr/>
+            <a:r>
+              <a:rPr lang="en-US" dirty="0"/>
+              <a:t>Notes:</a:t>
+            </a:r>
+          </a:p>
+          <a:p>
+            <a:pPr marL="171450" indent="-171450">
+              <a:buFont typeface="Arial" panose="020B0604020202020204" pitchFamily="34" charset="0"/>
+              <a:buChar char="•"/>
             </a:pPr>
             <a:r>
-              <a:rPr lang="en-US" dirty="0" smtClean="0"/>
-              <a:t>The Simple Linux Utility for Resource Management (SLURM), also known as the SLURM Workload Manager, is a free and open-source job scheduler for Linux that excels at distributing heavy computing workloads across clusters of machines and processors. It is used on more than half of the world's largest supercomputers and High-Performance Computing (HPC) clusters, and it enjoys widespread use in the research community for jobs that require significant CPU resources.</a:t>
-            </a:r>
+              <a:rPr lang="en-US" dirty="0"/>
+              <a:t>Another deployment option is to use ARM Templates</a:t>
+            </a:r>
+          </a:p>
+          <a:p>
+            <a:pPr marL="171450" indent="-171450">
+              <a:buFont typeface="Arial" panose="020B0604020202020204" pitchFamily="34" charset="0"/>
+              <a:buChar char="•"/>
+            </a:pPr>
+            <a:r>
+              <a:rPr lang="en-US" dirty="0"/>
+              <a:t>ARM Templates are declarative</a:t>
+            </a:r>
+            <a:r>
+              <a:rPr lang="en-US" baseline="0" dirty="0"/>
+              <a:t> files that define the resources to deploy and the inter-relationships between deployed resources</a:t>
+            </a:r>
+            <a:endParaRPr lang="en-US" dirty="0"/>
+          </a:p>
+          <a:p>
+            <a:pPr marL="171450" indent="-171450">
+              <a:buFont typeface="Arial" panose="020B0604020202020204" pitchFamily="34" charset="0"/>
+              <a:buChar char="•"/>
+            </a:pPr>
+            <a:r>
+              <a:rPr lang="en-US" dirty="0"/>
+              <a:t>Specify input parameters and variables, use expressions</a:t>
+            </a:r>
+          </a:p>
+          <a:p>
+            <a:pPr marL="171450" indent="-171450">
+              <a:buFont typeface="Arial" panose="020B0604020202020204" pitchFamily="34" charset="0"/>
+              <a:buChar char="•"/>
+            </a:pPr>
+            <a:r>
+              <a:rPr lang="en-US" dirty="0"/>
+              <a:t>Use Azure </a:t>
+            </a:r>
+            <a:r>
+              <a:rPr lang="en-US" dirty="0" err="1"/>
+              <a:t>Quickstart</a:t>
+            </a:r>
+            <a:r>
+              <a:rPr lang="en-US" dirty="0"/>
+              <a:t> templates, with source in GitHub</a:t>
+            </a:r>
+          </a:p>
+          <a:p>
+            <a:pPr marL="171450" indent="-171450">
+              <a:buFont typeface="Arial" panose="020B0604020202020204" pitchFamily="34" charset="0"/>
+              <a:buChar char="•"/>
+            </a:pPr>
+            <a:r>
+              <a:rPr lang="en-US" dirty="0"/>
+              <a:t>Edit in Azure online editor, use Visual Studio tooling, use Visual Studio Code</a:t>
+            </a:r>
+          </a:p>
+          <a:p>
+            <a:pPr marL="171450" indent="-171450">
+              <a:buFont typeface="Arial" panose="020B0604020202020204" pitchFamily="34" charset="0"/>
+              <a:buChar char="•"/>
+            </a:pPr>
+            <a:r>
+              <a:rPr lang="en-US" dirty="0"/>
+              <a:t>They can be checked into source</a:t>
+            </a:r>
+            <a:r>
+              <a:rPr lang="en-US" baseline="0" dirty="0"/>
+              <a:t> control in order to simplify deployment management</a:t>
+            </a:r>
+            <a:endParaRPr lang="en-US" dirty="0"/>
+          </a:p>
+          <a:p>
+            <a:endParaRPr lang="en-US" dirty="0"/>
           </a:p>
         </p:txBody>
       </p:sp>
@@ -2868,7 +3088,7 @@
     </p:spTree>
     <p:extLst>
       <p:ext uri="{BB962C8B-B14F-4D97-AF65-F5344CB8AC3E}">
-        <p14:creationId xmlns:p14="http://schemas.microsoft.com/office/powerpoint/2010/main" val="2236143850"/>
+        <p14:creationId xmlns:p14="http://schemas.microsoft.com/office/powerpoint/2010/main" val="1674096139"/>
       </p:ext>
     </p:extLst>
   </p:cSld>
@@ -3025,7 +3245,7 @@
           <a:p>
             <a:fld id="{0459C166-16D3-4A25-A2F8-C51E0E346B22}" type="datetimeFigureOut">
               <a:rPr lang="en-US" smtClean="0"/>
-              <a:t>10/24/2016</a:t>
+              <a:t>12/20/2016</a:t>
             </a:fld>
             <a:endParaRPr lang="en-US"/>
           </a:p>
@@ -3120,7 +3340,7 @@
           <a:p>
             <a:fld id="{0459C166-16D3-4A25-A2F8-C51E0E346B22}" type="datetimeFigureOut">
               <a:rPr lang="en-US" smtClean="0"/>
-              <a:t>10/24/2016</a:t>
+              <a:t>12/20/2016</a:t>
             </a:fld>
             <a:endParaRPr lang="en-US"/>
           </a:p>
@@ -3395,7 +3615,7 @@
           <a:p>
             <a:fld id="{0459C166-16D3-4A25-A2F8-C51E0E346B22}" type="datetimeFigureOut">
               <a:rPr lang="en-US" smtClean="0"/>
-              <a:t>10/24/2016</a:t>
+              <a:t>12/20/2016</a:t>
             </a:fld>
             <a:endParaRPr lang="en-US"/>
           </a:p>
@@ -3647,7 +3867,7 @@
           <a:p>
             <a:fld id="{0459C166-16D3-4A25-A2F8-C51E0E346B22}" type="datetimeFigureOut">
               <a:rPr lang="en-US" smtClean="0"/>
-              <a:t>10/24/2016</a:t>
+              <a:t>12/20/2016</a:t>
             </a:fld>
             <a:endParaRPr lang="en-US"/>
           </a:p>
@@ -3815,7 +4035,7 @@
           <a:p>
             <a:fld id="{0459C166-16D3-4A25-A2F8-C51E0E346B22}" type="datetimeFigureOut">
               <a:rPr lang="en-US" smtClean="0"/>
-              <a:t>10/24/2016</a:t>
+              <a:t>12/20/2016</a:t>
             </a:fld>
             <a:endParaRPr lang="en-US"/>
           </a:p>
@@ -3993,7 +4213,7 @@
           <a:p>
             <a:fld id="{0459C166-16D3-4A25-A2F8-C51E0E346B22}" type="datetimeFigureOut">
               <a:rPr lang="en-US" smtClean="0"/>
-              <a:t>10/24/2016</a:t>
+              <a:t>12/20/2016</a:t>
             </a:fld>
             <a:endParaRPr lang="en-US"/>
           </a:p>
@@ -5920,7 +6140,7 @@
           <a:p>
             <a:fld id="{0459C166-16D3-4A25-A2F8-C51E0E346B22}" type="datetimeFigureOut">
               <a:rPr lang="en-US" smtClean="0"/>
-              <a:t>10/24/2016</a:t>
+              <a:t>12/20/2016</a:t>
             </a:fld>
             <a:endParaRPr lang="en-US"/>
           </a:p>
@@ -11547,7 +11767,7 @@
             <a:fld id="{0459C166-16D3-4A25-A2F8-C51E0E346B22}" type="datetimeFigureOut">
               <a:rPr lang="en-US" smtClean="0"/>
               <a:pPr/>
-              <a:t>10/24/2016</a:t>
+              <a:t>12/20/2016</a:t>
             </a:fld>
             <a:endParaRPr lang="en-US"/>
           </a:p>
@@ -15609,7 +15829,7 @@
           <a:p>
             <a:fld id="{0459C166-16D3-4A25-A2F8-C51E0E346B22}" type="datetimeFigureOut">
               <a:rPr lang="en-US" smtClean="0"/>
-              <a:t>10/24/2016</a:t>
+              <a:t>12/20/2016</a:t>
             </a:fld>
             <a:endParaRPr lang="en-US"/>
           </a:p>
@@ -15973,7 +16193,7 @@
           <a:p>
             <a:fld id="{0459C166-16D3-4A25-A2F8-C51E0E346B22}" type="datetimeFigureOut">
               <a:rPr lang="en-US" smtClean="0"/>
-              <a:t>10/24/2016</a:t>
+              <a:t>12/20/2016</a:t>
             </a:fld>
             <a:endParaRPr lang="en-US"/>
           </a:p>
@@ -16090,7 +16310,7 @@
           <a:p>
             <a:fld id="{0459C166-16D3-4A25-A2F8-C51E0E346B22}" type="datetimeFigureOut">
               <a:rPr lang="en-US" smtClean="0"/>
-              <a:t>10/24/2016</a:t>
+              <a:t>12/20/2016</a:t>
             </a:fld>
             <a:endParaRPr lang="en-US"/>
           </a:p>
@@ -16301,7 +16521,7 @@
           <a:p>
             <a:fld id="{0459C166-16D3-4A25-A2F8-C51E0E346B22}" type="datetimeFigureOut">
               <a:rPr lang="en-US" smtClean="0"/>
-              <a:t>10/24/2016</a:t>
+              <a:t>12/20/2016</a:t>
             </a:fld>
             <a:endParaRPr lang="en-US"/>
           </a:p>
@@ -17710,6 +17930,367 @@
           <a:p>
             <a:r>
               <a:rPr lang="en-US" dirty="0" smtClean="0"/>
+              <a:t>Azure </a:t>
+            </a:r>
+            <a:r>
+              <a:rPr lang="en-US" dirty="0" err="1" smtClean="0"/>
+              <a:t>Quickstart</a:t>
+            </a:r>
+            <a:r>
+              <a:rPr lang="en-US" dirty="0" smtClean="0"/>
+              <a:t> Templates</a:t>
+            </a:r>
+            <a:endParaRPr lang="en-US" dirty="0"/>
+          </a:p>
+        </p:txBody>
+      </p:sp>
+      <p:sp>
+        <p:nvSpPr>
+          <p:cNvPr id="3" name="Content Placeholder 2"/>
+          <p:cNvSpPr>
+            <a:spLocks noGrp="1"/>
+          </p:cNvSpPr>
+          <p:nvPr>
+            <p:ph idx="1"/>
+          </p:nvPr>
+        </p:nvSpPr>
+        <p:spPr/>
+        <p:txBody>
+          <a:bodyPr/>
+          <a:lstStyle/>
+          <a:p>
+            <a:r>
+              <a:rPr lang="en-US" dirty="0"/>
+              <a:t>Free, open-source deployment templates</a:t>
+            </a:r>
+          </a:p>
+          <a:p>
+            <a:endParaRPr lang="en-US" dirty="0"/>
+          </a:p>
+          <a:p>
+            <a:endParaRPr lang="en-US" dirty="0"/>
+          </a:p>
+          <a:p>
+            <a:endParaRPr lang="en-US" dirty="0"/>
+          </a:p>
+          <a:p>
+            <a:endParaRPr lang="en-US" dirty="0"/>
+          </a:p>
+          <a:p>
+            <a:endParaRPr lang="en-US" dirty="0"/>
+          </a:p>
+          <a:p>
+            <a:r>
+              <a:rPr lang="en-US" dirty="0"/>
+              <a:t>Find them on the Azure site (</a:t>
+            </a:r>
+            <a:r>
+              <a:rPr lang="en-US" dirty="0">
+                <a:hlinkClick r:id="rId3"/>
+              </a:rPr>
+              <a:t>http://bit.ly/a4r-quickstart</a:t>
+            </a:r>
+            <a:r>
+              <a:rPr lang="en-US" dirty="0"/>
+              <a:t>)</a:t>
+            </a:r>
+          </a:p>
+          <a:p>
+            <a:r>
+              <a:rPr lang="en-US" dirty="0"/>
+              <a:t>Or browse them on GitHub (</a:t>
+            </a:r>
+            <a:r>
+              <a:rPr lang="en-US" dirty="0">
+                <a:hlinkClick r:id="rId4"/>
+              </a:rPr>
+              <a:t>http://</a:t>
+            </a:r>
+            <a:r>
+              <a:rPr lang="en-US" dirty="0" smtClean="0">
+                <a:hlinkClick r:id="rId4"/>
+              </a:rPr>
+              <a:t>bit.ly/a4r-github</a:t>
+            </a:r>
+            <a:r>
+              <a:rPr lang="en-US" dirty="0" smtClean="0"/>
+              <a:t>)</a:t>
+            </a:r>
+          </a:p>
+          <a:p>
+            <a:pPr marL="0" indent="0">
+              <a:buNone/>
+            </a:pPr>
+            <a:endParaRPr lang="en-US" dirty="0"/>
+          </a:p>
+        </p:txBody>
+      </p:sp>
+      <p:pic>
+        <p:nvPicPr>
+          <p:cNvPr id="4" name="Picture 3"/>
+          <p:cNvPicPr>
+            <a:picLocks noChangeAspect="1"/>
+          </p:cNvPicPr>
+          <p:nvPr/>
+        </p:nvPicPr>
+        <p:blipFill>
+          <a:blip r:embed="rId5"/>
+          <a:stretch>
+            <a:fillRect/>
+          </a:stretch>
+        </p:blipFill>
+        <p:spPr>
+          <a:xfrm>
+            <a:off x="981075" y="2716411"/>
+            <a:ext cx="2914650" cy="1666875"/>
+          </a:xfrm>
+          <a:prstGeom prst="rect">
+            <a:avLst/>
+          </a:prstGeom>
+          <a:ln>
+            <a:solidFill>
+              <a:schemeClr val="accent2"/>
+            </a:solidFill>
+          </a:ln>
+        </p:spPr>
+      </p:pic>
+      <p:pic>
+        <p:nvPicPr>
+          <p:cNvPr id="5" name="Picture 4"/>
+          <p:cNvPicPr>
+            <a:picLocks noChangeAspect="1"/>
+          </p:cNvPicPr>
+          <p:nvPr/>
+        </p:nvPicPr>
+        <p:blipFill>
+          <a:blip r:embed="rId6"/>
+          <a:stretch>
+            <a:fillRect/>
+          </a:stretch>
+        </p:blipFill>
+        <p:spPr>
+          <a:xfrm>
+            <a:off x="4564226" y="2716411"/>
+            <a:ext cx="2924175" cy="1666875"/>
+          </a:xfrm>
+          <a:prstGeom prst="rect">
+            <a:avLst/>
+          </a:prstGeom>
+          <a:ln>
+            <a:solidFill>
+              <a:schemeClr val="accent2"/>
+            </a:solidFill>
+          </a:ln>
+        </p:spPr>
+      </p:pic>
+      <p:pic>
+        <p:nvPicPr>
+          <p:cNvPr id="6" name="Picture 5"/>
+          <p:cNvPicPr>
+            <a:picLocks noChangeAspect="1"/>
+          </p:cNvPicPr>
+          <p:nvPr/>
+        </p:nvPicPr>
+        <p:blipFill>
+          <a:blip r:embed="rId7"/>
+          <a:stretch>
+            <a:fillRect/>
+          </a:stretch>
+        </p:blipFill>
+        <p:spPr>
+          <a:xfrm>
+            <a:off x="8156903" y="2716411"/>
+            <a:ext cx="2914650" cy="1666875"/>
+          </a:xfrm>
+          <a:prstGeom prst="rect">
+            <a:avLst/>
+          </a:prstGeom>
+          <a:ln>
+            <a:solidFill>
+              <a:schemeClr val="accent2"/>
+            </a:solidFill>
+          </a:ln>
+        </p:spPr>
+      </p:pic>
+    </p:spTree>
+    <p:extLst>
+      <p:ext uri="{BB962C8B-B14F-4D97-AF65-F5344CB8AC3E}">
+        <p14:creationId xmlns:p14="http://schemas.microsoft.com/office/powerpoint/2010/main" val="3324523628"/>
+      </p:ext>
+    </p:extLst>
+  </p:cSld>
+  <p:clrMapOvr>
+    <a:masterClrMapping/>
+  </p:clrMapOvr>
+</p:sld>
+</file>
+
+<file path=ppt/slides/slide11.xml><?xml version="1.0" encoding="utf-8"?>
+<p:sld xmlns:a="http://schemas.openxmlformats.org/drawingml/2006/main" xmlns:r="http://schemas.openxmlformats.org/officeDocument/2006/relationships" xmlns:p="http://schemas.openxmlformats.org/presentationml/2006/main">
+  <p:cSld>
+    <p:spTree>
+      <p:nvGrpSpPr>
+        <p:cNvPr id="1" name=""/>
+        <p:cNvGrpSpPr/>
+        <p:nvPr/>
+      </p:nvGrpSpPr>
+      <p:grpSpPr>
+        <a:xfrm>
+          <a:off x="0" y="0"/>
+          <a:ext cx="0" cy="0"/>
+          <a:chOff x="0" y="0"/>
+          <a:chExt cx="0" cy="0"/>
+        </a:xfrm>
+      </p:grpSpPr>
+      <p:sp>
+        <p:nvSpPr>
+          <p:cNvPr id="2" name="Title 1"/>
+          <p:cNvSpPr>
+            <a:spLocks noGrp="1"/>
+          </p:cNvSpPr>
+          <p:nvPr>
+            <p:ph type="title"/>
+          </p:nvPr>
+        </p:nvSpPr>
+        <p:spPr/>
+        <p:txBody>
+          <a:bodyPr/>
+          <a:lstStyle/>
+          <a:p>
+            <a:r>
+              <a:rPr lang="en-US" dirty="0" smtClean="0"/>
+              <a:t>SLURM Clusters</a:t>
+            </a:r>
+            <a:endParaRPr lang="en-US" dirty="0"/>
+          </a:p>
+        </p:txBody>
+      </p:sp>
+      <p:sp>
+        <p:nvSpPr>
+          <p:cNvPr id="3" name="Content Placeholder 2"/>
+          <p:cNvSpPr>
+            <a:spLocks noGrp="1"/>
+          </p:cNvSpPr>
+          <p:nvPr>
+            <p:ph idx="1"/>
+          </p:nvPr>
+        </p:nvSpPr>
+        <p:spPr/>
+        <p:txBody>
+          <a:bodyPr/>
+          <a:lstStyle/>
+          <a:p>
+            <a:r>
+              <a:rPr lang="en-US" dirty="0"/>
+              <a:t>Simple Linux Utility for Resource Management (SLURM)</a:t>
+            </a:r>
+          </a:p>
+          <a:p>
+            <a:r>
+              <a:rPr lang="en-US" dirty="0" err="1"/>
+              <a:t>Quickstart</a:t>
+            </a:r>
+            <a:r>
+              <a:rPr lang="en-US" dirty="0"/>
+              <a:t> template at </a:t>
+            </a:r>
+            <a:r>
+              <a:rPr lang="en-US" dirty="0">
+                <a:hlinkClick r:id="rId3"/>
+              </a:rPr>
+              <a:t>http://bit.ly/a4r-slurm</a:t>
+            </a:r>
+            <a:r>
+              <a:rPr lang="en-US" dirty="0"/>
+              <a:t> enables easy deployment of SLURM clusters of user-specified </a:t>
+            </a:r>
+            <a:r>
+              <a:rPr lang="en-US" dirty="0" smtClean="0"/>
+              <a:t>sizes</a:t>
+            </a:r>
+            <a:endParaRPr lang="en-US" dirty="0"/>
+          </a:p>
+        </p:txBody>
+      </p:sp>
+      <p:pic>
+        <p:nvPicPr>
+          <p:cNvPr id="4" name="Picture 3"/>
+          <p:cNvPicPr>
+            <a:picLocks noChangeAspect="1"/>
+          </p:cNvPicPr>
+          <p:nvPr/>
+        </p:nvPicPr>
+        <p:blipFill>
+          <a:blip r:embed="rId4"/>
+          <a:stretch>
+            <a:fillRect/>
+          </a:stretch>
+        </p:blipFill>
+        <p:spPr>
+          <a:xfrm>
+            <a:off x="3174205" y="3542756"/>
+            <a:ext cx="5842001" cy="2769144"/>
+          </a:xfrm>
+          <a:prstGeom prst="rect">
+            <a:avLst/>
+          </a:prstGeom>
+          <a:ln>
+            <a:solidFill>
+              <a:schemeClr val="bg1">
+                <a:lumMod val="75000"/>
+              </a:schemeClr>
+            </a:solidFill>
+          </a:ln>
+          <a:effectLst/>
+        </p:spPr>
+      </p:pic>
+    </p:spTree>
+    <p:extLst>
+      <p:ext uri="{BB962C8B-B14F-4D97-AF65-F5344CB8AC3E}">
+        <p14:creationId xmlns:p14="http://schemas.microsoft.com/office/powerpoint/2010/main" val="2739371626"/>
+      </p:ext>
+    </p:extLst>
+  </p:cSld>
+  <p:clrMapOvr>
+    <a:masterClrMapping/>
+  </p:clrMapOvr>
+</p:sld>
+</file>
+
+<file path=ppt/slides/slide12.xml><?xml version="1.0" encoding="utf-8"?>
+<p:sld xmlns:a="http://schemas.openxmlformats.org/drawingml/2006/main" xmlns:r="http://schemas.openxmlformats.org/officeDocument/2006/relationships" xmlns:p="http://schemas.openxmlformats.org/presentationml/2006/main">
+  <p:cSld>
+    <p:spTree>
+      <p:nvGrpSpPr>
+        <p:cNvPr id="1" name=""/>
+        <p:cNvGrpSpPr/>
+        <p:nvPr/>
+      </p:nvGrpSpPr>
+      <p:grpSpPr>
+        <a:xfrm>
+          <a:off x="0" y="0"/>
+          <a:ext cx="0" cy="0"/>
+          <a:chOff x="0" y="0"/>
+          <a:chExt cx="0" cy="0"/>
+        </a:xfrm>
+      </p:grpSpPr>
+      <p:sp>
+        <p:nvSpPr>
+          <p:cNvPr id="2" name="Title 1"/>
+          <p:cNvSpPr>
+            <a:spLocks noGrp="1"/>
+          </p:cNvSpPr>
+          <p:nvPr>
+            <p:ph type="title"/>
+          </p:nvPr>
+        </p:nvSpPr>
+        <p:spPr/>
+        <p:txBody>
+          <a:bodyPr/>
+          <a:lstStyle/>
+          <a:p>
+            <a:r>
+              <a:rPr lang="en-US" dirty="0" smtClean="0"/>
               <a:t>Containers</a:t>
             </a:r>
             <a:endParaRPr lang="en-US" dirty="0"/>
@@ -18874,7 +19455,7 @@
 </p:sld>
 </file>
 
-<file path=ppt/slides/slide11.xml><?xml version="1.0" encoding="utf-8"?>
+<file path=ppt/slides/slide13.xml><?xml version="1.0" encoding="utf-8"?>
 <p:sld xmlns:a="http://schemas.openxmlformats.org/drawingml/2006/main" xmlns:r="http://schemas.openxmlformats.org/officeDocument/2006/relationships" xmlns:p="http://schemas.openxmlformats.org/presentationml/2006/main">
   <p:cSld>
     <p:spTree>
@@ -19041,7 +19622,7 @@
 </p:sld>
 </file>
 
-<file path=ppt/slides/slide12.xml><?xml version="1.0" encoding="utf-8"?>
+<file path=ppt/slides/slide14.xml><?xml version="1.0" encoding="utf-8"?>
 <p:sld xmlns:a="http://schemas.openxmlformats.org/drawingml/2006/main" xmlns:r="http://schemas.openxmlformats.org/officeDocument/2006/relationships" xmlns:p="http://schemas.openxmlformats.org/presentationml/2006/main">
   <p:cSld>
     <p:spTree>
@@ -19118,7 +19699,7 @@
 </p:sld>
 </file>
 
-<file path=ppt/slides/slide13.xml><?xml version="1.0" encoding="utf-8"?>
+<file path=ppt/slides/slide15.xml><?xml version="1.0" encoding="utf-8"?>
 <p:sld xmlns:a="http://schemas.openxmlformats.org/drawingml/2006/main" xmlns:r="http://schemas.openxmlformats.org/officeDocument/2006/relationships" xmlns:p="http://schemas.openxmlformats.org/presentationml/2006/main">
   <p:cSld>
     <p:spTree>
@@ -19218,7 +19799,7 @@
 </p:sld>
 </file>
 
-<file path=ppt/slides/slide14.xml><?xml version="1.0" encoding="utf-8"?>
+<file path=ppt/slides/slide16.xml><?xml version="1.0" encoding="utf-8"?>
 <p:sld xmlns:a="http://schemas.openxmlformats.org/drawingml/2006/main" xmlns:r="http://schemas.openxmlformats.org/officeDocument/2006/relationships" xmlns:p="http://schemas.openxmlformats.org/presentationml/2006/main">
   <p:cSld>
     <p:spTree>
@@ -19957,7 +20538,7 @@
 </p:sld>
 </file>
 
-<file path=ppt/slides/slide15.xml><?xml version="1.0" encoding="utf-8"?>
+<file path=ppt/slides/slide17.xml><?xml version="1.0" encoding="utf-8"?>
 <p:sld xmlns:a="http://schemas.openxmlformats.org/drawingml/2006/main" xmlns:r="http://schemas.openxmlformats.org/officeDocument/2006/relationships" xmlns:p="http://schemas.openxmlformats.org/presentationml/2006/main">
   <p:cSld>
     <p:spTree>
@@ -20451,7 +21032,7 @@
 </p:sld>
 </file>
 
-<file path=ppt/slides/slide16.xml><?xml version="1.0" encoding="utf-8"?>
+<file path=ppt/slides/slide18.xml><?xml version="1.0" encoding="utf-8"?>
 <p:sld xmlns:a="http://schemas.openxmlformats.org/drawingml/2006/main" xmlns:r="http://schemas.openxmlformats.org/officeDocument/2006/relationships" xmlns:p="http://schemas.openxmlformats.org/presentationml/2006/main">
   <p:cSld>
     <p:spTree>
@@ -20556,7 +21137,7 @@
 </p:sld>
 </file>
 
-<file path=ppt/slides/slide17.xml><?xml version="1.0" encoding="utf-8"?>
+<file path=ppt/slides/slide19.xml><?xml version="1.0" encoding="utf-8"?>
 <p:sld xmlns:a="http://schemas.openxmlformats.org/drawingml/2006/main" xmlns:r="http://schemas.openxmlformats.org/officeDocument/2006/relationships" xmlns:p="http://schemas.openxmlformats.org/presentationml/2006/main">
   <p:cSld>
     <p:spTree>
@@ -20639,7 +21220,187 @@
 </p:sld>
 </file>
 
-<file path=ppt/slides/slide18.xml><?xml version="1.0" encoding="utf-8"?>
+<file path=ppt/slides/slide2.xml><?xml version="1.0" encoding="utf-8"?>
+<p:sld xmlns:a="http://schemas.openxmlformats.org/drawingml/2006/main" xmlns:r="http://schemas.openxmlformats.org/officeDocument/2006/relationships" xmlns:p="http://schemas.openxmlformats.org/presentationml/2006/main">
+  <p:cSld>
+    <p:spTree>
+      <p:nvGrpSpPr>
+        <p:cNvPr id="1" name=""/>
+        <p:cNvGrpSpPr/>
+        <p:nvPr/>
+      </p:nvGrpSpPr>
+      <p:grpSpPr>
+        <a:xfrm>
+          <a:off x="0" y="0"/>
+          <a:ext cx="0" cy="0"/>
+          <a:chOff x="0" y="0"/>
+          <a:chExt cx="0" cy="0"/>
+        </a:xfrm>
+      </p:grpSpPr>
+      <p:sp>
+        <p:nvSpPr>
+          <p:cNvPr id="2" name="Title 1"/>
+          <p:cNvSpPr>
+            <a:spLocks noGrp="1"/>
+          </p:cNvSpPr>
+          <p:nvPr>
+            <p:ph type="title"/>
+          </p:nvPr>
+        </p:nvSpPr>
+        <p:spPr/>
+        <p:txBody>
+          <a:bodyPr/>
+          <a:lstStyle/>
+          <a:p>
+            <a:r>
+              <a:rPr lang="en-US" dirty="0" smtClean="0"/>
+              <a:t>High-Performance Computing</a:t>
+            </a:r>
+            <a:endParaRPr lang="en-US" dirty="0"/>
+          </a:p>
+        </p:txBody>
+      </p:sp>
+      <p:sp>
+        <p:nvSpPr>
+          <p:cNvPr id="4" name="TextBox 3"/>
+          <p:cNvSpPr txBox="1"/>
+          <p:nvPr/>
+        </p:nvSpPr>
+        <p:spPr>
+          <a:xfrm>
+            <a:off x="1806235" y="2140504"/>
+            <a:ext cx="8577943" cy="4185761"/>
+          </a:xfrm>
+          <a:prstGeom prst="rect">
+            <a:avLst/>
+          </a:prstGeom>
+          <a:noFill/>
+        </p:spPr>
+        <p:txBody>
+          <a:bodyPr wrap="square" lIns="0" tIns="0" rIns="0" bIns="0" rtlCol="0">
+            <a:spAutoFit/>
+          </a:bodyPr>
+          <a:lstStyle/>
+          <a:p>
+            <a:pPr>
+              <a:lnSpc>
+                <a:spcPct val="90000"/>
+              </a:lnSpc>
+              <a:spcBef>
+                <a:spcPct val="20000"/>
+              </a:spcBef>
+              <a:buSzPct val="80000"/>
+            </a:pPr>
+            <a:r>
+              <a:rPr lang="en-US" sz="3200" dirty="0">
+                <a:solidFill>
+                  <a:srgbClr val="5095D1"/>
+                </a:solidFill>
+              </a:rPr>
+              <a:t>“High-Performance Computing most generally refers to the practice of aggregating computing power in a way that delivers much higher performance than one could get out of a typical desktop computer or workstation in order to solve large problems in science, engineering, or business.”</a:t>
+            </a:r>
+          </a:p>
+          <a:p>
+            <a:pPr>
+              <a:lnSpc>
+                <a:spcPct val="90000"/>
+              </a:lnSpc>
+              <a:spcBef>
+                <a:spcPct val="20000"/>
+              </a:spcBef>
+              <a:buSzPct val="80000"/>
+            </a:pPr>
+            <a:r>
+              <a:rPr lang="en-US" sz="3200" dirty="0" smtClean="0">
+                <a:gradFill>
+                  <a:gsLst>
+                    <a:gs pos="0">
+                      <a:srgbClr val="292929">
+                        <a:lumMod val="90000"/>
+                        <a:lumOff val="10000"/>
+                      </a:srgbClr>
+                    </a:gs>
+                    <a:gs pos="86000">
+                      <a:srgbClr val="292929">
+                        <a:lumMod val="90000"/>
+                        <a:lumOff val="10000"/>
+                      </a:srgbClr>
+                    </a:gs>
+                  </a:gsLst>
+                  <a:lin ang="5400000" scaled="0"/>
+                </a:gradFill>
+              </a:rPr>
+              <a:t>						--</a:t>
+            </a:r>
+            <a:r>
+              <a:rPr lang="en-US" sz="3200" dirty="0">
+                <a:gradFill>
+                  <a:gsLst>
+                    <a:gs pos="0">
+                      <a:srgbClr val="292929">
+                        <a:lumMod val="90000"/>
+                        <a:lumOff val="10000"/>
+                      </a:srgbClr>
+                    </a:gs>
+                    <a:gs pos="86000">
+                      <a:srgbClr val="292929">
+                        <a:lumMod val="90000"/>
+                        <a:lumOff val="10000"/>
+                      </a:srgbClr>
+                    </a:gs>
+                  </a:gsLst>
+                  <a:lin ang="5400000" scaled="0"/>
+                </a:gradFill>
+              </a:rPr>
+              <a:t>Inside HPC</a:t>
+            </a:r>
+          </a:p>
+          <a:p>
+            <a:pPr>
+              <a:lnSpc>
+                <a:spcPct val="90000"/>
+              </a:lnSpc>
+              <a:spcBef>
+                <a:spcPct val="20000"/>
+              </a:spcBef>
+              <a:buSzPct val="80000"/>
+            </a:pPr>
+            <a:endParaRPr lang="en-US" sz="3200" dirty="0">
+              <a:gradFill>
+                <a:gsLst>
+                  <a:gs pos="0">
+                    <a:srgbClr val="292929">
+                      <a:lumMod val="90000"/>
+                      <a:lumOff val="10000"/>
+                    </a:srgbClr>
+                  </a:gs>
+                  <a:gs pos="86000">
+                    <a:srgbClr val="292929">
+                      <a:lumMod val="90000"/>
+                      <a:lumOff val="10000"/>
+                    </a:srgbClr>
+                  </a:gs>
+                </a:gsLst>
+                <a:lin ang="5400000" scaled="0"/>
+              </a:gradFill>
+            </a:endParaRPr>
+          </a:p>
+        </p:txBody>
+      </p:sp>
+    </p:spTree>
+    <p:extLst>
+      <p:ext uri="{BB962C8B-B14F-4D97-AF65-F5344CB8AC3E}">
+        <p14:creationId xmlns:p14="http://schemas.microsoft.com/office/powerpoint/2010/main" val="1319533140"/>
+      </p:ext>
+    </p:extLst>
+  </p:cSld>
+  <p:clrMapOvr>
+    <a:masterClrMapping/>
+  </p:clrMapOvr>
+</p:sld>
+</file>
+
+<file path=ppt/slides/slide20.xml><?xml version="1.0" encoding="utf-8"?>
 <p:sld xmlns:a="http://schemas.openxmlformats.org/drawingml/2006/main" xmlns:r="http://schemas.openxmlformats.org/officeDocument/2006/relationships" xmlns:p="http://schemas.openxmlformats.org/presentationml/2006/main">
   <p:cSld>
     <p:spTree>
@@ -21105,7 +21866,7 @@
 </p:sld>
 </file>
 
-<file path=ppt/slides/slide19.xml><?xml version="1.0" encoding="utf-8"?>
+<file path=ppt/slides/slide21.xml><?xml version="1.0" encoding="utf-8"?>
 <p:sld xmlns:a="http://schemas.openxmlformats.org/drawingml/2006/main" xmlns:r="http://schemas.openxmlformats.org/officeDocument/2006/relationships" xmlns:p="http://schemas.openxmlformats.org/presentationml/2006/main">
   <p:cSld>
     <p:spTree>
@@ -21187,150 +21948,7 @@
 </p:sld>
 </file>
 
-<file path=ppt/slides/slide2.xml><?xml version="1.0" encoding="utf-8"?>
-<p:sld xmlns:a="http://schemas.openxmlformats.org/drawingml/2006/main" xmlns:r="http://schemas.openxmlformats.org/officeDocument/2006/relationships" xmlns:p="http://schemas.openxmlformats.org/presentationml/2006/main">
-  <p:cSld>
-    <p:spTree>
-      <p:nvGrpSpPr>
-        <p:cNvPr id="1" name=""/>
-        <p:cNvGrpSpPr/>
-        <p:nvPr/>
-      </p:nvGrpSpPr>
-      <p:grpSpPr>
-        <a:xfrm>
-          <a:off x="0" y="0"/>
-          <a:ext cx="0" cy="0"/>
-          <a:chOff x="0" y="0"/>
-          <a:chExt cx="0" cy="0"/>
-        </a:xfrm>
-      </p:grpSpPr>
-      <p:sp>
-        <p:nvSpPr>
-          <p:cNvPr id="2" name="Title 1"/>
-          <p:cNvSpPr>
-            <a:spLocks noGrp="1"/>
-          </p:cNvSpPr>
-          <p:nvPr>
-            <p:ph type="title"/>
-          </p:nvPr>
-        </p:nvSpPr>
-        <p:spPr/>
-        <p:txBody>
-          <a:bodyPr/>
-          <a:lstStyle/>
-          <a:p>
-            <a:r>
-              <a:rPr lang="en-US" dirty="0" smtClean="0"/>
-              <a:t>Azure HPC</a:t>
-            </a:r>
-            <a:endParaRPr lang="en-US" dirty="0"/>
-          </a:p>
-        </p:txBody>
-      </p:sp>
-      <p:sp>
-        <p:nvSpPr>
-          <p:cNvPr id="3" name="Content Placeholder 2"/>
-          <p:cNvSpPr>
-            <a:spLocks noGrp="1"/>
-          </p:cNvSpPr>
-          <p:nvPr>
-            <p:ph idx="1"/>
-          </p:nvPr>
-        </p:nvSpPr>
-        <p:spPr/>
-        <p:txBody>
-          <a:bodyPr/>
-          <a:lstStyle/>
-          <a:p>
-            <a:r>
-              <a:rPr lang="en-US" dirty="0"/>
-              <a:t>Run massively parallel compute jobs in the cloud</a:t>
-            </a:r>
-          </a:p>
-          <a:p>
-            <a:pPr lvl="1"/>
-            <a:r>
-              <a:rPr lang="en-US" dirty="0"/>
-              <a:t>Photorealistic 3D rendering</a:t>
-            </a:r>
-          </a:p>
-          <a:p>
-            <a:pPr lvl="1"/>
-            <a:r>
-              <a:rPr lang="en-US" dirty="0"/>
-              <a:t>Brute force </a:t>
-            </a:r>
-            <a:r>
-              <a:rPr lang="en-US" dirty="0" err="1"/>
-              <a:t>cryptographical</a:t>
-            </a:r>
-            <a:r>
-              <a:rPr lang="en-US" dirty="0"/>
-              <a:t> analysis</a:t>
-            </a:r>
-          </a:p>
-          <a:p>
-            <a:pPr lvl="1"/>
-            <a:r>
-              <a:rPr lang="en-US" dirty="0" smtClean="0"/>
-              <a:t>Financial </a:t>
-            </a:r>
-            <a:r>
-              <a:rPr lang="en-US" dirty="0"/>
-              <a:t>risk modeling, genomics research, and more</a:t>
-            </a:r>
-          </a:p>
-          <a:p>
-            <a:r>
-              <a:rPr lang="en-US" dirty="0"/>
-              <a:t>Deploy an HPC cluster in minutes and scale as needed</a:t>
-            </a:r>
-          </a:p>
-          <a:p>
-            <a:r>
-              <a:rPr lang="en-US" dirty="0"/>
-              <a:t>Automate deployments with deployment templates</a:t>
-            </a:r>
-          </a:p>
-          <a:p>
-            <a:r>
-              <a:rPr lang="en-US" dirty="0"/>
-              <a:t>Combine with Azure Batch for batch scheduling and compute management (</a:t>
-            </a:r>
-            <a:r>
-              <a:rPr lang="en-US" dirty="0">
-                <a:hlinkClick r:id="rId3"/>
-              </a:rPr>
-              <a:t>http://bit.ly/a4r-batch</a:t>
-            </a:r>
-            <a:r>
-              <a:rPr lang="en-US" dirty="0" smtClean="0"/>
-              <a:t>)</a:t>
-            </a:r>
-          </a:p>
-          <a:p>
-            <a:r>
-              <a:rPr lang="en-US" dirty="0" smtClean="0"/>
-              <a:t>Linux or Windows</a:t>
-            </a:r>
-            <a:endParaRPr lang="en-US" dirty="0"/>
-          </a:p>
-        </p:txBody>
-      </p:sp>
-    </p:spTree>
-    <p:extLst>
-      <p:ext uri="{BB962C8B-B14F-4D97-AF65-F5344CB8AC3E}">
-        <p14:creationId xmlns:p14="http://schemas.microsoft.com/office/powerpoint/2010/main" val="2410609805"/>
-      </p:ext>
-    </p:extLst>
-  </p:cSld>
-  <p:clrMapOvr>
-    <a:masterClrMapping/>
-  </p:clrMapOvr>
-</p:sld>
-</file>
-
-<file path=ppt/slides/slide20.xml><?xml version="1.0" encoding="utf-8"?>
+<file path=ppt/slides/slide22.xml><?xml version="1.0" encoding="utf-8"?>
 <p:sld xmlns:a="http://schemas.openxmlformats.org/drawingml/2006/main" xmlns:r="http://schemas.openxmlformats.org/officeDocument/2006/relationships" xmlns:p="http://schemas.openxmlformats.org/presentationml/2006/main">
   <p:cSld>
     <p:spTree>
@@ -21371,6 +21989,370 @@
 </file>
 
 <file path=ppt/slides/slide3.xml><?xml version="1.0" encoding="utf-8"?>
+<p:sld xmlns:a="http://schemas.openxmlformats.org/drawingml/2006/main" xmlns:r="http://schemas.openxmlformats.org/officeDocument/2006/relationships" xmlns:p="http://schemas.openxmlformats.org/presentationml/2006/main">
+  <p:cSld>
+    <p:spTree>
+      <p:nvGrpSpPr>
+        <p:cNvPr id="1" name=""/>
+        <p:cNvGrpSpPr/>
+        <p:nvPr/>
+      </p:nvGrpSpPr>
+      <p:grpSpPr>
+        <a:xfrm>
+          <a:off x="0" y="0"/>
+          <a:ext cx="0" cy="0"/>
+          <a:chOff x="0" y="0"/>
+          <a:chExt cx="0" cy="0"/>
+        </a:xfrm>
+      </p:grpSpPr>
+      <p:sp>
+        <p:nvSpPr>
+          <p:cNvPr id="2" name="Title 1"/>
+          <p:cNvSpPr>
+            <a:spLocks noGrp="1"/>
+          </p:cNvSpPr>
+          <p:nvPr>
+            <p:ph type="title"/>
+          </p:nvPr>
+        </p:nvSpPr>
+        <p:spPr/>
+        <p:txBody>
+          <a:bodyPr/>
+          <a:lstStyle/>
+          <a:p>
+            <a:r>
+              <a:rPr lang="en-US" dirty="0" smtClean="0"/>
+              <a:t>HPC Clusters</a:t>
+            </a:r>
+            <a:endParaRPr lang="en-US" dirty="0"/>
+          </a:p>
+        </p:txBody>
+      </p:sp>
+      <p:sp>
+        <p:nvSpPr>
+          <p:cNvPr id="3" name="Content Placeholder 2"/>
+          <p:cNvSpPr>
+            <a:spLocks noGrp="1"/>
+          </p:cNvSpPr>
+          <p:nvPr>
+            <p:ph idx="1"/>
+          </p:nvPr>
+        </p:nvSpPr>
+        <p:spPr>
+          <a:xfrm>
+            <a:off x="838200" y="1825625"/>
+            <a:ext cx="6897491" cy="4351338"/>
+          </a:xfrm>
+        </p:spPr>
+        <p:txBody>
+          <a:bodyPr/>
+          <a:lstStyle/>
+          <a:p>
+            <a:pPr marL="571500" indent="-571500"/>
+            <a:r>
+              <a:rPr lang="en-US" dirty="0"/>
+              <a:t>HPC typically involves </a:t>
+            </a:r>
+            <a:r>
+              <a:rPr lang="en-US" b="1" dirty="0">
+                <a:solidFill>
+                  <a:schemeClr val="accent2"/>
+                </a:solidFill>
+              </a:rPr>
+              <a:t>clusters</a:t>
+            </a:r>
+            <a:r>
+              <a:rPr lang="en-US" dirty="0">
+                <a:solidFill>
+                  <a:schemeClr val="accent2"/>
+                </a:solidFill>
+              </a:rPr>
+              <a:t> </a:t>
+            </a:r>
+            <a:r>
+              <a:rPr lang="en-US" dirty="0"/>
+              <a:t>of computers interconnected by a high- speed network</a:t>
+            </a:r>
+          </a:p>
+          <a:p>
+            <a:pPr marL="571500" indent="-571500"/>
+            <a:r>
+              <a:rPr lang="en-US" dirty="0"/>
+              <a:t>A single computer in the cluster is called a </a:t>
+            </a:r>
+            <a:r>
+              <a:rPr lang="en-US" b="1" dirty="0">
+                <a:solidFill>
+                  <a:schemeClr val="accent2"/>
+                </a:solidFill>
+              </a:rPr>
+              <a:t>node</a:t>
+            </a:r>
+            <a:endParaRPr lang="en-US" dirty="0">
+              <a:solidFill>
+                <a:schemeClr val="accent2"/>
+              </a:solidFill>
+            </a:endParaRPr>
+          </a:p>
+          <a:p>
+            <a:pPr marL="571500" indent="-571500"/>
+            <a:r>
+              <a:rPr lang="en-US" b="1" dirty="0">
+                <a:solidFill>
+                  <a:schemeClr val="accent2"/>
+                </a:solidFill>
+              </a:rPr>
+              <a:t>Workloads</a:t>
+            </a:r>
+            <a:r>
+              <a:rPr lang="en-US" b="1" dirty="0"/>
+              <a:t> </a:t>
+            </a:r>
+            <a:r>
+              <a:rPr lang="en-US" dirty="0"/>
+              <a:t>are managed by </a:t>
+            </a:r>
+            <a:r>
+              <a:rPr lang="en-US" b="1" dirty="0">
+                <a:solidFill>
+                  <a:schemeClr val="accent2"/>
+                </a:solidFill>
+              </a:rPr>
+              <a:t>master</a:t>
+            </a:r>
+            <a:r>
+              <a:rPr lang="en-US" dirty="0">
+                <a:solidFill>
+                  <a:schemeClr val="accent2"/>
+                </a:solidFill>
+              </a:rPr>
+              <a:t> </a:t>
+            </a:r>
+            <a:r>
+              <a:rPr lang="en-US" dirty="0"/>
+              <a:t>nodes that distribute workloads across </a:t>
+            </a:r>
+            <a:r>
+              <a:rPr lang="en-US" b="1" dirty="0">
+                <a:solidFill>
+                  <a:schemeClr val="accent2"/>
+                </a:solidFill>
+              </a:rPr>
+              <a:t>worker</a:t>
+            </a:r>
+            <a:r>
+              <a:rPr lang="en-US" dirty="0">
+                <a:solidFill>
+                  <a:schemeClr val="accent2"/>
+                </a:solidFill>
+              </a:rPr>
+              <a:t> </a:t>
+            </a:r>
+            <a:r>
+              <a:rPr lang="en-US" dirty="0"/>
+              <a:t>nodes</a:t>
+            </a:r>
+            <a:endParaRPr lang="en-US" b="1" dirty="0"/>
+          </a:p>
+          <a:p>
+            <a:endParaRPr lang="en-US" dirty="0"/>
+          </a:p>
+        </p:txBody>
+      </p:sp>
+      <p:pic>
+        <p:nvPicPr>
+          <p:cNvPr id="4" name="Picture 3"/>
+          <p:cNvPicPr>
+            <a:picLocks noChangeAspect="1"/>
+          </p:cNvPicPr>
+          <p:nvPr/>
+        </p:nvPicPr>
+        <p:blipFill>
+          <a:blip r:embed="rId3">
+            <a:extLst>
+              <a:ext uri="{28A0092B-C50C-407E-A947-70E740481C1C}">
+                <a14:useLocalDpi xmlns:a14="http://schemas.microsoft.com/office/drawing/2010/main" val="0"/>
+              </a:ext>
+            </a:extLst>
+          </a:blip>
+          <a:stretch>
+            <a:fillRect/>
+          </a:stretch>
+        </p:blipFill>
+        <p:spPr>
+          <a:xfrm>
+            <a:off x="8216008" y="976500"/>
+            <a:ext cx="2657475" cy="4886325"/>
+          </a:xfrm>
+          <a:prstGeom prst="rect">
+            <a:avLst/>
+          </a:prstGeom>
+          <a:ln>
+            <a:solidFill>
+              <a:schemeClr val="bg1">
+                <a:lumMod val="75000"/>
+              </a:schemeClr>
+            </a:solidFill>
+          </a:ln>
+        </p:spPr>
+      </p:pic>
+    </p:spTree>
+    <p:extLst>
+      <p:ext uri="{BB962C8B-B14F-4D97-AF65-F5344CB8AC3E}">
+        <p14:creationId xmlns:p14="http://schemas.microsoft.com/office/powerpoint/2010/main" val="678717861"/>
+      </p:ext>
+    </p:extLst>
+  </p:cSld>
+  <p:clrMapOvr>
+    <a:masterClrMapping/>
+  </p:clrMapOvr>
+</p:sld>
+</file>
+
+<file path=ppt/slides/slide4.xml><?xml version="1.0" encoding="utf-8"?>
+<p:sld xmlns:a="http://schemas.openxmlformats.org/drawingml/2006/main" xmlns:r="http://schemas.openxmlformats.org/officeDocument/2006/relationships" xmlns:p="http://schemas.openxmlformats.org/presentationml/2006/main">
+  <p:cSld>
+    <p:spTree>
+      <p:nvGrpSpPr>
+        <p:cNvPr id="1" name=""/>
+        <p:cNvGrpSpPr/>
+        <p:nvPr/>
+      </p:nvGrpSpPr>
+      <p:grpSpPr>
+        <a:xfrm>
+          <a:off x="0" y="0"/>
+          <a:ext cx="0" cy="0"/>
+          <a:chOff x="0" y="0"/>
+          <a:chExt cx="0" cy="0"/>
+        </a:xfrm>
+      </p:grpSpPr>
+      <p:sp>
+        <p:nvSpPr>
+          <p:cNvPr id="2" name="Title 1"/>
+          <p:cNvSpPr>
+            <a:spLocks noGrp="1"/>
+          </p:cNvSpPr>
+          <p:nvPr>
+            <p:ph type="title"/>
+          </p:nvPr>
+        </p:nvSpPr>
+        <p:spPr/>
+        <p:txBody>
+          <a:bodyPr/>
+          <a:lstStyle/>
+          <a:p>
+            <a:r>
+              <a:rPr lang="en-US" dirty="0" smtClean="0"/>
+              <a:t>HPC in Azure</a:t>
+            </a:r>
+            <a:endParaRPr lang="en-US" dirty="0"/>
+          </a:p>
+        </p:txBody>
+      </p:sp>
+      <p:sp>
+        <p:nvSpPr>
+          <p:cNvPr id="3" name="Content Placeholder 2"/>
+          <p:cNvSpPr>
+            <a:spLocks noGrp="1"/>
+          </p:cNvSpPr>
+          <p:nvPr>
+            <p:ph idx="1"/>
+          </p:nvPr>
+        </p:nvSpPr>
+        <p:spPr/>
+        <p:txBody>
+          <a:bodyPr/>
+          <a:lstStyle/>
+          <a:p>
+            <a:r>
+              <a:rPr lang="en-US" dirty="0"/>
+              <a:t>Run massively parallel compute jobs in the cloud</a:t>
+            </a:r>
+          </a:p>
+          <a:p>
+            <a:pPr lvl="1"/>
+            <a:r>
+              <a:rPr lang="en-US" dirty="0"/>
+              <a:t>Photorealistic 3D rendering</a:t>
+            </a:r>
+          </a:p>
+          <a:p>
+            <a:pPr lvl="1"/>
+            <a:r>
+              <a:rPr lang="en-US" dirty="0"/>
+              <a:t>Brute force </a:t>
+            </a:r>
+            <a:r>
+              <a:rPr lang="en-US" dirty="0" err="1"/>
+              <a:t>cryptographical</a:t>
+            </a:r>
+            <a:r>
+              <a:rPr lang="en-US" dirty="0"/>
+              <a:t> analysis</a:t>
+            </a:r>
+          </a:p>
+          <a:p>
+            <a:pPr lvl="1"/>
+            <a:r>
+              <a:rPr lang="en-US" dirty="0" smtClean="0"/>
+              <a:t>Financial </a:t>
+            </a:r>
+            <a:r>
+              <a:rPr lang="en-US" dirty="0"/>
+              <a:t>risk modeling, genomics research, and more</a:t>
+            </a:r>
+          </a:p>
+          <a:p>
+            <a:r>
+              <a:rPr lang="en-US" dirty="0"/>
+              <a:t>Deploy an HPC cluster in minutes and scale as needed</a:t>
+            </a:r>
+          </a:p>
+          <a:p>
+            <a:r>
+              <a:rPr lang="en-US" dirty="0"/>
+              <a:t>Automate deployments with deployment templates</a:t>
+            </a:r>
+          </a:p>
+          <a:p>
+            <a:r>
+              <a:rPr lang="en-US" dirty="0"/>
+              <a:t>Combine with Azure Batch for batch scheduling and compute management (</a:t>
+            </a:r>
+            <a:r>
+              <a:rPr lang="en-US" dirty="0">
+                <a:hlinkClick r:id="rId3"/>
+              </a:rPr>
+              <a:t>http://bit.ly/a4r-batch</a:t>
+            </a:r>
+            <a:r>
+              <a:rPr lang="en-US" dirty="0" smtClean="0"/>
+              <a:t>)</a:t>
+            </a:r>
+          </a:p>
+          <a:p>
+            <a:r>
+              <a:rPr lang="en-US" dirty="0" smtClean="0"/>
+              <a:t>Linux or Windows</a:t>
+            </a:r>
+            <a:endParaRPr lang="en-US" dirty="0"/>
+          </a:p>
+        </p:txBody>
+      </p:sp>
+    </p:spTree>
+    <p:extLst>
+      <p:ext uri="{BB962C8B-B14F-4D97-AF65-F5344CB8AC3E}">
+        <p14:creationId xmlns:p14="http://schemas.microsoft.com/office/powerpoint/2010/main" val="3204493886"/>
+      </p:ext>
+    </p:extLst>
+  </p:cSld>
+  <p:clrMapOvr>
+    <a:masterClrMapping/>
+  </p:clrMapOvr>
+</p:sld>
+</file>
+
+<file path=ppt/slides/slide5.xml><?xml version="1.0" encoding="utf-8"?>
 <p:sld xmlns:a="http://schemas.openxmlformats.org/drawingml/2006/main" xmlns:r="http://schemas.openxmlformats.org/officeDocument/2006/relationships" xmlns:p="http://schemas.openxmlformats.org/presentationml/2006/main">
   <p:cSld>
     <p:spTree>
@@ -26113,7 +27095,7 @@
 </p:sld>
 </file>
 
-<file path=ppt/slides/slide4.xml><?xml version="1.0" encoding="utf-8"?>
+<file path=ppt/slides/slide6.xml><?xml version="1.0" encoding="utf-8"?>
 <p:sld xmlns:a="http://schemas.openxmlformats.org/drawingml/2006/main" xmlns:r="http://schemas.openxmlformats.org/officeDocument/2006/relationships" xmlns:p="http://schemas.openxmlformats.org/presentationml/2006/main">
   <p:cSld>
     <p:spTree>
@@ -27699,7 +28681,7 @@
 </p:sld>
 </file>
 
-<file path=ppt/slides/slide5.xml><?xml version="1.0" encoding="utf-8"?>
+<file path=ppt/slides/slide7.xml><?xml version="1.0" encoding="utf-8"?>
 <p:sld xmlns:a="http://schemas.openxmlformats.org/drawingml/2006/main" xmlns:r="http://schemas.openxmlformats.org/officeDocument/2006/relationships" xmlns:p="http://schemas.openxmlformats.org/presentationml/2006/main">
   <p:cSld>
     <p:spTree>
@@ -29105,7 +30087,7 @@
 </p:sld>
 </file>
 
-<file path=ppt/slides/slide6.xml><?xml version="1.0" encoding="utf-8"?>
+<file path=ppt/slides/slide8.xml><?xml version="1.0" encoding="utf-8"?>
 <p:sld xmlns:a="http://schemas.openxmlformats.org/drawingml/2006/main" xmlns:r="http://schemas.openxmlformats.org/officeDocument/2006/relationships" xmlns:p="http://schemas.openxmlformats.org/presentationml/2006/main">
   <p:cSld>
     <p:spTree>
@@ -29235,7 +30217,7 @@
 </p:sld>
 </file>
 
-<file path=ppt/slides/slide7.xml><?xml version="1.0" encoding="utf-8"?>
+<file path=ppt/slides/slide9.xml><?xml version="1.0" encoding="utf-8"?>
 <p:sld xmlns:a="http://schemas.openxmlformats.org/drawingml/2006/main" xmlns:r="http://schemas.openxmlformats.org/officeDocument/2006/relationships" xmlns:p="http://schemas.openxmlformats.org/presentationml/2006/main">
   <p:cSld>
     <p:spTree>
@@ -29363,367 +30345,6 @@
     <p:extLst>
       <p:ext uri="{BB962C8B-B14F-4D97-AF65-F5344CB8AC3E}">
         <p14:creationId xmlns:p14="http://schemas.microsoft.com/office/powerpoint/2010/main" val="2812936699"/>
-      </p:ext>
-    </p:extLst>
-  </p:cSld>
-  <p:clrMapOvr>
-    <a:masterClrMapping/>
-  </p:clrMapOvr>
-</p:sld>
-</file>
-
-<file path=ppt/slides/slide8.xml><?xml version="1.0" encoding="utf-8"?>
-<p:sld xmlns:a="http://schemas.openxmlformats.org/drawingml/2006/main" xmlns:r="http://schemas.openxmlformats.org/officeDocument/2006/relationships" xmlns:p="http://schemas.openxmlformats.org/presentationml/2006/main">
-  <p:cSld>
-    <p:spTree>
-      <p:nvGrpSpPr>
-        <p:cNvPr id="1" name=""/>
-        <p:cNvGrpSpPr/>
-        <p:nvPr/>
-      </p:nvGrpSpPr>
-      <p:grpSpPr>
-        <a:xfrm>
-          <a:off x="0" y="0"/>
-          <a:ext cx="0" cy="0"/>
-          <a:chOff x="0" y="0"/>
-          <a:chExt cx="0" cy="0"/>
-        </a:xfrm>
-      </p:grpSpPr>
-      <p:sp>
-        <p:nvSpPr>
-          <p:cNvPr id="2" name="Title 1"/>
-          <p:cNvSpPr>
-            <a:spLocks noGrp="1"/>
-          </p:cNvSpPr>
-          <p:nvPr>
-            <p:ph type="title"/>
-          </p:nvPr>
-        </p:nvSpPr>
-        <p:spPr/>
-        <p:txBody>
-          <a:bodyPr/>
-          <a:lstStyle/>
-          <a:p>
-            <a:r>
-              <a:rPr lang="en-US" dirty="0" smtClean="0"/>
-              <a:t>Azure </a:t>
-            </a:r>
-            <a:r>
-              <a:rPr lang="en-US" dirty="0" err="1" smtClean="0"/>
-              <a:t>Quickstart</a:t>
-            </a:r>
-            <a:r>
-              <a:rPr lang="en-US" dirty="0" smtClean="0"/>
-              <a:t> Templates</a:t>
-            </a:r>
-            <a:endParaRPr lang="en-US" dirty="0"/>
-          </a:p>
-        </p:txBody>
-      </p:sp>
-      <p:sp>
-        <p:nvSpPr>
-          <p:cNvPr id="3" name="Content Placeholder 2"/>
-          <p:cNvSpPr>
-            <a:spLocks noGrp="1"/>
-          </p:cNvSpPr>
-          <p:nvPr>
-            <p:ph idx="1"/>
-          </p:nvPr>
-        </p:nvSpPr>
-        <p:spPr/>
-        <p:txBody>
-          <a:bodyPr/>
-          <a:lstStyle/>
-          <a:p>
-            <a:r>
-              <a:rPr lang="en-US" dirty="0"/>
-              <a:t>Free, open-source deployment templates</a:t>
-            </a:r>
-          </a:p>
-          <a:p>
-            <a:endParaRPr lang="en-US" dirty="0"/>
-          </a:p>
-          <a:p>
-            <a:endParaRPr lang="en-US" dirty="0"/>
-          </a:p>
-          <a:p>
-            <a:endParaRPr lang="en-US" dirty="0"/>
-          </a:p>
-          <a:p>
-            <a:endParaRPr lang="en-US" dirty="0"/>
-          </a:p>
-          <a:p>
-            <a:endParaRPr lang="en-US" dirty="0"/>
-          </a:p>
-          <a:p>
-            <a:r>
-              <a:rPr lang="en-US" dirty="0"/>
-              <a:t>Find them on the Azure site (</a:t>
-            </a:r>
-            <a:r>
-              <a:rPr lang="en-US" dirty="0">
-                <a:hlinkClick r:id="rId3"/>
-              </a:rPr>
-              <a:t>http://bit.ly/a4r-quickstart</a:t>
-            </a:r>
-            <a:r>
-              <a:rPr lang="en-US" dirty="0"/>
-              <a:t>)</a:t>
-            </a:r>
-          </a:p>
-          <a:p>
-            <a:r>
-              <a:rPr lang="en-US" dirty="0"/>
-              <a:t>Or browse them on GitHub (</a:t>
-            </a:r>
-            <a:r>
-              <a:rPr lang="en-US" dirty="0">
-                <a:hlinkClick r:id="rId4"/>
-              </a:rPr>
-              <a:t>http://</a:t>
-            </a:r>
-            <a:r>
-              <a:rPr lang="en-US" dirty="0" smtClean="0">
-                <a:hlinkClick r:id="rId4"/>
-              </a:rPr>
-              <a:t>bit.ly/a4r-github</a:t>
-            </a:r>
-            <a:r>
-              <a:rPr lang="en-US" dirty="0" smtClean="0"/>
-              <a:t>)</a:t>
-            </a:r>
-          </a:p>
-          <a:p>
-            <a:pPr marL="0" indent="0">
-              <a:buNone/>
-            </a:pPr>
-            <a:endParaRPr lang="en-US" dirty="0"/>
-          </a:p>
-        </p:txBody>
-      </p:sp>
-      <p:pic>
-        <p:nvPicPr>
-          <p:cNvPr id="4" name="Picture 3"/>
-          <p:cNvPicPr>
-            <a:picLocks noChangeAspect="1"/>
-          </p:cNvPicPr>
-          <p:nvPr/>
-        </p:nvPicPr>
-        <p:blipFill>
-          <a:blip r:embed="rId5"/>
-          <a:stretch>
-            <a:fillRect/>
-          </a:stretch>
-        </p:blipFill>
-        <p:spPr>
-          <a:xfrm>
-            <a:off x="981075" y="2716411"/>
-            <a:ext cx="2914650" cy="1666875"/>
-          </a:xfrm>
-          <a:prstGeom prst="rect">
-            <a:avLst/>
-          </a:prstGeom>
-          <a:ln>
-            <a:solidFill>
-              <a:schemeClr val="accent2"/>
-            </a:solidFill>
-          </a:ln>
-        </p:spPr>
-      </p:pic>
-      <p:pic>
-        <p:nvPicPr>
-          <p:cNvPr id="5" name="Picture 4"/>
-          <p:cNvPicPr>
-            <a:picLocks noChangeAspect="1"/>
-          </p:cNvPicPr>
-          <p:nvPr/>
-        </p:nvPicPr>
-        <p:blipFill>
-          <a:blip r:embed="rId6"/>
-          <a:stretch>
-            <a:fillRect/>
-          </a:stretch>
-        </p:blipFill>
-        <p:spPr>
-          <a:xfrm>
-            <a:off x="4564226" y="2716411"/>
-            <a:ext cx="2924175" cy="1666875"/>
-          </a:xfrm>
-          <a:prstGeom prst="rect">
-            <a:avLst/>
-          </a:prstGeom>
-          <a:ln>
-            <a:solidFill>
-              <a:schemeClr val="accent2"/>
-            </a:solidFill>
-          </a:ln>
-        </p:spPr>
-      </p:pic>
-      <p:pic>
-        <p:nvPicPr>
-          <p:cNvPr id="6" name="Picture 5"/>
-          <p:cNvPicPr>
-            <a:picLocks noChangeAspect="1"/>
-          </p:cNvPicPr>
-          <p:nvPr/>
-        </p:nvPicPr>
-        <p:blipFill>
-          <a:blip r:embed="rId7"/>
-          <a:stretch>
-            <a:fillRect/>
-          </a:stretch>
-        </p:blipFill>
-        <p:spPr>
-          <a:xfrm>
-            <a:off x="8156903" y="2716411"/>
-            <a:ext cx="2914650" cy="1666875"/>
-          </a:xfrm>
-          <a:prstGeom prst="rect">
-            <a:avLst/>
-          </a:prstGeom>
-          <a:ln>
-            <a:solidFill>
-              <a:schemeClr val="accent2"/>
-            </a:solidFill>
-          </a:ln>
-        </p:spPr>
-      </p:pic>
-    </p:spTree>
-    <p:extLst>
-      <p:ext uri="{BB962C8B-B14F-4D97-AF65-F5344CB8AC3E}">
-        <p14:creationId xmlns:p14="http://schemas.microsoft.com/office/powerpoint/2010/main" val="3324523628"/>
-      </p:ext>
-    </p:extLst>
-  </p:cSld>
-  <p:clrMapOvr>
-    <a:masterClrMapping/>
-  </p:clrMapOvr>
-</p:sld>
-</file>
-
-<file path=ppt/slides/slide9.xml><?xml version="1.0" encoding="utf-8"?>
-<p:sld xmlns:a="http://schemas.openxmlformats.org/drawingml/2006/main" xmlns:r="http://schemas.openxmlformats.org/officeDocument/2006/relationships" xmlns:p="http://schemas.openxmlformats.org/presentationml/2006/main">
-  <p:cSld>
-    <p:spTree>
-      <p:nvGrpSpPr>
-        <p:cNvPr id="1" name=""/>
-        <p:cNvGrpSpPr/>
-        <p:nvPr/>
-      </p:nvGrpSpPr>
-      <p:grpSpPr>
-        <a:xfrm>
-          <a:off x="0" y="0"/>
-          <a:ext cx="0" cy="0"/>
-          <a:chOff x="0" y="0"/>
-          <a:chExt cx="0" cy="0"/>
-        </a:xfrm>
-      </p:grpSpPr>
-      <p:sp>
-        <p:nvSpPr>
-          <p:cNvPr id="2" name="Title 1"/>
-          <p:cNvSpPr>
-            <a:spLocks noGrp="1"/>
-          </p:cNvSpPr>
-          <p:nvPr>
-            <p:ph type="title"/>
-          </p:nvPr>
-        </p:nvSpPr>
-        <p:spPr/>
-        <p:txBody>
-          <a:bodyPr/>
-          <a:lstStyle/>
-          <a:p>
-            <a:r>
-              <a:rPr lang="en-US" dirty="0" smtClean="0"/>
-              <a:t>SLURM Clusters</a:t>
-            </a:r>
-            <a:endParaRPr lang="en-US" dirty="0"/>
-          </a:p>
-        </p:txBody>
-      </p:sp>
-      <p:sp>
-        <p:nvSpPr>
-          <p:cNvPr id="3" name="Content Placeholder 2"/>
-          <p:cNvSpPr>
-            <a:spLocks noGrp="1"/>
-          </p:cNvSpPr>
-          <p:nvPr>
-            <p:ph idx="1"/>
-          </p:nvPr>
-        </p:nvSpPr>
-        <p:spPr/>
-        <p:txBody>
-          <a:bodyPr/>
-          <a:lstStyle/>
-          <a:p>
-            <a:r>
-              <a:rPr lang="en-US" dirty="0"/>
-              <a:t>Simple Linux Utility for Resource Management (SLURM)</a:t>
-            </a:r>
-          </a:p>
-          <a:p>
-            <a:r>
-              <a:rPr lang="en-US" dirty="0" err="1"/>
-              <a:t>Quickstart</a:t>
-            </a:r>
-            <a:r>
-              <a:rPr lang="en-US" dirty="0"/>
-              <a:t> template at </a:t>
-            </a:r>
-            <a:r>
-              <a:rPr lang="en-US" dirty="0">
-                <a:hlinkClick r:id="rId3"/>
-              </a:rPr>
-              <a:t>http://bit.ly/a4r-slurm</a:t>
-            </a:r>
-            <a:r>
-              <a:rPr lang="en-US" dirty="0"/>
-              <a:t> enables easy deployment of SLURM clusters of user-specified </a:t>
-            </a:r>
-            <a:r>
-              <a:rPr lang="en-US" dirty="0" smtClean="0"/>
-              <a:t>sizes</a:t>
-            </a:r>
-            <a:endParaRPr lang="en-US" dirty="0"/>
-          </a:p>
-        </p:txBody>
-      </p:sp>
-      <p:pic>
-        <p:nvPicPr>
-          <p:cNvPr id="4" name="Picture 3"/>
-          <p:cNvPicPr>
-            <a:picLocks noChangeAspect="1"/>
-          </p:cNvPicPr>
-          <p:nvPr/>
-        </p:nvPicPr>
-        <p:blipFill>
-          <a:blip r:embed="rId4"/>
-          <a:stretch>
-            <a:fillRect/>
-          </a:stretch>
-        </p:blipFill>
-        <p:spPr>
-          <a:xfrm>
-            <a:off x="3174205" y="3542756"/>
-            <a:ext cx="5842001" cy="2769144"/>
-          </a:xfrm>
-          <a:prstGeom prst="rect">
-            <a:avLst/>
-          </a:prstGeom>
-          <a:ln>
-            <a:solidFill>
-              <a:schemeClr val="bg1">
-                <a:lumMod val="75000"/>
-              </a:schemeClr>
-            </a:solidFill>
-          </a:ln>
-          <a:effectLst/>
-        </p:spPr>
-      </p:pic>
-    </p:spTree>
-    <p:extLst>
-      <p:ext uri="{BB962C8B-B14F-4D97-AF65-F5344CB8AC3E}">
-        <p14:creationId xmlns:p14="http://schemas.microsoft.com/office/powerpoint/2010/main" val="2739371626"/>
       </p:ext>
     </p:extLst>
   </p:cSld>

</xml_diff>